<commit_message>
Moved src folder to inside the thesis, so that LaTeX is able to read the code
</commit_message>
<xml_diff>
--- a/presentations/TG2_Apresentacao_Cassio.pptx
+++ b/presentations/TG2_Apresentacao_Cassio.pptx
@@ -16044,18 +16044,7 @@
                 <a:ea typeface="Helvetica" charset="0"/>
                 <a:cs typeface="Helvetica" charset="0"/>
               </a:rPr>
-              <a:t>An</a:t>
-            </a:r>
-            <a:r>
-              <a:rPr lang="en-US" sz="2000" dirty="0" err="1" smtClean="0">
-                <a:solidFill>
-                  <a:schemeClr val="tx1"/>
-                </a:solidFill>
-                <a:latin typeface="Helvetica" charset="0"/>
-                <a:ea typeface="Helvetica" charset="0"/>
-                <a:cs typeface="Helvetica" charset="0"/>
-              </a:rPr>
-              <a:t>álises</a:t>
+              <a:t>Análises</a:t>
             </a:r>
             <a:r>
               <a:rPr lang="en-US" sz="2000" dirty="0" smtClean="0">
@@ -16445,18 +16434,7 @@
                 <a:ea typeface="Helvetica" charset="0"/>
                 <a:cs typeface="Helvetica" charset="0"/>
               </a:rPr>
-              <a:t>evolu</a:t>
-            </a:r>
-            <a:r>
-              <a:rPr lang="en-US" sz="2000" dirty="0" err="1" smtClean="0">
-                <a:solidFill>
-                  <a:schemeClr val="tx1"/>
-                </a:solidFill>
-                <a:latin typeface="Helvetica" charset="0"/>
-                <a:ea typeface="Helvetica" charset="0"/>
-                <a:cs typeface="Helvetica" charset="0"/>
-              </a:rPr>
-              <a:t>ção</a:t>
+              <a:t>evolução</a:t>
             </a:r>
             <a:endParaRPr lang="en-US" sz="2000" dirty="0" smtClean="0">
               <a:solidFill>
@@ -16499,18 +16477,7 @@
                 <a:ea typeface="Helvetica" charset="0"/>
                 <a:cs typeface="Helvetica" charset="0"/>
               </a:rPr>
-              <a:t>Gen</a:t>
-            </a:r>
-            <a:r>
-              <a:rPr lang="en-US" sz="2000" b="1" dirty="0" err="1" smtClean="0">
-                <a:solidFill>
-                  <a:schemeClr val="tx1"/>
-                </a:solidFill>
-                <a:latin typeface="Helvetica" charset="0"/>
-                <a:ea typeface="Helvetica" charset="0"/>
-                <a:cs typeface="Helvetica" charset="0"/>
-              </a:rPr>
-              <a:t>ético</a:t>
+              <a:t>Genético</a:t>
             </a:r>
             <a:r>
               <a:rPr lang="en-US" sz="2000" b="1" dirty="0" smtClean="0">
@@ -17097,26 +17064,50 @@
           <a:lstStyle/>
           <a:p>
             <a:r>
-              <a:rPr lang="en-US" dirty="0" err="1" smtClean="0"/>
+              <a:rPr lang="en-US" b="1" dirty="0" err="1" smtClean="0">
+                <a:latin typeface="Helvetica" charset="0"/>
+                <a:ea typeface="Helvetica" charset="0"/>
+                <a:cs typeface="Helvetica" charset="0"/>
+              </a:rPr>
               <a:t>Algoritmo</a:t>
             </a:r>
             <a:r>
-              <a:rPr lang="en-US" dirty="0" smtClean="0"/>
+              <a:rPr lang="en-US" b="1" dirty="0" smtClean="0">
+                <a:latin typeface="Helvetica" charset="0"/>
+                <a:ea typeface="Helvetica" charset="0"/>
+                <a:cs typeface="Helvetica" charset="0"/>
+              </a:rPr>
               <a:t> </a:t>
             </a:r>
             <a:r>
-              <a:rPr lang="en-US" dirty="0" err="1" smtClean="0"/>
+              <a:rPr lang="en-US" b="1" dirty="0" err="1" smtClean="0">
+                <a:latin typeface="Helvetica" charset="0"/>
+                <a:ea typeface="Helvetica" charset="0"/>
+                <a:cs typeface="Helvetica" charset="0"/>
+              </a:rPr>
               <a:t>Evolutivo</a:t>
             </a:r>
             <a:r>
-              <a:rPr lang="en-US" dirty="0" smtClean="0"/>
-              <a:t> (AE) - </a:t>
-            </a:r>
-            <a:r>
-              <a:rPr lang="en-US" dirty="0" err="1" smtClean="0"/>
-              <a:t>Definição</a:t>
-            </a:r>
-            <a:endParaRPr lang="en-US" dirty="0"/>
+              <a:rPr lang="en-US" b="1" dirty="0" smtClean="0">
+                <a:latin typeface="Helvetica" charset="0"/>
+                <a:ea typeface="Helvetica" charset="0"/>
+                <a:cs typeface="Helvetica" charset="0"/>
+              </a:rPr>
+              <a:t> (AE</a:t>
+            </a:r>
+            <a:r>
+              <a:rPr lang="en-US" b="1" dirty="0" smtClean="0">
+                <a:latin typeface="Helvetica" charset="0"/>
+                <a:ea typeface="Helvetica" charset="0"/>
+                <a:cs typeface="Helvetica" charset="0"/>
+              </a:rPr>
+              <a:t>)</a:t>
+            </a:r>
+            <a:endParaRPr lang="en-US" b="1" dirty="0">
+              <a:latin typeface="Helvetica" charset="0"/>
+              <a:ea typeface="Helvetica" charset="0"/>
+              <a:cs typeface="Helvetica" charset="0"/>
+            </a:endParaRPr>
           </a:p>
         </p:txBody>
       </p:sp>
@@ -17138,252 +17129,668 @@
           <a:lstStyle/>
           <a:p>
             <a:r>
-              <a:rPr lang="en-US" dirty="0" err="1" smtClean="0"/>
+              <a:rPr lang="en-US" dirty="0" err="1" smtClean="0">
+                <a:solidFill>
+                  <a:schemeClr val="tx1"/>
+                </a:solidFill>
+                <a:latin typeface="Helvetica" charset="0"/>
+                <a:ea typeface="Helvetica" charset="0"/>
+                <a:cs typeface="Helvetica" charset="0"/>
+              </a:rPr>
               <a:t>Encontrar</a:t>
             </a:r>
             <a:r>
-              <a:rPr lang="en-US" dirty="0" smtClean="0"/>
+              <a:rPr lang="en-US" dirty="0" smtClean="0">
+                <a:solidFill>
+                  <a:schemeClr val="tx1"/>
+                </a:solidFill>
+                <a:latin typeface="Helvetica" charset="0"/>
+                <a:ea typeface="Helvetica" charset="0"/>
+                <a:cs typeface="Helvetica" charset="0"/>
+              </a:rPr>
               <a:t> </a:t>
             </a:r>
             <a:r>
-              <a:rPr lang="en-US" dirty="0" err="1" smtClean="0"/>
+              <a:rPr lang="en-US" dirty="0" err="1" smtClean="0">
+                <a:solidFill>
+                  <a:schemeClr val="tx1"/>
+                </a:solidFill>
+                <a:latin typeface="Helvetica" charset="0"/>
+                <a:ea typeface="Helvetica" charset="0"/>
+                <a:cs typeface="Helvetica" charset="0"/>
+              </a:rPr>
               <a:t>soluções</a:t>
             </a:r>
             <a:r>
-              <a:rPr lang="en-US" dirty="0" smtClean="0"/>
+              <a:rPr lang="en-US" dirty="0" smtClean="0">
+                <a:solidFill>
+                  <a:schemeClr val="tx1"/>
+                </a:solidFill>
+                <a:latin typeface="Helvetica" charset="0"/>
+                <a:ea typeface="Helvetica" charset="0"/>
+                <a:cs typeface="Helvetica" charset="0"/>
+              </a:rPr>
               <a:t> </a:t>
             </a:r>
             <a:r>
-              <a:rPr lang="en-US" dirty="0" err="1" smtClean="0"/>
+              <a:rPr lang="en-US" dirty="0" err="1" smtClean="0">
+                <a:solidFill>
+                  <a:schemeClr val="tx1"/>
+                </a:solidFill>
+                <a:latin typeface="Helvetica" charset="0"/>
+                <a:ea typeface="Helvetica" charset="0"/>
+                <a:cs typeface="Helvetica" charset="0"/>
+              </a:rPr>
               <a:t>enquanto</a:t>
             </a:r>
             <a:r>
-              <a:rPr lang="en-US" dirty="0" smtClean="0"/>
+              <a:rPr lang="en-US" dirty="0" smtClean="0">
+                <a:solidFill>
+                  <a:schemeClr val="tx1"/>
+                </a:solidFill>
+                <a:latin typeface="Helvetica" charset="0"/>
+                <a:ea typeface="Helvetica" charset="0"/>
+                <a:cs typeface="Helvetica" charset="0"/>
+              </a:rPr>
               <a:t> se </a:t>
             </a:r>
             <a:r>
-              <a:rPr lang="en-US" dirty="0" err="1" smtClean="0"/>
+              <a:rPr lang="en-US" dirty="0" err="1" smtClean="0">
+                <a:solidFill>
+                  <a:schemeClr val="tx1"/>
+                </a:solidFill>
+                <a:latin typeface="Helvetica" charset="0"/>
+                <a:ea typeface="Helvetica" charset="0"/>
+                <a:cs typeface="Helvetica" charset="0"/>
+              </a:rPr>
               <a:t>interage</a:t>
             </a:r>
             <a:r>
-              <a:rPr lang="en-US" dirty="0" smtClean="0"/>
+              <a:rPr lang="en-US" dirty="0" smtClean="0">
+                <a:solidFill>
+                  <a:schemeClr val="tx1"/>
+                </a:solidFill>
+                <a:latin typeface="Helvetica" charset="0"/>
+                <a:ea typeface="Helvetica" charset="0"/>
+                <a:cs typeface="Helvetica" charset="0"/>
+              </a:rPr>
               <a:t> com o </a:t>
             </a:r>
             <a:r>
-              <a:rPr lang="en-US" dirty="0" err="1" smtClean="0"/>
+              <a:rPr lang="en-US" dirty="0" err="1" smtClean="0">
+                <a:solidFill>
+                  <a:schemeClr val="tx1"/>
+                </a:solidFill>
+                <a:latin typeface="Helvetica" charset="0"/>
+                <a:ea typeface="Helvetica" charset="0"/>
+                <a:cs typeface="Helvetica" charset="0"/>
+              </a:rPr>
               <a:t>problema</a:t>
             </a:r>
-            <a:endParaRPr lang="en-US" dirty="0" smtClean="0"/>
-          </a:p>
-          <a:p>
-            <a:r>
-              <a:rPr lang="en-US" dirty="0" smtClean="0"/>
+            <a:endParaRPr lang="en-US" dirty="0" smtClean="0">
+              <a:solidFill>
+                <a:schemeClr val="tx1"/>
+              </a:solidFill>
+              <a:latin typeface="Helvetica" charset="0"/>
+              <a:ea typeface="Helvetica" charset="0"/>
+              <a:cs typeface="Helvetica" charset="0"/>
+            </a:endParaRPr>
+          </a:p>
+          <a:p>
+            <a:r>
+              <a:rPr lang="en-US" dirty="0" smtClean="0">
+                <a:solidFill>
+                  <a:schemeClr val="tx1"/>
+                </a:solidFill>
+                <a:latin typeface="Helvetica" charset="0"/>
+                <a:ea typeface="Helvetica" charset="0"/>
+                <a:cs typeface="Helvetica" charset="0"/>
+              </a:rPr>
               <a:t>Base </a:t>
             </a:r>
             <a:r>
-              <a:rPr lang="en-US" dirty="0" err="1" smtClean="0"/>
+              <a:rPr lang="en-US" dirty="0" err="1" smtClean="0">
+                <a:solidFill>
+                  <a:schemeClr val="tx1"/>
+                </a:solidFill>
+                <a:latin typeface="Helvetica" charset="0"/>
+                <a:ea typeface="Helvetica" charset="0"/>
+                <a:cs typeface="Helvetica" charset="0"/>
+              </a:rPr>
               <a:t>na</a:t>
             </a:r>
             <a:r>
-              <a:rPr lang="en-US" dirty="0" smtClean="0"/>
+              <a:rPr lang="en-US" dirty="0" smtClean="0">
+                <a:solidFill>
+                  <a:schemeClr val="tx1"/>
+                </a:solidFill>
+                <a:latin typeface="Helvetica" charset="0"/>
+                <a:ea typeface="Helvetica" charset="0"/>
+                <a:cs typeface="Helvetica" charset="0"/>
+              </a:rPr>
               <a:t> </a:t>
             </a:r>
             <a:r>
-              <a:rPr lang="en-US" dirty="0" err="1" smtClean="0"/>
+              <a:rPr lang="en-US" dirty="0" err="1" smtClean="0">
+                <a:solidFill>
+                  <a:schemeClr val="tx1"/>
+                </a:solidFill>
+                <a:latin typeface="Helvetica" charset="0"/>
+                <a:ea typeface="Helvetica" charset="0"/>
+                <a:cs typeface="Helvetica" charset="0"/>
+              </a:rPr>
               <a:t>tentativa</a:t>
             </a:r>
             <a:r>
-              <a:rPr lang="en-US" dirty="0" smtClean="0"/>
+              <a:rPr lang="en-US" dirty="0" smtClean="0">
+                <a:solidFill>
+                  <a:schemeClr val="tx1"/>
+                </a:solidFill>
+                <a:latin typeface="Helvetica" charset="0"/>
+                <a:ea typeface="Helvetica" charset="0"/>
+                <a:cs typeface="Helvetica" charset="0"/>
+              </a:rPr>
               <a:t>-e-</a:t>
             </a:r>
             <a:r>
-              <a:rPr lang="en-US" dirty="0" err="1" smtClean="0"/>
+              <a:rPr lang="en-US" dirty="0" err="1" smtClean="0">
+                <a:solidFill>
+                  <a:schemeClr val="tx1"/>
+                </a:solidFill>
+                <a:latin typeface="Helvetica" charset="0"/>
+                <a:ea typeface="Helvetica" charset="0"/>
+                <a:cs typeface="Helvetica" charset="0"/>
+              </a:rPr>
               <a:t>erro</a:t>
             </a:r>
             <a:r>
-              <a:rPr lang="en-US" dirty="0" smtClean="0"/>
+              <a:rPr lang="en-US" dirty="0" smtClean="0">
+                <a:solidFill>
+                  <a:schemeClr val="tx1"/>
+                </a:solidFill>
+                <a:latin typeface="Helvetica" charset="0"/>
+                <a:ea typeface="Helvetica" charset="0"/>
+                <a:cs typeface="Helvetica" charset="0"/>
+              </a:rPr>
               <a:t> </a:t>
             </a:r>
             <a:r>
               <a:rPr lang="en-US" b="1" baseline="30000" dirty="0" smtClean="0">
                 <a:solidFill>
-                  <a:srgbClr val="0432FF"/>
-                </a:solidFill>
+                  <a:schemeClr val="tx1"/>
+                </a:solidFill>
+                <a:latin typeface="Helvetica" charset="0"/>
+                <a:ea typeface="Helvetica" charset="0"/>
+                <a:cs typeface="Helvetica" charset="0"/>
               </a:rPr>
               <a:t>[1]</a:t>
             </a:r>
           </a:p>
           <a:p>
             <a:r>
-              <a:rPr lang="en-US" dirty="0" err="1" smtClean="0"/>
+              <a:rPr lang="en-US" dirty="0" err="1" smtClean="0">
+                <a:solidFill>
+                  <a:schemeClr val="tx1"/>
+                </a:solidFill>
+                <a:latin typeface="Helvetica" charset="0"/>
+                <a:ea typeface="Helvetica" charset="0"/>
+                <a:cs typeface="Helvetica" charset="0"/>
+              </a:rPr>
               <a:t>Mesmos</a:t>
             </a:r>
             <a:r>
-              <a:rPr lang="en-US" dirty="0" smtClean="0"/>
+              <a:rPr lang="en-US" dirty="0" smtClean="0">
+                <a:solidFill>
+                  <a:schemeClr val="tx1"/>
+                </a:solidFill>
+                <a:latin typeface="Helvetica" charset="0"/>
+                <a:ea typeface="Helvetica" charset="0"/>
+                <a:cs typeface="Helvetica" charset="0"/>
+              </a:rPr>
               <a:t> </a:t>
             </a:r>
             <a:r>
-              <a:rPr lang="en-US" dirty="0" err="1" smtClean="0"/>
+              <a:rPr lang="en-US" dirty="0" err="1" smtClean="0">
+                <a:solidFill>
+                  <a:schemeClr val="tx1"/>
+                </a:solidFill>
+                <a:latin typeface="Helvetica" charset="0"/>
+                <a:ea typeface="Helvetica" charset="0"/>
+                <a:cs typeface="Helvetica" charset="0"/>
+              </a:rPr>
               <a:t>princípios</a:t>
             </a:r>
             <a:r>
-              <a:rPr lang="en-US" dirty="0" smtClean="0"/>
+              <a:rPr lang="en-US" dirty="0" smtClean="0">
+                <a:solidFill>
+                  <a:schemeClr val="tx1"/>
+                </a:solidFill>
+                <a:latin typeface="Helvetica" charset="0"/>
+                <a:ea typeface="Helvetica" charset="0"/>
+                <a:cs typeface="Helvetica" charset="0"/>
+              </a:rPr>
               <a:t> da </a:t>
             </a:r>
             <a:r>
-              <a:rPr lang="en-US" dirty="0" err="1" smtClean="0"/>
+              <a:rPr lang="en-US" dirty="0" err="1" smtClean="0">
+                <a:solidFill>
+                  <a:schemeClr val="tx1"/>
+                </a:solidFill>
+                <a:latin typeface="Helvetica" charset="0"/>
+                <a:ea typeface="Helvetica" charset="0"/>
+                <a:cs typeface="Helvetica" charset="0"/>
+              </a:rPr>
               <a:t>seleção</a:t>
             </a:r>
             <a:r>
-              <a:rPr lang="en-US" dirty="0" smtClean="0"/>
+              <a:rPr lang="en-US" dirty="0" smtClean="0">
+                <a:solidFill>
+                  <a:schemeClr val="tx1"/>
+                </a:solidFill>
+                <a:latin typeface="Helvetica" charset="0"/>
+                <a:ea typeface="Helvetica" charset="0"/>
+                <a:cs typeface="Helvetica" charset="0"/>
+              </a:rPr>
               <a:t> natural:</a:t>
             </a:r>
           </a:p>
           <a:p>
             <a:pPr lvl="1"/>
             <a:r>
-              <a:rPr lang="en-US" dirty="0" err="1" smtClean="0"/>
+              <a:rPr lang="en-US" dirty="0" err="1" smtClean="0">
+                <a:solidFill>
+                  <a:schemeClr val="tx1"/>
+                </a:solidFill>
+                <a:latin typeface="Helvetica" charset="0"/>
+                <a:ea typeface="Helvetica" charset="0"/>
+                <a:cs typeface="Helvetica" charset="0"/>
+              </a:rPr>
               <a:t>Variação</a:t>
             </a:r>
             <a:r>
-              <a:rPr lang="en-US" dirty="0" smtClean="0"/>
+              <a:rPr lang="en-US" dirty="0" smtClean="0">
+                <a:solidFill>
+                  <a:schemeClr val="tx1"/>
+                </a:solidFill>
+                <a:latin typeface="Helvetica" charset="0"/>
+                <a:ea typeface="Helvetica" charset="0"/>
+                <a:cs typeface="Helvetica" charset="0"/>
+              </a:rPr>
               <a:t> (</a:t>
             </a:r>
             <a:r>
-              <a:rPr lang="en-US" dirty="0" err="1" smtClean="0"/>
+              <a:rPr lang="en-US" dirty="0" err="1" smtClean="0">
+                <a:solidFill>
+                  <a:schemeClr val="tx1"/>
+                </a:solidFill>
+                <a:latin typeface="Helvetica" charset="0"/>
+                <a:ea typeface="Helvetica" charset="0"/>
+                <a:cs typeface="Helvetica" charset="0"/>
+              </a:rPr>
               <a:t>Mutação</a:t>
             </a:r>
             <a:r>
-              <a:rPr lang="en-US" dirty="0"/>
+              <a:rPr lang="en-US" dirty="0">
+                <a:solidFill>
+                  <a:schemeClr val="tx1"/>
+                </a:solidFill>
+                <a:latin typeface="Helvetica" charset="0"/>
+                <a:ea typeface="Helvetica" charset="0"/>
+                <a:cs typeface="Helvetica" charset="0"/>
+              </a:rPr>
               <a:t> </a:t>
             </a:r>
             <a:r>
-              <a:rPr lang="en-US" dirty="0" smtClean="0"/>
+              <a:rPr lang="en-US" dirty="0" smtClean="0">
+                <a:solidFill>
+                  <a:schemeClr val="tx1"/>
+                </a:solidFill>
+                <a:latin typeface="Helvetica" charset="0"/>
+                <a:ea typeface="Helvetica" charset="0"/>
+                <a:cs typeface="Helvetica" charset="0"/>
+              </a:rPr>
               <a:t>/ </a:t>
             </a:r>
             <a:r>
-              <a:rPr lang="en-US" dirty="0" err="1" smtClean="0"/>
+              <a:rPr lang="en-US" dirty="0" err="1" smtClean="0">
+                <a:solidFill>
+                  <a:schemeClr val="tx1"/>
+                </a:solidFill>
+                <a:latin typeface="Helvetica" charset="0"/>
+                <a:ea typeface="Helvetica" charset="0"/>
+                <a:cs typeface="Helvetica" charset="0"/>
+              </a:rPr>
               <a:t>Recombinação</a:t>
             </a:r>
             <a:r>
-              <a:rPr lang="en-US" dirty="0" smtClean="0"/>
+              <a:rPr lang="en-US" dirty="0" smtClean="0">
+                <a:solidFill>
+                  <a:schemeClr val="tx1"/>
+                </a:solidFill>
+                <a:latin typeface="Helvetica" charset="0"/>
+                <a:ea typeface="Helvetica" charset="0"/>
+                <a:cs typeface="Helvetica" charset="0"/>
+              </a:rPr>
               <a:t>)</a:t>
             </a:r>
           </a:p>
           <a:p>
             <a:pPr lvl="1"/>
             <a:r>
-              <a:rPr lang="en-US" dirty="0" err="1" smtClean="0"/>
+              <a:rPr lang="en-US" dirty="0" err="1" smtClean="0">
+                <a:solidFill>
+                  <a:schemeClr val="tx1"/>
+                </a:solidFill>
+                <a:latin typeface="Helvetica" charset="0"/>
+                <a:ea typeface="Helvetica" charset="0"/>
+                <a:cs typeface="Helvetica" charset="0"/>
+              </a:rPr>
               <a:t>Seleção</a:t>
             </a:r>
             <a:r>
-              <a:rPr lang="en-US" dirty="0"/>
+              <a:rPr lang="en-US" dirty="0">
+                <a:solidFill>
+                  <a:schemeClr val="tx1"/>
+                </a:solidFill>
+                <a:latin typeface="Helvetica" charset="0"/>
+                <a:ea typeface="Helvetica" charset="0"/>
+                <a:cs typeface="Helvetica" charset="0"/>
+              </a:rPr>
               <a:t> </a:t>
             </a:r>
             <a:r>
-              <a:rPr lang="en-US" dirty="0" smtClean="0"/>
+              <a:rPr lang="en-US" dirty="0" smtClean="0">
+                <a:solidFill>
+                  <a:schemeClr val="tx1"/>
+                </a:solidFill>
+                <a:latin typeface="Helvetica" charset="0"/>
+                <a:ea typeface="Helvetica" charset="0"/>
+                <a:cs typeface="Helvetica" charset="0"/>
+              </a:rPr>
               <a:t>/ </a:t>
             </a:r>
             <a:r>
-              <a:rPr lang="en-US" dirty="0" err="1" smtClean="0"/>
+              <a:rPr lang="en-US" dirty="0" err="1" smtClean="0">
+                <a:solidFill>
+                  <a:schemeClr val="tx1"/>
+                </a:solidFill>
+                <a:latin typeface="Helvetica" charset="0"/>
+                <a:ea typeface="Helvetica" charset="0"/>
+                <a:cs typeface="Helvetica" charset="0"/>
+              </a:rPr>
               <a:t>Sobrevivência</a:t>
             </a:r>
-            <a:endParaRPr lang="en-US" dirty="0" smtClean="0"/>
-          </a:p>
-          <a:p>
-            <a:r>
-              <a:rPr lang="en-US" b="1" dirty="0" err="1" smtClean="0"/>
+            <a:endParaRPr lang="en-US" dirty="0" smtClean="0">
+              <a:solidFill>
+                <a:schemeClr val="tx1"/>
+              </a:solidFill>
+              <a:latin typeface="Helvetica" charset="0"/>
+              <a:ea typeface="Helvetica" charset="0"/>
+              <a:cs typeface="Helvetica" charset="0"/>
+            </a:endParaRPr>
+          </a:p>
+          <a:p>
+            <a:r>
+              <a:rPr lang="en-US" b="1" dirty="0" err="1" smtClean="0">
+                <a:solidFill>
+                  <a:schemeClr val="tx1"/>
+                </a:solidFill>
+                <a:latin typeface="Helvetica" charset="0"/>
+                <a:ea typeface="Helvetica" charset="0"/>
+                <a:cs typeface="Helvetica" charset="0"/>
+              </a:rPr>
               <a:t>População</a:t>
             </a:r>
             <a:r>
-              <a:rPr lang="en-US" b="1" dirty="0" smtClean="0"/>
+              <a:rPr lang="en-US" b="1" dirty="0" smtClean="0">
+                <a:solidFill>
+                  <a:schemeClr val="tx1"/>
+                </a:solidFill>
+                <a:latin typeface="Helvetica" charset="0"/>
+                <a:ea typeface="Helvetica" charset="0"/>
+                <a:cs typeface="Helvetica" charset="0"/>
+              </a:rPr>
               <a:t>:</a:t>
             </a:r>
             <a:r>
-              <a:rPr lang="en-US" dirty="0" smtClean="0"/>
+              <a:rPr lang="en-US" dirty="0" smtClean="0">
+                <a:solidFill>
+                  <a:schemeClr val="tx1"/>
+                </a:solidFill>
+                <a:latin typeface="Helvetica" charset="0"/>
+                <a:ea typeface="Helvetica" charset="0"/>
+                <a:cs typeface="Helvetica" charset="0"/>
+              </a:rPr>
               <a:t> </a:t>
             </a:r>
             <a:r>
-              <a:rPr lang="en-US" dirty="0" err="1" smtClean="0"/>
+              <a:rPr lang="en-US" dirty="0" err="1" smtClean="0">
+                <a:solidFill>
+                  <a:schemeClr val="tx1"/>
+                </a:solidFill>
+                <a:latin typeface="Helvetica" charset="0"/>
+                <a:ea typeface="Helvetica" charset="0"/>
+                <a:cs typeface="Helvetica" charset="0"/>
+              </a:rPr>
               <a:t>parâmetros</a:t>
             </a:r>
             <a:r>
-              <a:rPr lang="en-US" dirty="0" smtClean="0"/>
+              <a:rPr lang="en-US" dirty="0" smtClean="0">
+                <a:solidFill>
+                  <a:schemeClr val="tx1"/>
+                </a:solidFill>
+                <a:latin typeface="Helvetica" charset="0"/>
+                <a:ea typeface="Helvetica" charset="0"/>
+                <a:cs typeface="Helvetica" charset="0"/>
+              </a:rPr>
               <a:t> de </a:t>
             </a:r>
             <a:r>
-              <a:rPr lang="en-US" dirty="0" err="1" smtClean="0"/>
+              <a:rPr lang="en-US" dirty="0" err="1" smtClean="0">
+                <a:solidFill>
+                  <a:schemeClr val="tx1"/>
+                </a:solidFill>
+                <a:latin typeface="Helvetica" charset="0"/>
+                <a:ea typeface="Helvetica" charset="0"/>
+                <a:cs typeface="Helvetica" charset="0"/>
+              </a:rPr>
               <a:t>interesse</a:t>
             </a:r>
             <a:r>
-              <a:rPr lang="en-US" dirty="0" smtClean="0"/>
+              <a:rPr lang="en-US" dirty="0" smtClean="0">
+                <a:solidFill>
+                  <a:schemeClr val="tx1"/>
+                </a:solidFill>
+                <a:latin typeface="Helvetica" charset="0"/>
+                <a:ea typeface="Helvetica" charset="0"/>
+                <a:cs typeface="Helvetica" charset="0"/>
+              </a:rPr>
               <a:t> </a:t>
             </a:r>
             <a:r>
-              <a:rPr lang="en-US" dirty="0" err="1" smtClean="0"/>
+              <a:rPr lang="en-US" dirty="0" err="1" smtClean="0">
+                <a:solidFill>
+                  <a:schemeClr val="tx1"/>
+                </a:solidFill>
+                <a:latin typeface="Helvetica" charset="0"/>
+                <a:ea typeface="Helvetica" charset="0"/>
+                <a:cs typeface="Helvetica" charset="0"/>
+              </a:rPr>
               <a:t>retornados</a:t>
             </a:r>
             <a:r>
-              <a:rPr lang="en-US" dirty="0" smtClean="0"/>
+              <a:rPr lang="en-US" dirty="0" smtClean="0">
+                <a:solidFill>
+                  <a:schemeClr val="tx1"/>
+                </a:solidFill>
+                <a:latin typeface="Helvetica" charset="0"/>
+                <a:ea typeface="Helvetica" charset="0"/>
+                <a:cs typeface="Helvetica" charset="0"/>
+              </a:rPr>
               <a:t> </a:t>
             </a:r>
             <a:r>
-              <a:rPr lang="en-US" dirty="0" err="1" smtClean="0"/>
+              <a:rPr lang="en-US" dirty="0" err="1" smtClean="0">
+                <a:solidFill>
+                  <a:schemeClr val="tx1"/>
+                </a:solidFill>
+                <a:latin typeface="Helvetica" charset="0"/>
+                <a:ea typeface="Helvetica" charset="0"/>
+                <a:cs typeface="Helvetica" charset="0"/>
+              </a:rPr>
               <a:t>pelo</a:t>
             </a:r>
             <a:r>
-              <a:rPr lang="en-US" dirty="0" smtClean="0"/>
+              <a:rPr lang="en-US" dirty="0" smtClean="0">
+                <a:solidFill>
+                  <a:schemeClr val="tx1"/>
+                </a:solidFill>
+                <a:latin typeface="Helvetica" charset="0"/>
+                <a:ea typeface="Helvetica" charset="0"/>
+                <a:cs typeface="Helvetica" charset="0"/>
+              </a:rPr>
               <a:t> </a:t>
             </a:r>
             <a:r>
-              <a:rPr lang="en-US" dirty="0" err="1" smtClean="0"/>
+              <a:rPr lang="en-US" dirty="0" err="1" smtClean="0">
+                <a:solidFill>
+                  <a:schemeClr val="tx1"/>
+                </a:solidFill>
+                <a:latin typeface="Helvetica" charset="0"/>
+                <a:ea typeface="Helvetica" charset="0"/>
+                <a:cs typeface="Helvetica" charset="0"/>
+              </a:rPr>
               <a:t>problema</a:t>
             </a:r>
-            <a:endParaRPr lang="en-US" dirty="0" smtClean="0"/>
-          </a:p>
-          <a:p>
-            <a:r>
-              <a:rPr lang="en-US" b="1" dirty="0" err="1" smtClean="0"/>
+            <a:endParaRPr lang="en-US" dirty="0" smtClean="0">
+              <a:solidFill>
+                <a:schemeClr val="tx1"/>
+              </a:solidFill>
+              <a:latin typeface="Helvetica" charset="0"/>
+              <a:ea typeface="Helvetica" charset="0"/>
+              <a:cs typeface="Helvetica" charset="0"/>
+            </a:endParaRPr>
+          </a:p>
+          <a:p>
+            <a:r>
+              <a:rPr lang="en-US" b="1" dirty="0" err="1" smtClean="0">
+                <a:solidFill>
+                  <a:schemeClr val="tx1"/>
+                </a:solidFill>
+                <a:latin typeface="Helvetica" charset="0"/>
+                <a:ea typeface="Helvetica" charset="0"/>
+                <a:cs typeface="Helvetica" charset="0"/>
+              </a:rPr>
               <a:t>Geração</a:t>
             </a:r>
             <a:r>
-              <a:rPr lang="en-US" b="1" dirty="0" smtClean="0"/>
+              <a:rPr lang="en-US" b="1" dirty="0" smtClean="0">
+                <a:solidFill>
+                  <a:schemeClr val="tx1"/>
+                </a:solidFill>
+                <a:latin typeface="Helvetica" charset="0"/>
+                <a:ea typeface="Helvetica" charset="0"/>
+                <a:cs typeface="Helvetica" charset="0"/>
+              </a:rPr>
               <a:t>:</a:t>
             </a:r>
             <a:r>
-              <a:rPr lang="en-US" dirty="0" smtClean="0"/>
+              <a:rPr lang="en-US" dirty="0" smtClean="0">
+                <a:solidFill>
+                  <a:schemeClr val="tx1"/>
+                </a:solidFill>
+                <a:latin typeface="Helvetica" charset="0"/>
+                <a:ea typeface="Helvetica" charset="0"/>
+                <a:cs typeface="Helvetica" charset="0"/>
+              </a:rPr>
               <a:t> </a:t>
             </a:r>
             <a:r>
-              <a:rPr lang="en-US" dirty="0" err="1" smtClean="0"/>
+              <a:rPr lang="en-US" dirty="0" err="1" smtClean="0">
+                <a:solidFill>
+                  <a:schemeClr val="tx1"/>
+                </a:solidFill>
+                <a:latin typeface="Helvetica" charset="0"/>
+                <a:ea typeface="Helvetica" charset="0"/>
+                <a:cs typeface="Helvetica" charset="0"/>
+              </a:rPr>
               <a:t>população</a:t>
             </a:r>
             <a:r>
-              <a:rPr lang="en-US" dirty="0" smtClean="0"/>
+              <a:rPr lang="en-US" dirty="0" smtClean="0">
+                <a:solidFill>
+                  <a:schemeClr val="tx1"/>
+                </a:solidFill>
+                <a:latin typeface="Helvetica" charset="0"/>
+                <a:ea typeface="Helvetica" charset="0"/>
+                <a:cs typeface="Helvetica" charset="0"/>
+              </a:rPr>
               <a:t> </a:t>
             </a:r>
             <a:r>
-              <a:rPr lang="en-US" dirty="0" err="1" smtClean="0"/>
+              <a:rPr lang="en-US" dirty="0" err="1" smtClean="0">
+                <a:solidFill>
+                  <a:schemeClr val="tx1"/>
+                </a:solidFill>
+                <a:latin typeface="Helvetica" charset="0"/>
+                <a:ea typeface="Helvetica" charset="0"/>
+                <a:cs typeface="Helvetica" charset="0"/>
+              </a:rPr>
               <a:t>após</a:t>
             </a:r>
             <a:r>
-              <a:rPr lang="en-US" dirty="0" smtClean="0"/>
+              <a:rPr lang="en-US" dirty="0" smtClean="0">
+                <a:solidFill>
+                  <a:schemeClr val="tx1"/>
+                </a:solidFill>
+                <a:latin typeface="Helvetica" charset="0"/>
+                <a:ea typeface="Helvetica" charset="0"/>
+                <a:cs typeface="Helvetica" charset="0"/>
+              </a:rPr>
               <a:t> um </a:t>
             </a:r>
             <a:r>
-              <a:rPr lang="en-US" dirty="0" err="1" smtClean="0"/>
+              <a:rPr lang="en-US" dirty="0" err="1" smtClean="0">
+                <a:solidFill>
+                  <a:schemeClr val="tx1"/>
+                </a:solidFill>
+                <a:latin typeface="Helvetica" charset="0"/>
+                <a:ea typeface="Helvetica" charset="0"/>
+                <a:cs typeface="Helvetica" charset="0"/>
+              </a:rPr>
               <a:t>ciclo</a:t>
             </a:r>
             <a:r>
-              <a:rPr lang="en-US" dirty="0" smtClean="0"/>
+              <a:rPr lang="en-US" dirty="0" smtClean="0">
+                <a:solidFill>
+                  <a:schemeClr val="tx1"/>
+                </a:solidFill>
+                <a:latin typeface="Helvetica" charset="0"/>
+                <a:ea typeface="Helvetica" charset="0"/>
+                <a:cs typeface="Helvetica" charset="0"/>
+              </a:rPr>
               <a:t> de </a:t>
             </a:r>
             <a:r>
-              <a:rPr lang="en-US" dirty="0" err="1" smtClean="0"/>
+              <a:rPr lang="en-US" dirty="0" err="1" smtClean="0">
+                <a:solidFill>
+                  <a:schemeClr val="tx1"/>
+                </a:solidFill>
+                <a:latin typeface="Helvetica" charset="0"/>
+                <a:ea typeface="Helvetica" charset="0"/>
+                <a:cs typeface="Helvetica" charset="0"/>
+              </a:rPr>
               <a:t>iterações</a:t>
             </a:r>
             <a:r>
-              <a:rPr lang="en-US" dirty="0" smtClean="0"/>
+              <a:rPr lang="en-US" dirty="0" smtClean="0">
+                <a:solidFill>
+                  <a:schemeClr val="tx1"/>
+                </a:solidFill>
+                <a:latin typeface="Helvetica" charset="0"/>
+                <a:ea typeface="Helvetica" charset="0"/>
+                <a:cs typeface="Helvetica" charset="0"/>
+              </a:rPr>
               <a:t> do AE</a:t>
             </a:r>
           </a:p>
@@ -17920,13 +18327,19 @@
               <a:rPr lang="en-US" dirty="0" err="1" smtClean="0">
                 <a:sym typeface="Wingdings"/>
               </a:rPr>
-              <a:t>indiv</a:t>
+              <a:t>indivíduos</a:t>
+            </a:r>
+            <a:r>
+              <a:rPr lang="en-US" dirty="0" smtClean="0">
+                <a:sym typeface="Wingdings"/>
+              </a:rPr>
+              <a:t> </a:t>
             </a:r>
             <a:r>
               <a:rPr lang="en-US" dirty="0" err="1" smtClean="0">
                 <a:sym typeface="Wingdings"/>
               </a:rPr>
-              <a:t>íduos</a:t>
+              <a:t>são</a:t>
             </a:r>
             <a:r>
               <a:rPr lang="en-US" dirty="0" smtClean="0">
@@ -17934,21 +18347,6 @@
               </a:rPr>
               <a:t> </a:t>
             </a:r>
-            <a:r>
-              <a:rPr lang="en-US" dirty="0" err="1" smtClean="0">
-                <a:sym typeface="Wingdings"/>
-              </a:rPr>
-              <a:t>são</a:t>
-            </a:r>
-            <a:r>
-              <a:rPr lang="en-US" dirty="0" smtClean="0">
-                <a:sym typeface="Wingdings"/>
-              </a:rPr>
-              <a:t> </a:t>
-            </a:r>
-            <a:endParaRPr lang="en-US" dirty="0" smtClean="0">
-              <a:sym typeface="Wingdings"/>
-            </a:endParaRPr>
           </a:p>
           <a:p>
             <a:r>

</xml_diff>

<commit_message>
Added results for OneMax Real and added captions to files on appendices
</commit_message>
<xml_diff>
--- a/presentations/TG2_Apresentacao_Cassio.pptx
+++ b/presentations/TG2_Apresentacao_Cassio.pptx
@@ -220,7 +220,7 @@
           <a:p>
             <a:fld id="{7CDA9EC1-9FF2-0E46-B2FE-07EA8F5F1A10}" type="datetimeFigureOut">
               <a:rPr lang="en-US" smtClean="0"/>
-              <a:t>11/18/16</a:t>
+              <a:t>11/19/16</a:t>
             </a:fld>
             <a:endParaRPr lang="en-US"/>
           </a:p>
@@ -2424,7 +2424,7 @@
           <a:p>
             <a:fld id="{B95531F0-7D46-4A43-A343-9A720F56E8FD}" type="datetime1">
               <a:rPr lang="en-US" smtClean="0"/>
-              <a:t>11/18/16</a:t>
+              <a:t>11/19/16</a:t>
             </a:fld>
             <a:endParaRPr lang="en-US"/>
           </a:p>
@@ -3411,7 +3411,7 @@
           <a:p>
             <a:fld id="{F435AD97-0A67-2C45-AE8B-2B8591FF5D6C}" type="datetime1">
               <a:rPr lang="en-US" smtClean="0"/>
-              <a:t>11/18/16</a:t>
+              <a:t>11/19/16</a:t>
             </a:fld>
             <a:endParaRPr lang="en-US"/>
           </a:p>
@@ -4281,7 +4281,7 @@
           <a:p>
             <a:fld id="{9E4B5003-0778-EA40-B828-7E4D015DFBA4}" type="datetime1">
               <a:rPr lang="en-US" smtClean="0"/>
-              <a:t>11/18/16</a:t>
+              <a:t>11/19/16</a:t>
             </a:fld>
             <a:endParaRPr lang="en-US"/>
           </a:p>
@@ -5302,7 +5302,7 @@
           <a:p>
             <a:fld id="{ADAE3BDB-1B20-3745-A530-985E7F3920B3}" type="datetime1">
               <a:rPr lang="en-US" smtClean="0"/>
-              <a:t>11/18/16</a:t>
+              <a:t>11/19/16</a:t>
             </a:fld>
             <a:endParaRPr lang="en-US"/>
           </a:p>
@@ -6222,7 +6222,7 @@
           <a:p>
             <a:fld id="{C55A703E-90FD-714F-8944-51221692724F}" type="datetime1">
               <a:rPr lang="en-US" smtClean="0"/>
-              <a:t>11/18/16</a:t>
+              <a:t>11/19/16</a:t>
             </a:fld>
             <a:endParaRPr lang="en-US"/>
           </a:p>
@@ -6878,7 +6878,7 @@
           <a:p>
             <a:fld id="{83D04EA7-B7D0-0C4C-8B74-A050CE5BEBB2}" type="datetime1">
               <a:rPr lang="en-US" smtClean="0"/>
-              <a:t>11/18/16</a:t>
+              <a:t>11/19/16</a:t>
             </a:fld>
             <a:endParaRPr lang="en-US"/>
           </a:p>
@@ -7735,7 +7735,7 @@
           <a:p>
             <a:fld id="{DBDB68CD-C4A5-F640-9F17-C5F496A2B526}" type="datetime1">
               <a:rPr lang="en-US" smtClean="0"/>
-              <a:t>11/18/16</a:t>
+              <a:t>11/19/16</a:t>
             </a:fld>
             <a:endParaRPr lang="en-US"/>
           </a:p>
@@ -7918,7 +7918,7 @@
           <a:p>
             <a:fld id="{CDC6AF7C-9055-CD49-B5B9-F120B1AB3571}" type="datetime1">
               <a:rPr lang="en-US" smtClean="0"/>
-              <a:t>11/18/16</a:t>
+              <a:t>11/19/16</a:t>
             </a:fld>
             <a:endParaRPr lang="en-US"/>
           </a:p>
@@ -8775,7 +8775,7 @@
           <a:p>
             <a:fld id="{4AE42515-A517-D44B-940E-E41C792E779D}" type="datetime1">
               <a:rPr lang="en-US" smtClean="0"/>
-              <a:t>11/18/16</a:t>
+              <a:t>11/19/16</a:t>
             </a:fld>
             <a:endParaRPr lang="en-US"/>
           </a:p>
@@ -8999,7 +8999,7 @@
           <a:p>
             <a:fld id="{F20BEB36-C475-9A44-8608-8FEE2B7F390D}" type="datetime1">
               <a:rPr lang="en-US" smtClean="0"/>
-              <a:t>11/18/16</a:t>
+              <a:t>11/19/16</a:t>
             </a:fld>
             <a:endParaRPr lang="en-US"/>
           </a:p>
@@ -9924,7 +9924,7 @@
           <a:p>
             <a:fld id="{2A8867D1-E654-6B47-8BA0-7E05F767CDFF}" type="datetime1">
               <a:rPr lang="en-US" smtClean="0"/>
-              <a:t>11/18/16</a:t>
+              <a:t>11/19/16</a:t>
             </a:fld>
             <a:endParaRPr lang="en-US"/>
           </a:p>
@@ -10213,7 +10213,7 @@
           <a:p>
             <a:fld id="{0A347673-BF0E-DF43-BEED-BFB014A1AC71}" type="datetime1">
               <a:rPr lang="en-US" smtClean="0"/>
-              <a:t>11/18/16</a:t>
+              <a:t>11/19/16</a:t>
             </a:fld>
             <a:endParaRPr lang="en-US"/>
           </a:p>
@@ -10603,7 +10603,7 @@
           <a:p>
             <a:fld id="{E4FBF619-EEB5-254E-A8B0-229A8B9C6CED}" type="datetime1">
               <a:rPr lang="en-US" smtClean="0"/>
-              <a:t>11/18/16</a:t>
+              <a:t>11/19/16</a:t>
             </a:fld>
             <a:endParaRPr lang="en-US"/>
           </a:p>
@@ -10729,7 +10729,7 @@
           <a:p>
             <a:fld id="{0482079F-C31D-3444-8B7D-A62FFEBC2304}" type="datetime1">
               <a:rPr lang="en-US" smtClean="0"/>
-              <a:t>11/18/16</a:t>
+              <a:t>11/19/16</a:t>
             </a:fld>
             <a:endParaRPr lang="en-US"/>
           </a:p>
@@ -10824,7 +10824,7 @@
           <a:p>
             <a:fld id="{4BBCF8D0-02FB-E043-9D13-CB6CF6E94FBA}" type="datetime1">
               <a:rPr lang="en-US" smtClean="0"/>
-              <a:t>11/18/16</a:t>
+              <a:t>11/19/16</a:t>
             </a:fld>
             <a:endParaRPr lang="en-US"/>
           </a:p>
@@ -11795,7 +11795,7 @@
           <a:p>
             <a:fld id="{34AB9DC5-D280-3D49-8C84-E04B42D002DA}" type="datetime1">
               <a:rPr lang="en-US" smtClean="0"/>
-              <a:t>11/18/16</a:t>
+              <a:t>11/19/16</a:t>
             </a:fld>
             <a:endParaRPr lang="en-US"/>
           </a:p>
@@ -12790,7 +12790,7 @@
           <a:p>
             <a:fld id="{69D3B358-6744-4D44-A371-FA16E6DCD0C3}" type="datetime1">
               <a:rPr lang="en-US" smtClean="0"/>
-              <a:t>11/18/16</a:t>
+              <a:t>11/19/16</a:t>
             </a:fld>
             <a:endParaRPr lang="en-US"/>
           </a:p>
@@ -13674,7 +13674,7 @@
           <a:p>
             <a:fld id="{AA984BF0-9811-DC42-BCB0-A38ECDAD6224}" type="datetime1">
               <a:rPr lang="en-US" smtClean="0"/>
-              <a:t>11/18/16</a:t>
+              <a:t>11/19/16</a:t>
             </a:fld>
             <a:endParaRPr lang="en-US"/>
           </a:p>
@@ -14868,18 +14868,7 @@
                 <a:ea typeface="Helvetica" charset="0"/>
                 <a:cs typeface="Helvetica" charset="0"/>
               </a:rPr>
-              <a:t> </a:t>
-            </a:r>
-            <a:r>
-              <a:rPr lang="en-US" i="1" dirty="0" smtClean="0">
-                <a:solidFill>
-                  <a:schemeClr val="tx1"/>
-                </a:solidFill>
-                <a:latin typeface="Helvetica" charset="0"/>
-                <a:ea typeface="Helvetica" charset="0"/>
-                <a:cs typeface="Helvetica" charset="0"/>
-              </a:rPr>
-              <a:t>(</a:t>
+              <a:t> (</a:t>
             </a:r>
             <a:r>
               <a:rPr lang="en-US" i="1" dirty="0" err="1" smtClean="0">
@@ -16498,18 +16487,7 @@
                 <a:ea typeface="Helvetica" charset="0"/>
                 <a:cs typeface="Helvetica" charset="0"/>
               </a:rPr>
-              <a:t>[6</a:t>
-            </a:r>
-            <a:r>
-              <a:rPr lang="en-US" b="1" baseline="30000" dirty="0" smtClean="0">
-                <a:solidFill>
-                  <a:srgbClr val="0432FF"/>
-                </a:solidFill>
-                <a:latin typeface="Helvetica" charset="0"/>
-                <a:ea typeface="Helvetica" charset="0"/>
-                <a:cs typeface="Helvetica" charset="0"/>
-              </a:rPr>
-              <a:t>]</a:t>
+              <a:t>[6]</a:t>
             </a:r>
           </a:p>
           <a:p>
@@ -16533,40 +16511,51 @@
                 <a:ea typeface="Helvetica" charset="0"/>
                 <a:cs typeface="Helvetica" charset="0"/>
               </a:rPr>
+              <a:t> Real</a:t>
+            </a:r>
+            <a:r>
+              <a:rPr lang="en-US" dirty="0" smtClean="0">
+                <a:solidFill>
+                  <a:schemeClr val="tx1"/>
+                </a:solidFill>
+                <a:latin typeface="Helvetica" charset="0"/>
+                <a:ea typeface="Helvetica" charset="0"/>
+                <a:cs typeface="Helvetica" charset="0"/>
+              </a:rPr>
+              <a:t> (100 </a:t>
+            </a:r>
+            <a:r>
+              <a:rPr lang="en-US" dirty="0" err="1" smtClean="0">
+                <a:solidFill>
+                  <a:schemeClr val="tx1"/>
+                </a:solidFill>
+                <a:latin typeface="Helvetica" charset="0"/>
+                <a:ea typeface="Helvetica" charset="0"/>
+                <a:cs typeface="Helvetica" charset="0"/>
+              </a:rPr>
+              <a:t>variáveis</a:t>
+            </a:r>
+            <a:r>
+              <a:rPr lang="en-US" dirty="0" smtClean="0">
+                <a:solidFill>
+                  <a:schemeClr val="tx1"/>
+                </a:solidFill>
+                <a:latin typeface="Helvetica" charset="0"/>
+                <a:ea typeface="Helvetica" charset="0"/>
+                <a:cs typeface="Helvetica" charset="0"/>
+              </a:rPr>
               <a:t> </a:t>
             </a:r>
             <a:r>
-              <a:rPr lang="en-US" b="1" dirty="0" smtClean="0">
-                <a:solidFill>
-                  <a:schemeClr val="tx1"/>
-                </a:solidFill>
-                <a:latin typeface="Helvetica" charset="0"/>
-                <a:ea typeface="Helvetica" charset="0"/>
-                <a:cs typeface="Helvetica" charset="0"/>
-              </a:rPr>
-              <a:t>Real</a:t>
-            </a:r>
-            <a:r>
-              <a:rPr lang="en-US" dirty="0" smtClean="0">
-                <a:solidFill>
-                  <a:schemeClr val="tx1"/>
-                </a:solidFill>
-                <a:latin typeface="Helvetica" charset="0"/>
-                <a:ea typeface="Helvetica" charset="0"/>
-                <a:cs typeface="Helvetica" charset="0"/>
-              </a:rPr>
-              <a:t> (100 </a:t>
-            </a:r>
-            <a:r>
-              <a:rPr lang="en-US" dirty="0" err="1" smtClean="0">
-                <a:solidFill>
-                  <a:schemeClr val="tx1"/>
-                </a:solidFill>
-                <a:latin typeface="Helvetica" charset="0"/>
-                <a:ea typeface="Helvetica" charset="0"/>
-                <a:cs typeface="Helvetica" charset="0"/>
-              </a:rPr>
-              <a:t>variáveis</a:t>
+              <a:rPr lang="en-US" dirty="0" err="1" smtClean="0">
+                <a:solidFill>
+                  <a:schemeClr val="tx1"/>
+                </a:solidFill>
+                <a:latin typeface="Helvetica" charset="0"/>
+                <a:ea typeface="Helvetica" charset="0"/>
+                <a:cs typeface="Helvetica" charset="0"/>
+              </a:rPr>
+              <a:t>reais</a:t>
             </a:r>
             <a:r>
               <a:rPr lang="en-US" dirty="0" smtClean="0">
@@ -16588,7 +16577,7 @@
                 <a:ea typeface="Helvetica" charset="0"/>
                 <a:cs typeface="Helvetica" charset="0"/>
               </a:rPr>
-              <a:t>reais</a:t>
+              <a:t>iniciam</a:t>
             </a:r>
             <a:r>
               <a:rPr lang="en-US" dirty="0" smtClean="0">
@@ -16610,7 +16599,29 @@
                 <a:ea typeface="Helvetica" charset="0"/>
                 <a:cs typeface="Helvetica" charset="0"/>
               </a:rPr>
-              <a:t>iniciam</a:t>
+              <a:t>em</a:t>
+            </a:r>
+            <a:r>
+              <a:rPr lang="en-US" dirty="0" smtClean="0">
+                <a:solidFill>
+                  <a:schemeClr val="tx1"/>
+                </a:solidFill>
+                <a:latin typeface="Helvetica" charset="0"/>
+                <a:ea typeface="Helvetica" charset="0"/>
+                <a:cs typeface="Helvetica" charset="0"/>
+              </a:rPr>
+              <a:t> 0.0; </a:t>
+            </a:r>
+            <a:r>
+              <a:rPr lang="en-US" dirty="0" err="1" smtClean="0">
+                <a:solidFill>
+                  <a:schemeClr val="tx1"/>
+                </a:solidFill>
+                <a:latin typeface="Helvetica" charset="0"/>
+                <a:ea typeface="Helvetica" charset="0"/>
+                <a:cs typeface="Helvetica" charset="0"/>
+              </a:rPr>
+              <a:t>Todas</a:t>
             </a:r>
             <a:r>
               <a:rPr lang="en-US" dirty="0" smtClean="0">
@@ -16632,50 +16643,6 @@
                 <a:ea typeface="Helvetica" charset="0"/>
                 <a:cs typeface="Helvetica" charset="0"/>
               </a:rPr>
-              <a:t>em</a:t>
-            </a:r>
-            <a:r>
-              <a:rPr lang="en-US" dirty="0" smtClean="0">
-                <a:solidFill>
-                  <a:schemeClr val="tx1"/>
-                </a:solidFill>
-                <a:latin typeface="Helvetica" charset="0"/>
-                <a:ea typeface="Helvetica" charset="0"/>
-                <a:cs typeface="Helvetica" charset="0"/>
-              </a:rPr>
-              <a:t> 0.0; </a:t>
-            </a:r>
-            <a:r>
-              <a:rPr lang="en-US" dirty="0" err="1" smtClean="0">
-                <a:solidFill>
-                  <a:schemeClr val="tx1"/>
-                </a:solidFill>
-                <a:latin typeface="Helvetica" charset="0"/>
-                <a:ea typeface="Helvetica" charset="0"/>
-                <a:cs typeface="Helvetica" charset="0"/>
-              </a:rPr>
-              <a:t>Todas</a:t>
-            </a:r>
-            <a:r>
-              <a:rPr lang="en-US" dirty="0" smtClean="0">
-                <a:solidFill>
-                  <a:schemeClr val="tx1"/>
-                </a:solidFill>
-                <a:latin typeface="Helvetica" charset="0"/>
-                <a:ea typeface="Helvetica" charset="0"/>
-                <a:cs typeface="Helvetica" charset="0"/>
-              </a:rPr>
-              <a:t> </a:t>
-            </a:r>
-            <a:r>
-              <a:rPr lang="en-US" dirty="0" err="1" smtClean="0">
-                <a:solidFill>
-                  <a:schemeClr val="tx1"/>
-                </a:solidFill>
-                <a:latin typeface="Helvetica" charset="0"/>
-                <a:ea typeface="Helvetica" charset="0"/>
-                <a:cs typeface="Helvetica" charset="0"/>
-              </a:rPr>
               <a:t>devem</a:t>
             </a:r>
             <a:r>
@@ -16709,18 +16676,7 @@
                 <a:ea typeface="Helvetica" charset="0"/>
                 <a:cs typeface="Helvetica" charset="0"/>
               </a:rPr>
-              <a:t> de 1.0</a:t>
-            </a:r>
-            <a:r>
-              <a:rPr lang="en-US" dirty="0" smtClean="0">
-                <a:solidFill>
-                  <a:schemeClr val="tx1"/>
-                </a:solidFill>
-                <a:latin typeface="Helvetica" charset="0"/>
-                <a:ea typeface="Helvetica" charset="0"/>
-                <a:cs typeface="Helvetica" charset="0"/>
-              </a:rPr>
-              <a:t>)</a:t>
+              <a:t> de 1.0)</a:t>
             </a:r>
           </a:p>
           <a:p>
@@ -17607,40 +17563,18 @@
                 <a:ea typeface="Helvetica" charset="0"/>
                 <a:cs typeface="Helvetica" charset="0"/>
               </a:rPr>
-              <a:t>- </a:t>
-            </a:r>
-            <a:r>
-              <a:rPr lang="en-US" dirty="0" smtClean="0">
-                <a:solidFill>
-                  <a:schemeClr val="tx1"/>
-                </a:solidFill>
-                <a:latin typeface="Helvetica" charset="0"/>
-                <a:ea typeface="Helvetica" charset="0"/>
-                <a:cs typeface="Helvetica" charset="0"/>
-              </a:rPr>
-              <a:t>100 </a:t>
-            </a:r>
-            <a:r>
-              <a:rPr lang="en-US" dirty="0" err="1" smtClean="0">
-                <a:solidFill>
-                  <a:schemeClr val="tx1"/>
-                </a:solidFill>
-                <a:latin typeface="Helvetica" charset="0"/>
-                <a:ea typeface="Helvetica" charset="0"/>
-                <a:cs typeface="Helvetica" charset="0"/>
-              </a:rPr>
-              <a:t>BooleanGene</a:t>
-            </a:r>
-            <a:r>
-              <a:rPr lang="en-US" dirty="0" err="1" smtClean="0">
-                <a:solidFill>
-                  <a:schemeClr val="tx1"/>
-                </a:solidFill>
-                <a:latin typeface="Helvetica" charset="0"/>
-                <a:ea typeface="Helvetica" charset="0"/>
-                <a:cs typeface="Helvetica" charset="0"/>
-              </a:rPr>
-              <a:t>s</a:t>
+              <a:t>- 100 </a:t>
+            </a:r>
+            <a:r>
+              <a:rPr lang="en-US" dirty="0" err="1" smtClean="0">
+                <a:solidFill>
+                  <a:schemeClr val="tx1"/>
+                </a:solidFill>
+                <a:latin typeface="Helvetica" charset="0"/>
+                <a:ea typeface="Helvetica" charset="0"/>
+                <a:cs typeface="Helvetica" charset="0"/>
+              </a:rPr>
+              <a:t>BooleanGenes</a:t>
             </a:r>
             <a:r>
               <a:rPr lang="en-US" dirty="0" smtClean="0">
@@ -18206,18 +18140,7 @@
                 <a:ea typeface="Helvetica" charset="0"/>
                 <a:cs typeface="Helvetica" charset="0"/>
               </a:rPr>
-              <a:t>Fun</a:t>
-            </a:r>
-            <a:r>
-              <a:rPr lang="en-US" i="1" dirty="0" err="1" smtClean="0">
-                <a:solidFill>
-                  <a:schemeClr val="tx1"/>
-                </a:solidFill>
-                <a:latin typeface="Helvetica" charset="0"/>
-                <a:ea typeface="Helvetica" charset="0"/>
-                <a:cs typeface="Helvetica" charset="0"/>
-              </a:rPr>
-              <a:t>ção</a:t>
+              <a:t>Função</a:t>
             </a:r>
             <a:r>
               <a:rPr lang="en-US" i="1" dirty="0" smtClean="0">
@@ -18250,18 +18173,7 @@
                 <a:ea typeface="Helvetica" charset="0"/>
                 <a:cs typeface="Helvetica" charset="0"/>
               </a:rPr>
-              <a:t>expressividade</a:t>
-            </a:r>
-            <a:r>
-              <a:rPr lang="en-US" dirty="0" err="1" smtClean="0">
-                <a:solidFill>
-                  <a:schemeClr val="tx1"/>
-                </a:solidFill>
-                <a:latin typeface="Helvetica" charset="0"/>
-                <a:ea typeface="Helvetica" charset="0"/>
-                <a:cs typeface="Helvetica" charset="0"/>
-              </a:rPr>
-              <a:t>s</a:t>
+              <a:t>expressividades</a:t>
             </a:r>
             <a:r>
               <a:rPr lang="en-US" dirty="0" smtClean="0">
@@ -18611,18 +18523,7 @@
                 <a:ea typeface="Helvetica" charset="0"/>
                 <a:cs typeface="Helvetica" charset="0"/>
               </a:rPr>
-              <a:t>n</a:t>
-            </a:r>
-            <a:r>
-              <a:rPr lang="en-US" dirty="0" err="1" smtClean="0">
-                <a:solidFill>
-                  <a:schemeClr val="tx1"/>
-                </a:solidFill>
-                <a:latin typeface="Helvetica" charset="0"/>
-                <a:ea typeface="Helvetica" charset="0"/>
-                <a:cs typeface="Helvetica" charset="0"/>
-              </a:rPr>
-              <a:t>ão</a:t>
+              <a:t>não</a:t>
             </a:r>
             <a:r>
               <a:rPr lang="en-US" dirty="0" smtClean="0">
@@ -21882,15 +21783,7 @@
                 <a:ea typeface="Helvetica" charset="0"/>
                 <a:cs typeface="Helvetica" charset="0"/>
               </a:rPr>
-              <a:t>Otimiza</a:t>
-            </a:r>
-            <a:r>
-              <a:rPr lang="en-US" b="1" dirty="0" err="1" smtClean="0">
-                <a:latin typeface="Helvetica" charset="0"/>
-                <a:ea typeface="Helvetica" charset="0"/>
-                <a:cs typeface="Helvetica" charset="0"/>
-              </a:rPr>
-              <a:t>ções</a:t>
+              <a:t>Otimizações</a:t>
             </a:r>
             <a:endParaRPr lang="en-US" sz="2800" b="1" dirty="0">
               <a:latin typeface="Helvetica" charset="0"/>
@@ -22305,15 +22198,7 @@
                 <a:ea typeface="Helvetica" charset="0"/>
                 <a:cs typeface="Helvetica" charset="0"/>
               </a:rPr>
-              <a:t>Otimiza</a:t>
-            </a:r>
-            <a:r>
-              <a:rPr lang="en-US" b="1" dirty="0" err="1" smtClean="0">
-                <a:latin typeface="Helvetica" charset="0"/>
-                <a:ea typeface="Helvetica" charset="0"/>
-                <a:cs typeface="Helvetica" charset="0"/>
-              </a:rPr>
-              <a:t>ções</a:t>
+              <a:t>Otimizações</a:t>
             </a:r>
             <a:r>
               <a:rPr lang="en-US" b="1" dirty="0" smtClean="0">
@@ -23126,15 +23011,7 @@
                 <a:ea typeface="Helvetica" charset="0"/>
                 <a:cs typeface="Helvetica" charset="0"/>
               </a:rPr>
-              <a:t>Otimiza</a:t>
-            </a:r>
-            <a:r>
-              <a:rPr lang="en-US" b="1" dirty="0" err="1" smtClean="0">
-                <a:latin typeface="Helvetica" charset="0"/>
-                <a:ea typeface="Helvetica" charset="0"/>
-                <a:cs typeface="Helvetica" charset="0"/>
-              </a:rPr>
-              <a:t>ções</a:t>
+              <a:t>Otimizações</a:t>
             </a:r>
             <a:r>
               <a:rPr lang="en-US" b="1" dirty="0" smtClean="0">
@@ -24402,15 +24279,7 @@
                 <a:ea typeface="Helvetica" charset="0"/>
                 <a:cs typeface="Helvetica" charset="0"/>
               </a:rPr>
-              <a:t>Otimiza</a:t>
-            </a:r>
-            <a:r>
-              <a:rPr lang="en-US" b="1" dirty="0" err="1" smtClean="0">
-                <a:latin typeface="Helvetica" charset="0"/>
-                <a:ea typeface="Helvetica" charset="0"/>
-                <a:cs typeface="Helvetica" charset="0"/>
-              </a:rPr>
-              <a:t>ções</a:t>
+              <a:t>Otimizações</a:t>
             </a:r>
             <a:r>
               <a:rPr lang="en-US" b="1" dirty="0" smtClean="0">
@@ -26263,7 +26132,7 @@
           </a:p>
           <a:p>
             <a:r>
-              <a:rPr lang="en-US" sz="2000" dirty="0" err="1" smtClean="0">
+              <a:rPr lang="en-US" sz="2000" smtClean="0">
                 <a:solidFill>
                   <a:schemeClr val="tx1"/>
                 </a:solidFill>
@@ -26651,15 +26520,7 @@
                 <a:ea typeface="Helvetica" charset="0"/>
                 <a:cs typeface="Helvetica" charset="0"/>
               </a:rPr>
-              <a:t>Otimiza</a:t>
-            </a:r>
-            <a:r>
-              <a:rPr lang="en-US" b="1" dirty="0" err="1" smtClean="0">
-                <a:latin typeface="Helvetica" charset="0"/>
-                <a:ea typeface="Helvetica" charset="0"/>
-                <a:cs typeface="Helvetica" charset="0"/>
-              </a:rPr>
-              <a:t>ções</a:t>
+              <a:t>Otimizações</a:t>
             </a:r>
             <a:r>
               <a:rPr lang="en-US" b="1" dirty="0" smtClean="0">
@@ -26803,15 +26664,7 @@
                 <a:ea typeface="Helvetica" charset="0"/>
                 <a:cs typeface="Helvetica" charset="0"/>
               </a:rPr>
-              <a:t>An</a:t>
-            </a:r>
-            <a:r>
-              <a:rPr lang="en-US" b="1" dirty="0" err="1" smtClean="0">
-                <a:latin typeface="Helvetica" charset="0"/>
-                <a:ea typeface="Helvetica" charset="0"/>
-                <a:cs typeface="Helvetica" charset="0"/>
-              </a:rPr>
-              <a:t>álises</a:t>
+              <a:t>Análises</a:t>
             </a:r>
             <a:r>
               <a:rPr lang="en-US" b="1" dirty="0" smtClean="0">
@@ -28291,18 +28144,7 @@
                 <a:ea typeface="Helvetica" charset="0"/>
                 <a:cs typeface="Helvetica" charset="0"/>
               </a:rPr>
-              <a:t>"</a:t>
-            </a:r>
-            <a:r>
-              <a:rPr lang="en-US" dirty="0" smtClean="0">
-                <a:solidFill>
-                  <a:schemeClr val="tx1"/>
-                </a:solidFill>
-                <a:latin typeface="Helvetica" charset="0"/>
-                <a:ea typeface="Helvetica" charset="0"/>
-                <a:cs typeface="Helvetica" charset="0"/>
-              </a:rPr>
-              <a:t>Section </a:t>
+              <a:t>"Section </a:t>
             </a:r>
             <a:r>
               <a:rPr lang="en-US" dirty="0">
@@ -28346,29 +28188,7 @@
                 <a:ea typeface="Helvetica" charset="0"/>
                 <a:cs typeface="Helvetica" charset="0"/>
               </a:rPr>
-              <a:t>algorithm</a:t>
-            </a:r>
-            <a:r>
-              <a:rPr lang="en-US" dirty="0" smtClean="0">
-                <a:solidFill>
-                  <a:schemeClr val="tx1"/>
-                </a:solidFill>
-                <a:latin typeface="Helvetica" charset="0"/>
-                <a:ea typeface="Helvetica" charset="0"/>
-                <a:cs typeface="Helvetica" charset="0"/>
-              </a:rPr>
-              <a:t>”</a:t>
-            </a:r>
-            <a:r>
-              <a:rPr lang="en-US" dirty="0" smtClean="0">
-                <a:solidFill>
-                  <a:schemeClr val="tx1"/>
-                </a:solidFill>
-                <a:latin typeface="Helvetica" charset="0"/>
-                <a:ea typeface="Helvetica" charset="0"/>
-                <a:cs typeface="Helvetica" charset="0"/>
-              </a:rPr>
-              <a:t>. </a:t>
+              <a:t>algorithm”. </a:t>
             </a:r>
             <a:r>
               <a:rPr lang="en-US" i="1" dirty="0" smtClean="0">
@@ -28444,18 +28264,7 @@
                 <a:ea typeface="Helvetica" charset="0"/>
                 <a:cs typeface="Helvetica" charset="0"/>
               </a:rPr>
-              <a:t>"</a:t>
-            </a:r>
-            <a:r>
-              <a:rPr lang="en-US" dirty="0" smtClean="0">
-                <a:solidFill>
-                  <a:schemeClr val="tx1"/>
-                </a:solidFill>
-                <a:latin typeface="Helvetica" charset="0"/>
-                <a:ea typeface="Helvetica" charset="0"/>
-                <a:cs typeface="Helvetica" charset="0"/>
-              </a:rPr>
-              <a:t>An </a:t>
+              <a:t>"An </a:t>
             </a:r>
             <a:r>
               <a:rPr lang="en-US" dirty="0">
@@ -28477,29 +28286,7 @@
                 <a:ea typeface="Helvetica" charset="0"/>
                 <a:cs typeface="Helvetica" charset="0"/>
               </a:rPr>
-              <a:t>algorithms</a:t>
-            </a:r>
-            <a:r>
-              <a:rPr lang="en-US" dirty="0" smtClean="0">
-                <a:solidFill>
-                  <a:schemeClr val="tx1"/>
-                </a:solidFill>
-                <a:latin typeface="Helvetica" charset="0"/>
-                <a:ea typeface="Helvetica" charset="0"/>
-                <a:cs typeface="Helvetica" charset="0"/>
-              </a:rPr>
-              <a:t>"</a:t>
-            </a:r>
-            <a:r>
-              <a:rPr lang="en-US" dirty="0" smtClean="0">
-                <a:solidFill>
-                  <a:schemeClr val="tx1"/>
-                </a:solidFill>
-                <a:latin typeface="Helvetica" charset="0"/>
-                <a:ea typeface="Helvetica" charset="0"/>
-                <a:cs typeface="Helvetica" charset="0"/>
-              </a:rPr>
-              <a:t>. </a:t>
+              <a:t>algorithms". </a:t>
             </a:r>
             <a:r>
               <a:rPr lang="en-US" i="1" dirty="0">
@@ -28553,18 +28340,7 @@
                 <a:ea typeface="Helvetica" charset="0"/>
                 <a:cs typeface="Helvetica" charset="0"/>
               </a:rPr>
-              <a:t>[10] </a:t>
-            </a:r>
-            <a:r>
-              <a:rPr lang="en-US" dirty="0" smtClean="0">
-                <a:solidFill>
-                  <a:schemeClr val="tx1"/>
-                </a:solidFill>
-                <a:latin typeface="Helvetica" charset="0"/>
-                <a:ea typeface="Helvetica" charset="0"/>
-                <a:cs typeface="Helvetica" charset="0"/>
-              </a:rPr>
-              <a:t>M</a:t>
+              <a:t>[10] M</a:t>
             </a:r>
             <a:r>
               <a:rPr lang="en-US" dirty="0">
@@ -28608,18 +28384,7 @@
                 <a:ea typeface="Helvetica" charset="0"/>
                 <a:cs typeface="Helvetica" charset="0"/>
               </a:rPr>
-              <a:t>"</a:t>
-            </a:r>
-            <a:r>
-              <a:rPr lang="en-US" dirty="0" smtClean="0">
-                <a:solidFill>
-                  <a:schemeClr val="tx1"/>
-                </a:solidFill>
-                <a:latin typeface="Helvetica" charset="0"/>
-                <a:ea typeface="Helvetica" charset="0"/>
-                <a:cs typeface="Helvetica" charset="0"/>
-              </a:rPr>
-              <a:t>Adaptive </a:t>
+              <a:t>"Adaptive </a:t>
             </a:r>
             <a:r>
               <a:rPr lang="en-US" dirty="0">
@@ -28641,29 +28406,7 @@
                 <a:ea typeface="Helvetica" charset="0"/>
                 <a:cs typeface="Helvetica" charset="0"/>
               </a:rPr>
-              <a:t>algorithms</a:t>
-            </a:r>
-            <a:r>
-              <a:rPr lang="en-US" dirty="0" smtClean="0">
-                <a:solidFill>
-                  <a:schemeClr val="tx1"/>
-                </a:solidFill>
-                <a:latin typeface="Helvetica" charset="0"/>
-                <a:ea typeface="Helvetica" charset="0"/>
-                <a:cs typeface="Helvetica" charset="0"/>
-              </a:rPr>
-              <a:t>"</a:t>
-            </a:r>
-            <a:r>
-              <a:rPr lang="en-US" dirty="0" smtClean="0">
-                <a:solidFill>
-                  <a:schemeClr val="tx1"/>
-                </a:solidFill>
-                <a:latin typeface="Helvetica" charset="0"/>
-                <a:ea typeface="Helvetica" charset="0"/>
-                <a:cs typeface="Helvetica" charset="0"/>
-              </a:rPr>
-              <a:t>. </a:t>
+              <a:t>algorithms". </a:t>
             </a:r>
             <a:r>
               <a:rPr lang="en-US" i="1" dirty="0">
@@ -28687,14 +28430,6 @@
               </a:rPr>
               <a:t>, 24(4):656–667, 1994. </a:t>
             </a:r>
-            <a:endParaRPr lang="en-US" dirty="0">
-              <a:solidFill>
-                <a:schemeClr val="tx1"/>
-              </a:solidFill>
-              <a:latin typeface="Helvetica" charset="0"/>
-              <a:ea typeface="Helvetica" charset="0"/>
-              <a:cs typeface="Helvetica" charset="0"/>
-            </a:endParaRPr>
           </a:p>
           <a:p>
             <a:endParaRPr lang="en-US" dirty="0">
@@ -28904,18 +28639,7 @@
                 <a:ea typeface="Helvetica" charset="0"/>
                 <a:cs typeface="Helvetica" charset="0"/>
               </a:rPr>
-              <a:t>“</a:t>
-            </a:r>
-            <a:r>
-              <a:rPr lang="en-US" dirty="0" smtClean="0">
-                <a:solidFill>
-                  <a:schemeClr val="tx1"/>
-                </a:solidFill>
-                <a:latin typeface="Helvetica" charset="0"/>
-                <a:ea typeface="Helvetica" charset="0"/>
-                <a:cs typeface="Helvetica" charset="0"/>
-              </a:rPr>
-              <a:t>Adaptive </a:t>
+              <a:t>“Adaptive </a:t>
             </a:r>
             <a:r>
               <a:rPr lang="en-US" dirty="0">
@@ -28937,29 +28661,7 @@
                 <a:ea typeface="Helvetica" charset="0"/>
                 <a:cs typeface="Helvetica" charset="0"/>
               </a:rPr>
-              <a:t>enetic Algorithm</a:t>
-            </a:r>
-            <a:r>
-              <a:rPr lang="en-US" dirty="0" smtClean="0">
-                <a:solidFill>
-                  <a:schemeClr val="tx1"/>
-                </a:solidFill>
-                <a:latin typeface="Helvetica" charset="0"/>
-                <a:ea typeface="Helvetica" charset="0"/>
-                <a:cs typeface="Helvetica" charset="0"/>
-              </a:rPr>
-              <a:t>”</a:t>
-            </a:r>
-            <a:r>
-              <a:rPr lang="en-US" dirty="0" smtClean="0">
-                <a:solidFill>
-                  <a:schemeClr val="tx1"/>
-                </a:solidFill>
-                <a:latin typeface="Helvetica" charset="0"/>
-                <a:ea typeface="Helvetica" charset="0"/>
-                <a:cs typeface="Helvetica" charset="0"/>
-              </a:rPr>
-              <a:t>. </a:t>
+              <a:t>enetic Algorithm”. </a:t>
             </a:r>
             <a:r>
               <a:rPr lang="en-US" i="1" dirty="0">
@@ -28983,14 +28685,6 @@
               </a:rPr>
               <a:t>, 7(3):229–235, 1999. </a:t>
             </a:r>
-            <a:endParaRPr lang="en-US" dirty="0">
-              <a:solidFill>
-                <a:schemeClr val="tx1"/>
-              </a:solidFill>
-              <a:latin typeface="Helvetica" charset="0"/>
-              <a:ea typeface="Helvetica" charset="0"/>
-              <a:cs typeface="Helvetica" charset="0"/>
-            </a:endParaRPr>
           </a:p>
           <a:p>
             <a:r>
@@ -29024,18 +28718,7 @@
                 <a:ea typeface="Helvetica" charset="0"/>
                 <a:cs typeface="Helvetica" charset="0"/>
               </a:rPr>
-              <a:t>"</a:t>
-            </a:r>
-            <a:r>
-              <a:rPr lang="en-US" dirty="0" smtClean="0">
-                <a:solidFill>
-                  <a:schemeClr val="tx1"/>
-                </a:solidFill>
-                <a:latin typeface="Helvetica" charset="0"/>
-                <a:ea typeface="Helvetica" charset="0"/>
-                <a:cs typeface="Helvetica" charset="0"/>
-              </a:rPr>
-              <a:t>Improved </a:t>
+              <a:t>"Improved </a:t>
             </a:r>
             <a:r>
               <a:rPr lang="en-US" dirty="0">
@@ -29057,29 +28740,7 @@
                 <a:ea typeface="Helvetica" charset="0"/>
                 <a:cs typeface="Helvetica" charset="0"/>
               </a:rPr>
-              <a:t>segmentation</a:t>
-            </a:r>
-            <a:r>
-              <a:rPr lang="en-US" dirty="0" smtClean="0">
-                <a:solidFill>
-                  <a:schemeClr val="tx1"/>
-                </a:solidFill>
-                <a:latin typeface="Helvetica" charset="0"/>
-                <a:ea typeface="Helvetica" charset="0"/>
-                <a:cs typeface="Helvetica" charset="0"/>
-              </a:rPr>
-              <a:t>"</a:t>
-            </a:r>
-            <a:r>
-              <a:rPr lang="en-US" dirty="0" smtClean="0">
-                <a:solidFill>
-                  <a:schemeClr val="tx1"/>
-                </a:solidFill>
-                <a:latin typeface="Helvetica" charset="0"/>
-                <a:ea typeface="Helvetica" charset="0"/>
-                <a:cs typeface="Helvetica" charset="0"/>
-              </a:rPr>
-              <a:t>. </a:t>
+              <a:t>segmentation". </a:t>
             </a:r>
             <a:r>
               <a:rPr lang="en-US" i="1" dirty="0">
@@ -29188,18 +28849,7 @@
                 <a:ea typeface="Helvetica" charset="0"/>
                 <a:cs typeface="Helvetica" charset="0"/>
               </a:rPr>
-              <a:t>"</a:t>
-            </a:r>
-            <a:r>
-              <a:rPr lang="en-US" dirty="0" smtClean="0">
-                <a:solidFill>
-                  <a:schemeClr val="tx1"/>
-                </a:solidFill>
-                <a:latin typeface="Helvetica" charset="0"/>
-                <a:ea typeface="Helvetica" charset="0"/>
-                <a:cs typeface="Helvetica" charset="0"/>
-              </a:rPr>
-              <a:t>Variable </a:t>
+              <a:t>"Variable </a:t>
             </a:r>
             <a:r>
               <a:rPr lang="en-US" dirty="0">
@@ -29221,29 +28871,7 @@
                 <a:ea typeface="Helvetica" charset="0"/>
                 <a:cs typeface="Helvetica" charset="0"/>
               </a:rPr>
-              <a:t>representation</a:t>
-            </a:r>
-            <a:r>
-              <a:rPr lang="en-US" dirty="0" smtClean="0">
-                <a:solidFill>
-                  <a:schemeClr val="tx1"/>
-                </a:solidFill>
-                <a:latin typeface="Helvetica" charset="0"/>
-                <a:ea typeface="Helvetica" charset="0"/>
-                <a:cs typeface="Helvetica" charset="0"/>
-              </a:rPr>
-              <a:t>"</a:t>
-            </a:r>
-            <a:r>
-              <a:rPr lang="en-US" dirty="0" smtClean="0">
-                <a:solidFill>
-                  <a:schemeClr val="tx1"/>
-                </a:solidFill>
-                <a:latin typeface="Helvetica" charset="0"/>
-                <a:ea typeface="Helvetica" charset="0"/>
-                <a:cs typeface="Helvetica" charset="0"/>
-              </a:rPr>
-              <a:t>. </a:t>
+              <a:t>representation". </a:t>
             </a:r>
             <a:r>
               <a:rPr lang="en-US" i="1" dirty="0">
@@ -30469,18 +30097,7 @@
                 <a:ea typeface="Helvetica" charset="0"/>
                 <a:cs typeface="Helvetica" charset="0"/>
               </a:rPr>
-              <a:t>solu</a:t>
-            </a:r>
-            <a:r>
-              <a:rPr lang="en-US" sz="2000" b="1" dirty="0" err="1" smtClean="0">
-                <a:solidFill>
-                  <a:schemeClr val="tx1"/>
-                </a:solidFill>
-                <a:latin typeface="Helvetica" charset="0"/>
-                <a:ea typeface="Helvetica" charset="0"/>
-                <a:cs typeface="Helvetica" charset="0"/>
-              </a:rPr>
-              <a:t>ções</a:t>
+              <a:t>soluções</a:t>
             </a:r>
             <a:r>
               <a:rPr lang="en-US" sz="2000" b="1" dirty="0" smtClean="0">
@@ -30491,18 +30108,7 @@
                 <a:ea typeface="Helvetica" charset="0"/>
                 <a:cs typeface="Helvetica" charset="0"/>
               </a:rPr>
-              <a:t> </a:t>
-            </a:r>
-            <a:r>
-              <a:rPr lang="en-US" sz="2000" b="1" dirty="0" smtClean="0">
-                <a:solidFill>
-                  <a:schemeClr val="tx1"/>
-                </a:solidFill>
-                <a:latin typeface="Helvetica" charset="0"/>
-                <a:ea typeface="Helvetica" charset="0"/>
-                <a:cs typeface="Helvetica" charset="0"/>
-              </a:rPr>
-              <a:t>antes de performance</a:t>
+              <a:t> antes de performance</a:t>
             </a:r>
             <a:endParaRPr lang="en-US" sz="2000" dirty="0" smtClean="0">
               <a:solidFill>
@@ -31477,29 +31083,7 @@
                 <a:ea typeface="Helvetica" charset="0"/>
                 <a:cs typeface="Helvetica" charset="0"/>
               </a:rPr>
-              <a:t>[</a:t>
-            </a:r>
-            <a:r>
-              <a:rPr lang="en-US" b="1" baseline="30000" dirty="0" smtClean="0">
-                <a:solidFill>
-                  <a:srgbClr val="0432FF"/>
-                </a:solidFill>
-                <a:latin typeface="Helvetica" charset="0"/>
-                <a:ea typeface="Helvetica" charset="0"/>
-                <a:cs typeface="Helvetica" charset="0"/>
-              </a:rPr>
-              <a:t>1,2</a:t>
-            </a:r>
-            <a:r>
-              <a:rPr lang="en-US" b="1" baseline="30000" dirty="0" smtClean="0">
-                <a:solidFill>
-                  <a:srgbClr val="0432FF"/>
-                </a:solidFill>
-                <a:latin typeface="Helvetica" charset="0"/>
-                <a:ea typeface="Helvetica" charset="0"/>
-                <a:cs typeface="Helvetica" charset="0"/>
-              </a:rPr>
-              <a:t>]</a:t>
+              <a:t>[1,2]</a:t>
             </a:r>
             <a:r>
               <a:rPr lang="en-US" b="1" dirty="0" smtClean="0">
@@ -31554,18 +31138,7 @@
                 <a:ea typeface="Helvetica" charset="0"/>
                 <a:cs typeface="Helvetica" charset="0"/>
               </a:rPr>
-              <a:t>num</a:t>
-            </a:r>
-            <a:r>
-              <a:rPr lang="en-US" dirty="0" err="1" smtClean="0">
-                <a:solidFill>
-                  <a:schemeClr val="tx1"/>
-                </a:solidFill>
-                <a:latin typeface="Helvetica" charset="0"/>
-                <a:ea typeface="Helvetica" charset="0"/>
-                <a:cs typeface="Helvetica" charset="0"/>
-              </a:rPr>
-              <a:t>érica</a:t>
+              <a:t>numérica</a:t>
             </a:r>
             <a:r>
               <a:rPr lang="en-US" dirty="0" smtClean="0">
@@ -31622,14 +31195,6 @@
               </a:rPr>
               <a:t>)</a:t>
             </a:r>
-            <a:endParaRPr lang="en-US" dirty="0" smtClean="0">
-              <a:solidFill>
-                <a:schemeClr val="tx1"/>
-              </a:solidFill>
-              <a:latin typeface="Helvetica" charset="0"/>
-              <a:ea typeface="Helvetica" charset="0"/>
-              <a:cs typeface="Helvetica" charset="0"/>
-            </a:endParaRPr>
           </a:p>
         </p:txBody>
       </p:sp>
@@ -31749,18 +31314,7 @@
                 <a:ea typeface="Helvetica" charset="0"/>
                 <a:cs typeface="Helvetica" charset="0"/>
               </a:rPr>
-              <a:t>[2</a:t>
-            </a:r>
-            <a:r>
-              <a:rPr lang="en-US" b="1" baseline="30000" dirty="0" smtClean="0">
-                <a:solidFill>
-                  <a:srgbClr val="00B0F0"/>
-                </a:solidFill>
-                <a:latin typeface="Helvetica" charset="0"/>
-                <a:ea typeface="Helvetica" charset="0"/>
-                <a:cs typeface="Helvetica" charset="0"/>
-              </a:rPr>
-              <a:t>]</a:t>
+              <a:t>[2]</a:t>
             </a:r>
             <a:endParaRPr lang="en-US" b="1" baseline="30000" dirty="0">
               <a:solidFill>

</xml_diff>

<commit_message>
Added a few more images for presentation
</commit_message>
<xml_diff>
--- a/presentations/TG2_Apresentacao_Cassio.pptx
+++ b/presentations/TG2_Apresentacao_Cassio.pptx
@@ -5,7 +5,7 @@
     <p:sldMasterId id="2147484198" r:id="rId1"/>
   </p:sldMasterIdLst>
   <p:notesMasterIdLst>
-    <p:notesMasterId r:id="rId26"/>
+    <p:notesMasterId r:id="rId29"/>
   </p:notesMasterIdLst>
   <p:sldIdLst>
     <p:sldId id="256" r:id="rId2"/>
@@ -28,10 +28,13 @@
     <p:sldId id="286" r:id="rId19"/>
     <p:sldId id="288" r:id="rId20"/>
     <p:sldId id="287" r:id="rId21"/>
-    <p:sldId id="291" r:id="rId22"/>
-    <p:sldId id="269" r:id="rId23"/>
-    <p:sldId id="271" r:id="rId24"/>
-    <p:sldId id="289" r:id="rId25"/>
+    <p:sldId id="293" r:id="rId22"/>
+    <p:sldId id="292" r:id="rId23"/>
+    <p:sldId id="294" r:id="rId24"/>
+    <p:sldId id="291" r:id="rId25"/>
+    <p:sldId id="269" r:id="rId26"/>
+    <p:sldId id="271" r:id="rId27"/>
+    <p:sldId id="289" r:id="rId28"/>
   </p:sldIdLst>
   <p:sldSz cx="12192000" cy="6858000"/>
   <p:notesSz cx="6858000" cy="9144000"/>
@@ -1234,7 +1237,175 @@
     </p:spTree>
     <p:extLst>
       <p:ext uri="{BB962C8B-B14F-4D97-AF65-F5344CB8AC3E}">
-        <p14:creationId xmlns:p14="http://schemas.microsoft.com/office/powerpoint/2010/main" val="2072068894"/>
+        <p14:creationId xmlns:p14="http://schemas.microsoft.com/office/powerpoint/2010/main" val="1437822982"/>
+      </p:ext>
+    </p:extLst>
+  </p:cSld>
+  <p:clrMapOvr>
+    <a:masterClrMapping/>
+  </p:clrMapOvr>
+</p:notes>
+</file>
+
+<file path=ppt/notesSlides/notesSlide18.xml><?xml version="1.0" encoding="utf-8"?>
+<p:notes xmlns:a="http://schemas.openxmlformats.org/drawingml/2006/main" xmlns:r="http://schemas.openxmlformats.org/officeDocument/2006/relationships" xmlns:p="http://schemas.openxmlformats.org/presentationml/2006/main">
+  <p:cSld>
+    <p:spTree>
+      <p:nvGrpSpPr>
+        <p:cNvPr id="1" name=""/>
+        <p:cNvGrpSpPr/>
+        <p:nvPr/>
+      </p:nvGrpSpPr>
+      <p:grpSpPr>
+        <a:xfrm>
+          <a:off x="0" y="0"/>
+          <a:ext cx="0" cy="0"/>
+          <a:chOff x="0" y="0"/>
+          <a:chExt cx="0" cy="0"/>
+        </a:xfrm>
+      </p:grpSpPr>
+      <p:sp>
+        <p:nvSpPr>
+          <p:cNvPr id="2" name="Slide Image Placeholder 1"/>
+          <p:cNvSpPr>
+            <a:spLocks noGrp="1" noRot="1" noChangeAspect="1"/>
+          </p:cNvSpPr>
+          <p:nvPr>
+            <p:ph type="sldImg"/>
+          </p:nvPr>
+        </p:nvSpPr>
+        <p:spPr/>
+      </p:sp>
+      <p:sp>
+        <p:nvSpPr>
+          <p:cNvPr id="3" name="Notes Placeholder 2"/>
+          <p:cNvSpPr>
+            <a:spLocks noGrp="1"/>
+          </p:cNvSpPr>
+          <p:nvPr>
+            <p:ph type="body" idx="1"/>
+          </p:nvPr>
+        </p:nvSpPr>
+        <p:spPr/>
+        <p:txBody>
+          <a:bodyPr/>
+          <a:lstStyle/>
+          <a:p>
+            <a:endParaRPr lang="en-US"/>
+          </a:p>
+        </p:txBody>
+      </p:sp>
+      <p:sp>
+        <p:nvSpPr>
+          <p:cNvPr id="4" name="Slide Number Placeholder 3"/>
+          <p:cNvSpPr>
+            <a:spLocks noGrp="1"/>
+          </p:cNvSpPr>
+          <p:nvPr>
+            <p:ph type="sldNum" sz="quarter" idx="10"/>
+          </p:nvPr>
+        </p:nvSpPr>
+        <p:spPr/>
+        <p:txBody>
+          <a:bodyPr/>
+          <a:lstStyle/>
+          <a:p>
+            <a:fld id="{728E3497-A358-B14F-AE0E-969A2D296615}" type="slidenum">
+              <a:rPr lang="en-US" smtClean="0"/>
+              <a:t>21</a:t>
+            </a:fld>
+            <a:endParaRPr lang="en-US"/>
+          </a:p>
+        </p:txBody>
+      </p:sp>
+    </p:spTree>
+    <p:extLst>
+      <p:ext uri="{BB962C8B-B14F-4D97-AF65-F5344CB8AC3E}">
+        <p14:creationId xmlns:p14="http://schemas.microsoft.com/office/powerpoint/2010/main" val="1234342965"/>
+      </p:ext>
+    </p:extLst>
+  </p:cSld>
+  <p:clrMapOvr>
+    <a:masterClrMapping/>
+  </p:clrMapOvr>
+</p:notes>
+</file>
+
+<file path=ppt/notesSlides/notesSlide19.xml><?xml version="1.0" encoding="utf-8"?>
+<p:notes xmlns:a="http://schemas.openxmlformats.org/drawingml/2006/main" xmlns:r="http://schemas.openxmlformats.org/officeDocument/2006/relationships" xmlns:p="http://schemas.openxmlformats.org/presentationml/2006/main">
+  <p:cSld>
+    <p:spTree>
+      <p:nvGrpSpPr>
+        <p:cNvPr id="1" name=""/>
+        <p:cNvGrpSpPr/>
+        <p:nvPr/>
+      </p:nvGrpSpPr>
+      <p:grpSpPr>
+        <a:xfrm>
+          <a:off x="0" y="0"/>
+          <a:ext cx="0" cy="0"/>
+          <a:chOff x="0" y="0"/>
+          <a:chExt cx="0" cy="0"/>
+        </a:xfrm>
+      </p:grpSpPr>
+      <p:sp>
+        <p:nvSpPr>
+          <p:cNvPr id="2" name="Slide Image Placeholder 1"/>
+          <p:cNvSpPr>
+            <a:spLocks noGrp="1" noRot="1" noChangeAspect="1"/>
+          </p:cNvSpPr>
+          <p:nvPr>
+            <p:ph type="sldImg"/>
+          </p:nvPr>
+        </p:nvSpPr>
+        <p:spPr/>
+      </p:sp>
+      <p:sp>
+        <p:nvSpPr>
+          <p:cNvPr id="3" name="Notes Placeholder 2"/>
+          <p:cNvSpPr>
+            <a:spLocks noGrp="1"/>
+          </p:cNvSpPr>
+          <p:nvPr>
+            <p:ph type="body" idx="1"/>
+          </p:nvPr>
+        </p:nvSpPr>
+        <p:spPr/>
+        <p:txBody>
+          <a:bodyPr/>
+          <a:lstStyle/>
+          <a:p>
+            <a:endParaRPr lang="en-US"/>
+          </a:p>
+        </p:txBody>
+      </p:sp>
+      <p:sp>
+        <p:nvSpPr>
+          <p:cNvPr id="4" name="Slide Number Placeholder 3"/>
+          <p:cNvSpPr>
+            <a:spLocks noGrp="1"/>
+          </p:cNvSpPr>
+          <p:nvPr>
+            <p:ph type="sldNum" sz="quarter" idx="10"/>
+          </p:nvPr>
+        </p:nvSpPr>
+        <p:spPr/>
+        <p:txBody>
+          <a:bodyPr/>
+          <a:lstStyle/>
+          <a:p>
+            <a:fld id="{728E3497-A358-B14F-AE0E-969A2D296615}" type="slidenum">
+              <a:rPr lang="en-US" smtClean="0"/>
+              <a:t>22</a:t>
+            </a:fld>
+            <a:endParaRPr lang="en-US"/>
+          </a:p>
+        </p:txBody>
+      </p:sp>
+    </p:spTree>
+    <p:extLst>
+      <p:ext uri="{BB962C8B-B14F-4D97-AF65-F5344CB8AC3E}">
+        <p14:creationId xmlns:p14="http://schemas.microsoft.com/office/powerpoint/2010/main" val="1923837116"/>
       </p:ext>
     </p:extLst>
   </p:cSld>
@@ -1319,6 +1490,90 @@
     <p:extLst>
       <p:ext uri="{BB962C8B-B14F-4D97-AF65-F5344CB8AC3E}">
         <p14:creationId xmlns:p14="http://schemas.microsoft.com/office/powerpoint/2010/main" val="1676824279"/>
+      </p:ext>
+    </p:extLst>
+  </p:cSld>
+  <p:clrMapOvr>
+    <a:masterClrMapping/>
+  </p:clrMapOvr>
+</p:notes>
+</file>
+
+<file path=ppt/notesSlides/notesSlide20.xml><?xml version="1.0" encoding="utf-8"?>
+<p:notes xmlns:a="http://schemas.openxmlformats.org/drawingml/2006/main" xmlns:r="http://schemas.openxmlformats.org/officeDocument/2006/relationships" xmlns:p="http://schemas.openxmlformats.org/presentationml/2006/main">
+  <p:cSld>
+    <p:spTree>
+      <p:nvGrpSpPr>
+        <p:cNvPr id="1" name=""/>
+        <p:cNvGrpSpPr/>
+        <p:nvPr/>
+      </p:nvGrpSpPr>
+      <p:grpSpPr>
+        <a:xfrm>
+          <a:off x="0" y="0"/>
+          <a:ext cx="0" cy="0"/>
+          <a:chOff x="0" y="0"/>
+          <a:chExt cx="0" cy="0"/>
+        </a:xfrm>
+      </p:grpSpPr>
+      <p:sp>
+        <p:nvSpPr>
+          <p:cNvPr id="2" name="Slide Image Placeholder 1"/>
+          <p:cNvSpPr>
+            <a:spLocks noGrp="1" noRot="1" noChangeAspect="1"/>
+          </p:cNvSpPr>
+          <p:nvPr>
+            <p:ph type="sldImg"/>
+          </p:nvPr>
+        </p:nvSpPr>
+        <p:spPr/>
+      </p:sp>
+      <p:sp>
+        <p:nvSpPr>
+          <p:cNvPr id="3" name="Notes Placeholder 2"/>
+          <p:cNvSpPr>
+            <a:spLocks noGrp="1"/>
+          </p:cNvSpPr>
+          <p:nvPr>
+            <p:ph type="body" idx="1"/>
+          </p:nvPr>
+        </p:nvSpPr>
+        <p:spPr/>
+        <p:txBody>
+          <a:bodyPr/>
+          <a:lstStyle/>
+          <a:p>
+            <a:endParaRPr lang="en-US"/>
+          </a:p>
+        </p:txBody>
+      </p:sp>
+      <p:sp>
+        <p:nvSpPr>
+          <p:cNvPr id="4" name="Slide Number Placeholder 3"/>
+          <p:cNvSpPr>
+            <a:spLocks noGrp="1"/>
+          </p:cNvSpPr>
+          <p:nvPr>
+            <p:ph type="sldNum" sz="quarter" idx="10"/>
+          </p:nvPr>
+        </p:nvSpPr>
+        <p:spPr/>
+        <p:txBody>
+          <a:bodyPr/>
+          <a:lstStyle/>
+          <a:p>
+            <a:fld id="{728E3497-A358-B14F-AE0E-969A2D296615}" type="slidenum">
+              <a:rPr lang="en-US" smtClean="0"/>
+              <a:t>23</a:t>
+            </a:fld>
+            <a:endParaRPr lang="en-US"/>
+          </a:p>
+        </p:txBody>
+      </p:sp>
+    </p:spTree>
+    <p:extLst>
+      <p:ext uri="{BB962C8B-B14F-4D97-AF65-F5344CB8AC3E}">
+        <p14:creationId xmlns:p14="http://schemas.microsoft.com/office/powerpoint/2010/main" val="2072068894"/>
       </p:ext>
     </p:extLst>
   </p:cSld>
@@ -26132,7 +26387,7 @@
           </a:p>
           <a:p>
             <a:r>
-              <a:rPr lang="en-US" sz="2000" smtClean="0">
+              <a:rPr lang="en-US" sz="2000" dirty="0" err="1" smtClean="0">
                 <a:solidFill>
                   <a:schemeClr val="tx1"/>
                 </a:solidFill>
@@ -26664,7 +26919,7 @@
                 <a:ea typeface="Helvetica" charset="0"/>
                 <a:cs typeface="Helvetica" charset="0"/>
               </a:rPr>
-              <a:t>Análises</a:t>
+              <a:t>Otimizações</a:t>
             </a:r>
             <a:r>
               <a:rPr lang="en-US" b="1" dirty="0" smtClean="0">
@@ -26672,7 +26927,31 @@
                 <a:ea typeface="Helvetica" charset="0"/>
                 <a:cs typeface="Helvetica" charset="0"/>
               </a:rPr>
-              <a:t> e </a:t>
+              <a:t> </a:t>
+            </a:r>
+            <a:r>
+              <a:rPr lang="mr-IN" b="1" dirty="0" smtClean="0">
+                <a:latin typeface="Helvetica" charset="0"/>
+                <a:ea typeface="Helvetica" charset="0"/>
+                <a:cs typeface="Helvetica" charset="0"/>
+              </a:rPr>
+              <a:t>–</a:t>
+            </a:r>
+            <a:r>
+              <a:rPr lang="en-US" b="1" dirty="0" smtClean="0">
+                <a:latin typeface="Helvetica" charset="0"/>
+                <a:ea typeface="Helvetica" charset="0"/>
+                <a:cs typeface="Helvetica" charset="0"/>
+              </a:rPr>
+              <a:t> </a:t>
+            </a:r>
+            <a:r>
+              <a:rPr lang="en-US" b="1" dirty="0" smtClean="0">
+                <a:latin typeface="Helvetica" charset="0"/>
+                <a:ea typeface="Helvetica" charset="0"/>
+                <a:cs typeface="Helvetica" charset="0"/>
+              </a:rPr>
+              <a:t>AGA (</a:t>
             </a:r>
             <a:r>
               <a:rPr lang="en-US" b="1" dirty="0" err="1" smtClean="0">
@@ -26680,86 +26959,17 @@
                 <a:ea typeface="Helvetica" charset="0"/>
                 <a:cs typeface="Helvetica" charset="0"/>
               </a:rPr>
-              <a:t>Resultados</a:t>
+              <a:t>Exemplos</a:t>
+            </a:r>
+            <a:r>
+              <a:rPr lang="en-US" b="1" dirty="0" smtClean="0">
+                <a:latin typeface="Helvetica" charset="0"/>
+                <a:ea typeface="Helvetica" charset="0"/>
+                <a:cs typeface="Helvetica" charset="0"/>
+              </a:rPr>
+              <a:t>)</a:t>
             </a:r>
             <a:endParaRPr lang="en-US" sz="2800" b="1" dirty="0">
-              <a:latin typeface="Helvetica" charset="0"/>
-              <a:ea typeface="Helvetica" charset="0"/>
-              <a:cs typeface="Helvetica" charset="0"/>
-            </a:endParaRPr>
-          </a:p>
-        </p:txBody>
-      </p:sp>
-      <p:sp>
-        <p:nvSpPr>
-          <p:cNvPr id="3" name="Content Placeholder 2"/>
-          <p:cNvSpPr>
-            <a:spLocks noGrp="1"/>
-          </p:cNvSpPr>
-          <p:nvPr>
-            <p:ph idx="1"/>
-          </p:nvPr>
-        </p:nvSpPr>
-        <p:spPr>
-          <a:xfrm>
-            <a:off x="1154954" y="2603500"/>
-            <a:ext cx="9647158" cy="4126484"/>
-          </a:xfrm>
-        </p:spPr>
-        <p:txBody>
-          <a:bodyPr>
-            <a:normAutofit/>
-          </a:bodyPr>
-          <a:lstStyle/>
-          <a:p>
-            <a:r>
-              <a:rPr lang="en-US" dirty="0" err="1">
-                <a:solidFill>
-                  <a:schemeClr val="tx1"/>
-                </a:solidFill>
-                <a:latin typeface="Helvetica" charset="0"/>
-                <a:ea typeface="Helvetica" charset="0"/>
-                <a:cs typeface="Helvetica" charset="0"/>
-              </a:rPr>
-              <a:t>T</a:t>
-            </a:r>
-            <a:r>
-              <a:rPr lang="en-US" dirty="0" err="1" smtClean="0">
-                <a:solidFill>
-                  <a:schemeClr val="tx1"/>
-                </a:solidFill>
-                <a:latin typeface="Helvetica" charset="0"/>
-                <a:ea typeface="Helvetica" charset="0"/>
-                <a:cs typeface="Helvetica" charset="0"/>
-              </a:rPr>
-              <a:t>exto</a:t>
-            </a:r>
-            <a:r>
-              <a:rPr lang="en-US" dirty="0" smtClean="0">
-                <a:solidFill>
-                  <a:schemeClr val="tx1"/>
-                </a:solidFill>
-                <a:latin typeface="Helvetica" charset="0"/>
-                <a:ea typeface="Helvetica" charset="0"/>
-                <a:cs typeface="Helvetica" charset="0"/>
-              </a:rPr>
-              <a:t> </a:t>
-            </a:r>
-            <a:r>
-              <a:rPr lang="en-US" dirty="0" err="1" smtClean="0">
-                <a:solidFill>
-                  <a:schemeClr val="tx1"/>
-                </a:solidFill>
-                <a:latin typeface="Helvetica" charset="0"/>
-                <a:ea typeface="Helvetica" charset="0"/>
-                <a:cs typeface="Helvetica" charset="0"/>
-              </a:rPr>
-              <a:t>aqui</a:t>
-            </a:r>
-            <a:endParaRPr lang="en-US" i="1" baseline="-25000" dirty="0" smtClean="0">
-              <a:solidFill>
-                <a:schemeClr val="tx1"/>
-              </a:solidFill>
               <a:latin typeface="Helvetica" charset="0"/>
               <a:ea typeface="Helvetica" charset="0"/>
               <a:cs typeface="Helvetica" charset="0"/>
@@ -26790,10 +27000,39 @@
           </a:p>
         </p:txBody>
       </p:sp>
+      <p:pic>
+        <p:nvPicPr>
+          <p:cNvPr id="8" name="Content Placeholder 7"/>
+          <p:cNvPicPr>
+            <a:picLocks noGrp="1" noChangeAspect="1"/>
+          </p:cNvPicPr>
+          <p:nvPr>
+            <p:ph idx="1"/>
+          </p:nvPr>
+        </p:nvPicPr>
+        <p:blipFill>
+          <a:blip r:embed="rId3">
+            <a:extLst>
+              <a:ext uri="{28A0092B-C50C-407E-A947-70E740481C1C}">
+                <a14:useLocalDpi xmlns:a14="http://schemas.microsoft.com/office/drawing/2010/main" val="0"/>
+              </a:ext>
+            </a:extLst>
+          </a:blip>
+          <a:stretch>
+            <a:fillRect/>
+          </a:stretch>
+        </p:blipFill>
+        <p:spPr>
+          <a:xfrm>
+            <a:off x="2288874" y="2603500"/>
+            <a:ext cx="6558564" cy="3416300"/>
+          </a:xfrm>
+        </p:spPr>
+      </p:pic>
     </p:spTree>
     <p:extLst>
       <p:ext uri="{BB962C8B-B14F-4D97-AF65-F5344CB8AC3E}">
-        <p14:creationId xmlns:p14="http://schemas.microsoft.com/office/powerpoint/2010/main" val="1732599681"/>
+        <p14:creationId xmlns:p14="http://schemas.microsoft.com/office/powerpoint/2010/main" val="1106345644"/>
       </p:ext>
     </p:extLst>
   </p:cSld>
@@ -26848,848 +27087,61 @@
                 <a:ea typeface="Helvetica" charset="0"/>
                 <a:cs typeface="Helvetica" charset="0"/>
               </a:rPr>
-              <a:t>Referências</a:t>
-            </a:r>
-            <a:endParaRPr lang="en-US" b="1" dirty="0">
+              <a:t>Otimizações</a:t>
+            </a:r>
+            <a:r>
+              <a:rPr lang="en-US" b="1" dirty="0" smtClean="0">
+                <a:latin typeface="Helvetica" charset="0"/>
+                <a:ea typeface="Helvetica" charset="0"/>
+                <a:cs typeface="Helvetica" charset="0"/>
+              </a:rPr>
+              <a:t> </a:t>
+            </a:r>
+            <a:r>
+              <a:rPr lang="mr-IN" b="1" dirty="0" smtClean="0">
+                <a:latin typeface="Helvetica" charset="0"/>
+                <a:ea typeface="Helvetica" charset="0"/>
+                <a:cs typeface="Helvetica" charset="0"/>
+              </a:rPr>
+              <a:t>–</a:t>
+            </a:r>
+            <a:r>
+              <a:rPr lang="en-US" b="1" dirty="0" smtClean="0">
+                <a:latin typeface="Helvetica" charset="0"/>
+                <a:ea typeface="Helvetica" charset="0"/>
+                <a:cs typeface="Helvetica" charset="0"/>
+              </a:rPr>
+              <a:t> </a:t>
+            </a:r>
+            <a:r>
+              <a:rPr lang="en-US" b="1" dirty="0" smtClean="0">
+                <a:latin typeface="Helvetica" charset="0"/>
+                <a:ea typeface="Helvetica" charset="0"/>
+                <a:cs typeface="Helvetica" charset="0"/>
+              </a:rPr>
+              <a:t>AGA (</a:t>
+            </a:r>
+            <a:r>
+              <a:rPr lang="en-US" b="1" dirty="0" err="1" smtClean="0">
+                <a:latin typeface="Helvetica" charset="0"/>
+                <a:ea typeface="Helvetica" charset="0"/>
+                <a:cs typeface="Helvetica" charset="0"/>
+              </a:rPr>
+              <a:t>Exemplos</a:t>
+            </a:r>
+            <a:r>
+              <a:rPr lang="en-US" b="1" dirty="0" smtClean="0">
+                <a:latin typeface="Helvetica" charset="0"/>
+                <a:ea typeface="Helvetica" charset="0"/>
+                <a:cs typeface="Helvetica" charset="0"/>
+              </a:rPr>
+              <a:t>)</a:t>
+            </a:r>
+            <a:endParaRPr lang="en-US" sz="2800" b="1" dirty="0">
               <a:latin typeface="Helvetica" charset="0"/>
               <a:ea typeface="Helvetica" charset="0"/>
               <a:cs typeface="Helvetica" charset="0"/>
             </a:endParaRPr>
-          </a:p>
-        </p:txBody>
-      </p:sp>
-      <p:sp>
-        <p:nvSpPr>
-          <p:cNvPr id="3" name="Content Placeholder 2"/>
-          <p:cNvSpPr>
-            <a:spLocks noGrp="1"/>
-          </p:cNvSpPr>
-          <p:nvPr>
-            <p:ph idx="1"/>
-          </p:nvPr>
-        </p:nvSpPr>
-        <p:spPr>
-          <a:xfrm>
-            <a:off x="1154954" y="2603500"/>
-            <a:ext cx="10035785" cy="4102100"/>
-          </a:xfrm>
-        </p:spPr>
-        <p:txBody>
-          <a:bodyPr>
-            <a:normAutofit/>
-          </a:bodyPr>
-          <a:lstStyle/>
-          <a:p>
-            <a:r>
-              <a:rPr lang="en-US" dirty="0" smtClean="0">
-                <a:solidFill>
-                  <a:schemeClr val="tx1"/>
-                </a:solidFill>
-                <a:latin typeface="Helvetica" charset="0"/>
-                <a:ea typeface="Helvetica" charset="0"/>
-                <a:cs typeface="Helvetica" charset="0"/>
-              </a:rPr>
-              <a:t>[1] </a:t>
-            </a:r>
-            <a:r>
-              <a:rPr lang="en-US" dirty="0">
-                <a:solidFill>
-                  <a:schemeClr val="tx1"/>
-                </a:solidFill>
-                <a:latin typeface="Helvetica" charset="0"/>
-                <a:ea typeface="Helvetica" charset="0"/>
-                <a:cs typeface="Helvetica" charset="0"/>
-              </a:rPr>
-              <a:t>A. E. </a:t>
-            </a:r>
-            <a:r>
-              <a:rPr lang="en-US" dirty="0" err="1" smtClean="0">
-                <a:solidFill>
-                  <a:schemeClr val="tx1"/>
-                </a:solidFill>
-                <a:latin typeface="Helvetica" charset="0"/>
-                <a:ea typeface="Helvetica" charset="0"/>
-                <a:cs typeface="Helvetica" charset="0"/>
-              </a:rPr>
-              <a:t>Eiben</a:t>
-            </a:r>
-            <a:r>
-              <a:rPr lang="en-US" dirty="0" smtClean="0">
-                <a:solidFill>
-                  <a:schemeClr val="tx1"/>
-                </a:solidFill>
-                <a:latin typeface="Helvetica" charset="0"/>
-                <a:ea typeface="Helvetica" charset="0"/>
-                <a:cs typeface="Helvetica" charset="0"/>
-              </a:rPr>
-              <a:t>, J</a:t>
-            </a:r>
-            <a:r>
-              <a:rPr lang="en-US" dirty="0">
-                <a:solidFill>
-                  <a:schemeClr val="tx1"/>
-                </a:solidFill>
-                <a:latin typeface="Helvetica" charset="0"/>
-                <a:ea typeface="Helvetica" charset="0"/>
-                <a:cs typeface="Helvetica" charset="0"/>
-              </a:rPr>
-              <a:t>. E. Smith. </a:t>
-            </a:r>
-            <a:r>
-              <a:rPr lang="en-US" dirty="0" smtClean="0">
-                <a:solidFill>
-                  <a:schemeClr val="tx1"/>
-                </a:solidFill>
-                <a:latin typeface="Helvetica" charset="0"/>
-                <a:ea typeface="Helvetica" charset="0"/>
-                <a:cs typeface="Helvetica" charset="0"/>
-              </a:rPr>
-              <a:t>“</a:t>
-            </a:r>
-            <a:r>
-              <a:rPr lang="en-US" i="1" dirty="0" smtClean="0">
-                <a:solidFill>
-                  <a:schemeClr val="tx1"/>
-                </a:solidFill>
-                <a:latin typeface="Helvetica" charset="0"/>
-                <a:ea typeface="Helvetica" charset="0"/>
-                <a:cs typeface="Helvetica" charset="0"/>
-              </a:rPr>
-              <a:t>Introduction </a:t>
-            </a:r>
-            <a:r>
-              <a:rPr lang="en-US" i="1" dirty="0">
-                <a:solidFill>
-                  <a:schemeClr val="tx1"/>
-                </a:solidFill>
-                <a:latin typeface="Helvetica" charset="0"/>
-                <a:ea typeface="Helvetica" charset="0"/>
-                <a:cs typeface="Helvetica" charset="0"/>
-              </a:rPr>
-              <a:t>To Evolutionary </a:t>
-            </a:r>
-            <a:r>
-              <a:rPr lang="en-US" i="1" dirty="0" smtClean="0">
-                <a:solidFill>
-                  <a:schemeClr val="tx1"/>
-                </a:solidFill>
-                <a:latin typeface="Helvetica" charset="0"/>
-                <a:ea typeface="Helvetica" charset="0"/>
-                <a:cs typeface="Helvetica" charset="0"/>
-              </a:rPr>
-              <a:t>Computing”</a:t>
-            </a:r>
-            <a:r>
-              <a:rPr lang="en-US" dirty="0" smtClean="0">
-                <a:solidFill>
-                  <a:schemeClr val="tx1"/>
-                </a:solidFill>
-                <a:latin typeface="Helvetica" charset="0"/>
-                <a:ea typeface="Helvetica" charset="0"/>
-                <a:cs typeface="Helvetica" charset="0"/>
-              </a:rPr>
-              <a:t>. </a:t>
-            </a:r>
-            <a:r>
-              <a:rPr lang="en-US" dirty="0">
-                <a:solidFill>
-                  <a:schemeClr val="tx1"/>
-                </a:solidFill>
-                <a:latin typeface="Helvetica" charset="0"/>
-                <a:ea typeface="Helvetica" charset="0"/>
-                <a:cs typeface="Helvetica" charset="0"/>
-              </a:rPr>
-              <a:t>V</a:t>
-            </a:r>
-            <a:r>
-              <a:rPr lang="en-US" dirty="0" smtClean="0">
-                <a:solidFill>
-                  <a:schemeClr val="tx1"/>
-                </a:solidFill>
-                <a:latin typeface="Helvetica" charset="0"/>
-                <a:ea typeface="Helvetica" charset="0"/>
-                <a:cs typeface="Helvetica" charset="0"/>
-              </a:rPr>
-              <a:t>olume 53. </a:t>
-            </a:r>
-            <a:r>
-              <a:rPr lang="en-US" dirty="0">
-                <a:solidFill>
-                  <a:schemeClr val="tx1"/>
-                </a:solidFill>
-                <a:latin typeface="Helvetica" charset="0"/>
-                <a:ea typeface="Helvetica" charset="0"/>
-                <a:cs typeface="Helvetica" charset="0"/>
-              </a:rPr>
-              <a:t>Springer-</a:t>
-            </a:r>
-            <a:r>
-              <a:rPr lang="en-US" dirty="0" err="1">
-                <a:solidFill>
-                  <a:schemeClr val="tx1"/>
-                </a:solidFill>
-                <a:latin typeface="Helvetica" charset="0"/>
-                <a:ea typeface="Helvetica" charset="0"/>
-                <a:cs typeface="Helvetica" charset="0"/>
-              </a:rPr>
-              <a:t>Verlag</a:t>
-            </a:r>
-            <a:r>
-              <a:rPr lang="en-US" dirty="0">
-                <a:solidFill>
-                  <a:schemeClr val="tx1"/>
-                </a:solidFill>
-                <a:latin typeface="Helvetica" charset="0"/>
-                <a:ea typeface="Helvetica" charset="0"/>
-                <a:cs typeface="Helvetica" charset="0"/>
-              </a:rPr>
-              <a:t>, 2003. </a:t>
-            </a:r>
-            <a:endParaRPr lang="en-US" dirty="0" smtClean="0">
-              <a:solidFill>
-                <a:schemeClr val="tx1"/>
-              </a:solidFill>
-              <a:latin typeface="Helvetica" charset="0"/>
-              <a:ea typeface="Helvetica" charset="0"/>
-              <a:cs typeface="Helvetica" charset="0"/>
-            </a:endParaRPr>
-          </a:p>
-          <a:p>
-            <a:r>
-              <a:rPr lang="en-US" dirty="0" smtClean="0">
-                <a:solidFill>
-                  <a:schemeClr val="tx1"/>
-                </a:solidFill>
-                <a:latin typeface="Helvetica" charset="0"/>
-                <a:ea typeface="Helvetica" charset="0"/>
-                <a:cs typeface="Helvetica" charset="0"/>
-              </a:rPr>
-              <a:t>[2] A</a:t>
-            </a:r>
-            <a:r>
-              <a:rPr lang="en-US" dirty="0">
-                <a:solidFill>
-                  <a:schemeClr val="tx1"/>
-                </a:solidFill>
-                <a:latin typeface="Helvetica" charset="0"/>
-                <a:ea typeface="Helvetica" charset="0"/>
-                <a:cs typeface="Helvetica" charset="0"/>
-              </a:rPr>
-              <a:t>. E. </a:t>
-            </a:r>
-            <a:r>
-              <a:rPr lang="en-US" dirty="0" err="1" smtClean="0">
-                <a:solidFill>
-                  <a:schemeClr val="tx1"/>
-                </a:solidFill>
-                <a:latin typeface="Helvetica" charset="0"/>
-                <a:ea typeface="Helvetica" charset="0"/>
-                <a:cs typeface="Helvetica" charset="0"/>
-              </a:rPr>
-              <a:t>Eiben</a:t>
-            </a:r>
-            <a:r>
-              <a:rPr lang="en-US" dirty="0" smtClean="0">
-                <a:solidFill>
-                  <a:schemeClr val="tx1"/>
-                </a:solidFill>
-                <a:latin typeface="Helvetica" charset="0"/>
-                <a:ea typeface="Helvetica" charset="0"/>
-                <a:cs typeface="Helvetica" charset="0"/>
-              </a:rPr>
-              <a:t>, S</a:t>
-            </a:r>
-            <a:r>
-              <a:rPr lang="en-US" dirty="0">
-                <a:solidFill>
-                  <a:schemeClr val="tx1"/>
-                </a:solidFill>
-                <a:latin typeface="Helvetica" charset="0"/>
-                <a:ea typeface="Helvetica" charset="0"/>
-                <a:cs typeface="Helvetica" charset="0"/>
-              </a:rPr>
-              <a:t>. K. </a:t>
-            </a:r>
-            <a:r>
-              <a:rPr lang="en-US" dirty="0" err="1">
-                <a:solidFill>
-                  <a:schemeClr val="tx1"/>
-                </a:solidFill>
-                <a:latin typeface="Helvetica" charset="0"/>
-                <a:ea typeface="Helvetica" charset="0"/>
-                <a:cs typeface="Helvetica" charset="0"/>
-              </a:rPr>
-              <a:t>Smit</a:t>
-            </a:r>
-            <a:r>
-              <a:rPr lang="en-US" dirty="0">
-                <a:solidFill>
-                  <a:schemeClr val="tx1"/>
-                </a:solidFill>
-                <a:latin typeface="Helvetica" charset="0"/>
-                <a:ea typeface="Helvetica" charset="0"/>
-                <a:cs typeface="Helvetica" charset="0"/>
-              </a:rPr>
-              <a:t>. </a:t>
-            </a:r>
-            <a:r>
-              <a:rPr lang="en-US" dirty="0" smtClean="0">
-                <a:solidFill>
-                  <a:schemeClr val="tx1"/>
-                </a:solidFill>
-                <a:latin typeface="Helvetica" charset="0"/>
-                <a:ea typeface="Helvetica" charset="0"/>
-                <a:cs typeface="Helvetica" charset="0"/>
-              </a:rPr>
-              <a:t>“Parameter </a:t>
-            </a:r>
-            <a:r>
-              <a:rPr lang="en-US" dirty="0">
-                <a:solidFill>
-                  <a:schemeClr val="tx1"/>
-                </a:solidFill>
-                <a:latin typeface="Helvetica" charset="0"/>
-                <a:ea typeface="Helvetica" charset="0"/>
-                <a:cs typeface="Helvetica" charset="0"/>
-              </a:rPr>
-              <a:t>tuning for configuring and analyzing evolutionary </a:t>
-            </a:r>
-            <a:r>
-              <a:rPr lang="en-US" dirty="0" smtClean="0">
-                <a:solidFill>
-                  <a:schemeClr val="tx1"/>
-                </a:solidFill>
-                <a:latin typeface="Helvetica" charset="0"/>
-                <a:ea typeface="Helvetica" charset="0"/>
-                <a:cs typeface="Helvetica" charset="0"/>
-              </a:rPr>
-              <a:t>algorithms”. </a:t>
-            </a:r>
-            <a:r>
-              <a:rPr lang="en-US" i="1" dirty="0">
-                <a:solidFill>
-                  <a:schemeClr val="tx1"/>
-                </a:solidFill>
-                <a:latin typeface="Helvetica" charset="0"/>
-                <a:ea typeface="Helvetica" charset="0"/>
-                <a:cs typeface="Helvetica" charset="0"/>
-              </a:rPr>
-              <a:t>Swarm and Evolutionary Computation</a:t>
-            </a:r>
-            <a:r>
-              <a:rPr lang="en-US" dirty="0">
-                <a:solidFill>
-                  <a:schemeClr val="tx1"/>
-                </a:solidFill>
-                <a:latin typeface="Helvetica" charset="0"/>
-                <a:ea typeface="Helvetica" charset="0"/>
-                <a:cs typeface="Helvetica" charset="0"/>
-              </a:rPr>
-              <a:t>, 1(1):19–31, 2011</a:t>
-            </a:r>
-            <a:r>
-              <a:rPr lang="en-US" dirty="0" smtClean="0">
-                <a:solidFill>
-                  <a:schemeClr val="tx1"/>
-                </a:solidFill>
-                <a:latin typeface="Helvetica" charset="0"/>
-                <a:ea typeface="Helvetica" charset="0"/>
-                <a:cs typeface="Helvetica" charset="0"/>
-              </a:rPr>
-              <a:t>.</a:t>
-            </a:r>
-          </a:p>
-          <a:p>
-            <a:r>
-              <a:rPr lang="en-US" dirty="0" smtClean="0">
-                <a:solidFill>
-                  <a:schemeClr val="tx1"/>
-                </a:solidFill>
-                <a:latin typeface="Helvetica" charset="0"/>
-                <a:ea typeface="Helvetica" charset="0"/>
-                <a:cs typeface="Helvetica" charset="0"/>
-              </a:rPr>
-              <a:t>[3] </a:t>
-            </a:r>
-            <a:r>
-              <a:rPr lang="en-US" dirty="0">
-                <a:solidFill>
-                  <a:schemeClr val="tx1"/>
-                </a:solidFill>
-                <a:latin typeface="Helvetica" charset="0"/>
-                <a:ea typeface="Helvetica" charset="0"/>
-                <a:cs typeface="Helvetica" charset="0"/>
-              </a:rPr>
-              <a:t>K. Matthias, T. </a:t>
-            </a:r>
-            <a:r>
-              <a:rPr lang="en-US" dirty="0" err="1">
-                <a:solidFill>
-                  <a:schemeClr val="tx1"/>
-                </a:solidFill>
-                <a:latin typeface="Helvetica" charset="0"/>
-                <a:ea typeface="Helvetica" charset="0"/>
-                <a:cs typeface="Helvetica" charset="0"/>
-              </a:rPr>
-              <a:t>Severin</a:t>
-            </a:r>
-            <a:r>
-              <a:rPr lang="en-US" dirty="0">
-                <a:solidFill>
-                  <a:schemeClr val="tx1"/>
-                </a:solidFill>
-                <a:latin typeface="Helvetica" charset="0"/>
-                <a:ea typeface="Helvetica" charset="0"/>
-                <a:cs typeface="Helvetica" charset="0"/>
-              </a:rPr>
-              <a:t>, and H. </a:t>
-            </a:r>
-            <a:r>
-              <a:rPr lang="en-US" dirty="0" err="1">
-                <a:solidFill>
-                  <a:schemeClr val="tx1"/>
-                </a:solidFill>
-                <a:latin typeface="Helvetica" charset="0"/>
-                <a:ea typeface="Helvetica" charset="0"/>
-                <a:cs typeface="Helvetica" charset="0"/>
-              </a:rPr>
-              <a:t>Salzwedel</a:t>
-            </a:r>
-            <a:r>
-              <a:rPr lang="en-US" dirty="0">
-                <a:solidFill>
-                  <a:schemeClr val="tx1"/>
-                </a:solidFill>
-                <a:latin typeface="Helvetica" charset="0"/>
-                <a:ea typeface="Helvetica" charset="0"/>
-                <a:cs typeface="Helvetica" charset="0"/>
-              </a:rPr>
-              <a:t>. </a:t>
-            </a:r>
-            <a:r>
-              <a:rPr lang="en-US" dirty="0" smtClean="0">
-                <a:solidFill>
-                  <a:schemeClr val="tx1"/>
-                </a:solidFill>
-                <a:latin typeface="Helvetica" charset="0"/>
-                <a:ea typeface="Helvetica" charset="0"/>
-                <a:cs typeface="Helvetica" charset="0"/>
-              </a:rPr>
-              <a:t>"Variable </a:t>
-            </a:r>
-            <a:r>
-              <a:rPr lang="en-US" dirty="0">
-                <a:solidFill>
-                  <a:schemeClr val="tx1"/>
-                </a:solidFill>
-                <a:latin typeface="Helvetica" charset="0"/>
-                <a:ea typeface="Helvetica" charset="0"/>
-                <a:cs typeface="Helvetica" charset="0"/>
-              </a:rPr>
-              <a:t>mutation rate at genetic algorithms: introduction of chromosome fitness in connection with multi-chromosome </a:t>
-            </a:r>
-            <a:r>
-              <a:rPr lang="en-US" dirty="0" smtClean="0">
-                <a:solidFill>
-                  <a:schemeClr val="tx1"/>
-                </a:solidFill>
-                <a:latin typeface="Helvetica" charset="0"/>
-                <a:ea typeface="Helvetica" charset="0"/>
-                <a:cs typeface="Helvetica" charset="0"/>
-              </a:rPr>
-              <a:t>representation". </a:t>
-            </a:r>
-            <a:r>
-              <a:rPr lang="en-US" i="1" dirty="0">
-                <a:solidFill>
-                  <a:schemeClr val="tx1"/>
-                </a:solidFill>
-                <a:latin typeface="Helvetica" charset="0"/>
-                <a:ea typeface="Helvetica" charset="0"/>
-                <a:cs typeface="Helvetica" charset="0"/>
-              </a:rPr>
-              <a:t>International Journal of Computer Applications</a:t>
-            </a:r>
-            <a:r>
-              <a:rPr lang="en-US" dirty="0">
-                <a:solidFill>
-                  <a:schemeClr val="tx1"/>
-                </a:solidFill>
-                <a:latin typeface="Helvetica" charset="0"/>
-                <a:ea typeface="Helvetica" charset="0"/>
-                <a:cs typeface="Helvetica" charset="0"/>
-              </a:rPr>
-              <a:t>, 72(17), 2013. </a:t>
-            </a:r>
-            <a:endParaRPr lang="en-US" dirty="0" smtClean="0">
-              <a:solidFill>
-                <a:schemeClr val="tx1"/>
-              </a:solidFill>
-              <a:latin typeface="Helvetica" charset="0"/>
-              <a:ea typeface="Helvetica" charset="0"/>
-              <a:cs typeface="Helvetica" charset="0"/>
-            </a:endParaRPr>
-          </a:p>
-          <a:p>
-            <a:r>
-              <a:rPr lang="en-US" dirty="0" smtClean="0">
-                <a:solidFill>
-                  <a:schemeClr val="tx1"/>
-                </a:solidFill>
-                <a:latin typeface="Helvetica" charset="0"/>
-                <a:ea typeface="Helvetica" charset="0"/>
-                <a:cs typeface="Helvetica" charset="0"/>
-              </a:rPr>
-              <a:t>[4] </a:t>
-            </a:r>
-            <a:r>
-              <a:rPr lang="en-US" dirty="0">
-                <a:solidFill>
-                  <a:schemeClr val="tx1"/>
-                </a:solidFill>
-                <a:latin typeface="Helvetica" charset="0"/>
-                <a:ea typeface="Helvetica" charset="0"/>
-                <a:cs typeface="Helvetica" charset="0"/>
-              </a:rPr>
-              <a:t>M. </a:t>
-            </a:r>
-            <a:r>
-              <a:rPr lang="en-US" dirty="0" err="1">
-                <a:solidFill>
-                  <a:schemeClr val="tx1"/>
-                </a:solidFill>
-                <a:latin typeface="Helvetica" charset="0"/>
-                <a:ea typeface="Helvetica" charset="0"/>
-                <a:cs typeface="Helvetica" charset="0"/>
-              </a:rPr>
-              <a:t>Obitko</a:t>
-            </a:r>
-            <a:r>
-              <a:rPr lang="en-US" dirty="0">
-                <a:solidFill>
-                  <a:schemeClr val="tx1"/>
-                </a:solidFill>
-                <a:latin typeface="Helvetica" charset="0"/>
-                <a:ea typeface="Helvetica" charset="0"/>
-                <a:cs typeface="Helvetica" charset="0"/>
-              </a:rPr>
-              <a:t>. </a:t>
-            </a:r>
-            <a:r>
-              <a:rPr lang="en-US" dirty="0" smtClean="0">
-                <a:solidFill>
-                  <a:schemeClr val="tx1"/>
-                </a:solidFill>
-                <a:latin typeface="Helvetica" charset="0"/>
-                <a:ea typeface="Helvetica" charset="0"/>
-                <a:cs typeface="Helvetica" charset="0"/>
-              </a:rPr>
-              <a:t>"Introduction </a:t>
-            </a:r>
-            <a:r>
-              <a:rPr lang="en-US" dirty="0">
-                <a:solidFill>
-                  <a:schemeClr val="tx1"/>
-                </a:solidFill>
-                <a:latin typeface="Helvetica" charset="0"/>
-                <a:ea typeface="Helvetica" charset="0"/>
-                <a:cs typeface="Helvetica" charset="0"/>
-              </a:rPr>
-              <a:t>to genetic algorithms - </a:t>
-            </a:r>
-            <a:r>
-              <a:rPr lang="en-US" dirty="0" smtClean="0">
-                <a:solidFill>
-                  <a:schemeClr val="tx1"/>
-                </a:solidFill>
-                <a:latin typeface="Helvetica" charset="0"/>
-                <a:ea typeface="Helvetica" charset="0"/>
-                <a:cs typeface="Helvetica" charset="0"/>
-              </a:rPr>
-              <a:t>XIII. Recommendations". </a:t>
-            </a:r>
-            <a:r>
-              <a:rPr lang="en-US" dirty="0">
-                <a:solidFill>
-                  <a:srgbClr val="0432FF"/>
-                </a:solidFill>
-                <a:latin typeface="Helvetica" charset="0"/>
-                <a:ea typeface="Helvetica" charset="0"/>
-                <a:cs typeface="Helvetica" charset="0"/>
-                <a:hlinkClick r:id="rId2"/>
-              </a:rPr>
-              <a:t>http://www.obitko.com/tutorials/genetic-algorithms/recommendations.php</a:t>
-            </a:r>
-            <a:r>
-              <a:rPr lang="en-US" dirty="0" smtClean="0">
-                <a:solidFill>
-                  <a:srgbClr val="0432FF"/>
-                </a:solidFill>
-                <a:latin typeface="Helvetica" charset="0"/>
-                <a:ea typeface="Helvetica" charset="0"/>
-                <a:cs typeface="Helvetica" charset="0"/>
-                <a:hlinkClick r:id="rId2"/>
-              </a:rPr>
-              <a:t>/</a:t>
-            </a:r>
-            <a:r>
-              <a:rPr lang="en-US" dirty="0" smtClean="0">
-                <a:solidFill>
-                  <a:srgbClr val="0432FF"/>
-                </a:solidFill>
-                <a:latin typeface="Helvetica" charset="0"/>
-                <a:ea typeface="Helvetica" charset="0"/>
-                <a:cs typeface="Helvetica" charset="0"/>
-              </a:rPr>
-              <a:t> </a:t>
-            </a:r>
-            <a:r>
-              <a:rPr lang="en-US" dirty="0" smtClean="0">
-                <a:solidFill>
-                  <a:schemeClr val="tx1"/>
-                </a:solidFill>
-                <a:latin typeface="Helvetica" charset="0"/>
-                <a:ea typeface="Helvetica" charset="0"/>
-                <a:cs typeface="Helvetica" charset="0"/>
-              </a:rPr>
-              <a:t>[</a:t>
-            </a:r>
-            <a:r>
-              <a:rPr lang="en-US" dirty="0">
-                <a:solidFill>
-                  <a:schemeClr val="tx1"/>
-                </a:solidFill>
-                <a:latin typeface="Helvetica" charset="0"/>
-                <a:ea typeface="Helvetica" charset="0"/>
-                <a:cs typeface="Helvetica" charset="0"/>
-              </a:rPr>
-              <a:t>Online; </a:t>
-            </a:r>
-            <a:r>
-              <a:rPr lang="en-US" dirty="0" err="1">
-                <a:solidFill>
-                  <a:schemeClr val="tx1"/>
-                </a:solidFill>
-                <a:latin typeface="Helvetica" charset="0"/>
-                <a:ea typeface="Helvetica" charset="0"/>
-                <a:cs typeface="Helvetica" charset="0"/>
-              </a:rPr>
-              <a:t>acessado</a:t>
-            </a:r>
-            <a:r>
-              <a:rPr lang="en-US" dirty="0">
-                <a:solidFill>
-                  <a:schemeClr val="tx1"/>
-                </a:solidFill>
-                <a:latin typeface="Helvetica" charset="0"/>
-                <a:ea typeface="Helvetica" charset="0"/>
-                <a:cs typeface="Helvetica" charset="0"/>
-              </a:rPr>
-              <a:t> </a:t>
-            </a:r>
-            <a:r>
-              <a:rPr lang="en-US" dirty="0" err="1">
-                <a:solidFill>
-                  <a:schemeClr val="tx1"/>
-                </a:solidFill>
-                <a:latin typeface="Helvetica" charset="0"/>
-                <a:ea typeface="Helvetica" charset="0"/>
-                <a:cs typeface="Helvetica" charset="0"/>
-              </a:rPr>
-              <a:t>em</a:t>
-            </a:r>
-            <a:r>
-              <a:rPr lang="en-US" dirty="0">
-                <a:solidFill>
-                  <a:schemeClr val="tx1"/>
-                </a:solidFill>
-                <a:latin typeface="Helvetica" charset="0"/>
-                <a:ea typeface="Helvetica" charset="0"/>
-                <a:cs typeface="Helvetica" charset="0"/>
-              </a:rPr>
-              <a:t> 17 de </a:t>
-            </a:r>
-            <a:r>
-              <a:rPr lang="en-US" dirty="0" err="1">
-                <a:solidFill>
-                  <a:schemeClr val="tx1"/>
-                </a:solidFill>
-                <a:latin typeface="Helvetica" charset="0"/>
-                <a:ea typeface="Helvetica" charset="0"/>
-                <a:cs typeface="Helvetica" charset="0"/>
-              </a:rPr>
-              <a:t>novembro</a:t>
-            </a:r>
-            <a:r>
-              <a:rPr lang="en-US" dirty="0">
-                <a:solidFill>
-                  <a:schemeClr val="tx1"/>
-                </a:solidFill>
-                <a:latin typeface="Helvetica" charset="0"/>
-                <a:ea typeface="Helvetica" charset="0"/>
-                <a:cs typeface="Helvetica" charset="0"/>
-              </a:rPr>
-              <a:t> de 2016</a:t>
-            </a:r>
-            <a:r>
-              <a:rPr lang="en-US" dirty="0" smtClean="0">
-                <a:solidFill>
-                  <a:schemeClr val="tx1"/>
-                </a:solidFill>
-                <a:latin typeface="Helvetica" charset="0"/>
-                <a:ea typeface="Helvetica" charset="0"/>
-                <a:cs typeface="Helvetica" charset="0"/>
-              </a:rPr>
-              <a:t>].</a:t>
-            </a:r>
-          </a:p>
-          <a:p>
-            <a:r>
-              <a:rPr lang="en-US" dirty="0" smtClean="0">
-                <a:solidFill>
-                  <a:schemeClr val="tx1"/>
-                </a:solidFill>
-                <a:latin typeface="Helvetica" charset="0"/>
-                <a:ea typeface="Helvetica" charset="0"/>
-                <a:cs typeface="Helvetica" charset="0"/>
-              </a:rPr>
-              <a:t>[5] </a:t>
-            </a:r>
-            <a:r>
-              <a:rPr lang="en-US" dirty="0">
-                <a:solidFill>
-                  <a:schemeClr val="tx1"/>
-                </a:solidFill>
-                <a:latin typeface="Helvetica" charset="0"/>
-                <a:ea typeface="Helvetica" charset="0"/>
-                <a:cs typeface="Helvetica" charset="0"/>
-              </a:rPr>
-              <a:t>K. </a:t>
-            </a:r>
-            <a:r>
-              <a:rPr lang="en-US" dirty="0" err="1">
-                <a:solidFill>
-                  <a:schemeClr val="tx1"/>
-                </a:solidFill>
-                <a:latin typeface="Helvetica" charset="0"/>
-                <a:ea typeface="Helvetica" charset="0"/>
-                <a:cs typeface="Helvetica" charset="0"/>
-              </a:rPr>
-              <a:t>DeJong</a:t>
-            </a:r>
-            <a:r>
-              <a:rPr lang="en-US" dirty="0">
-                <a:solidFill>
-                  <a:schemeClr val="tx1"/>
-                </a:solidFill>
-                <a:latin typeface="Helvetica" charset="0"/>
-                <a:ea typeface="Helvetica" charset="0"/>
-                <a:cs typeface="Helvetica" charset="0"/>
-              </a:rPr>
-              <a:t>. </a:t>
-            </a:r>
-            <a:r>
-              <a:rPr lang="en-US" dirty="0" smtClean="0">
-                <a:solidFill>
-                  <a:schemeClr val="tx1"/>
-                </a:solidFill>
-                <a:latin typeface="Helvetica" charset="0"/>
-                <a:ea typeface="Helvetica" charset="0"/>
-                <a:cs typeface="Helvetica" charset="0"/>
-              </a:rPr>
-              <a:t>“An </a:t>
-            </a:r>
-            <a:r>
-              <a:rPr lang="en-US" dirty="0">
-                <a:solidFill>
-                  <a:schemeClr val="tx1"/>
-                </a:solidFill>
-                <a:latin typeface="Helvetica" charset="0"/>
-                <a:ea typeface="Helvetica" charset="0"/>
-                <a:cs typeface="Helvetica" charset="0"/>
-              </a:rPr>
-              <a:t>analysis of the behavior of a class of genetic adaptive </a:t>
-            </a:r>
-            <a:r>
-              <a:rPr lang="en-US" dirty="0" smtClean="0">
-                <a:solidFill>
-                  <a:schemeClr val="tx1"/>
-                </a:solidFill>
-                <a:latin typeface="Helvetica" charset="0"/>
-                <a:ea typeface="Helvetica" charset="0"/>
-                <a:cs typeface="Helvetica" charset="0"/>
-              </a:rPr>
-              <a:t>systems”. </a:t>
-            </a:r>
-            <a:r>
-              <a:rPr lang="en-US" i="1" dirty="0" smtClean="0">
-                <a:solidFill>
-                  <a:schemeClr val="tx1"/>
-                </a:solidFill>
-                <a:latin typeface="Helvetica" charset="0"/>
-                <a:ea typeface="Helvetica" charset="0"/>
-                <a:cs typeface="Helvetica" charset="0"/>
-              </a:rPr>
-              <a:t>Ph.D</a:t>
-            </a:r>
-            <a:r>
-              <a:rPr lang="en-US" i="1" dirty="0">
-                <a:solidFill>
-                  <a:schemeClr val="tx1"/>
-                </a:solidFill>
-                <a:latin typeface="Helvetica" charset="0"/>
-                <a:ea typeface="Helvetica" charset="0"/>
-                <a:cs typeface="Helvetica" charset="0"/>
-              </a:rPr>
-              <a:t>. </a:t>
-            </a:r>
-            <a:r>
-              <a:rPr lang="en-US" i="1" dirty="0" smtClean="0">
-                <a:solidFill>
-                  <a:schemeClr val="tx1"/>
-                </a:solidFill>
-                <a:latin typeface="Helvetica" charset="0"/>
-                <a:ea typeface="Helvetica" charset="0"/>
-                <a:cs typeface="Helvetica" charset="0"/>
-              </a:rPr>
-              <a:t>Thesis</a:t>
-            </a:r>
-            <a:r>
-              <a:rPr lang="en-US" dirty="0">
-                <a:solidFill>
-                  <a:schemeClr val="tx1"/>
-                </a:solidFill>
-                <a:latin typeface="Helvetica" charset="0"/>
-                <a:ea typeface="Helvetica" charset="0"/>
-                <a:cs typeface="Helvetica" charset="0"/>
-              </a:rPr>
-              <a:t>, University of Michigan, 1975</a:t>
-            </a:r>
-            <a:r>
-              <a:rPr lang="en-US" dirty="0" smtClean="0">
-                <a:solidFill>
-                  <a:schemeClr val="tx1"/>
-                </a:solidFill>
-                <a:latin typeface="Helvetica" charset="0"/>
-                <a:ea typeface="Helvetica" charset="0"/>
-                <a:cs typeface="Helvetica" charset="0"/>
-              </a:rPr>
-              <a:t>.</a:t>
-            </a:r>
-            <a:endParaRPr lang="en-US" dirty="0">
-              <a:solidFill>
-                <a:schemeClr val="tx1"/>
-              </a:solidFill>
-              <a:latin typeface="Helvetica" charset="0"/>
-              <a:ea typeface="Helvetica" charset="0"/>
-              <a:cs typeface="Helvetica" charset="0"/>
-            </a:endParaRPr>
-          </a:p>
-          <a:p>
-            <a:endParaRPr lang="en-US" dirty="0"/>
-          </a:p>
-          <a:p>
-            <a:endParaRPr lang="en-US" dirty="0"/>
           </a:p>
         </p:txBody>
       </p:sp>
@@ -27716,10 +27168,39 @@
           </a:p>
         </p:txBody>
       </p:sp>
+      <p:pic>
+        <p:nvPicPr>
+          <p:cNvPr id="7" name="Content Placeholder 6"/>
+          <p:cNvPicPr>
+            <a:picLocks noGrp="1" noChangeAspect="1"/>
+          </p:cNvPicPr>
+          <p:nvPr>
+            <p:ph idx="1"/>
+          </p:nvPr>
+        </p:nvPicPr>
+        <p:blipFill>
+          <a:blip r:embed="rId3">
+            <a:extLst>
+              <a:ext uri="{28A0092B-C50C-407E-A947-70E740481C1C}">
+                <a14:useLocalDpi xmlns:a14="http://schemas.microsoft.com/office/drawing/2010/main" val="0"/>
+              </a:ext>
+            </a:extLst>
+          </a:blip>
+          <a:stretch>
+            <a:fillRect/>
+          </a:stretch>
+        </p:blipFill>
+        <p:spPr>
+          <a:xfrm>
+            <a:off x="2261470" y="2603500"/>
+            <a:ext cx="6613372" cy="3416300"/>
+          </a:xfrm>
+        </p:spPr>
+      </p:pic>
     </p:spTree>
     <p:extLst>
       <p:ext uri="{BB962C8B-B14F-4D97-AF65-F5344CB8AC3E}">
-        <p14:creationId xmlns:p14="http://schemas.microsoft.com/office/powerpoint/2010/main" val="530941430"/>
+        <p14:creationId xmlns:p14="http://schemas.microsoft.com/office/powerpoint/2010/main" val="306601274"/>
       </p:ext>
     </p:extLst>
   </p:cSld>
@@ -27774,9 +27255,57 @@
                 <a:ea typeface="Helvetica" charset="0"/>
                 <a:cs typeface="Helvetica" charset="0"/>
               </a:rPr>
-              <a:t>Referências</a:t>
-            </a:r>
-            <a:endParaRPr lang="en-US" b="1" dirty="0">
+              <a:t>Otimizações</a:t>
+            </a:r>
+            <a:r>
+              <a:rPr lang="en-US" b="1" dirty="0" smtClean="0">
+                <a:latin typeface="Helvetica" charset="0"/>
+                <a:ea typeface="Helvetica" charset="0"/>
+                <a:cs typeface="Helvetica" charset="0"/>
+              </a:rPr>
+              <a:t> </a:t>
+            </a:r>
+            <a:r>
+              <a:rPr lang="mr-IN" b="1" dirty="0" smtClean="0">
+                <a:latin typeface="Helvetica" charset="0"/>
+                <a:ea typeface="Helvetica" charset="0"/>
+                <a:cs typeface="Helvetica" charset="0"/>
+              </a:rPr>
+              <a:t>–</a:t>
+            </a:r>
+            <a:r>
+              <a:rPr lang="en-US" b="1" dirty="0" smtClean="0">
+                <a:latin typeface="Helvetica" charset="0"/>
+                <a:ea typeface="Helvetica" charset="0"/>
+                <a:cs typeface="Helvetica" charset="0"/>
+              </a:rPr>
+              <a:t> </a:t>
+            </a:r>
+            <a:r>
+              <a:rPr lang="en-US" b="1" dirty="0" smtClean="0">
+                <a:latin typeface="Helvetica" charset="0"/>
+                <a:ea typeface="Helvetica" charset="0"/>
+                <a:cs typeface="Helvetica" charset="0"/>
+              </a:rPr>
+              <a:t>AGA (</a:t>
+            </a:r>
+            <a:r>
+              <a:rPr lang="en-US" b="1" dirty="0" err="1" smtClean="0">
+                <a:latin typeface="Helvetica" charset="0"/>
+                <a:ea typeface="Helvetica" charset="0"/>
+                <a:cs typeface="Helvetica" charset="0"/>
+              </a:rPr>
+              <a:t>Exemplos</a:t>
+            </a:r>
+            <a:r>
+              <a:rPr lang="en-US" b="1" dirty="0" smtClean="0">
+                <a:latin typeface="Helvetica" charset="0"/>
+                <a:ea typeface="Helvetica" charset="0"/>
+                <a:cs typeface="Helvetica" charset="0"/>
+              </a:rPr>
+              <a:t>)</a:t>
+            </a:r>
+            <a:endParaRPr lang="en-US" sz="2800" b="1" dirty="0">
               <a:latin typeface="Helvetica" charset="0"/>
               <a:ea typeface="Helvetica" charset="0"/>
               <a:cs typeface="Helvetica" charset="0"/>
@@ -27786,676 +27315,7 @@
       </p:sp>
       <p:sp>
         <p:nvSpPr>
-          <p:cNvPr id="3" name="Content Placeholder 2"/>
-          <p:cNvSpPr>
-            <a:spLocks noGrp="1"/>
-          </p:cNvSpPr>
-          <p:nvPr>
-            <p:ph idx="1"/>
-          </p:nvPr>
-        </p:nvSpPr>
-        <p:spPr>
-          <a:xfrm>
-            <a:off x="1154954" y="2603500"/>
-            <a:ext cx="10035785" cy="3416300"/>
-          </a:xfrm>
-        </p:spPr>
-        <p:txBody>
-          <a:bodyPr/>
-          <a:lstStyle/>
-          <a:p>
-            <a:r>
-              <a:rPr lang="en-US" dirty="0">
-                <a:solidFill>
-                  <a:schemeClr val="tx1"/>
-                </a:solidFill>
-                <a:latin typeface="Helvetica" charset="0"/>
-                <a:ea typeface="Helvetica" charset="0"/>
-                <a:cs typeface="Helvetica" charset="0"/>
-              </a:rPr>
-              <a:t>[6] </a:t>
-            </a:r>
-            <a:r>
-              <a:rPr lang="en-US" dirty="0" smtClean="0">
-                <a:solidFill>
-                  <a:schemeClr val="tx1"/>
-                </a:solidFill>
-                <a:latin typeface="Helvetica" charset="0"/>
-                <a:ea typeface="Helvetica" charset="0"/>
-                <a:cs typeface="Helvetica" charset="0"/>
-              </a:rPr>
-              <a:t>P</a:t>
-            </a:r>
-            <a:r>
-              <a:rPr lang="en-US" dirty="0">
-                <a:solidFill>
-                  <a:schemeClr val="tx1"/>
-                </a:solidFill>
-                <a:latin typeface="Helvetica" charset="0"/>
-                <a:ea typeface="Helvetica" charset="0"/>
-                <a:cs typeface="Helvetica" charset="0"/>
-              </a:rPr>
-              <a:t>. </a:t>
-            </a:r>
-            <a:r>
-              <a:rPr lang="en-US" dirty="0" err="1">
-                <a:solidFill>
-                  <a:schemeClr val="tx1"/>
-                </a:solidFill>
-                <a:latin typeface="Helvetica" charset="0"/>
-                <a:ea typeface="Helvetica" charset="0"/>
-                <a:cs typeface="Helvetica" charset="0"/>
-              </a:rPr>
-              <a:t>Giguere</a:t>
-            </a:r>
-            <a:r>
-              <a:rPr lang="en-US" dirty="0">
-                <a:solidFill>
-                  <a:schemeClr val="tx1"/>
-                </a:solidFill>
-                <a:latin typeface="Helvetica" charset="0"/>
-                <a:ea typeface="Helvetica" charset="0"/>
-                <a:cs typeface="Helvetica" charset="0"/>
-              </a:rPr>
-              <a:t> and D. E. Goldberg. “Population sizing for optimum sampling with genetic algorithms: A case study of the </a:t>
-            </a:r>
-            <a:r>
-              <a:rPr lang="en-US" dirty="0" err="1">
-                <a:solidFill>
-                  <a:schemeClr val="tx1"/>
-                </a:solidFill>
-                <a:latin typeface="Helvetica" charset="0"/>
-                <a:ea typeface="Helvetica" charset="0"/>
-                <a:cs typeface="Helvetica" charset="0"/>
-              </a:rPr>
-              <a:t>onemax</a:t>
-            </a:r>
-            <a:r>
-              <a:rPr lang="en-US" dirty="0">
-                <a:solidFill>
-                  <a:schemeClr val="tx1"/>
-                </a:solidFill>
-                <a:latin typeface="Helvetica" charset="0"/>
-                <a:ea typeface="Helvetica" charset="0"/>
-                <a:cs typeface="Helvetica" charset="0"/>
-              </a:rPr>
-              <a:t> problem”. </a:t>
-            </a:r>
-            <a:r>
-              <a:rPr lang="en-US" i="1" dirty="0">
-                <a:solidFill>
-                  <a:schemeClr val="tx1"/>
-                </a:solidFill>
-                <a:latin typeface="Helvetica" charset="0"/>
-                <a:ea typeface="Helvetica" charset="0"/>
-                <a:cs typeface="Helvetica" charset="0"/>
-              </a:rPr>
-              <a:t>Genetic Programming</a:t>
-            </a:r>
-            <a:r>
-              <a:rPr lang="en-US" dirty="0">
-                <a:solidFill>
-                  <a:schemeClr val="tx1"/>
-                </a:solidFill>
-                <a:latin typeface="Helvetica" charset="0"/>
-                <a:ea typeface="Helvetica" charset="0"/>
-                <a:cs typeface="Helvetica" charset="0"/>
-              </a:rPr>
-              <a:t>, 98:496–503, 1998. </a:t>
-            </a:r>
-          </a:p>
-          <a:p>
-            <a:r>
-              <a:rPr lang="en-US" dirty="0" smtClean="0">
-                <a:solidFill>
-                  <a:schemeClr val="tx1"/>
-                </a:solidFill>
-                <a:latin typeface="Helvetica" charset="0"/>
-                <a:ea typeface="Helvetica" charset="0"/>
-                <a:cs typeface="Helvetica" charset="0"/>
-              </a:rPr>
-              <a:t>[7]</a:t>
-            </a:r>
-            <a:r>
-              <a:rPr lang="en-US" dirty="0">
-                <a:solidFill>
-                  <a:schemeClr val="tx1"/>
-                </a:solidFill>
-                <a:latin typeface="Helvetica" charset="0"/>
-                <a:ea typeface="Helvetica" charset="0"/>
-                <a:cs typeface="Helvetica" charset="0"/>
-              </a:rPr>
-              <a:t> D. L. Applegate, R. E. Bixby, V. </a:t>
-            </a:r>
-            <a:r>
-              <a:rPr lang="en-US" dirty="0" err="1">
-                <a:solidFill>
-                  <a:schemeClr val="tx1"/>
-                </a:solidFill>
-                <a:latin typeface="Helvetica" charset="0"/>
-                <a:ea typeface="Helvetica" charset="0"/>
-                <a:cs typeface="Helvetica" charset="0"/>
-              </a:rPr>
-              <a:t>Chvatal</a:t>
-            </a:r>
-            <a:r>
-              <a:rPr lang="en-US" dirty="0">
-                <a:solidFill>
-                  <a:schemeClr val="tx1"/>
-                </a:solidFill>
-                <a:latin typeface="Helvetica" charset="0"/>
-                <a:ea typeface="Helvetica" charset="0"/>
-                <a:cs typeface="Helvetica" charset="0"/>
-              </a:rPr>
-              <a:t>, and W. J. Cook. </a:t>
-            </a:r>
-            <a:r>
-              <a:rPr lang="en-US" dirty="0" smtClean="0">
-                <a:solidFill>
-                  <a:schemeClr val="tx1"/>
-                </a:solidFill>
-                <a:latin typeface="Helvetica" charset="0"/>
-                <a:ea typeface="Helvetica" charset="0"/>
-                <a:cs typeface="Helvetica" charset="0"/>
-              </a:rPr>
-              <a:t>"The </a:t>
-            </a:r>
-            <a:r>
-              <a:rPr lang="en-US" dirty="0">
-                <a:solidFill>
-                  <a:schemeClr val="tx1"/>
-                </a:solidFill>
-                <a:latin typeface="Helvetica" charset="0"/>
-                <a:ea typeface="Helvetica" charset="0"/>
-                <a:cs typeface="Helvetica" charset="0"/>
-              </a:rPr>
-              <a:t>Traveling Salesman Problem: a computational </a:t>
-            </a:r>
-            <a:r>
-              <a:rPr lang="en-US" dirty="0" smtClean="0">
-                <a:solidFill>
-                  <a:schemeClr val="tx1"/>
-                </a:solidFill>
-                <a:latin typeface="Helvetica" charset="0"/>
-                <a:ea typeface="Helvetica" charset="0"/>
-                <a:cs typeface="Helvetica" charset="0"/>
-              </a:rPr>
-              <a:t>study". </a:t>
-            </a:r>
-            <a:r>
-              <a:rPr lang="en-US" i="1" dirty="0">
-                <a:solidFill>
-                  <a:schemeClr val="tx1"/>
-                </a:solidFill>
-                <a:latin typeface="Helvetica" charset="0"/>
-                <a:ea typeface="Helvetica" charset="0"/>
-                <a:cs typeface="Helvetica" charset="0"/>
-              </a:rPr>
-              <a:t>Princeton </a:t>
-            </a:r>
-            <a:r>
-              <a:rPr lang="en-US" i="1" dirty="0" smtClean="0">
-                <a:solidFill>
-                  <a:schemeClr val="tx1"/>
-                </a:solidFill>
-                <a:latin typeface="Helvetica" charset="0"/>
-                <a:ea typeface="Helvetica" charset="0"/>
-                <a:cs typeface="Helvetica" charset="0"/>
-              </a:rPr>
-              <a:t>University </a:t>
-            </a:r>
-            <a:r>
-              <a:rPr lang="en-US" i="1" dirty="0">
-                <a:solidFill>
-                  <a:schemeClr val="tx1"/>
-                </a:solidFill>
-                <a:latin typeface="Helvetica" charset="0"/>
-                <a:ea typeface="Helvetica" charset="0"/>
-                <a:cs typeface="Helvetica" charset="0"/>
-              </a:rPr>
-              <a:t>P</a:t>
-            </a:r>
-            <a:r>
-              <a:rPr lang="en-US" i="1" dirty="0" smtClean="0">
-                <a:solidFill>
-                  <a:schemeClr val="tx1"/>
-                </a:solidFill>
-                <a:latin typeface="Helvetica" charset="0"/>
-                <a:ea typeface="Helvetica" charset="0"/>
-                <a:cs typeface="Helvetica" charset="0"/>
-              </a:rPr>
-              <a:t>ress</a:t>
-            </a:r>
-            <a:r>
-              <a:rPr lang="en-US" dirty="0">
-                <a:solidFill>
-                  <a:schemeClr val="tx1"/>
-                </a:solidFill>
-                <a:latin typeface="Helvetica" charset="0"/>
-                <a:ea typeface="Helvetica" charset="0"/>
-                <a:cs typeface="Helvetica" charset="0"/>
-              </a:rPr>
-              <a:t>, 2011. </a:t>
-            </a:r>
-            <a:endParaRPr lang="en-US" dirty="0" smtClean="0">
-              <a:solidFill>
-                <a:schemeClr val="tx1"/>
-              </a:solidFill>
-              <a:latin typeface="Helvetica" charset="0"/>
-              <a:ea typeface="Helvetica" charset="0"/>
-              <a:cs typeface="Helvetica" charset="0"/>
-            </a:endParaRPr>
-          </a:p>
-          <a:p>
-            <a:r>
-              <a:rPr lang="en-US" dirty="0" smtClean="0">
-                <a:solidFill>
-                  <a:schemeClr val="tx1"/>
-                </a:solidFill>
-                <a:latin typeface="Helvetica" charset="0"/>
-                <a:ea typeface="Helvetica" charset="0"/>
-                <a:cs typeface="Helvetica" charset="0"/>
-              </a:rPr>
-              <a:t>[8] </a:t>
-            </a:r>
-            <a:r>
-              <a:rPr lang="en-US" dirty="0">
-                <a:solidFill>
-                  <a:schemeClr val="tx1"/>
-                </a:solidFill>
-                <a:latin typeface="Helvetica" charset="0"/>
-                <a:ea typeface="Helvetica" charset="0"/>
-                <a:cs typeface="Helvetica" charset="0"/>
-              </a:rPr>
-              <a:t>T. H. </a:t>
-            </a:r>
-            <a:r>
-              <a:rPr lang="en-US" dirty="0" err="1">
-                <a:solidFill>
-                  <a:schemeClr val="tx1"/>
-                </a:solidFill>
-                <a:latin typeface="Helvetica" charset="0"/>
-                <a:ea typeface="Helvetica" charset="0"/>
-                <a:cs typeface="Helvetica" charset="0"/>
-              </a:rPr>
-              <a:t>Cormen</a:t>
-            </a:r>
-            <a:r>
-              <a:rPr lang="en-US" dirty="0">
-                <a:solidFill>
-                  <a:schemeClr val="tx1"/>
-                </a:solidFill>
-                <a:latin typeface="Helvetica" charset="0"/>
-                <a:ea typeface="Helvetica" charset="0"/>
-                <a:cs typeface="Helvetica" charset="0"/>
-              </a:rPr>
-              <a:t>, C. E. </a:t>
-            </a:r>
-            <a:r>
-              <a:rPr lang="en-US" dirty="0" err="1">
-                <a:solidFill>
-                  <a:schemeClr val="tx1"/>
-                </a:solidFill>
-                <a:latin typeface="Helvetica" charset="0"/>
-                <a:ea typeface="Helvetica" charset="0"/>
-                <a:cs typeface="Helvetica" charset="0"/>
-              </a:rPr>
-              <a:t>Leiserson</a:t>
-            </a:r>
-            <a:r>
-              <a:rPr lang="en-US" dirty="0">
-                <a:solidFill>
-                  <a:schemeClr val="tx1"/>
-                </a:solidFill>
-                <a:latin typeface="Helvetica" charset="0"/>
-                <a:ea typeface="Helvetica" charset="0"/>
-                <a:cs typeface="Helvetica" charset="0"/>
-              </a:rPr>
-              <a:t>, R. L. </a:t>
-            </a:r>
-            <a:r>
-              <a:rPr lang="en-US" dirty="0" err="1">
-                <a:solidFill>
-                  <a:schemeClr val="tx1"/>
-                </a:solidFill>
-                <a:latin typeface="Helvetica" charset="0"/>
-                <a:ea typeface="Helvetica" charset="0"/>
-                <a:cs typeface="Helvetica" charset="0"/>
-              </a:rPr>
-              <a:t>Rivest</a:t>
-            </a:r>
-            <a:r>
-              <a:rPr lang="en-US" dirty="0">
-                <a:solidFill>
-                  <a:schemeClr val="tx1"/>
-                </a:solidFill>
-                <a:latin typeface="Helvetica" charset="0"/>
-                <a:ea typeface="Helvetica" charset="0"/>
-                <a:cs typeface="Helvetica" charset="0"/>
-              </a:rPr>
-              <a:t>, et al. </a:t>
-            </a:r>
-            <a:r>
-              <a:rPr lang="en-US" dirty="0" smtClean="0">
-                <a:solidFill>
-                  <a:schemeClr val="tx1"/>
-                </a:solidFill>
-                <a:latin typeface="Helvetica" charset="0"/>
-                <a:ea typeface="Helvetica" charset="0"/>
-                <a:cs typeface="Helvetica" charset="0"/>
-              </a:rPr>
-              <a:t>"Section </a:t>
-            </a:r>
-            <a:r>
-              <a:rPr lang="en-US" dirty="0">
-                <a:solidFill>
-                  <a:schemeClr val="tx1"/>
-                </a:solidFill>
-                <a:latin typeface="Helvetica" charset="0"/>
-                <a:ea typeface="Helvetica" charset="0"/>
-                <a:cs typeface="Helvetica" charset="0"/>
-              </a:rPr>
-              <a:t>24.3: </a:t>
-            </a:r>
-            <a:r>
-              <a:rPr lang="en-US" dirty="0" err="1">
-                <a:solidFill>
-                  <a:schemeClr val="tx1"/>
-                </a:solidFill>
-                <a:latin typeface="Helvetica" charset="0"/>
-                <a:ea typeface="Helvetica" charset="0"/>
-                <a:cs typeface="Helvetica" charset="0"/>
-              </a:rPr>
-              <a:t>Dijkstra’s</a:t>
-            </a:r>
-            <a:r>
-              <a:rPr lang="en-US" dirty="0">
-                <a:solidFill>
-                  <a:schemeClr val="tx1"/>
-                </a:solidFill>
-                <a:latin typeface="Helvetica" charset="0"/>
-                <a:ea typeface="Helvetica" charset="0"/>
-                <a:cs typeface="Helvetica" charset="0"/>
-              </a:rPr>
-              <a:t> </a:t>
-            </a:r>
-            <a:r>
-              <a:rPr lang="en-US" dirty="0" smtClean="0">
-                <a:solidFill>
-                  <a:schemeClr val="tx1"/>
-                </a:solidFill>
-                <a:latin typeface="Helvetica" charset="0"/>
-                <a:ea typeface="Helvetica" charset="0"/>
-                <a:cs typeface="Helvetica" charset="0"/>
-              </a:rPr>
-              <a:t>algorithm”. </a:t>
-            </a:r>
-            <a:r>
-              <a:rPr lang="en-US" i="1" dirty="0" smtClean="0">
-                <a:solidFill>
-                  <a:schemeClr val="tx1"/>
-                </a:solidFill>
-                <a:latin typeface="Helvetica" charset="0"/>
-                <a:ea typeface="Helvetica" charset="0"/>
-                <a:cs typeface="Helvetica" charset="0"/>
-              </a:rPr>
-              <a:t>MIT Press </a:t>
-            </a:r>
-            <a:r>
-              <a:rPr lang="en-US" i="1" dirty="0">
-                <a:solidFill>
-                  <a:schemeClr val="tx1"/>
-                </a:solidFill>
-                <a:latin typeface="Helvetica" charset="0"/>
-                <a:ea typeface="Helvetica" charset="0"/>
-                <a:cs typeface="Helvetica" charset="0"/>
-              </a:rPr>
-              <a:t>and McGraw-Hill</a:t>
-            </a:r>
-            <a:r>
-              <a:rPr lang="en-US" dirty="0">
-                <a:solidFill>
-                  <a:schemeClr val="tx1"/>
-                </a:solidFill>
-                <a:latin typeface="Helvetica" charset="0"/>
-                <a:ea typeface="Helvetica" charset="0"/>
-                <a:cs typeface="Helvetica" charset="0"/>
-              </a:rPr>
-              <a:t>, 2001. </a:t>
-            </a:r>
-            <a:endParaRPr lang="en-US" dirty="0" smtClean="0">
-              <a:solidFill>
-                <a:schemeClr val="tx1"/>
-              </a:solidFill>
-              <a:latin typeface="Helvetica" charset="0"/>
-              <a:ea typeface="Helvetica" charset="0"/>
-              <a:cs typeface="Helvetica" charset="0"/>
-            </a:endParaRPr>
-          </a:p>
-          <a:p>
-            <a:r>
-              <a:rPr lang="en-US" dirty="0" smtClean="0">
-                <a:solidFill>
-                  <a:schemeClr val="tx1"/>
-                </a:solidFill>
-                <a:latin typeface="Helvetica" charset="0"/>
-                <a:ea typeface="Helvetica" charset="0"/>
-                <a:cs typeface="Helvetica" charset="0"/>
-              </a:rPr>
-              <a:t>[9] </a:t>
-            </a:r>
-            <a:r>
-              <a:rPr lang="en-US" dirty="0">
-                <a:solidFill>
-                  <a:schemeClr val="tx1"/>
-                </a:solidFill>
-                <a:latin typeface="Helvetica" charset="0"/>
-                <a:ea typeface="Helvetica" charset="0"/>
-                <a:cs typeface="Helvetica" charset="0"/>
-              </a:rPr>
-              <a:t>M. Mitchell. </a:t>
-            </a:r>
-            <a:r>
-              <a:rPr lang="en-US" dirty="0" smtClean="0">
-                <a:solidFill>
-                  <a:schemeClr val="tx1"/>
-                </a:solidFill>
-                <a:latin typeface="Helvetica" charset="0"/>
-                <a:ea typeface="Helvetica" charset="0"/>
-                <a:cs typeface="Helvetica" charset="0"/>
-              </a:rPr>
-              <a:t>"An </a:t>
-            </a:r>
-            <a:r>
-              <a:rPr lang="en-US" dirty="0">
-                <a:solidFill>
-                  <a:schemeClr val="tx1"/>
-                </a:solidFill>
-                <a:latin typeface="Helvetica" charset="0"/>
-                <a:ea typeface="Helvetica" charset="0"/>
-                <a:cs typeface="Helvetica" charset="0"/>
-              </a:rPr>
-              <a:t>introduction to genetic </a:t>
-            </a:r>
-            <a:r>
-              <a:rPr lang="en-US" dirty="0" smtClean="0">
-                <a:solidFill>
-                  <a:schemeClr val="tx1"/>
-                </a:solidFill>
-                <a:latin typeface="Helvetica" charset="0"/>
-                <a:ea typeface="Helvetica" charset="0"/>
-                <a:cs typeface="Helvetica" charset="0"/>
-              </a:rPr>
-              <a:t>algorithms". </a:t>
-            </a:r>
-            <a:r>
-              <a:rPr lang="en-US" i="1" dirty="0">
-                <a:solidFill>
-                  <a:schemeClr val="tx1"/>
-                </a:solidFill>
-                <a:latin typeface="Helvetica" charset="0"/>
-                <a:ea typeface="Helvetica" charset="0"/>
-                <a:cs typeface="Helvetica" charset="0"/>
-              </a:rPr>
-              <a:t>MIT </a:t>
-            </a:r>
-            <a:r>
-              <a:rPr lang="en-US" i="1" dirty="0" smtClean="0">
-                <a:solidFill>
-                  <a:schemeClr val="tx1"/>
-                </a:solidFill>
-                <a:latin typeface="Helvetica" charset="0"/>
-                <a:ea typeface="Helvetica" charset="0"/>
-                <a:cs typeface="Helvetica" charset="0"/>
-              </a:rPr>
-              <a:t>Press</a:t>
-            </a:r>
-            <a:r>
-              <a:rPr lang="en-US" dirty="0">
-                <a:solidFill>
-                  <a:schemeClr val="tx1"/>
-                </a:solidFill>
-                <a:latin typeface="Helvetica" charset="0"/>
-                <a:ea typeface="Helvetica" charset="0"/>
-                <a:cs typeface="Helvetica" charset="0"/>
-              </a:rPr>
-              <a:t>, 1998. </a:t>
-            </a:r>
-            <a:endParaRPr lang="en-US" dirty="0" smtClean="0">
-              <a:solidFill>
-                <a:schemeClr val="tx1"/>
-              </a:solidFill>
-              <a:latin typeface="Helvetica" charset="0"/>
-              <a:ea typeface="Helvetica" charset="0"/>
-              <a:cs typeface="Helvetica" charset="0"/>
-            </a:endParaRPr>
-          </a:p>
-          <a:p>
-            <a:r>
-              <a:rPr lang="en-US" dirty="0" smtClean="0">
-                <a:solidFill>
-                  <a:schemeClr val="tx1"/>
-                </a:solidFill>
-                <a:latin typeface="Helvetica" charset="0"/>
-                <a:ea typeface="Helvetica" charset="0"/>
-                <a:cs typeface="Helvetica" charset="0"/>
-              </a:rPr>
-              <a:t>[10] M</a:t>
-            </a:r>
-            <a:r>
-              <a:rPr lang="en-US" dirty="0">
-                <a:solidFill>
-                  <a:schemeClr val="tx1"/>
-                </a:solidFill>
-                <a:latin typeface="Helvetica" charset="0"/>
-                <a:ea typeface="Helvetica" charset="0"/>
-                <a:cs typeface="Helvetica" charset="0"/>
-              </a:rPr>
-              <a:t>. Srinivas and L. M. </a:t>
-            </a:r>
-            <a:r>
-              <a:rPr lang="en-US" dirty="0" err="1">
-                <a:solidFill>
-                  <a:schemeClr val="tx1"/>
-                </a:solidFill>
-                <a:latin typeface="Helvetica" charset="0"/>
-                <a:ea typeface="Helvetica" charset="0"/>
-                <a:cs typeface="Helvetica" charset="0"/>
-              </a:rPr>
-              <a:t>Patnaik</a:t>
-            </a:r>
-            <a:r>
-              <a:rPr lang="en-US" dirty="0">
-                <a:solidFill>
-                  <a:schemeClr val="tx1"/>
-                </a:solidFill>
-                <a:latin typeface="Helvetica" charset="0"/>
-                <a:ea typeface="Helvetica" charset="0"/>
-                <a:cs typeface="Helvetica" charset="0"/>
-              </a:rPr>
-              <a:t>. </a:t>
-            </a:r>
-            <a:r>
-              <a:rPr lang="en-US" dirty="0" smtClean="0">
-                <a:solidFill>
-                  <a:schemeClr val="tx1"/>
-                </a:solidFill>
-                <a:latin typeface="Helvetica" charset="0"/>
-                <a:ea typeface="Helvetica" charset="0"/>
-                <a:cs typeface="Helvetica" charset="0"/>
-              </a:rPr>
-              <a:t>"Adaptive </a:t>
-            </a:r>
-            <a:r>
-              <a:rPr lang="en-US" dirty="0">
-                <a:solidFill>
-                  <a:schemeClr val="tx1"/>
-                </a:solidFill>
-                <a:latin typeface="Helvetica" charset="0"/>
-                <a:ea typeface="Helvetica" charset="0"/>
-                <a:cs typeface="Helvetica" charset="0"/>
-              </a:rPr>
-              <a:t>probabilities of crossover and mutation in genetic </a:t>
-            </a:r>
-            <a:r>
-              <a:rPr lang="en-US" dirty="0" smtClean="0">
-                <a:solidFill>
-                  <a:schemeClr val="tx1"/>
-                </a:solidFill>
-                <a:latin typeface="Helvetica" charset="0"/>
-                <a:ea typeface="Helvetica" charset="0"/>
-                <a:cs typeface="Helvetica" charset="0"/>
-              </a:rPr>
-              <a:t>algorithms". </a:t>
-            </a:r>
-            <a:r>
-              <a:rPr lang="en-US" i="1" dirty="0">
-                <a:solidFill>
-                  <a:schemeClr val="tx1"/>
-                </a:solidFill>
-                <a:latin typeface="Helvetica" charset="0"/>
-                <a:ea typeface="Helvetica" charset="0"/>
-                <a:cs typeface="Helvetica" charset="0"/>
-              </a:rPr>
-              <a:t>IEEE Transactions on Systems, Man, and Cybernetics</a:t>
-            </a:r>
-            <a:r>
-              <a:rPr lang="en-US" dirty="0">
-                <a:solidFill>
-                  <a:schemeClr val="tx1"/>
-                </a:solidFill>
-                <a:latin typeface="Helvetica" charset="0"/>
-                <a:ea typeface="Helvetica" charset="0"/>
-                <a:cs typeface="Helvetica" charset="0"/>
-              </a:rPr>
-              <a:t>, 24(4):656–667, 1994. </a:t>
-            </a:r>
-          </a:p>
-          <a:p>
-            <a:endParaRPr lang="en-US" dirty="0">
-              <a:solidFill>
-                <a:schemeClr val="tx1"/>
-              </a:solidFill>
-              <a:latin typeface="Helvetica" charset="0"/>
-              <a:ea typeface="Helvetica" charset="0"/>
-              <a:cs typeface="Helvetica" charset="0"/>
-            </a:endParaRPr>
-          </a:p>
-          <a:p>
-            <a:endParaRPr lang="en-US" dirty="0">
-              <a:solidFill>
-                <a:schemeClr val="tx1"/>
-              </a:solidFill>
-              <a:latin typeface="Helvetica" charset="0"/>
-              <a:ea typeface="Helvetica" charset="0"/>
-              <a:cs typeface="Helvetica" charset="0"/>
-            </a:endParaRPr>
-          </a:p>
-        </p:txBody>
-      </p:sp>
-      <p:sp>
-        <p:nvSpPr>
-          <p:cNvPr id="4" name="Slide Number Placeholder 3"/>
+          <p:cNvPr id="5" name="Slide Number Placeholder 4"/>
           <p:cNvSpPr>
             <a:spLocks noGrp="1"/>
           </p:cNvSpPr>
@@ -28476,10 +27336,39 @@
           </a:p>
         </p:txBody>
       </p:sp>
+      <p:pic>
+        <p:nvPicPr>
+          <p:cNvPr id="4" name="Content Placeholder 3"/>
+          <p:cNvPicPr>
+            <a:picLocks noGrp="1" noChangeAspect="1"/>
+          </p:cNvPicPr>
+          <p:nvPr>
+            <p:ph idx="1"/>
+          </p:nvPr>
+        </p:nvPicPr>
+        <p:blipFill>
+          <a:blip r:embed="rId3">
+            <a:extLst>
+              <a:ext uri="{28A0092B-C50C-407E-A947-70E740481C1C}">
+                <a14:useLocalDpi xmlns:a14="http://schemas.microsoft.com/office/drawing/2010/main" val="0"/>
+              </a:ext>
+            </a:extLst>
+          </a:blip>
+          <a:stretch>
+            <a:fillRect/>
+          </a:stretch>
+        </p:blipFill>
+        <p:spPr>
+          <a:xfrm>
+            <a:off x="2261470" y="2603500"/>
+            <a:ext cx="6613372" cy="3416300"/>
+          </a:xfrm>
+        </p:spPr>
+      </p:pic>
     </p:spTree>
     <p:extLst>
       <p:ext uri="{BB962C8B-B14F-4D97-AF65-F5344CB8AC3E}">
-        <p14:creationId xmlns:p14="http://schemas.microsoft.com/office/powerpoint/2010/main" val="2080831962"/>
+        <p14:creationId xmlns:p14="http://schemas.microsoft.com/office/powerpoint/2010/main" val="1936772385"/>
       </p:ext>
     </p:extLst>
   </p:cSld>
@@ -28534,6 +27423,1116 @@
                 <a:ea typeface="Helvetica" charset="0"/>
                 <a:cs typeface="Helvetica" charset="0"/>
               </a:rPr>
+              <a:t>Análises</a:t>
+            </a:r>
+            <a:r>
+              <a:rPr lang="en-US" b="1" dirty="0" smtClean="0">
+                <a:latin typeface="Helvetica" charset="0"/>
+                <a:ea typeface="Helvetica" charset="0"/>
+                <a:cs typeface="Helvetica" charset="0"/>
+              </a:rPr>
+              <a:t> e </a:t>
+            </a:r>
+            <a:r>
+              <a:rPr lang="en-US" b="1" dirty="0" err="1" smtClean="0">
+                <a:latin typeface="Helvetica" charset="0"/>
+                <a:ea typeface="Helvetica" charset="0"/>
+                <a:cs typeface="Helvetica" charset="0"/>
+              </a:rPr>
+              <a:t>Resultados</a:t>
+            </a:r>
+            <a:endParaRPr lang="en-US" sz="2800" b="1" dirty="0">
+              <a:latin typeface="Helvetica" charset="0"/>
+              <a:ea typeface="Helvetica" charset="0"/>
+              <a:cs typeface="Helvetica" charset="0"/>
+            </a:endParaRPr>
+          </a:p>
+        </p:txBody>
+      </p:sp>
+      <p:sp>
+        <p:nvSpPr>
+          <p:cNvPr id="3" name="Content Placeholder 2"/>
+          <p:cNvSpPr>
+            <a:spLocks noGrp="1"/>
+          </p:cNvSpPr>
+          <p:nvPr>
+            <p:ph idx="1"/>
+          </p:nvPr>
+        </p:nvSpPr>
+        <p:spPr>
+          <a:xfrm>
+            <a:off x="1154954" y="2603500"/>
+            <a:ext cx="9647158" cy="4126484"/>
+          </a:xfrm>
+        </p:spPr>
+        <p:txBody>
+          <a:bodyPr>
+            <a:normAutofit/>
+          </a:bodyPr>
+          <a:lstStyle/>
+          <a:p>
+            <a:r>
+              <a:rPr lang="en-US" dirty="0" err="1">
+                <a:solidFill>
+                  <a:schemeClr val="tx1"/>
+                </a:solidFill>
+                <a:latin typeface="Helvetica" charset="0"/>
+                <a:ea typeface="Helvetica" charset="0"/>
+                <a:cs typeface="Helvetica" charset="0"/>
+              </a:rPr>
+              <a:t>T</a:t>
+            </a:r>
+            <a:r>
+              <a:rPr lang="en-US" dirty="0" err="1" smtClean="0">
+                <a:solidFill>
+                  <a:schemeClr val="tx1"/>
+                </a:solidFill>
+                <a:latin typeface="Helvetica" charset="0"/>
+                <a:ea typeface="Helvetica" charset="0"/>
+                <a:cs typeface="Helvetica" charset="0"/>
+              </a:rPr>
+              <a:t>exto</a:t>
+            </a:r>
+            <a:r>
+              <a:rPr lang="en-US" dirty="0" smtClean="0">
+                <a:solidFill>
+                  <a:schemeClr val="tx1"/>
+                </a:solidFill>
+                <a:latin typeface="Helvetica" charset="0"/>
+                <a:ea typeface="Helvetica" charset="0"/>
+                <a:cs typeface="Helvetica" charset="0"/>
+              </a:rPr>
+              <a:t> </a:t>
+            </a:r>
+            <a:r>
+              <a:rPr lang="en-US" dirty="0" err="1" smtClean="0">
+                <a:solidFill>
+                  <a:schemeClr val="tx1"/>
+                </a:solidFill>
+                <a:latin typeface="Helvetica" charset="0"/>
+                <a:ea typeface="Helvetica" charset="0"/>
+                <a:cs typeface="Helvetica" charset="0"/>
+              </a:rPr>
+              <a:t>aqui</a:t>
+            </a:r>
+            <a:endParaRPr lang="en-US" i="1" baseline="-25000" dirty="0" smtClean="0">
+              <a:solidFill>
+                <a:schemeClr val="tx1"/>
+              </a:solidFill>
+              <a:latin typeface="Helvetica" charset="0"/>
+              <a:ea typeface="Helvetica" charset="0"/>
+              <a:cs typeface="Helvetica" charset="0"/>
+            </a:endParaRPr>
+          </a:p>
+        </p:txBody>
+      </p:sp>
+      <p:sp>
+        <p:nvSpPr>
+          <p:cNvPr id="5" name="Slide Number Placeholder 4"/>
+          <p:cNvSpPr>
+            <a:spLocks noGrp="1"/>
+          </p:cNvSpPr>
+          <p:nvPr>
+            <p:ph type="sldNum" sz="quarter" idx="12"/>
+          </p:nvPr>
+        </p:nvSpPr>
+        <p:spPr/>
+        <p:txBody>
+          <a:bodyPr/>
+          <a:lstStyle/>
+          <a:p>
+            <a:fld id="{55774153-6BEA-8641-B7A1-86CE42693FE2}" type="slidenum">
+              <a:rPr lang="en-US" smtClean="0"/>
+              <a:t>23</a:t>
+            </a:fld>
+            <a:endParaRPr lang="en-US"/>
+          </a:p>
+        </p:txBody>
+      </p:sp>
+    </p:spTree>
+    <p:extLst>
+      <p:ext uri="{BB962C8B-B14F-4D97-AF65-F5344CB8AC3E}">
+        <p14:creationId xmlns:p14="http://schemas.microsoft.com/office/powerpoint/2010/main" val="1732599681"/>
+      </p:ext>
+    </p:extLst>
+  </p:cSld>
+  <p:clrMapOvr>
+    <a:masterClrMapping/>
+  </p:clrMapOvr>
+  <p:timing>
+    <p:tnLst>
+      <p:par>
+        <p:cTn id="1" dur="indefinite" restart="never" nodeType="tmRoot"/>
+      </p:par>
+    </p:tnLst>
+  </p:timing>
+</p:sld>
+</file>
+
+<file path=ppt/slides/slide25.xml><?xml version="1.0" encoding="utf-8"?>
+<p:sld xmlns:a="http://schemas.openxmlformats.org/drawingml/2006/main" xmlns:r="http://schemas.openxmlformats.org/officeDocument/2006/relationships" xmlns:p="http://schemas.openxmlformats.org/presentationml/2006/main">
+  <p:cSld>
+    <p:spTree>
+      <p:nvGrpSpPr>
+        <p:cNvPr id="1" name=""/>
+        <p:cNvGrpSpPr/>
+        <p:nvPr/>
+      </p:nvGrpSpPr>
+      <p:grpSpPr>
+        <a:xfrm>
+          <a:off x="0" y="0"/>
+          <a:ext cx="0" cy="0"/>
+          <a:chOff x="0" y="0"/>
+          <a:chExt cx="0" cy="0"/>
+        </a:xfrm>
+      </p:grpSpPr>
+      <p:sp>
+        <p:nvSpPr>
+          <p:cNvPr id="2" name="Title 1"/>
+          <p:cNvSpPr>
+            <a:spLocks noGrp="1"/>
+          </p:cNvSpPr>
+          <p:nvPr>
+            <p:ph type="title"/>
+          </p:nvPr>
+        </p:nvSpPr>
+        <p:spPr/>
+        <p:txBody>
+          <a:bodyPr/>
+          <a:lstStyle/>
+          <a:p>
+            <a:r>
+              <a:rPr lang="en-US" b="1" dirty="0" err="1" smtClean="0">
+                <a:latin typeface="Helvetica" charset="0"/>
+                <a:ea typeface="Helvetica" charset="0"/>
+                <a:cs typeface="Helvetica" charset="0"/>
+              </a:rPr>
+              <a:t>Referências</a:t>
+            </a:r>
+            <a:endParaRPr lang="en-US" b="1" dirty="0">
+              <a:latin typeface="Helvetica" charset="0"/>
+              <a:ea typeface="Helvetica" charset="0"/>
+              <a:cs typeface="Helvetica" charset="0"/>
+            </a:endParaRPr>
+          </a:p>
+        </p:txBody>
+      </p:sp>
+      <p:sp>
+        <p:nvSpPr>
+          <p:cNvPr id="3" name="Content Placeholder 2"/>
+          <p:cNvSpPr>
+            <a:spLocks noGrp="1"/>
+          </p:cNvSpPr>
+          <p:nvPr>
+            <p:ph idx="1"/>
+          </p:nvPr>
+        </p:nvSpPr>
+        <p:spPr>
+          <a:xfrm>
+            <a:off x="1154954" y="2603500"/>
+            <a:ext cx="10035785" cy="4102100"/>
+          </a:xfrm>
+        </p:spPr>
+        <p:txBody>
+          <a:bodyPr>
+            <a:normAutofit/>
+          </a:bodyPr>
+          <a:lstStyle/>
+          <a:p>
+            <a:r>
+              <a:rPr lang="en-US" dirty="0" smtClean="0">
+                <a:solidFill>
+                  <a:schemeClr val="tx1"/>
+                </a:solidFill>
+                <a:latin typeface="Helvetica" charset="0"/>
+                <a:ea typeface="Helvetica" charset="0"/>
+                <a:cs typeface="Helvetica" charset="0"/>
+              </a:rPr>
+              <a:t>[1] </a:t>
+            </a:r>
+            <a:r>
+              <a:rPr lang="en-US" dirty="0">
+                <a:solidFill>
+                  <a:schemeClr val="tx1"/>
+                </a:solidFill>
+                <a:latin typeface="Helvetica" charset="0"/>
+                <a:ea typeface="Helvetica" charset="0"/>
+                <a:cs typeface="Helvetica" charset="0"/>
+              </a:rPr>
+              <a:t>A. E. </a:t>
+            </a:r>
+            <a:r>
+              <a:rPr lang="en-US" dirty="0" err="1" smtClean="0">
+                <a:solidFill>
+                  <a:schemeClr val="tx1"/>
+                </a:solidFill>
+                <a:latin typeface="Helvetica" charset="0"/>
+                <a:ea typeface="Helvetica" charset="0"/>
+                <a:cs typeface="Helvetica" charset="0"/>
+              </a:rPr>
+              <a:t>Eiben</a:t>
+            </a:r>
+            <a:r>
+              <a:rPr lang="en-US" dirty="0" smtClean="0">
+                <a:solidFill>
+                  <a:schemeClr val="tx1"/>
+                </a:solidFill>
+                <a:latin typeface="Helvetica" charset="0"/>
+                <a:ea typeface="Helvetica" charset="0"/>
+                <a:cs typeface="Helvetica" charset="0"/>
+              </a:rPr>
+              <a:t>, J</a:t>
+            </a:r>
+            <a:r>
+              <a:rPr lang="en-US" dirty="0">
+                <a:solidFill>
+                  <a:schemeClr val="tx1"/>
+                </a:solidFill>
+                <a:latin typeface="Helvetica" charset="0"/>
+                <a:ea typeface="Helvetica" charset="0"/>
+                <a:cs typeface="Helvetica" charset="0"/>
+              </a:rPr>
+              <a:t>. E. Smith. </a:t>
+            </a:r>
+            <a:r>
+              <a:rPr lang="en-US" dirty="0" smtClean="0">
+                <a:solidFill>
+                  <a:schemeClr val="tx1"/>
+                </a:solidFill>
+                <a:latin typeface="Helvetica" charset="0"/>
+                <a:ea typeface="Helvetica" charset="0"/>
+                <a:cs typeface="Helvetica" charset="0"/>
+              </a:rPr>
+              <a:t>“</a:t>
+            </a:r>
+            <a:r>
+              <a:rPr lang="en-US" i="1" dirty="0" smtClean="0">
+                <a:solidFill>
+                  <a:schemeClr val="tx1"/>
+                </a:solidFill>
+                <a:latin typeface="Helvetica" charset="0"/>
+                <a:ea typeface="Helvetica" charset="0"/>
+                <a:cs typeface="Helvetica" charset="0"/>
+              </a:rPr>
+              <a:t>Introduction </a:t>
+            </a:r>
+            <a:r>
+              <a:rPr lang="en-US" i="1" dirty="0">
+                <a:solidFill>
+                  <a:schemeClr val="tx1"/>
+                </a:solidFill>
+                <a:latin typeface="Helvetica" charset="0"/>
+                <a:ea typeface="Helvetica" charset="0"/>
+                <a:cs typeface="Helvetica" charset="0"/>
+              </a:rPr>
+              <a:t>To Evolutionary </a:t>
+            </a:r>
+            <a:r>
+              <a:rPr lang="en-US" i="1" dirty="0" smtClean="0">
+                <a:solidFill>
+                  <a:schemeClr val="tx1"/>
+                </a:solidFill>
+                <a:latin typeface="Helvetica" charset="0"/>
+                <a:ea typeface="Helvetica" charset="0"/>
+                <a:cs typeface="Helvetica" charset="0"/>
+              </a:rPr>
+              <a:t>Computing”</a:t>
+            </a:r>
+            <a:r>
+              <a:rPr lang="en-US" dirty="0" smtClean="0">
+                <a:solidFill>
+                  <a:schemeClr val="tx1"/>
+                </a:solidFill>
+                <a:latin typeface="Helvetica" charset="0"/>
+                <a:ea typeface="Helvetica" charset="0"/>
+                <a:cs typeface="Helvetica" charset="0"/>
+              </a:rPr>
+              <a:t>. </a:t>
+            </a:r>
+            <a:r>
+              <a:rPr lang="en-US" dirty="0">
+                <a:solidFill>
+                  <a:schemeClr val="tx1"/>
+                </a:solidFill>
+                <a:latin typeface="Helvetica" charset="0"/>
+                <a:ea typeface="Helvetica" charset="0"/>
+                <a:cs typeface="Helvetica" charset="0"/>
+              </a:rPr>
+              <a:t>V</a:t>
+            </a:r>
+            <a:r>
+              <a:rPr lang="en-US" dirty="0" smtClean="0">
+                <a:solidFill>
+                  <a:schemeClr val="tx1"/>
+                </a:solidFill>
+                <a:latin typeface="Helvetica" charset="0"/>
+                <a:ea typeface="Helvetica" charset="0"/>
+                <a:cs typeface="Helvetica" charset="0"/>
+              </a:rPr>
+              <a:t>olume 53. </a:t>
+            </a:r>
+            <a:r>
+              <a:rPr lang="en-US" dirty="0">
+                <a:solidFill>
+                  <a:schemeClr val="tx1"/>
+                </a:solidFill>
+                <a:latin typeface="Helvetica" charset="0"/>
+                <a:ea typeface="Helvetica" charset="0"/>
+                <a:cs typeface="Helvetica" charset="0"/>
+              </a:rPr>
+              <a:t>Springer-</a:t>
+            </a:r>
+            <a:r>
+              <a:rPr lang="en-US" dirty="0" err="1">
+                <a:solidFill>
+                  <a:schemeClr val="tx1"/>
+                </a:solidFill>
+                <a:latin typeface="Helvetica" charset="0"/>
+                <a:ea typeface="Helvetica" charset="0"/>
+                <a:cs typeface="Helvetica" charset="0"/>
+              </a:rPr>
+              <a:t>Verlag</a:t>
+            </a:r>
+            <a:r>
+              <a:rPr lang="en-US" dirty="0">
+                <a:solidFill>
+                  <a:schemeClr val="tx1"/>
+                </a:solidFill>
+                <a:latin typeface="Helvetica" charset="0"/>
+                <a:ea typeface="Helvetica" charset="0"/>
+                <a:cs typeface="Helvetica" charset="0"/>
+              </a:rPr>
+              <a:t>, 2003. </a:t>
+            </a:r>
+            <a:endParaRPr lang="en-US" dirty="0" smtClean="0">
+              <a:solidFill>
+                <a:schemeClr val="tx1"/>
+              </a:solidFill>
+              <a:latin typeface="Helvetica" charset="0"/>
+              <a:ea typeface="Helvetica" charset="0"/>
+              <a:cs typeface="Helvetica" charset="0"/>
+            </a:endParaRPr>
+          </a:p>
+          <a:p>
+            <a:r>
+              <a:rPr lang="en-US" dirty="0" smtClean="0">
+                <a:solidFill>
+                  <a:schemeClr val="tx1"/>
+                </a:solidFill>
+                <a:latin typeface="Helvetica" charset="0"/>
+                <a:ea typeface="Helvetica" charset="0"/>
+                <a:cs typeface="Helvetica" charset="0"/>
+              </a:rPr>
+              <a:t>[2] A</a:t>
+            </a:r>
+            <a:r>
+              <a:rPr lang="en-US" dirty="0">
+                <a:solidFill>
+                  <a:schemeClr val="tx1"/>
+                </a:solidFill>
+                <a:latin typeface="Helvetica" charset="0"/>
+                <a:ea typeface="Helvetica" charset="0"/>
+                <a:cs typeface="Helvetica" charset="0"/>
+              </a:rPr>
+              <a:t>. E. </a:t>
+            </a:r>
+            <a:r>
+              <a:rPr lang="en-US" dirty="0" err="1" smtClean="0">
+                <a:solidFill>
+                  <a:schemeClr val="tx1"/>
+                </a:solidFill>
+                <a:latin typeface="Helvetica" charset="0"/>
+                <a:ea typeface="Helvetica" charset="0"/>
+                <a:cs typeface="Helvetica" charset="0"/>
+              </a:rPr>
+              <a:t>Eiben</a:t>
+            </a:r>
+            <a:r>
+              <a:rPr lang="en-US" dirty="0" smtClean="0">
+                <a:solidFill>
+                  <a:schemeClr val="tx1"/>
+                </a:solidFill>
+                <a:latin typeface="Helvetica" charset="0"/>
+                <a:ea typeface="Helvetica" charset="0"/>
+                <a:cs typeface="Helvetica" charset="0"/>
+              </a:rPr>
+              <a:t>, S</a:t>
+            </a:r>
+            <a:r>
+              <a:rPr lang="en-US" dirty="0">
+                <a:solidFill>
+                  <a:schemeClr val="tx1"/>
+                </a:solidFill>
+                <a:latin typeface="Helvetica" charset="0"/>
+                <a:ea typeface="Helvetica" charset="0"/>
+                <a:cs typeface="Helvetica" charset="0"/>
+              </a:rPr>
+              <a:t>. K. </a:t>
+            </a:r>
+            <a:r>
+              <a:rPr lang="en-US" dirty="0" err="1">
+                <a:solidFill>
+                  <a:schemeClr val="tx1"/>
+                </a:solidFill>
+                <a:latin typeface="Helvetica" charset="0"/>
+                <a:ea typeface="Helvetica" charset="0"/>
+                <a:cs typeface="Helvetica" charset="0"/>
+              </a:rPr>
+              <a:t>Smit</a:t>
+            </a:r>
+            <a:r>
+              <a:rPr lang="en-US" dirty="0">
+                <a:solidFill>
+                  <a:schemeClr val="tx1"/>
+                </a:solidFill>
+                <a:latin typeface="Helvetica" charset="0"/>
+                <a:ea typeface="Helvetica" charset="0"/>
+                <a:cs typeface="Helvetica" charset="0"/>
+              </a:rPr>
+              <a:t>. </a:t>
+            </a:r>
+            <a:r>
+              <a:rPr lang="en-US" dirty="0" smtClean="0">
+                <a:solidFill>
+                  <a:schemeClr val="tx1"/>
+                </a:solidFill>
+                <a:latin typeface="Helvetica" charset="0"/>
+                <a:ea typeface="Helvetica" charset="0"/>
+                <a:cs typeface="Helvetica" charset="0"/>
+              </a:rPr>
+              <a:t>“Parameter </a:t>
+            </a:r>
+            <a:r>
+              <a:rPr lang="en-US" dirty="0">
+                <a:solidFill>
+                  <a:schemeClr val="tx1"/>
+                </a:solidFill>
+                <a:latin typeface="Helvetica" charset="0"/>
+                <a:ea typeface="Helvetica" charset="0"/>
+                <a:cs typeface="Helvetica" charset="0"/>
+              </a:rPr>
+              <a:t>tuning for configuring and analyzing evolutionary </a:t>
+            </a:r>
+            <a:r>
+              <a:rPr lang="en-US" dirty="0" smtClean="0">
+                <a:solidFill>
+                  <a:schemeClr val="tx1"/>
+                </a:solidFill>
+                <a:latin typeface="Helvetica" charset="0"/>
+                <a:ea typeface="Helvetica" charset="0"/>
+                <a:cs typeface="Helvetica" charset="0"/>
+              </a:rPr>
+              <a:t>algorithms”. </a:t>
+            </a:r>
+            <a:r>
+              <a:rPr lang="en-US" i="1" dirty="0">
+                <a:solidFill>
+                  <a:schemeClr val="tx1"/>
+                </a:solidFill>
+                <a:latin typeface="Helvetica" charset="0"/>
+                <a:ea typeface="Helvetica" charset="0"/>
+                <a:cs typeface="Helvetica" charset="0"/>
+              </a:rPr>
+              <a:t>Swarm and Evolutionary Computation</a:t>
+            </a:r>
+            <a:r>
+              <a:rPr lang="en-US" dirty="0">
+                <a:solidFill>
+                  <a:schemeClr val="tx1"/>
+                </a:solidFill>
+                <a:latin typeface="Helvetica" charset="0"/>
+                <a:ea typeface="Helvetica" charset="0"/>
+                <a:cs typeface="Helvetica" charset="0"/>
+              </a:rPr>
+              <a:t>, 1(1):19–31, 2011</a:t>
+            </a:r>
+            <a:r>
+              <a:rPr lang="en-US" dirty="0" smtClean="0">
+                <a:solidFill>
+                  <a:schemeClr val="tx1"/>
+                </a:solidFill>
+                <a:latin typeface="Helvetica" charset="0"/>
+                <a:ea typeface="Helvetica" charset="0"/>
+                <a:cs typeface="Helvetica" charset="0"/>
+              </a:rPr>
+              <a:t>.</a:t>
+            </a:r>
+          </a:p>
+          <a:p>
+            <a:r>
+              <a:rPr lang="en-US" dirty="0" smtClean="0">
+                <a:solidFill>
+                  <a:schemeClr val="tx1"/>
+                </a:solidFill>
+                <a:latin typeface="Helvetica" charset="0"/>
+                <a:ea typeface="Helvetica" charset="0"/>
+                <a:cs typeface="Helvetica" charset="0"/>
+              </a:rPr>
+              <a:t>[3] </a:t>
+            </a:r>
+            <a:r>
+              <a:rPr lang="en-US" dirty="0">
+                <a:solidFill>
+                  <a:schemeClr val="tx1"/>
+                </a:solidFill>
+                <a:latin typeface="Helvetica" charset="0"/>
+                <a:ea typeface="Helvetica" charset="0"/>
+                <a:cs typeface="Helvetica" charset="0"/>
+              </a:rPr>
+              <a:t>K. Matthias, T. </a:t>
+            </a:r>
+            <a:r>
+              <a:rPr lang="en-US" dirty="0" err="1">
+                <a:solidFill>
+                  <a:schemeClr val="tx1"/>
+                </a:solidFill>
+                <a:latin typeface="Helvetica" charset="0"/>
+                <a:ea typeface="Helvetica" charset="0"/>
+                <a:cs typeface="Helvetica" charset="0"/>
+              </a:rPr>
+              <a:t>Severin</a:t>
+            </a:r>
+            <a:r>
+              <a:rPr lang="en-US" dirty="0">
+                <a:solidFill>
+                  <a:schemeClr val="tx1"/>
+                </a:solidFill>
+                <a:latin typeface="Helvetica" charset="0"/>
+                <a:ea typeface="Helvetica" charset="0"/>
+                <a:cs typeface="Helvetica" charset="0"/>
+              </a:rPr>
+              <a:t>, and H. </a:t>
+            </a:r>
+            <a:r>
+              <a:rPr lang="en-US" dirty="0" err="1">
+                <a:solidFill>
+                  <a:schemeClr val="tx1"/>
+                </a:solidFill>
+                <a:latin typeface="Helvetica" charset="0"/>
+                <a:ea typeface="Helvetica" charset="0"/>
+                <a:cs typeface="Helvetica" charset="0"/>
+              </a:rPr>
+              <a:t>Salzwedel</a:t>
+            </a:r>
+            <a:r>
+              <a:rPr lang="en-US" dirty="0">
+                <a:solidFill>
+                  <a:schemeClr val="tx1"/>
+                </a:solidFill>
+                <a:latin typeface="Helvetica" charset="0"/>
+                <a:ea typeface="Helvetica" charset="0"/>
+                <a:cs typeface="Helvetica" charset="0"/>
+              </a:rPr>
+              <a:t>. </a:t>
+            </a:r>
+            <a:r>
+              <a:rPr lang="en-US" dirty="0" smtClean="0">
+                <a:solidFill>
+                  <a:schemeClr val="tx1"/>
+                </a:solidFill>
+                <a:latin typeface="Helvetica" charset="0"/>
+                <a:ea typeface="Helvetica" charset="0"/>
+                <a:cs typeface="Helvetica" charset="0"/>
+              </a:rPr>
+              <a:t>"Variable </a:t>
+            </a:r>
+            <a:r>
+              <a:rPr lang="en-US" dirty="0">
+                <a:solidFill>
+                  <a:schemeClr val="tx1"/>
+                </a:solidFill>
+                <a:latin typeface="Helvetica" charset="0"/>
+                <a:ea typeface="Helvetica" charset="0"/>
+                <a:cs typeface="Helvetica" charset="0"/>
+              </a:rPr>
+              <a:t>mutation rate at genetic algorithms: introduction of chromosome fitness in connection with multi-chromosome </a:t>
+            </a:r>
+            <a:r>
+              <a:rPr lang="en-US" dirty="0" smtClean="0">
+                <a:solidFill>
+                  <a:schemeClr val="tx1"/>
+                </a:solidFill>
+                <a:latin typeface="Helvetica" charset="0"/>
+                <a:ea typeface="Helvetica" charset="0"/>
+                <a:cs typeface="Helvetica" charset="0"/>
+              </a:rPr>
+              <a:t>representation". </a:t>
+            </a:r>
+            <a:r>
+              <a:rPr lang="en-US" i="1" dirty="0">
+                <a:solidFill>
+                  <a:schemeClr val="tx1"/>
+                </a:solidFill>
+                <a:latin typeface="Helvetica" charset="0"/>
+                <a:ea typeface="Helvetica" charset="0"/>
+                <a:cs typeface="Helvetica" charset="0"/>
+              </a:rPr>
+              <a:t>International Journal of Computer Applications</a:t>
+            </a:r>
+            <a:r>
+              <a:rPr lang="en-US" dirty="0">
+                <a:solidFill>
+                  <a:schemeClr val="tx1"/>
+                </a:solidFill>
+                <a:latin typeface="Helvetica" charset="0"/>
+                <a:ea typeface="Helvetica" charset="0"/>
+                <a:cs typeface="Helvetica" charset="0"/>
+              </a:rPr>
+              <a:t>, 72(17), 2013. </a:t>
+            </a:r>
+            <a:endParaRPr lang="en-US" dirty="0" smtClean="0">
+              <a:solidFill>
+                <a:schemeClr val="tx1"/>
+              </a:solidFill>
+              <a:latin typeface="Helvetica" charset="0"/>
+              <a:ea typeface="Helvetica" charset="0"/>
+              <a:cs typeface="Helvetica" charset="0"/>
+            </a:endParaRPr>
+          </a:p>
+          <a:p>
+            <a:r>
+              <a:rPr lang="en-US" dirty="0" smtClean="0">
+                <a:solidFill>
+                  <a:schemeClr val="tx1"/>
+                </a:solidFill>
+                <a:latin typeface="Helvetica" charset="0"/>
+                <a:ea typeface="Helvetica" charset="0"/>
+                <a:cs typeface="Helvetica" charset="0"/>
+              </a:rPr>
+              <a:t>[4] </a:t>
+            </a:r>
+            <a:r>
+              <a:rPr lang="en-US" dirty="0">
+                <a:solidFill>
+                  <a:schemeClr val="tx1"/>
+                </a:solidFill>
+                <a:latin typeface="Helvetica" charset="0"/>
+                <a:ea typeface="Helvetica" charset="0"/>
+                <a:cs typeface="Helvetica" charset="0"/>
+              </a:rPr>
+              <a:t>M. </a:t>
+            </a:r>
+            <a:r>
+              <a:rPr lang="en-US" dirty="0" err="1">
+                <a:solidFill>
+                  <a:schemeClr val="tx1"/>
+                </a:solidFill>
+                <a:latin typeface="Helvetica" charset="0"/>
+                <a:ea typeface="Helvetica" charset="0"/>
+                <a:cs typeface="Helvetica" charset="0"/>
+              </a:rPr>
+              <a:t>Obitko</a:t>
+            </a:r>
+            <a:r>
+              <a:rPr lang="en-US" dirty="0">
+                <a:solidFill>
+                  <a:schemeClr val="tx1"/>
+                </a:solidFill>
+                <a:latin typeface="Helvetica" charset="0"/>
+                <a:ea typeface="Helvetica" charset="0"/>
+                <a:cs typeface="Helvetica" charset="0"/>
+              </a:rPr>
+              <a:t>. </a:t>
+            </a:r>
+            <a:r>
+              <a:rPr lang="en-US" dirty="0" smtClean="0">
+                <a:solidFill>
+                  <a:schemeClr val="tx1"/>
+                </a:solidFill>
+                <a:latin typeface="Helvetica" charset="0"/>
+                <a:ea typeface="Helvetica" charset="0"/>
+                <a:cs typeface="Helvetica" charset="0"/>
+              </a:rPr>
+              <a:t>"Introduction </a:t>
+            </a:r>
+            <a:r>
+              <a:rPr lang="en-US" dirty="0">
+                <a:solidFill>
+                  <a:schemeClr val="tx1"/>
+                </a:solidFill>
+                <a:latin typeface="Helvetica" charset="0"/>
+                <a:ea typeface="Helvetica" charset="0"/>
+                <a:cs typeface="Helvetica" charset="0"/>
+              </a:rPr>
+              <a:t>to genetic algorithms - </a:t>
+            </a:r>
+            <a:r>
+              <a:rPr lang="en-US" dirty="0" smtClean="0">
+                <a:solidFill>
+                  <a:schemeClr val="tx1"/>
+                </a:solidFill>
+                <a:latin typeface="Helvetica" charset="0"/>
+                <a:ea typeface="Helvetica" charset="0"/>
+                <a:cs typeface="Helvetica" charset="0"/>
+              </a:rPr>
+              <a:t>XIII. Recommendations". </a:t>
+            </a:r>
+            <a:r>
+              <a:rPr lang="en-US" dirty="0">
+                <a:solidFill>
+                  <a:srgbClr val="0432FF"/>
+                </a:solidFill>
+                <a:latin typeface="Helvetica" charset="0"/>
+                <a:ea typeface="Helvetica" charset="0"/>
+                <a:cs typeface="Helvetica" charset="0"/>
+                <a:hlinkClick r:id="rId2"/>
+              </a:rPr>
+              <a:t>http://www.obitko.com/tutorials/genetic-algorithms/recommendations.php</a:t>
+            </a:r>
+            <a:r>
+              <a:rPr lang="en-US" dirty="0" smtClean="0">
+                <a:solidFill>
+                  <a:srgbClr val="0432FF"/>
+                </a:solidFill>
+                <a:latin typeface="Helvetica" charset="0"/>
+                <a:ea typeface="Helvetica" charset="0"/>
+                <a:cs typeface="Helvetica" charset="0"/>
+                <a:hlinkClick r:id="rId2"/>
+              </a:rPr>
+              <a:t>/</a:t>
+            </a:r>
+            <a:r>
+              <a:rPr lang="en-US" dirty="0" smtClean="0">
+                <a:solidFill>
+                  <a:srgbClr val="0432FF"/>
+                </a:solidFill>
+                <a:latin typeface="Helvetica" charset="0"/>
+                <a:ea typeface="Helvetica" charset="0"/>
+                <a:cs typeface="Helvetica" charset="0"/>
+              </a:rPr>
+              <a:t> </a:t>
+            </a:r>
+            <a:r>
+              <a:rPr lang="en-US" dirty="0" smtClean="0">
+                <a:solidFill>
+                  <a:schemeClr val="tx1"/>
+                </a:solidFill>
+                <a:latin typeface="Helvetica" charset="0"/>
+                <a:ea typeface="Helvetica" charset="0"/>
+                <a:cs typeface="Helvetica" charset="0"/>
+              </a:rPr>
+              <a:t>[</a:t>
+            </a:r>
+            <a:r>
+              <a:rPr lang="en-US" dirty="0">
+                <a:solidFill>
+                  <a:schemeClr val="tx1"/>
+                </a:solidFill>
+                <a:latin typeface="Helvetica" charset="0"/>
+                <a:ea typeface="Helvetica" charset="0"/>
+                <a:cs typeface="Helvetica" charset="0"/>
+              </a:rPr>
+              <a:t>Online; </a:t>
+            </a:r>
+            <a:r>
+              <a:rPr lang="en-US" dirty="0" err="1">
+                <a:solidFill>
+                  <a:schemeClr val="tx1"/>
+                </a:solidFill>
+                <a:latin typeface="Helvetica" charset="0"/>
+                <a:ea typeface="Helvetica" charset="0"/>
+                <a:cs typeface="Helvetica" charset="0"/>
+              </a:rPr>
+              <a:t>acessado</a:t>
+            </a:r>
+            <a:r>
+              <a:rPr lang="en-US" dirty="0">
+                <a:solidFill>
+                  <a:schemeClr val="tx1"/>
+                </a:solidFill>
+                <a:latin typeface="Helvetica" charset="0"/>
+                <a:ea typeface="Helvetica" charset="0"/>
+                <a:cs typeface="Helvetica" charset="0"/>
+              </a:rPr>
+              <a:t> </a:t>
+            </a:r>
+            <a:r>
+              <a:rPr lang="en-US" dirty="0" err="1">
+                <a:solidFill>
+                  <a:schemeClr val="tx1"/>
+                </a:solidFill>
+                <a:latin typeface="Helvetica" charset="0"/>
+                <a:ea typeface="Helvetica" charset="0"/>
+                <a:cs typeface="Helvetica" charset="0"/>
+              </a:rPr>
+              <a:t>em</a:t>
+            </a:r>
+            <a:r>
+              <a:rPr lang="en-US" dirty="0">
+                <a:solidFill>
+                  <a:schemeClr val="tx1"/>
+                </a:solidFill>
+                <a:latin typeface="Helvetica" charset="0"/>
+                <a:ea typeface="Helvetica" charset="0"/>
+                <a:cs typeface="Helvetica" charset="0"/>
+              </a:rPr>
+              <a:t> 17 de </a:t>
+            </a:r>
+            <a:r>
+              <a:rPr lang="en-US" dirty="0" err="1">
+                <a:solidFill>
+                  <a:schemeClr val="tx1"/>
+                </a:solidFill>
+                <a:latin typeface="Helvetica" charset="0"/>
+                <a:ea typeface="Helvetica" charset="0"/>
+                <a:cs typeface="Helvetica" charset="0"/>
+              </a:rPr>
+              <a:t>novembro</a:t>
+            </a:r>
+            <a:r>
+              <a:rPr lang="en-US" dirty="0">
+                <a:solidFill>
+                  <a:schemeClr val="tx1"/>
+                </a:solidFill>
+                <a:latin typeface="Helvetica" charset="0"/>
+                <a:ea typeface="Helvetica" charset="0"/>
+                <a:cs typeface="Helvetica" charset="0"/>
+              </a:rPr>
+              <a:t> de 2016</a:t>
+            </a:r>
+            <a:r>
+              <a:rPr lang="en-US" dirty="0" smtClean="0">
+                <a:solidFill>
+                  <a:schemeClr val="tx1"/>
+                </a:solidFill>
+                <a:latin typeface="Helvetica" charset="0"/>
+                <a:ea typeface="Helvetica" charset="0"/>
+                <a:cs typeface="Helvetica" charset="0"/>
+              </a:rPr>
+              <a:t>].</a:t>
+            </a:r>
+          </a:p>
+          <a:p>
+            <a:r>
+              <a:rPr lang="en-US" dirty="0" smtClean="0">
+                <a:solidFill>
+                  <a:schemeClr val="tx1"/>
+                </a:solidFill>
+                <a:latin typeface="Helvetica" charset="0"/>
+                <a:ea typeface="Helvetica" charset="0"/>
+                <a:cs typeface="Helvetica" charset="0"/>
+              </a:rPr>
+              <a:t>[5] </a:t>
+            </a:r>
+            <a:r>
+              <a:rPr lang="en-US" dirty="0">
+                <a:solidFill>
+                  <a:schemeClr val="tx1"/>
+                </a:solidFill>
+                <a:latin typeface="Helvetica" charset="0"/>
+                <a:ea typeface="Helvetica" charset="0"/>
+                <a:cs typeface="Helvetica" charset="0"/>
+              </a:rPr>
+              <a:t>K. </a:t>
+            </a:r>
+            <a:r>
+              <a:rPr lang="en-US" dirty="0" err="1">
+                <a:solidFill>
+                  <a:schemeClr val="tx1"/>
+                </a:solidFill>
+                <a:latin typeface="Helvetica" charset="0"/>
+                <a:ea typeface="Helvetica" charset="0"/>
+                <a:cs typeface="Helvetica" charset="0"/>
+              </a:rPr>
+              <a:t>DeJong</a:t>
+            </a:r>
+            <a:r>
+              <a:rPr lang="en-US" dirty="0">
+                <a:solidFill>
+                  <a:schemeClr val="tx1"/>
+                </a:solidFill>
+                <a:latin typeface="Helvetica" charset="0"/>
+                <a:ea typeface="Helvetica" charset="0"/>
+                <a:cs typeface="Helvetica" charset="0"/>
+              </a:rPr>
+              <a:t>. </a:t>
+            </a:r>
+            <a:r>
+              <a:rPr lang="en-US" dirty="0" smtClean="0">
+                <a:solidFill>
+                  <a:schemeClr val="tx1"/>
+                </a:solidFill>
+                <a:latin typeface="Helvetica" charset="0"/>
+                <a:ea typeface="Helvetica" charset="0"/>
+                <a:cs typeface="Helvetica" charset="0"/>
+              </a:rPr>
+              <a:t>“An </a:t>
+            </a:r>
+            <a:r>
+              <a:rPr lang="en-US" dirty="0">
+                <a:solidFill>
+                  <a:schemeClr val="tx1"/>
+                </a:solidFill>
+                <a:latin typeface="Helvetica" charset="0"/>
+                <a:ea typeface="Helvetica" charset="0"/>
+                <a:cs typeface="Helvetica" charset="0"/>
+              </a:rPr>
+              <a:t>analysis of the behavior of a class of genetic adaptive </a:t>
+            </a:r>
+            <a:r>
+              <a:rPr lang="en-US" dirty="0" smtClean="0">
+                <a:solidFill>
+                  <a:schemeClr val="tx1"/>
+                </a:solidFill>
+                <a:latin typeface="Helvetica" charset="0"/>
+                <a:ea typeface="Helvetica" charset="0"/>
+                <a:cs typeface="Helvetica" charset="0"/>
+              </a:rPr>
+              <a:t>systems”. </a:t>
+            </a:r>
+            <a:r>
+              <a:rPr lang="en-US" i="1" dirty="0" smtClean="0">
+                <a:solidFill>
+                  <a:schemeClr val="tx1"/>
+                </a:solidFill>
+                <a:latin typeface="Helvetica" charset="0"/>
+                <a:ea typeface="Helvetica" charset="0"/>
+                <a:cs typeface="Helvetica" charset="0"/>
+              </a:rPr>
+              <a:t>Ph.D</a:t>
+            </a:r>
+            <a:r>
+              <a:rPr lang="en-US" i="1" dirty="0">
+                <a:solidFill>
+                  <a:schemeClr val="tx1"/>
+                </a:solidFill>
+                <a:latin typeface="Helvetica" charset="0"/>
+                <a:ea typeface="Helvetica" charset="0"/>
+                <a:cs typeface="Helvetica" charset="0"/>
+              </a:rPr>
+              <a:t>. </a:t>
+            </a:r>
+            <a:r>
+              <a:rPr lang="en-US" i="1" dirty="0" smtClean="0">
+                <a:solidFill>
+                  <a:schemeClr val="tx1"/>
+                </a:solidFill>
+                <a:latin typeface="Helvetica" charset="0"/>
+                <a:ea typeface="Helvetica" charset="0"/>
+                <a:cs typeface="Helvetica" charset="0"/>
+              </a:rPr>
+              <a:t>Thesis</a:t>
+            </a:r>
+            <a:r>
+              <a:rPr lang="en-US" dirty="0">
+                <a:solidFill>
+                  <a:schemeClr val="tx1"/>
+                </a:solidFill>
+                <a:latin typeface="Helvetica" charset="0"/>
+                <a:ea typeface="Helvetica" charset="0"/>
+                <a:cs typeface="Helvetica" charset="0"/>
+              </a:rPr>
+              <a:t>, University of Michigan, 1975</a:t>
+            </a:r>
+            <a:r>
+              <a:rPr lang="en-US" dirty="0" smtClean="0">
+                <a:solidFill>
+                  <a:schemeClr val="tx1"/>
+                </a:solidFill>
+                <a:latin typeface="Helvetica" charset="0"/>
+                <a:ea typeface="Helvetica" charset="0"/>
+                <a:cs typeface="Helvetica" charset="0"/>
+              </a:rPr>
+              <a:t>.</a:t>
+            </a:r>
+            <a:endParaRPr lang="en-US" dirty="0">
+              <a:solidFill>
+                <a:schemeClr val="tx1"/>
+              </a:solidFill>
+              <a:latin typeface="Helvetica" charset="0"/>
+              <a:ea typeface="Helvetica" charset="0"/>
+              <a:cs typeface="Helvetica" charset="0"/>
+            </a:endParaRPr>
+          </a:p>
+          <a:p>
+            <a:endParaRPr lang="en-US" dirty="0"/>
+          </a:p>
+          <a:p>
+            <a:endParaRPr lang="en-US" dirty="0"/>
+          </a:p>
+        </p:txBody>
+      </p:sp>
+      <p:sp>
+        <p:nvSpPr>
+          <p:cNvPr id="5" name="Slide Number Placeholder 4"/>
+          <p:cNvSpPr>
+            <a:spLocks noGrp="1"/>
+          </p:cNvSpPr>
+          <p:nvPr>
+            <p:ph type="sldNum" sz="quarter" idx="12"/>
+          </p:nvPr>
+        </p:nvSpPr>
+        <p:spPr/>
+        <p:txBody>
+          <a:bodyPr/>
+          <a:lstStyle/>
+          <a:p>
+            <a:fld id="{55774153-6BEA-8641-B7A1-86CE42693FE2}" type="slidenum">
+              <a:rPr lang="en-US" smtClean="0"/>
+              <a:t>24</a:t>
+            </a:fld>
+            <a:endParaRPr lang="en-US"/>
+          </a:p>
+        </p:txBody>
+      </p:sp>
+    </p:spTree>
+    <p:extLst>
+      <p:ext uri="{BB962C8B-B14F-4D97-AF65-F5344CB8AC3E}">
+        <p14:creationId xmlns:p14="http://schemas.microsoft.com/office/powerpoint/2010/main" val="530941430"/>
+      </p:ext>
+    </p:extLst>
+  </p:cSld>
+  <p:clrMapOvr>
+    <a:masterClrMapping/>
+  </p:clrMapOvr>
+  <p:timing>
+    <p:tnLst>
+      <p:par>
+        <p:cTn id="1" dur="indefinite" restart="never" nodeType="tmRoot"/>
+      </p:par>
+    </p:tnLst>
+  </p:timing>
+</p:sld>
+</file>
+
+<file path=ppt/slides/slide26.xml><?xml version="1.0" encoding="utf-8"?>
+<p:sld xmlns:a="http://schemas.openxmlformats.org/drawingml/2006/main" xmlns:r="http://schemas.openxmlformats.org/officeDocument/2006/relationships" xmlns:p="http://schemas.openxmlformats.org/presentationml/2006/main">
+  <p:cSld>
+    <p:spTree>
+      <p:nvGrpSpPr>
+        <p:cNvPr id="1" name=""/>
+        <p:cNvGrpSpPr/>
+        <p:nvPr/>
+      </p:nvGrpSpPr>
+      <p:grpSpPr>
+        <a:xfrm>
+          <a:off x="0" y="0"/>
+          <a:ext cx="0" cy="0"/>
+          <a:chOff x="0" y="0"/>
+          <a:chExt cx="0" cy="0"/>
+        </a:xfrm>
+      </p:grpSpPr>
+      <p:sp>
+        <p:nvSpPr>
+          <p:cNvPr id="2" name="Title 1"/>
+          <p:cNvSpPr>
+            <a:spLocks noGrp="1"/>
+          </p:cNvSpPr>
+          <p:nvPr>
+            <p:ph type="title"/>
+          </p:nvPr>
+        </p:nvSpPr>
+        <p:spPr/>
+        <p:txBody>
+          <a:bodyPr/>
+          <a:lstStyle/>
+          <a:p>
+            <a:r>
+              <a:rPr lang="en-US" b="1" dirty="0" err="1" smtClean="0">
+                <a:latin typeface="Helvetica" charset="0"/>
+                <a:ea typeface="Helvetica" charset="0"/>
+                <a:cs typeface="Helvetica" charset="0"/>
+              </a:rPr>
               <a:t>Referências</a:t>
             </a:r>
             <a:endParaRPr lang="en-US" b="1" dirty="0">
@@ -28565,17 +28564,6 @@
           <a:lstStyle/>
           <a:p>
             <a:r>
-              <a:rPr lang="en-US" dirty="0" smtClean="0">
-                <a:solidFill>
-                  <a:schemeClr val="tx1"/>
-                </a:solidFill>
-                <a:latin typeface="Helvetica" charset="0"/>
-                <a:ea typeface="Helvetica" charset="0"/>
-                <a:cs typeface="Helvetica" charset="0"/>
-              </a:rPr>
-              <a:t>[11] </a:t>
-            </a:r>
-            <a:r>
               <a:rPr lang="en-US" dirty="0">
                 <a:solidFill>
                   <a:schemeClr val="tx1"/>
@@ -28584,7 +28572,29 @@
                 <a:ea typeface="Helvetica" charset="0"/>
                 <a:cs typeface="Helvetica" charset="0"/>
               </a:rPr>
-              <a:t>D. </a:t>
+              <a:t>[6] </a:t>
+            </a:r>
+            <a:r>
+              <a:rPr lang="en-US" dirty="0" smtClean="0">
+                <a:solidFill>
+                  <a:schemeClr val="tx1"/>
+                </a:solidFill>
+                <a:latin typeface="Helvetica" charset="0"/>
+                <a:ea typeface="Helvetica" charset="0"/>
+                <a:cs typeface="Helvetica" charset="0"/>
+              </a:rPr>
+              <a:t>P</a:t>
+            </a:r>
+            <a:r>
+              <a:rPr lang="en-US" dirty="0">
+                <a:solidFill>
+                  <a:schemeClr val="tx1"/>
+                </a:solidFill>
+                <a:latin typeface="Helvetica" charset="0"/>
+                <a:ea typeface="Helvetica" charset="0"/>
+                <a:cs typeface="Helvetica" charset="0"/>
+              </a:rPr>
+              <a:t>. </a:t>
             </a:r>
             <a:r>
               <a:rPr lang="en-US" dirty="0" err="1">
@@ -28595,7 +28605,7 @@
                 <a:ea typeface="Helvetica" charset="0"/>
                 <a:cs typeface="Helvetica" charset="0"/>
               </a:rPr>
-              <a:t>Jakobovic</a:t>
+              <a:t>Giguere</a:t>
             </a:r>
             <a:r>
               <a:rPr lang="en-US" dirty="0">
@@ -28606,7 +28616,7 @@
                 <a:ea typeface="Helvetica" charset="0"/>
                 <a:cs typeface="Helvetica" charset="0"/>
               </a:rPr>
-              <a:t>́ and M. </a:t>
+              <a:t> and D. E. Goldberg. “Population sizing for optimum sampling with genetic algorithms: A case study of the </a:t>
             </a:r>
             <a:r>
               <a:rPr lang="en-US" dirty="0" err="1">
@@ -28617,7 +28627,7 @@
                 <a:ea typeface="Helvetica" charset="0"/>
                 <a:cs typeface="Helvetica" charset="0"/>
               </a:rPr>
-              <a:t>Golub</a:t>
+              <a:t>onemax</a:t>
             </a:r>
             <a:r>
               <a:rPr lang="en-US" dirty="0">
@@ -28628,18 +28638,18 @@
                 <a:ea typeface="Helvetica" charset="0"/>
                 <a:cs typeface="Helvetica" charset="0"/>
               </a:rPr>
-              <a:t>. </a:t>
-            </a:r>
-            <a:r>
-              <a:rPr lang="en-US" dirty="0" smtClean="0">
-                <a:solidFill>
-                  <a:schemeClr val="tx1"/>
-                </a:solidFill>
-                <a:latin typeface="Helvetica" charset="0"/>
-                <a:ea typeface="Helvetica" charset="0"/>
-                <a:cs typeface="Helvetica" charset="0"/>
-              </a:rPr>
-              <a:t>“Adaptive </a:t>
+              <a:t> problem”. </a:t>
+            </a:r>
+            <a:r>
+              <a:rPr lang="en-US" i="1" dirty="0">
+                <a:solidFill>
+                  <a:schemeClr val="tx1"/>
+                </a:solidFill>
+                <a:latin typeface="Helvetica" charset="0"/>
+                <a:ea typeface="Helvetica" charset="0"/>
+                <a:cs typeface="Helvetica" charset="0"/>
+              </a:rPr>
+              <a:t>Genetic Programming</a:t>
             </a:r>
             <a:r>
               <a:rPr lang="en-US" dirty="0">
@@ -28650,18 +28660,86 @@
                 <a:ea typeface="Helvetica" charset="0"/>
                 <a:cs typeface="Helvetica" charset="0"/>
               </a:rPr>
-              <a:t>G</a:t>
-            </a:r>
-            <a:r>
-              <a:rPr lang="en-US" dirty="0" smtClean="0">
-                <a:solidFill>
-                  <a:schemeClr val="tx1"/>
-                </a:solidFill>
-                <a:latin typeface="Helvetica" charset="0"/>
-                <a:ea typeface="Helvetica" charset="0"/>
-                <a:cs typeface="Helvetica" charset="0"/>
-              </a:rPr>
-              <a:t>enetic Algorithm”. </a:t>
+              <a:t>, 98:496–503, 1998. </a:t>
+            </a:r>
+          </a:p>
+          <a:p>
+            <a:r>
+              <a:rPr lang="en-US" dirty="0" smtClean="0">
+                <a:solidFill>
+                  <a:schemeClr val="tx1"/>
+                </a:solidFill>
+                <a:latin typeface="Helvetica" charset="0"/>
+                <a:ea typeface="Helvetica" charset="0"/>
+                <a:cs typeface="Helvetica" charset="0"/>
+              </a:rPr>
+              <a:t>[7]</a:t>
+            </a:r>
+            <a:r>
+              <a:rPr lang="en-US" dirty="0">
+                <a:solidFill>
+                  <a:schemeClr val="tx1"/>
+                </a:solidFill>
+                <a:latin typeface="Helvetica" charset="0"/>
+                <a:ea typeface="Helvetica" charset="0"/>
+                <a:cs typeface="Helvetica" charset="0"/>
+              </a:rPr>
+              <a:t> D. L. Applegate, R. E. Bixby, V. </a:t>
+            </a:r>
+            <a:r>
+              <a:rPr lang="en-US" dirty="0" err="1">
+                <a:solidFill>
+                  <a:schemeClr val="tx1"/>
+                </a:solidFill>
+                <a:latin typeface="Helvetica" charset="0"/>
+                <a:ea typeface="Helvetica" charset="0"/>
+                <a:cs typeface="Helvetica" charset="0"/>
+              </a:rPr>
+              <a:t>Chvatal</a:t>
+            </a:r>
+            <a:r>
+              <a:rPr lang="en-US" dirty="0">
+                <a:solidFill>
+                  <a:schemeClr val="tx1"/>
+                </a:solidFill>
+                <a:latin typeface="Helvetica" charset="0"/>
+                <a:ea typeface="Helvetica" charset="0"/>
+                <a:cs typeface="Helvetica" charset="0"/>
+              </a:rPr>
+              <a:t>, and W. J. Cook. </a:t>
+            </a:r>
+            <a:r>
+              <a:rPr lang="en-US" dirty="0" smtClean="0">
+                <a:solidFill>
+                  <a:schemeClr val="tx1"/>
+                </a:solidFill>
+                <a:latin typeface="Helvetica" charset="0"/>
+                <a:ea typeface="Helvetica" charset="0"/>
+                <a:cs typeface="Helvetica" charset="0"/>
+              </a:rPr>
+              <a:t>"The </a:t>
+            </a:r>
+            <a:r>
+              <a:rPr lang="en-US" dirty="0">
+                <a:solidFill>
+                  <a:schemeClr val="tx1"/>
+                </a:solidFill>
+                <a:latin typeface="Helvetica" charset="0"/>
+                <a:ea typeface="Helvetica" charset="0"/>
+                <a:cs typeface="Helvetica" charset="0"/>
+              </a:rPr>
+              <a:t>Traveling Salesman Problem: a computational </a:t>
+            </a:r>
+            <a:r>
+              <a:rPr lang="en-US" dirty="0" smtClean="0">
+                <a:solidFill>
+                  <a:schemeClr val="tx1"/>
+                </a:solidFill>
+                <a:latin typeface="Helvetica" charset="0"/>
+                <a:ea typeface="Helvetica" charset="0"/>
+                <a:cs typeface="Helvetica" charset="0"/>
+              </a:rPr>
+              <a:t>study". </a:t>
             </a:r>
             <a:r>
               <a:rPr lang="en-US" i="1" dirty="0">
@@ -28672,7 +28750,40 @@
                 <a:ea typeface="Helvetica" charset="0"/>
                 <a:cs typeface="Helvetica" charset="0"/>
               </a:rPr>
-              <a:t>CIT. Journal of computing and information technology</a:t>
+              <a:t>Princeton </a:t>
+            </a:r>
+            <a:r>
+              <a:rPr lang="en-US" i="1" dirty="0" smtClean="0">
+                <a:solidFill>
+                  <a:schemeClr val="tx1"/>
+                </a:solidFill>
+                <a:latin typeface="Helvetica" charset="0"/>
+                <a:ea typeface="Helvetica" charset="0"/>
+                <a:cs typeface="Helvetica" charset="0"/>
+              </a:rPr>
+              <a:t>University </a:t>
+            </a:r>
+            <a:r>
+              <a:rPr lang="en-US" i="1" dirty="0">
+                <a:solidFill>
+                  <a:schemeClr val="tx1"/>
+                </a:solidFill>
+                <a:latin typeface="Helvetica" charset="0"/>
+                <a:ea typeface="Helvetica" charset="0"/>
+                <a:cs typeface="Helvetica" charset="0"/>
+              </a:rPr>
+              <a:t>P</a:t>
+            </a:r>
+            <a:r>
+              <a:rPr lang="en-US" i="1" dirty="0" smtClean="0">
+                <a:solidFill>
+                  <a:schemeClr val="tx1"/>
+                </a:solidFill>
+                <a:latin typeface="Helvetica" charset="0"/>
+                <a:ea typeface="Helvetica" charset="0"/>
+                <a:cs typeface="Helvetica" charset="0"/>
+              </a:rPr>
+              <a:t>ress</a:t>
             </a:r>
             <a:r>
               <a:rPr lang="en-US" dirty="0">
@@ -28683,86 +28794,7 @@
                 <a:ea typeface="Helvetica" charset="0"/>
                 <a:cs typeface="Helvetica" charset="0"/>
               </a:rPr>
-              <a:t>, 7(3):229–235, 1999. </a:t>
-            </a:r>
-          </a:p>
-          <a:p>
-            <a:r>
-              <a:rPr lang="en-US" dirty="0" smtClean="0">
-                <a:solidFill>
-                  <a:schemeClr val="tx1"/>
-                </a:solidFill>
-                <a:latin typeface="Helvetica" charset="0"/>
-                <a:ea typeface="Helvetica" charset="0"/>
-                <a:cs typeface="Helvetica" charset="0"/>
-              </a:rPr>
-              <a:t>[12] </a:t>
-            </a:r>
-            <a:r>
-              <a:rPr lang="en-US" dirty="0">
-                <a:solidFill>
-                  <a:schemeClr val="tx1"/>
-                </a:solidFill>
-                <a:latin typeface="Helvetica" charset="0"/>
-                <a:ea typeface="Helvetica" charset="0"/>
-                <a:cs typeface="Helvetica" charset="0"/>
-              </a:rPr>
-              <a:t>L. Wang and T. Shen. </a:t>
-            </a:r>
-            <a:r>
-              <a:rPr lang="en-US" dirty="0" smtClean="0">
-                <a:solidFill>
-                  <a:schemeClr val="tx1"/>
-                </a:solidFill>
-                <a:latin typeface="Helvetica" charset="0"/>
-                <a:ea typeface="Helvetica" charset="0"/>
-                <a:cs typeface="Helvetica" charset="0"/>
-              </a:rPr>
-              <a:t>"Improved </a:t>
-            </a:r>
-            <a:r>
-              <a:rPr lang="en-US" dirty="0">
-                <a:solidFill>
-                  <a:schemeClr val="tx1"/>
-                </a:solidFill>
-                <a:latin typeface="Helvetica" charset="0"/>
-                <a:ea typeface="Helvetica" charset="0"/>
-                <a:cs typeface="Helvetica" charset="0"/>
-              </a:rPr>
-              <a:t>adaptive genetic algorithm and its application to image </a:t>
-            </a:r>
-            <a:r>
-              <a:rPr lang="en-US" dirty="0" smtClean="0">
-                <a:solidFill>
-                  <a:schemeClr val="tx1"/>
-                </a:solidFill>
-                <a:latin typeface="Helvetica" charset="0"/>
-                <a:ea typeface="Helvetica" charset="0"/>
-                <a:cs typeface="Helvetica" charset="0"/>
-              </a:rPr>
-              <a:t>segmentation". </a:t>
-            </a:r>
-            <a:r>
-              <a:rPr lang="en-US" i="1" dirty="0">
-                <a:solidFill>
-                  <a:schemeClr val="tx1"/>
-                </a:solidFill>
-                <a:latin typeface="Helvetica" charset="0"/>
-                <a:ea typeface="Helvetica" charset="0"/>
-                <a:cs typeface="Helvetica" charset="0"/>
-              </a:rPr>
-              <a:t>In Multispectral Image Processing and Pattern Recognition</a:t>
-            </a:r>
-            <a:r>
-              <a:rPr lang="en-US" dirty="0">
-                <a:solidFill>
-                  <a:schemeClr val="tx1"/>
-                </a:solidFill>
-                <a:latin typeface="Helvetica" charset="0"/>
-                <a:ea typeface="Helvetica" charset="0"/>
-                <a:cs typeface="Helvetica" charset="0"/>
-              </a:rPr>
-              <a:t>, pages 115–120. International Society for Optics and Photonics, 2001. </a:t>
+              <a:t>, 2011. </a:t>
             </a:r>
             <a:endParaRPr lang="en-US" dirty="0" smtClean="0">
               <a:solidFill>
@@ -28783,7 +28815,7 @@
                 <a:ea typeface="Helvetica" charset="0"/>
                 <a:cs typeface="Helvetica" charset="0"/>
               </a:rPr>
-              <a:t>[13] </a:t>
+              <a:t>[8] </a:t>
             </a:r>
             <a:r>
               <a:rPr lang="en-US" dirty="0">
@@ -28794,7 +28826,7 @@
                 <a:ea typeface="Helvetica" charset="0"/>
                 <a:cs typeface="Helvetica" charset="0"/>
               </a:rPr>
-              <a:t>K. Matthias, T. </a:t>
+              <a:t>T. H. </a:t>
             </a:r>
             <a:r>
               <a:rPr lang="en-US" dirty="0" err="1">
@@ -28805,7 +28837,7 @@
                 <a:ea typeface="Helvetica" charset="0"/>
                 <a:cs typeface="Helvetica" charset="0"/>
               </a:rPr>
-              <a:t>Severin</a:t>
+              <a:t>Cormen</a:t>
             </a:r>
             <a:r>
               <a:rPr lang="en-US" dirty="0">
@@ -28816,7 +28848,7 @@
                 <a:ea typeface="Helvetica" charset="0"/>
                 <a:cs typeface="Helvetica" charset="0"/>
               </a:rPr>
-              <a:t>, and H. </a:t>
+              <a:t>, C. E. </a:t>
             </a:r>
             <a:r>
               <a:rPr lang="en-US" dirty="0" err="1">
@@ -28827,7 +28859,7 @@
                 <a:ea typeface="Helvetica" charset="0"/>
                 <a:cs typeface="Helvetica" charset="0"/>
               </a:rPr>
-              <a:t>Salzwedel</a:t>
+              <a:t>Leiserson</a:t>
             </a:r>
             <a:r>
               <a:rPr lang="en-US" dirty="0">
@@ -28838,6 +28870,268 @@
                 <a:ea typeface="Helvetica" charset="0"/>
                 <a:cs typeface="Helvetica" charset="0"/>
               </a:rPr>
+              <a:t>, R. L. </a:t>
+            </a:r>
+            <a:r>
+              <a:rPr lang="en-US" dirty="0" err="1">
+                <a:solidFill>
+                  <a:schemeClr val="tx1"/>
+                </a:solidFill>
+                <a:latin typeface="Helvetica" charset="0"/>
+                <a:ea typeface="Helvetica" charset="0"/>
+                <a:cs typeface="Helvetica" charset="0"/>
+              </a:rPr>
+              <a:t>Rivest</a:t>
+            </a:r>
+            <a:r>
+              <a:rPr lang="en-US" dirty="0">
+                <a:solidFill>
+                  <a:schemeClr val="tx1"/>
+                </a:solidFill>
+                <a:latin typeface="Helvetica" charset="0"/>
+                <a:ea typeface="Helvetica" charset="0"/>
+                <a:cs typeface="Helvetica" charset="0"/>
+              </a:rPr>
+              <a:t>, et al. </a:t>
+            </a:r>
+            <a:r>
+              <a:rPr lang="en-US" dirty="0" smtClean="0">
+                <a:solidFill>
+                  <a:schemeClr val="tx1"/>
+                </a:solidFill>
+                <a:latin typeface="Helvetica" charset="0"/>
+                <a:ea typeface="Helvetica" charset="0"/>
+                <a:cs typeface="Helvetica" charset="0"/>
+              </a:rPr>
+              <a:t>"Section </a:t>
+            </a:r>
+            <a:r>
+              <a:rPr lang="en-US" dirty="0">
+                <a:solidFill>
+                  <a:schemeClr val="tx1"/>
+                </a:solidFill>
+                <a:latin typeface="Helvetica" charset="0"/>
+                <a:ea typeface="Helvetica" charset="0"/>
+                <a:cs typeface="Helvetica" charset="0"/>
+              </a:rPr>
+              <a:t>24.3: </a:t>
+            </a:r>
+            <a:r>
+              <a:rPr lang="en-US" dirty="0" err="1">
+                <a:solidFill>
+                  <a:schemeClr val="tx1"/>
+                </a:solidFill>
+                <a:latin typeface="Helvetica" charset="0"/>
+                <a:ea typeface="Helvetica" charset="0"/>
+                <a:cs typeface="Helvetica" charset="0"/>
+              </a:rPr>
+              <a:t>Dijkstra’s</a:t>
+            </a:r>
+            <a:r>
+              <a:rPr lang="en-US" dirty="0">
+                <a:solidFill>
+                  <a:schemeClr val="tx1"/>
+                </a:solidFill>
+                <a:latin typeface="Helvetica" charset="0"/>
+                <a:ea typeface="Helvetica" charset="0"/>
+                <a:cs typeface="Helvetica" charset="0"/>
+              </a:rPr>
+              <a:t> </a:t>
+            </a:r>
+            <a:r>
+              <a:rPr lang="en-US" dirty="0" smtClean="0">
+                <a:solidFill>
+                  <a:schemeClr val="tx1"/>
+                </a:solidFill>
+                <a:latin typeface="Helvetica" charset="0"/>
+                <a:ea typeface="Helvetica" charset="0"/>
+                <a:cs typeface="Helvetica" charset="0"/>
+              </a:rPr>
+              <a:t>algorithm”. </a:t>
+            </a:r>
+            <a:r>
+              <a:rPr lang="en-US" i="1" dirty="0" smtClean="0">
+                <a:solidFill>
+                  <a:schemeClr val="tx1"/>
+                </a:solidFill>
+                <a:latin typeface="Helvetica" charset="0"/>
+                <a:ea typeface="Helvetica" charset="0"/>
+                <a:cs typeface="Helvetica" charset="0"/>
+              </a:rPr>
+              <a:t>MIT Press </a:t>
+            </a:r>
+            <a:r>
+              <a:rPr lang="en-US" i="1" dirty="0">
+                <a:solidFill>
+                  <a:schemeClr val="tx1"/>
+                </a:solidFill>
+                <a:latin typeface="Helvetica" charset="0"/>
+                <a:ea typeface="Helvetica" charset="0"/>
+                <a:cs typeface="Helvetica" charset="0"/>
+              </a:rPr>
+              <a:t>and McGraw-Hill</a:t>
+            </a:r>
+            <a:r>
+              <a:rPr lang="en-US" dirty="0">
+                <a:solidFill>
+                  <a:schemeClr val="tx1"/>
+                </a:solidFill>
+                <a:latin typeface="Helvetica" charset="0"/>
+                <a:ea typeface="Helvetica" charset="0"/>
+                <a:cs typeface="Helvetica" charset="0"/>
+              </a:rPr>
+              <a:t>, 2001. </a:t>
+            </a:r>
+            <a:endParaRPr lang="en-US" dirty="0" smtClean="0">
+              <a:solidFill>
+                <a:schemeClr val="tx1"/>
+              </a:solidFill>
+              <a:latin typeface="Helvetica" charset="0"/>
+              <a:ea typeface="Helvetica" charset="0"/>
+              <a:cs typeface="Helvetica" charset="0"/>
+            </a:endParaRPr>
+          </a:p>
+          <a:p>
+            <a:r>
+              <a:rPr lang="en-US" dirty="0" smtClean="0">
+                <a:solidFill>
+                  <a:schemeClr val="tx1"/>
+                </a:solidFill>
+                <a:latin typeface="Helvetica" charset="0"/>
+                <a:ea typeface="Helvetica" charset="0"/>
+                <a:cs typeface="Helvetica" charset="0"/>
+              </a:rPr>
+              <a:t>[9] </a:t>
+            </a:r>
+            <a:r>
+              <a:rPr lang="en-US" dirty="0">
+                <a:solidFill>
+                  <a:schemeClr val="tx1"/>
+                </a:solidFill>
+                <a:latin typeface="Helvetica" charset="0"/>
+                <a:ea typeface="Helvetica" charset="0"/>
+                <a:cs typeface="Helvetica" charset="0"/>
+              </a:rPr>
+              <a:t>M. Mitchell. </a:t>
+            </a:r>
+            <a:r>
+              <a:rPr lang="en-US" dirty="0" smtClean="0">
+                <a:solidFill>
+                  <a:schemeClr val="tx1"/>
+                </a:solidFill>
+                <a:latin typeface="Helvetica" charset="0"/>
+                <a:ea typeface="Helvetica" charset="0"/>
+                <a:cs typeface="Helvetica" charset="0"/>
+              </a:rPr>
+              <a:t>"An </a:t>
+            </a:r>
+            <a:r>
+              <a:rPr lang="en-US" dirty="0">
+                <a:solidFill>
+                  <a:schemeClr val="tx1"/>
+                </a:solidFill>
+                <a:latin typeface="Helvetica" charset="0"/>
+                <a:ea typeface="Helvetica" charset="0"/>
+                <a:cs typeface="Helvetica" charset="0"/>
+              </a:rPr>
+              <a:t>introduction to genetic </a:t>
+            </a:r>
+            <a:r>
+              <a:rPr lang="en-US" dirty="0" smtClean="0">
+                <a:solidFill>
+                  <a:schemeClr val="tx1"/>
+                </a:solidFill>
+                <a:latin typeface="Helvetica" charset="0"/>
+                <a:ea typeface="Helvetica" charset="0"/>
+                <a:cs typeface="Helvetica" charset="0"/>
+              </a:rPr>
+              <a:t>algorithms". </a:t>
+            </a:r>
+            <a:r>
+              <a:rPr lang="en-US" i="1" dirty="0">
+                <a:solidFill>
+                  <a:schemeClr val="tx1"/>
+                </a:solidFill>
+                <a:latin typeface="Helvetica" charset="0"/>
+                <a:ea typeface="Helvetica" charset="0"/>
+                <a:cs typeface="Helvetica" charset="0"/>
+              </a:rPr>
+              <a:t>MIT </a:t>
+            </a:r>
+            <a:r>
+              <a:rPr lang="en-US" i="1" dirty="0" smtClean="0">
+                <a:solidFill>
+                  <a:schemeClr val="tx1"/>
+                </a:solidFill>
+                <a:latin typeface="Helvetica" charset="0"/>
+                <a:ea typeface="Helvetica" charset="0"/>
+                <a:cs typeface="Helvetica" charset="0"/>
+              </a:rPr>
+              <a:t>Press</a:t>
+            </a:r>
+            <a:r>
+              <a:rPr lang="en-US" dirty="0">
+                <a:solidFill>
+                  <a:schemeClr val="tx1"/>
+                </a:solidFill>
+                <a:latin typeface="Helvetica" charset="0"/>
+                <a:ea typeface="Helvetica" charset="0"/>
+                <a:cs typeface="Helvetica" charset="0"/>
+              </a:rPr>
+              <a:t>, 1998. </a:t>
+            </a:r>
+            <a:endParaRPr lang="en-US" dirty="0" smtClean="0">
+              <a:solidFill>
+                <a:schemeClr val="tx1"/>
+              </a:solidFill>
+              <a:latin typeface="Helvetica" charset="0"/>
+              <a:ea typeface="Helvetica" charset="0"/>
+              <a:cs typeface="Helvetica" charset="0"/>
+            </a:endParaRPr>
+          </a:p>
+          <a:p>
+            <a:r>
+              <a:rPr lang="en-US" dirty="0" smtClean="0">
+                <a:solidFill>
+                  <a:schemeClr val="tx1"/>
+                </a:solidFill>
+                <a:latin typeface="Helvetica" charset="0"/>
+                <a:ea typeface="Helvetica" charset="0"/>
+                <a:cs typeface="Helvetica" charset="0"/>
+              </a:rPr>
+              <a:t>[10] M</a:t>
+            </a:r>
+            <a:r>
+              <a:rPr lang="en-US" dirty="0">
+                <a:solidFill>
+                  <a:schemeClr val="tx1"/>
+                </a:solidFill>
+                <a:latin typeface="Helvetica" charset="0"/>
+                <a:ea typeface="Helvetica" charset="0"/>
+                <a:cs typeface="Helvetica" charset="0"/>
+              </a:rPr>
+              <a:t>. Srinivas and L. M. </a:t>
+            </a:r>
+            <a:r>
+              <a:rPr lang="en-US" dirty="0" err="1">
+                <a:solidFill>
+                  <a:schemeClr val="tx1"/>
+                </a:solidFill>
+                <a:latin typeface="Helvetica" charset="0"/>
+                <a:ea typeface="Helvetica" charset="0"/>
+                <a:cs typeface="Helvetica" charset="0"/>
+              </a:rPr>
+              <a:t>Patnaik</a:t>
+            </a:r>
+            <a:r>
+              <a:rPr lang="en-US" dirty="0">
+                <a:solidFill>
+                  <a:schemeClr val="tx1"/>
+                </a:solidFill>
+                <a:latin typeface="Helvetica" charset="0"/>
+                <a:ea typeface="Helvetica" charset="0"/>
+                <a:cs typeface="Helvetica" charset="0"/>
+              </a:rPr>
               <a:t>. </a:t>
             </a:r>
             <a:r>
@@ -28849,7 +29143,7 @@
                 <a:ea typeface="Helvetica" charset="0"/>
                 <a:cs typeface="Helvetica" charset="0"/>
               </a:rPr>
-              <a:t>"Variable </a:t>
+              <a:t>"Adaptive </a:t>
             </a:r>
             <a:r>
               <a:rPr lang="en-US" dirty="0">
@@ -28860,18 +29154,18 @@
                 <a:ea typeface="Helvetica" charset="0"/>
                 <a:cs typeface="Helvetica" charset="0"/>
               </a:rPr>
-              <a:t>mutation rate at genetic algorithms: introduction of chromosome fitness in connection with multi-chromosome </a:t>
-            </a:r>
-            <a:r>
-              <a:rPr lang="en-US" dirty="0" smtClean="0">
-                <a:solidFill>
-                  <a:schemeClr val="tx1"/>
-                </a:solidFill>
-                <a:latin typeface="Helvetica" charset="0"/>
-                <a:ea typeface="Helvetica" charset="0"/>
-                <a:cs typeface="Helvetica" charset="0"/>
-              </a:rPr>
-              <a:t>representation". </a:t>
+              <a:t>probabilities of crossover and mutation in genetic </a:t>
+            </a:r>
+            <a:r>
+              <a:rPr lang="en-US" dirty="0" smtClean="0">
+                <a:solidFill>
+                  <a:schemeClr val="tx1"/>
+                </a:solidFill>
+                <a:latin typeface="Helvetica" charset="0"/>
+                <a:ea typeface="Helvetica" charset="0"/>
+                <a:cs typeface="Helvetica" charset="0"/>
+              </a:rPr>
+              <a:t>algorithms". </a:t>
             </a:r>
             <a:r>
               <a:rPr lang="en-US" i="1" dirty="0">
@@ -28882,7 +29176,7 @@
                 <a:ea typeface="Helvetica" charset="0"/>
                 <a:cs typeface="Helvetica" charset="0"/>
               </a:rPr>
-              <a:t>International Journal of Computer Applications</a:t>
+              <a:t>IEEE Transactions on Systems, Man, and Cybernetics</a:t>
             </a:r>
             <a:r>
               <a:rPr lang="en-US" dirty="0">
@@ -28893,18 +29187,7 @@
                 <a:ea typeface="Helvetica" charset="0"/>
                 <a:cs typeface="Helvetica" charset="0"/>
               </a:rPr>
-              <a:t>, 72(17), 2013</a:t>
-            </a:r>
-            <a:r>
-              <a:rPr lang="en-US" dirty="0" smtClean="0">
-                <a:solidFill>
-                  <a:schemeClr val="tx1"/>
-                </a:solidFill>
-                <a:latin typeface="Helvetica" charset="0"/>
-                <a:ea typeface="Helvetica" charset="0"/>
-                <a:cs typeface="Helvetica" charset="0"/>
-              </a:rPr>
-              <a:t>.</a:t>
+              <a:t>, 24(4):656–667, 1994. </a:t>
             </a:r>
           </a:p>
           <a:p>
@@ -28946,7 +29229,483 @@
           <a:p>
             <a:fld id="{55774153-6BEA-8641-B7A1-86CE42693FE2}" type="slidenum">
               <a:rPr lang="en-US" smtClean="0"/>
-              <a:t>23</a:t>
+              <a:t>25</a:t>
+            </a:fld>
+            <a:endParaRPr lang="en-US"/>
+          </a:p>
+        </p:txBody>
+      </p:sp>
+    </p:spTree>
+    <p:extLst>
+      <p:ext uri="{BB962C8B-B14F-4D97-AF65-F5344CB8AC3E}">
+        <p14:creationId xmlns:p14="http://schemas.microsoft.com/office/powerpoint/2010/main" val="2080831962"/>
+      </p:ext>
+    </p:extLst>
+  </p:cSld>
+  <p:clrMapOvr>
+    <a:masterClrMapping/>
+  </p:clrMapOvr>
+  <p:timing>
+    <p:tnLst>
+      <p:par>
+        <p:cTn id="1" dur="indefinite" restart="never" nodeType="tmRoot"/>
+      </p:par>
+    </p:tnLst>
+  </p:timing>
+</p:sld>
+</file>
+
+<file path=ppt/slides/slide27.xml><?xml version="1.0" encoding="utf-8"?>
+<p:sld xmlns:a="http://schemas.openxmlformats.org/drawingml/2006/main" xmlns:r="http://schemas.openxmlformats.org/officeDocument/2006/relationships" xmlns:p="http://schemas.openxmlformats.org/presentationml/2006/main">
+  <p:cSld>
+    <p:spTree>
+      <p:nvGrpSpPr>
+        <p:cNvPr id="1" name=""/>
+        <p:cNvGrpSpPr/>
+        <p:nvPr/>
+      </p:nvGrpSpPr>
+      <p:grpSpPr>
+        <a:xfrm>
+          <a:off x="0" y="0"/>
+          <a:ext cx="0" cy="0"/>
+          <a:chOff x="0" y="0"/>
+          <a:chExt cx="0" cy="0"/>
+        </a:xfrm>
+      </p:grpSpPr>
+      <p:sp>
+        <p:nvSpPr>
+          <p:cNvPr id="2" name="Title 1"/>
+          <p:cNvSpPr>
+            <a:spLocks noGrp="1"/>
+          </p:cNvSpPr>
+          <p:nvPr>
+            <p:ph type="title"/>
+          </p:nvPr>
+        </p:nvSpPr>
+        <p:spPr/>
+        <p:txBody>
+          <a:bodyPr/>
+          <a:lstStyle/>
+          <a:p>
+            <a:r>
+              <a:rPr lang="en-US" b="1" dirty="0" err="1" smtClean="0">
+                <a:latin typeface="Helvetica" charset="0"/>
+                <a:ea typeface="Helvetica" charset="0"/>
+                <a:cs typeface="Helvetica" charset="0"/>
+              </a:rPr>
+              <a:t>Referências</a:t>
+            </a:r>
+            <a:endParaRPr lang="en-US" b="1" dirty="0">
+              <a:latin typeface="Helvetica" charset="0"/>
+              <a:ea typeface="Helvetica" charset="0"/>
+              <a:cs typeface="Helvetica" charset="0"/>
+            </a:endParaRPr>
+          </a:p>
+        </p:txBody>
+      </p:sp>
+      <p:sp>
+        <p:nvSpPr>
+          <p:cNvPr id="3" name="Content Placeholder 2"/>
+          <p:cNvSpPr>
+            <a:spLocks noGrp="1"/>
+          </p:cNvSpPr>
+          <p:nvPr>
+            <p:ph idx="1"/>
+          </p:nvPr>
+        </p:nvSpPr>
+        <p:spPr>
+          <a:xfrm>
+            <a:off x="1154954" y="2603500"/>
+            <a:ext cx="10035785" cy="3416300"/>
+          </a:xfrm>
+        </p:spPr>
+        <p:txBody>
+          <a:bodyPr/>
+          <a:lstStyle/>
+          <a:p>
+            <a:r>
+              <a:rPr lang="en-US" dirty="0" smtClean="0">
+                <a:solidFill>
+                  <a:schemeClr val="tx1"/>
+                </a:solidFill>
+                <a:latin typeface="Helvetica" charset="0"/>
+                <a:ea typeface="Helvetica" charset="0"/>
+                <a:cs typeface="Helvetica" charset="0"/>
+              </a:rPr>
+              <a:t>[11] </a:t>
+            </a:r>
+            <a:r>
+              <a:rPr lang="en-US" dirty="0">
+                <a:solidFill>
+                  <a:schemeClr val="tx1"/>
+                </a:solidFill>
+                <a:latin typeface="Helvetica" charset="0"/>
+                <a:ea typeface="Helvetica" charset="0"/>
+                <a:cs typeface="Helvetica" charset="0"/>
+              </a:rPr>
+              <a:t>D. </a:t>
+            </a:r>
+            <a:r>
+              <a:rPr lang="en-US" dirty="0" err="1">
+                <a:solidFill>
+                  <a:schemeClr val="tx1"/>
+                </a:solidFill>
+                <a:latin typeface="Helvetica" charset="0"/>
+                <a:ea typeface="Helvetica" charset="0"/>
+                <a:cs typeface="Helvetica" charset="0"/>
+              </a:rPr>
+              <a:t>Jakobovic</a:t>
+            </a:r>
+            <a:r>
+              <a:rPr lang="en-US" dirty="0">
+                <a:solidFill>
+                  <a:schemeClr val="tx1"/>
+                </a:solidFill>
+                <a:latin typeface="Helvetica" charset="0"/>
+                <a:ea typeface="Helvetica" charset="0"/>
+                <a:cs typeface="Helvetica" charset="0"/>
+              </a:rPr>
+              <a:t>́ and M. </a:t>
+            </a:r>
+            <a:r>
+              <a:rPr lang="en-US" dirty="0" err="1">
+                <a:solidFill>
+                  <a:schemeClr val="tx1"/>
+                </a:solidFill>
+                <a:latin typeface="Helvetica" charset="0"/>
+                <a:ea typeface="Helvetica" charset="0"/>
+                <a:cs typeface="Helvetica" charset="0"/>
+              </a:rPr>
+              <a:t>Golub</a:t>
+            </a:r>
+            <a:r>
+              <a:rPr lang="en-US" dirty="0">
+                <a:solidFill>
+                  <a:schemeClr val="tx1"/>
+                </a:solidFill>
+                <a:latin typeface="Helvetica" charset="0"/>
+                <a:ea typeface="Helvetica" charset="0"/>
+                <a:cs typeface="Helvetica" charset="0"/>
+              </a:rPr>
+              <a:t>. </a:t>
+            </a:r>
+            <a:r>
+              <a:rPr lang="en-US" dirty="0" smtClean="0">
+                <a:solidFill>
+                  <a:schemeClr val="tx1"/>
+                </a:solidFill>
+                <a:latin typeface="Helvetica" charset="0"/>
+                <a:ea typeface="Helvetica" charset="0"/>
+                <a:cs typeface="Helvetica" charset="0"/>
+              </a:rPr>
+              <a:t>“Adaptive </a:t>
+            </a:r>
+            <a:r>
+              <a:rPr lang="en-US" dirty="0">
+                <a:solidFill>
+                  <a:schemeClr val="tx1"/>
+                </a:solidFill>
+                <a:latin typeface="Helvetica" charset="0"/>
+                <a:ea typeface="Helvetica" charset="0"/>
+                <a:cs typeface="Helvetica" charset="0"/>
+              </a:rPr>
+              <a:t>G</a:t>
+            </a:r>
+            <a:r>
+              <a:rPr lang="en-US" dirty="0" smtClean="0">
+                <a:solidFill>
+                  <a:schemeClr val="tx1"/>
+                </a:solidFill>
+                <a:latin typeface="Helvetica" charset="0"/>
+                <a:ea typeface="Helvetica" charset="0"/>
+                <a:cs typeface="Helvetica" charset="0"/>
+              </a:rPr>
+              <a:t>enetic Algorithm”. </a:t>
+            </a:r>
+            <a:r>
+              <a:rPr lang="en-US" i="1" dirty="0">
+                <a:solidFill>
+                  <a:schemeClr val="tx1"/>
+                </a:solidFill>
+                <a:latin typeface="Helvetica" charset="0"/>
+                <a:ea typeface="Helvetica" charset="0"/>
+                <a:cs typeface="Helvetica" charset="0"/>
+              </a:rPr>
+              <a:t>CIT. Journal of computing and information technology</a:t>
+            </a:r>
+            <a:r>
+              <a:rPr lang="en-US" dirty="0">
+                <a:solidFill>
+                  <a:schemeClr val="tx1"/>
+                </a:solidFill>
+                <a:latin typeface="Helvetica" charset="0"/>
+                <a:ea typeface="Helvetica" charset="0"/>
+                <a:cs typeface="Helvetica" charset="0"/>
+              </a:rPr>
+              <a:t>, 7(3):229–235, 1999. </a:t>
+            </a:r>
+          </a:p>
+          <a:p>
+            <a:r>
+              <a:rPr lang="en-US" dirty="0" smtClean="0">
+                <a:solidFill>
+                  <a:schemeClr val="tx1"/>
+                </a:solidFill>
+                <a:latin typeface="Helvetica" charset="0"/>
+                <a:ea typeface="Helvetica" charset="0"/>
+                <a:cs typeface="Helvetica" charset="0"/>
+              </a:rPr>
+              <a:t>[12] </a:t>
+            </a:r>
+            <a:r>
+              <a:rPr lang="en-US" dirty="0">
+                <a:solidFill>
+                  <a:schemeClr val="tx1"/>
+                </a:solidFill>
+                <a:latin typeface="Helvetica" charset="0"/>
+                <a:ea typeface="Helvetica" charset="0"/>
+                <a:cs typeface="Helvetica" charset="0"/>
+              </a:rPr>
+              <a:t>L. Wang and T. Shen. </a:t>
+            </a:r>
+            <a:r>
+              <a:rPr lang="en-US" dirty="0" smtClean="0">
+                <a:solidFill>
+                  <a:schemeClr val="tx1"/>
+                </a:solidFill>
+                <a:latin typeface="Helvetica" charset="0"/>
+                <a:ea typeface="Helvetica" charset="0"/>
+                <a:cs typeface="Helvetica" charset="0"/>
+              </a:rPr>
+              <a:t>"Improved </a:t>
+            </a:r>
+            <a:r>
+              <a:rPr lang="en-US" dirty="0">
+                <a:solidFill>
+                  <a:schemeClr val="tx1"/>
+                </a:solidFill>
+                <a:latin typeface="Helvetica" charset="0"/>
+                <a:ea typeface="Helvetica" charset="0"/>
+                <a:cs typeface="Helvetica" charset="0"/>
+              </a:rPr>
+              <a:t>adaptive genetic algorithm and its application to image </a:t>
+            </a:r>
+            <a:r>
+              <a:rPr lang="en-US" dirty="0" smtClean="0">
+                <a:solidFill>
+                  <a:schemeClr val="tx1"/>
+                </a:solidFill>
+                <a:latin typeface="Helvetica" charset="0"/>
+                <a:ea typeface="Helvetica" charset="0"/>
+                <a:cs typeface="Helvetica" charset="0"/>
+              </a:rPr>
+              <a:t>segmentation". </a:t>
+            </a:r>
+            <a:r>
+              <a:rPr lang="en-US" i="1" dirty="0">
+                <a:solidFill>
+                  <a:schemeClr val="tx1"/>
+                </a:solidFill>
+                <a:latin typeface="Helvetica" charset="0"/>
+                <a:ea typeface="Helvetica" charset="0"/>
+                <a:cs typeface="Helvetica" charset="0"/>
+              </a:rPr>
+              <a:t>In Multispectral Image Processing and Pattern Recognition</a:t>
+            </a:r>
+            <a:r>
+              <a:rPr lang="en-US" dirty="0">
+                <a:solidFill>
+                  <a:schemeClr val="tx1"/>
+                </a:solidFill>
+                <a:latin typeface="Helvetica" charset="0"/>
+                <a:ea typeface="Helvetica" charset="0"/>
+                <a:cs typeface="Helvetica" charset="0"/>
+              </a:rPr>
+              <a:t>, pages 115–120. International Society for Optics and Photonics, 2001. </a:t>
+            </a:r>
+            <a:endParaRPr lang="en-US" dirty="0" smtClean="0">
+              <a:solidFill>
+                <a:schemeClr val="tx1"/>
+              </a:solidFill>
+              <a:latin typeface="Helvetica" charset="0"/>
+              <a:ea typeface="Helvetica" charset="0"/>
+              <a:cs typeface="Helvetica" charset="0"/>
+            </a:endParaRPr>
+          </a:p>
+          <a:p>
+            <a:r>
+              <a:rPr lang="en-US" dirty="0" smtClean="0">
+                <a:solidFill>
+                  <a:schemeClr val="tx1"/>
+                </a:solidFill>
+                <a:latin typeface="Helvetica" charset="0"/>
+                <a:ea typeface="Helvetica" charset="0"/>
+                <a:cs typeface="Helvetica" charset="0"/>
+              </a:rPr>
+              <a:t>[13] </a:t>
+            </a:r>
+            <a:r>
+              <a:rPr lang="en-US" dirty="0">
+                <a:solidFill>
+                  <a:schemeClr val="tx1"/>
+                </a:solidFill>
+                <a:latin typeface="Helvetica" charset="0"/>
+                <a:ea typeface="Helvetica" charset="0"/>
+                <a:cs typeface="Helvetica" charset="0"/>
+              </a:rPr>
+              <a:t>K. Matthias, T. </a:t>
+            </a:r>
+            <a:r>
+              <a:rPr lang="en-US" dirty="0" err="1">
+                <a:solidFill>
+                  <a:schemeClr val="tx1"/>
+                </a:solidFill>
+                <a:latin typeface="Helvetica" charset="0"/>
+                <a:ea typeface="Helvetica" charset="0"/>
+                <a:cs typeface="Helvetica" charset="0"/>
+              </a:rPr>
+              <a:t>Severin</a:t>
+            </a:r>
+            <a:r>
+              <a:rPr lang="en-US" dirty="0">
+                <a:solidFill>
+                  <a:schemeClr val="tx1"/>
+                </a:solidFill>
+                <a:latin typeface="Helvetica" charset="0"/>
+                <a:ea typeface="Helvetica" charset="0"/>
+                <a:cs typeface="Helvetica" charset="0"/>
+              </a:rPr>
+              <a:t>, and H. </a:t>
+            </a:r>
+            <a:r>
+              <a:rPr lang="en-US" dirty="0" err="1">
+                <a:solidFill>
+                  <a:schemeClr val="tx1"/>
+                </a:solidFill>
+                <a:latin typeface="Helvetica" charset="0"/>
+                <a:ea typeface="Helvetica" charset="0"/>
+                <a:cs typeface="Helvetica" charset="0"/>
+              </a:rPr>
+              <a:t>Salzwedel</a:t>
+            </a:r>
+            <a:r>
+              <a:rPr lang="en-US" dirty="0">
+                <a:solidFill>
+                  <a:schemeClr val="tx1"/>
+                </a:solidFill>
+                <a:latin typeface="Helvetica" charset="0"/>
+                <a:ea typeface="Helvetica" charset="0"/>
+                <a:cs typeface="Helvetica" charset="0"/>
+              </a:rPr>
+              <a:t>. </a:t>
+            </a:r>
+            <a:r>
+              <a:rPr lang="en-US" dirty="0" smtClean="0">
+                <a:solidFill>
+                  <a:schemeClr val="tx1"/>
+                </a:solidFill>
+                <a:latin typeface="Helvetica" charset="0"/>
+                <a:ea typeface="Helvetica" charset="0"/>
+                <a:cs typeface="Helvetica" charset="0"/>
+              </a:rPr>
+              <a:t>"Variable </a:t>
+            </a:r>
+            <a:r>
+              <a:rPr lang="en-US" dirty="0">
+                <a:solidFill>
+                  <a:schemeClr val="tx1"/>
+                </a:solidFill>
+                <a:latin typeface="Helvetica" charset="0"/>
+                <a:ea typeface="Helvetica" charset="0"/>
+                <a:cs typeface="Helvetica" charset="0"/>
+              </a:rPr>
+              <a:t>mutation rate at genetic algorithms: introduction of chromosome fitness in connection with multi-chromosome </a:t>
+            </a:r>
+            <a:r>
+              <a:rPr lang="en-US" dirty="0" smtClean="0">
+                <a:solidFill>
+                  <a:schemeClr val="tx1"/>
+                </a:solidFill>
+                <a:latin typeface="Helvetica" charset="0"/>
+                <a:ea typeface="Helvetica" charset="0"/>
+                <a:cs typeface="Helvetica" charset="0"/>
+              </a:rPr>
+              <a:t>representation". </a:t>
+            </a:r>
+            <a:r>
+              <a:rPr lang="en-US" i="1" dirty="0">
+                <a:solidFill>
+                  <a:schemeClr val="tx1"/>
+                </a:solidFill>
+                <a:latin typeface="Helvetica" charset="0"/>
+                <a:ea typeface="Helvetica" charset="0"/>
+                <a:cs typeface="Helvetica" charset="0"/>
+              </a:rPr>
+              <a:t>International Journal of Computer Applications</a:t>
+            </a:r>
+            <a:r>
+              <a:rPr lang="en-US" dirty="0">
+                <a:solidFill>
+                  <a:schemeClr val="tx1"/>
+                </a:solidFill>
+                <a:latin typeface="Helvetica" charset="0"/>
+                <a:ea typeface="Helvetica" charset="0"/>
+                <a:cs typeface="Helvetica" charset="0"/>
+              </a:rPr>
+              <a:t>, 72(17), 2013</a:t>
+            </a:r>
+            <a:r>
+              <a:rPr lang="en-US" dirty="0" smtClean="0">
+                <a:solidFill>
+                  <a:schemeClr val="tx1"/>
+                </a:solidFill>
+                <a:latin typeface="Helvetica" charset="0"/>
+                <a:ea typeface="Helvetica" charset="0"/>
+                <a:cs typeface="Helvetica" charset="0"/>
+              </a:rPr>
+              <a:t>.</a:t>
+            </a:r>
+          </a:p>
+          <a:p>
+            <a:endParaRPr lang="en-US" dirty="0">
+              <a:solidFill>
+                <a:schemeClr val="tx1"/>
+              </a:solidFill>
+              <a:latin typeface="Helvetica" charset="0"/>
+              <a:ea typeface="Helvetica" charset="0"/>
+              <a:cs typeface="Helvetica" charset="0"/>
+            </a:endParaRPr>
+          </a:p>
+          <a:p>
+            <a:endParaRPr lang="en-US" dirty="0">
+              <a:solidFill>
+                <a:schemeClr val="tx1"/>
+              </a:solidFill>
+              <a:latin typeface="Helvetica" charset="0"/>
+              <a:ea typeface="Helvetica" charset="0"/>
+              <a:cs typeface="Helvetica" charset="0"/>
+            </a:endParaRPr>
+          </a:p>
+        </p:txBody>
+      </p:sp>
+      <p:sp>
+        <p:nvSpPr>
+          <p:cNvPr id="4" name="Slide Number Placeholder 3"/>
+          <p:cNvSpPr>
+            <a:spLocks noGrp="1"/>
+          </p:cNvSpPr>
+          <p:nvPr>
+            <p:ph type="sldNum" sz="quarter" idx="12"/>
+          </p:nvPr>
+        </p:nvSpPr>
+        <p:spPr/>
+        <p:txBody>
+          <a:bodyPr/>
+          <a:lstStyle/>
+          <a:p>
+            <a:fld id="{55774153-6BEA-8641-B7A1-86CE42693FE2}" type="slidenum">
+              <a:rPr lang="en-US" smtClean="0"/>
+              <a:t>26</a:t>
             </a:fld>
             <a:endParaRPr lang="en-US"/>
           </a:p>

</xml_diff>

<commit_message>
Added last image for AGA presentation
</commit_message>
<xml_diff>
--- a/presentations/TG2_Apresentacao_Cassio.pptx
+++ b/presentations/TG2_Apresentacao_Cassio.pptx
@@ -5,7 +5,7 @@
     <p:sldMasterId id="2147484198" r:id="rId1"/>
   </p:sldMasterIdLst>
   <p:notesMasterIdLst>
-    <p:notesMasterId r:id="rId29"/>
+    <p:notesMasterId r:id="rId32"/>
   </p:notesMasterIdLst>
   <p:sldIdLst>
     <p:sldId id="256" r:id="rId2"/>
@@ -28,13 +28,16 @@
     <p:sldId id="286" r:id="rId19"/>
     <p:sldId id="288" r:id="rId20"/>
     <p:sldId id="287" r:id="rId21"/>
-    <p:sldId id="293" r:id="rId22"/>
-    <p:sldId id="292" r:id="rId23"/>
-    <p:sldId id="294" r:id="rId24"/>
-    <p:sldId id="291" r:id="rId25"/>
-    <p:sldId id="269" r:id="rId26"/>
-    <p:sldId id="271" r:id="rId27"/>
-    <p:sldId id="289" r:id="rId28"/>
+    <p:sldId id="296" r:id="rId22"/>
+    <p:sldId id="297" r:id="rId23"/>
+    <p:sldId id="293" r:id="rId24"/>
+    <p:sldId id="292" r:id="rId25"/>
+    <p:sldId id="294" r:id="rId26"/>
+    <p:sldId id="295" r:id="rId27"/>
+    <p:sldId id="291" r:id="rId28"/>
+    <p:sldId id="269" r:id="rId29"/>
+    <p:sldId id="271" r:id="rId30"/>
+    <p:sldId id="289" r:id="rId31"/>
   </p:sldIdLst>
   <p:sldSz cx="12192000" cy="6858000"/>
   <p:notesSz cx="6858000" cy="9144000"/>
@@ -1237,7 +1240,7 @@
     </p:spTree>
     <p:extLst>
       <p:ext uri="{BB962C8B-B14F-4D97-AF65-F5344CB8AC3E}">
-        <p14:creationId xmlns:p14="http://schemas.microsoft.com/office/powerpoint/2010/main" val="1437822982"/>
+        <p14:creationId xmlns:p14="http://schemas.microsoft.com/office/powerpoint/2010/main" val="395274262"/>
       </p:ext>
     </p:extLst>
   </p:cSld>
@@ -1321,7 +1324,7 @@
     </p:spTree>
     <p:extLst>
       <p:ext uri="{BB962C8B-B14F-4D97-AF65-F5344CB8AC3E}">
-        <p14:creationId xmlns:p14="http://schemas.microsoft.com/office/powerpoint/2010/main" val="1234342965"/>
+        <p14:creationId xmlns:p14="http://schemas.microsoft.com/office/powerpoint/2010/main" val="1589888064"/>
       </p:ext>
     </p:extLst>
   </p:cSld>
@@ -1405,7 +1408,7 @@
     </p:spTree>
     <p:extLst>
       <p:ext uri="{BB962C8B-B14F-4D97-AF65-F5344CB8AC3E}">
-        <p14:creationId xmlns:p14="http://schemas.microsoft.com/office/powerpoint/2010/main" val="1923837116"/>
+        <p14:creationId xmlns:p14="http://schemas.microsoft.com/office/powerpoint/2010/main" val="1437822982"/>
       </p:ext>
     </p:extLst>
   </p:cSld>
@@ -1565,6 +1568,258 @@
             <a:fld id="{728E3497-A358-B14F-AE0E-969A2D296615}" type="slidenum">
               <a:rPr lang="en-US" smtClean="0"/>
               <a:t>23</a:t>
+            </a:fld>
+            <a:endParaRPr lang="en-US"/>
+          </a:p>
+        </p:txBody>
+      </p:sp>
+    </p:spTree>
+    <p:extLst>
+      <p:ext uri="{BB962C8B-B14F-4D97-AF65-F5344CB8AC3E}">
+        <p14:creationId xmlns:p14="http://schemas.microsoft.com/office/powerpoint/2010/main" val="1234342965"/>
+      </p:ext>
+    </p:extLst>
+  </p:cSld>
+  <p:clrMapOvr>
+    <a:masterClrMapping/>
+  </p:clrMapOvr>
+</p:notes>
+</file>
+
+<file path=ppt/notesSlides/notesSlide21.xml><?xml version="1.0" encoding="utf-8"?>
+<p:notes xmlns:a="http://schemas.openxmlformats.org/drawingml/2006/main" xmlns:r="http://schemas.openxmlformats.org/officeDocument/2006/relationships" xmlns:p="http://schemas.openxmlformats.org/presentationml/2006/main">
+  <p:cSld>
+    <p:spTree>
+      <p:nvGrpSpPr>
+        <p:cNvPr id="1" name=""/>
+        <p:cNvGrpSpPr/>
+        <p:nvPr/>
+      </p:nvGrpSpPr>
+      <p:grpSpPr>
+        <a:xfrm>
+          <a:off x="0" y="0"/>
+          <a:ext cx="0" cy="0"/>
+          <a:chOff x="0" y="0"/>
+          <a:chExt cx="0" cy="0"/>
+        </a:xfrm>
+      </p:grpSpPr>
+      <p:sp>
+        <p:nvSpPr>
+          <p:cNvPr id="2" name="Slide Image Placeholder 1"/>
+          <p:cNvSpPr>
+            <a:spLocks noGrp="1" noRot="1" noChangeAspect="1"/>
+          </p:cNvSpPr>
+          <p:nvPr>
+            <p:ph type="sldImg"/>
+          </p:nvPr>
+        </p:nvSpPr>
+        <p:spPr/>
+      </p:sp>
+      <p:sp>
+        <p:nvSpPr>
+          <p:cNvPr id="3" name="Notes Placeholder 2"/>
+          <p:cNvSpPr>
+            <a:spLocks noGrp="1"/>
+          </p:cNvSpPr>
+          <p:nvPr>
+            <p:ph type="body" idx="1"/>
+          </p:nvPr>
+        </p:nvSpPr>
+        <p:spPr/>
+        <p:txBody>
+          <a:bodyPr/>
+          <a:lstStyle/>
+          <a:p>
+            <a:endParaRPr lang="en-US"/>
+          </a:p>
+        </p:txBody>
+      </p:sp>
+      <p:sp>
+        <p:nvSpPr>
+          <p:cNvPr id="4" name="Slide Number Placeholder 3"/>
+          <p:cNvSpPr>
+            <a:spLocks noGrp="1"/>
+          </p:cNvSpPr>
+          <p:nvPr>
+            <p:ph type="sldNum" sz="quarter" idx="10"/>
+          </p:nvPr>
+        </p:nvSpPr>
+        <p:spPr/>
+        <p:txBody>
+          <a:bodyPr/>
+          <a:lstStyle/>
+          <a:p>
+            <a:fld id="{728E3497-A358-B14F-AE0E-969A2D296615}" type="slidenum">
+              <a:rPr lang="en-US" smtClean="0"/>
+              <a:t>24</a:t>
+            </a:fld>
+            <a:endParaRPr lang="en-US"/>
+          </a:p>
+        </p:txBody>
+      </p:sp>
+    </p:spTree>
+    <p:extLst>
+      <p:ext uri="{BB962C8B-B14F-4D97-AF65-F5344CB8AC3E}">
+        <p14:creationId xmlns:p14="http://schemas.microsoft.com/office/powerpoint/2010/main" val="1923837116"/>
+      </p:ext>
+    </p:extLst>
+  </p:cSld>
+  <p:clrMapOvr>
+    <a:masterClrMapping/>
+  </p:clrMapOvr>
+</p:notes>
+</file>
+
+<file path=ppt/notesSlides/notesSlide22.xml><?xml version="1.0" encoding="utf-8"?>
+<p:notes xmlns:a="http://schemas.openxmlformats.org/drawingml/2006/main" xmlns:r="http://schemas.openxmlformats.org/officeDocument/2006/relationships" xmlns:p="http://schemas.openxmlformats.org/presentationml/2006/main">
+  <p:cSld>
+    <p:spTree>
+      <p:nvGrpSpPr>
+        <p:cNvPr id="1" name=""/>
+        <p:cNvGrpSpPr/>
+        <p:nvPr/>
+      </p:nvGrpSpPr>
+      <p:grpSpPr>
+        <a:xfrm>
+          <a:off x="0" y="0"/>
+          <a:ext cx="0" cy="0"/>
+          <a:chOff x="0" y="0"/>
+          <a:chExt cx="0" cy="0"/>
+        </a:xfrm>
+      </p:grpSpPr>
+      <p:sp>
+        <p:nvSpPr>
+          <p:cNvPr id="2" name="Slide Image Placeholder 1"/>
+          <p:cNvSpPr>
+            <a:spLocks noGrp="1" noRot="1" noChangeAspect="1"/>
+          </p:cNvSpPr>
+          <p:nvPr>
+            <p:ph type="sldImg"/>
+          </p:nvPr>
+        </p:nvSpPr>
+        <p:spPr/>
+      </p:sp>
+      <p:sp>
+        <p:nvSpPr>
+          <p:cNvPr id="3" name="Notes Placeholder 2"/>
+          <p:cNvSpPr>
+            <a:spLocks noGrp="1"/>
+          </p:cNvSpPr>
+          <p:nvPr>
+            <p:ph type="body" idx="1"/>
+          </p:nvPr>
+        </p:nvSpPr>
+        <p:spPr/>
+        <p:txBody>
+          <a:bodyPr/>
+          <a:lstStyle/>
+          <a:p>
+            <a:endParaRPr lang="en-US"/>
+          </a:p>
+        </p:txBody>
+      </p:sp>
+      <p:sp>
+        <p:nvSpPr>
+          <p:cNvPr id="4" name="Slide Number Placeholder 3"/>
+          <p:cNvSpPr>
+            <a:spLocks noGrp="1"/>
+          </p:cNvSpPr>
+          <p:nvPr>
+            <p:ph type="sldNum" sz="quarter" idx="10"/>
+          </p:nvPr>
+        </p:nvSpPr>
+        <p:spPr/>
+        <p:txBody>
+          <a:bodyPr/>
+          <a:lstStyle/>
+          <a:p>
+            <a:fld id="{728E3497-A358-B14F-AE0E-969A2D296615}" type="slidenum">
+              <a:rPr lang="en-US" smtClean="0"/>
+              <a:t>25</a:t>
+            </a:fld>
+            <a:endParaRPr lang="en-US"/>
+          </a:p>
+        </p:txBody>
+      </p:sp>
+    </p:spTree>
+    <p:extLst>
+      <p:ext uri="{BB962C8B-B14F-4D97-AF65-F5344CB8AC3E}">
+        <p14:creationId xmlns:p14="http://schemas.microsoft.com/office/powerpoint/2010/main" val="38904631"/>
+      </p:ext>
+    </p:extLst>
+  </p:cSld>
+  <p:clrMapOvr>
+    <a:masterClrMapping/>
+  </p:clrMapOvr>
+</p:notes>
+</file>
+
+<file path=ppt/notesSlides/notesSlide23.xml><?xml version="1.0" encoding="utf-8"?>
+<p:notes xmlns:a="http://schemas.openxmlformats.org/drawingml/2006/main" xmlns:r="http://schemas.openxmlformats.org/officeDocument/2006/relationships" xmlns:p="http://schemas.openxmlformats.org/presentationml/2006/main">
+  <p:cSld>
+    <p:spTree>
+      <p:nvGrpSpPr>
+        <p:cNvPr id="1" name=""/>
+        <p:cNvGrpSpPr/>
+        <p:nvPr/>
+      </p:nvGrpSpPr>
+      <p:grpSpPr>
+        <a:xfrm>
+          <a:off x="0" y="0"/>
+          <a:ext cx="0" cy="0"/>
+          <a:chOff x="0" y="0"/>
+          <a:chExt cx="0" cy="0"/>
+        </a:xfrm>
+      </p:grpSpPr>
+      <p:sp>
+        <p:nvSpPr>
+          <p:cNvPr id="2" name="Slide Image Placeholder 1"/>
+          <p:cNvSpPr>
+            <a:spLocks noGrp="1" noRot="1" noChangeAspect="1"/>
+          </p:cNvSpPr>
+          <p:nvPr>
+            <p:ph type="sldImg"/>
+          </p:nvPr>
+        </p:nvSpPr>
+        <p:spPr/>
+      </p:sp>
+      <p:sp>
+        <p:nvSpPr>
+          <p:cNvPr id="3" name="Notes Placeholder 2"/>
+          <p:cNvSpPr>
+            <a:spLocks noGrp="1"/>
+          </p:cNvSpPr>
+          <p:nvPr>
+            <p:ph type="body" idx="1"/>
+          </p:nvPr>
+        </p:nvSpPr>
+        <p:spPr/>
+        <p:txBody>
+          <a:bodyPr/>
+          <a:lstStyle/>
+          <a:p>
+            <a:endParaRPr lang="en-US"/>
+          </a:p>
+        </p:txBody>
+      </p:sp>
+      <p:sp>
+        <p:nvSpPr>
+          <p:cNvPr id="4" name="Slide Number Placeholder 3"/>
+          <p:cNvSpPr>
+            <a:spLocks noGrp="1"/>
+          </p:cNvSpPr>
+          <p:nvPr>
+            <p:ph type="sldNum" sz="quarter" idx="10"/>
+          </p:nvPr>
+        </p:nvSpPr>
+        <p:spPr/>
+        <p:txBody>
+          <a:bodyPr/>
+          <a:lstStyle/>
+          <a:p>
+            <a:fld id="{728E3497-A358-B14F-AE0E-969A2D296615}" type="slidenum">
+              <a:rPr lang="en-US" smtClean="0"/>
+              <a:t>26</a:t>
             </a:fld>
             <a:endParaRPr lang="en-US"/>
           </a:p>
@@ -27002,6 +27257,342 @@
       </p:sp>
       <p:pic>
         <p:nvPicPr>
+          <p:cNvPr id="7" name="Content Placeholder 6"/>
+          <p:cNvPicPr>
+            <a:picLocks noGrp="1" noChangeAspect="1"/>
+          </p:cNvPicPr>
+          <p:nvPr>
+            <p:ph idx="1"/>
+          </p:nvPr>
+        </p:nvPicPr>
+        <p:blipFill>
+          <a:blip r:embed="rId3">
+            <a:extLst>
+              <a:ext uri="{28A0092B-C50C-407E-A947-70E740481C1C}">
+                <a14:useLocalDpi xmlns:a14="http://schemas.microsoft.com/office/drawing/2010/main" val="0"/>
+              </a:ext>
+            </a:extLst>
+          </a:blip>
+          <a:stretch>
+            <a:fillRect/>
+          </a:stretch>
+        </p:blipFill>
+        <p:spPr>
+          <a:xfrm>
+            <a:off x="2288874" y="2603500"/>
+            <a:ext cx="6558564" cy="3416300"/>
+          </a:xfrm>
+        </p:spPr>
+      </p:pic>
+    </p:spTree>
+    <p:extLst>
+      <p:ext uri="{BB962C8B-B14F-4D97-AF65-F5344CB8AC3E}">
+        <p14:creationId xmlns:p14="http://schemas.microsoft.com/office/powerpoint/2010/main" val="435857797"/>
+      </p:ext>
+    </p:extLst>
+  </p:cSld>
+  <p:clrMapOvr>
+    <a:masterClrMapping/>
+  </p:clrMapOvr>
+  <p:timing>
+    <p:tnLst>
+      <p:par>
+        <p:cTn id="1" dur="indefinite" restart="never" nodeType="tmRoot"/>
+      </p:par>
+    </p:tnLst>
+  </p:timing>
+</p:sld>
+</file>
+
+<file path=ppt/slides/slide22.xml><?xml version="1.0" encoding="utf-8"?>
+<p:sld xmlns:a="http://schemas.openxmlformats.org/drawingml/2006/main" xmlns:r="http://schemas.openxmlformats.org/officeDocument/2006/relationships" xmlns:p="http://schemas.openxmlformats.org/presentationml/2006/main">
+  <p:cSld>
+    <p:spTree>
+      <p:nvGrpSpPr>
+        <p:cNvPr id="1" name=""/>
+        <p:cNvGrpSpPr/>
+        <p:nvPr/>
+      </p:nvGrpSpPr>
+      <p:grpSpPr>
+        <a:xfrm>
+          <a:off x="0" y="0"/>
+          <a:ext cx="0" cy="0"/>
+          <a:chOff x="0" y="0"/>
+          <a:chExt cx="0" cy="0"/>
+        </a:xfrm>
+      </p:grpSpPr>
+      <p:sp>
+        <p:nvSpPr>
+          <p:cNvPr id="2" name="Title 1"/>
+          <p:cNvSpPr>
+            <a:spLocks noGrp="1"/>
+          </p:cNvSpPr>
+          <p:nvPr>
+            <p:ph type="title"/>
+          </p:nvPr>
+        </p:nvSpPr>
+        <p:spPr/>
+        <p:txBody>
+          <a:bodyPr/>
+          <a:lstStyle/>
+          <a:p>
+            <a:r>
+              <a:rPr lang="en-US" b="1" dirty="0" err="1" smtClean="0">
+                <a:latin typeface="Helvetica" charset="0"/>
+                <a:ea typeface="Helvetica" charset="0"/>
+                <a:cs typeface="Helvetica" charset="0"/>
+              </a:rPr>
+              <a:t>Otimizações</a:t>
+            </a:r>
+            <a:r>
+              <a:rPr lang="en-US" b="1" dirty="0" smtClean="0">
+                <a:latin typeface="Helvetica" charset="0"/>
+                <a:ea typeface="Helvetica" charset="0"/>
+                <a:cs typeface="Helvetica" charset="0"/>
+              </a:rPr>
+              <a:t> </a:t>
+            </a:r>
+            <a:r>
+              <a:rPr lang="mr-IN" b="1" dirty="0" smtClean="0">
+                <a:latin typeface="Helvetica" charset="0"/>
+                <a:ea typeface="Helvetica" charset="0"/>
+                <a:cs typeface="Helvetica" charset="0"/>
+              </a:rPr>
+              <a:t>–</a:t>
+            </a:r>
+            <a:r>
+              <a:rPr lang="en-US" b="1" dirty="0" smtClean="0">
+                <a:latin typeface="Helvetica" charset="0"/>
+                <a:ea typeface="Helvetica" charset="0"/>
+                <a:cs typeface="Helvetica" charset="0"/>
+              </a:rPr>
+              <a:t> </a:t>
+            </a:r>
+            <a:r>
+              <a:rPr lang="en-US" b="1" dirty="0" smtClean="0">
+                <a:latin typeface="Helvetica" charset="0"/>
+                <a:ea typeface="Helvetica" charset="0"/>
+                <a:cs typeface="Helvetica" charset="0"/>
+              </a:rPr>
+              <a:t>AGA (</a:t>
+            </a:r>
+            <a:r>
+              <a:rPr lang="en-US" b="1" dirty="0" err="1" smtClean="0">
+                <a:latin typeface="Helvetica" charset="0"/>
+                <a:ea typeface="Helvetica" charset="0"/>
+                <a:cs typeface="Helvetica" charset="0"/>
+              </a:rPr>
+              <a:t>Exemplos</a:t>
+            </a:r>
+            <a:r>
+              <a:rPr lang="en-US" b="1" dirty="0" smtClean="0">
+                <a:latin typeface="Helvetica" charset="0"/>
+                <a:ea typeface="Helvetica" charset="0"/>
+                <a:cs typeface="Helvetica" charset="0"/>
+              </a:rPr>
+              <a:t>)</a:t>
+            </a:r>
+            <a:endParaRPr lang="en-US" sz="2800" b="1" dirty="0">
+              <a:latin typeface="Helvetica" charset="0"/>
+              <a:ea typeface="Helvetica" charset="0"/>
+              <a:cs typeface="Helvetica" charset="0"/>
+            </a:endParaRPr>
+          </a:p>
+        </p:txBody>
+      </p:sp>
+      <p:sp>
+        <p:nvSpPr>
+          <p:cNvPr id="5" name="Slide Number Placeholder 4"/>
+          <p:cNvSpPr>
+            <a:spLocks noGrp="1"/>
+          </p:cNvSpPr>
+          <p:nvPr>
+            <p:ph type="sldNum" sz="quarter" idx="12"/>
+          </p:nvPr>
+        </p:nvSpPr>
+        <p:spPr/>
+        <p:txBody>
+          <a:bodyPr/>
+          <a:lstStyle/>
+          <a:p>
+            <a:fld id="{55774153-6BEA-8641-B7A1-86CE42693FE2}" type="slidenum">
+              <a:rPr lang="en-US" smtClean="0"/>
+              <a:t>21</a:t>
+            </a:fld>
+            <a:endParaRPr lang="en-US"/>
+          </a:p>
+        </p:txBody>
+      </p:sp>
+      <p:pic>
+        <p:nvPicPr>
+          <p:cNvPr id="4" name="Content Placeholder 3"/>
+          <p:cNvPicPr>
+            <a:picLocks noGrp="1" noChangeAspect="1"/>
+          </p:cNvPicPr>
+          <p:nvPr>
+            <p:ph idx="1"/>
+          </p:nvPr>
+        </p:nvPicPr>
+        <p:blipFill>
+          <a:blip r:embed="rId3">
+            <a:extLst>
+              <a:ext uri="{28A0092B-C50C-407E-A947-70E740481C1C}">
+                <a14:useLocalDpi xmlns:a14="http://schemas.microsoft.com/office/drawing/2010/main" val="0"/>
+              </a:ext>
+            </a:extLst>
+          </a:blip>
+          <a:stretch>
+            <a:fillRect/>
+          </a:stretch>
+        </p:blipFill>
+        <p:spPr>
+          <a:xfrm>
+            <a:off x="2288874" y="2603500"/>
+            <a:ext cx="6558564" cy="3416300"/>
+          </a:xfrm>
+        </p:spPr>
+      </p:pic>
+    </p:spTree>
+    <p:extLst>
+      <p:ext uri="{BB962C8B-B14F-4D97-AF65-F5344CB8AC3E}">
+        <p14:creationId xmlns:p14="http://schemas.microsoft.com/office/powerpoint/2010/main" val="1750203689"/>
+      </p:ext>
+    </p:extLst>
+  </p:cSld>
+  <p:clrMapOvr>
+    <a:masterClrMapping/>
+  </p:clrMapOvr>
+  <p:timing>
+    <p:tnLst>
+      <p:par>
+        <p:cTn id="1" dur="indefinite" restart="never" nodeType="tmRoot"/>
+      </p:par>
+    </p:tnLst>
+  </p:timing>
+</p:sld>
+</file>
+
+<file path=ppt/slides/slide23.xml><?xml version="1.0" encoding="utf-8"?>
+<p:sld xmlns:a="http://schemas.openxmlformats.org/drawingml/2006/main" xmlns:r="http://schemas.openxmlformats.org/officeDocument/2006/relationships" xmlns:p="http://schemas.openxmlformats.org/presentationml/2006/main">
+  <p:cSld>
+    <p:spTree>
+      <p:nvGrpSpPr>
+        <p:cNvPr id="1" name=""/>
+        <p:cNvGrpSpPr/>
+        <p:nvPr/>
+      </p:nvGrpSpPr>
+      <p:grpSpPr>
+        <a:xfrm>
+          <a:off x="0" y="0"/>
+          <a:ext cx="0" cy="0"/>
+          <a:chOff x="0" y="0"/>
+          <a:chExt cx="0" cy="0"/>
+        </a:xfrm>
+      </p:grpSpPr>
+      <p:sp>
+        <p:nvSpPr>
+          <p:cNvPr id="2" name="Title 1"/>
+          <p:cNvSpPr>
+            <a:spLocks noGrp="1"/>
+          </p:cNvSpPr>
+          <p:nvPr>
+            <p:ph type="title"/>
+          </p:nvPr>
+        </p:nvSpPr>
+        <p:spPr/>
+        <p:txBody>
+          <a:bodyPr/>
+          <a:lstStyle/>
+          <a:p>
+            <a:r>
+              <a:rPr lang="en-US" b="1" dirty="0" err="1" smtClean="0">
+                <a:latin typeface="Helvetica" charset="0"/>
+                <a:ea typeface="Helvetica" charset="0"/>
+                <a:cs typeface="Helvetica" charset="0"/>
+              </a:rPr>
+              <a:t>Otimizações</a:t>
+            </a:r>
+            <a:r>
+              <a:rPr lang="en-US" b="1" dirty="0" smtClean="0">
+                <a:latin typeface="Helvetica" charset="0"/>
+                <a:ea typeface="Helvetica" charset="0"/>
+                <a:cs typeface="Helvetica" charset="0"/>
+              </a:rPr>
+              <a:t> </a:t>
+            </a:r>
+            <a:r>
+              <a:rPr lang="mr-IN" b="1" dirty="0" smtClean="0">
+                <a:latin typeface="Helvetica" charset="0"/>
+                <a:ea typeface="Helvetica" charset="0"/>
+                <a:cs typeface="Helvetica" charset="0"/>
+              </a:rPr>
+              <a:t>–</a:t>
+            </a:r>
+            <a:r>
+              <a:rPr lang="en-US" b="1" dirty="0" smtClean="0">
+                <a:latin typeface="Helvetica" charset="0"/>
+                <a:ea typeface="Helvetica" charset="0"/>
+                <a:cs typeface="Helvetica" charset="0"/>
+              </a:rPr>
+              <a:t> </a:t>
+            </a:r>
+            <a:r>
+              <a:rPr lang="en-US" b="1" dirty="0" smtClean="0">
+                <a:latin typeface="Helvetica" charset="0"/>
+                <a:ea typeface="Helvetica" charset="0"/>
+                <a:cs typeface="Helvetica" charset="0"/>
+              </a:rPr>
+              <a:t>AGA (</a:t>
+            </a:r>
+            <a:r>
+              <a:rPr lang="en-US" b="1" dirty="0" err="1" smtClean="0">
+                <a:latin typeface="Helvetica" charset="0"/>
+                <a:ea typeface="Helvetica" charset="0"/>
+                <a:cs typeface="Helvetica" charset="0"/>
+              </a:rPr>
+              <a:t>Exemplos</a:t>
+            </a:r>
+            <a:r>
+              <a:rPr lang="en-US" b="1" dirty="0" smtClean="0">
+                <a:latin typeface="Helvetica" charset="0"/>
+                <a:ea typeface="Helvetica" charset="0"/>
+                <a:cs typeface="Helvetica" charset="0"/>
+              </a:rPr>
+              <a:t>)</a:t>
+            </a:r>
+            <a:endParaRPr lang="en-US" sz="2800" b="1" dirty="0">
+              <a:latin typeface="Helvetica" charset="0"/>
+              <a:ea typeface="Helvetica" charset="0"/>
+              <a:cs typeface="Helvetica" charset="0"/>
+            </a:endParaRPr>
+          </a:p>
+        </p:txBody>
+      </p:sp>
+      <p:sp>
+        <p:nvSpPr>
+          <p:cNvPr id="5" name="Slide Number Placeholder 4"/>
+          <p:cNvSpPr>
+            <a:spLocks noGrp="1"/>
+          </p:cNvSpPr>
+          <p:nvPr>
+            <p:ph type="sldNum" sz="quarter" idx="12"/>
+          </p:nvPr>
+        </p:nvSpPr>
+        <p:spPr/>
+        <p:txBody>
+          <a:bodyPr/>
+          <a:lstStyle/>
+          <a:p>
+            <a:fld id="{55774153-6BEA-8641-B7A1-86CE42693FE2}" type="slidenum">
+              <a:rPr lang="en-US" smtClean="0"/>
+              <a:t>22</a:t>
+            </a:fld>
+            <a:endParaRPr lang="en-US"/>
+          </a:p>
+        </p:txBody>
+      </p:sp>
+      <p:pic>
+        <p:nvPicPr>
           <p:cNvPr id="8" name="Content Placeholder 7"/>
           <p:cNvPicPr>
             <a:picLocks noGrp="1" noChangeAspect="1"/>
@@ -27049,7 +27640,7 @@
 </p:sld>
 </file>
 
-<file path=ppt/slides/slide22.xml><?xml version="1.0" encoding="utf-8"?>
+<file path=ppt/slides/slide24.xml><?xml version="1.0" encoding="utf-8"?>
 <p:sld xmlns:a="http://schemas.openxmlformats.org/drawingml/2006/main" xmlns:r="http://schemas.openxmlformats.org/officeDocument/2006/relationships" xmlns:p="http://schemas.openxmlformats.org/presentationml/2006/main">
   <p:cSld>
     <p:spTree>
@@ -27162,7 +27753,7 @@
           <a:p>
             <a:fld id="{55774153-6BEA-8641-B7A1-86CE42693FE2}" type="slidenum">
               <a:rPr lang="en-US" smtClean="0"/>
-              <a:t>21</a:t>
+              <a:t>23</a:t>
             </a:fld>
             <a:endParaRPr lang="en-US"/>
           </a:p>
@@ -27217,7 +27808,7 @@
 </p:sld>
 </file>
 
-<file path=ppt/slides/slide23.xml><?xml version="1.0" encoding="utf-8"?>
+<file path=ppt/slides/slide25.xml><?xml version="1.0" encoding="utf-8"?>
 <p:sld xmlns:a="http://schemas.openxmlformats.org/drawingml/2006/main" xmlns:r="http://schemas.openxmlformats.org/officeDocument/2006/relationships" xmlns:p="http://schemas.openxmlformats.org/presentationml/2006/main">
   <p:cSld>
     <p:spTree>
@@ -27330,7 +27921,7 @@
           <a:p>
             <a:fld id="{55774153-6BEA-8641-B7A1-86CE42693FE2}" type="slidenum">
               <a:rPr lang="en-US" smtClean="0"/>
-              <a:t>22</a:t>
+              <a:t>24</a:t>
             </a:fld>
             <a:endParaRPr lang="en-US"/>
           </a:p>
@@ -27385,1116 +27976,6 @@
 </p:sld>
 </file>
 
-<file path=ppt/slides/slide24.xml><?xml version="1.0" encoding="utf-8"?>
-<p:sld xmlns:a="http://schemas.openxmlformats.org/drawingml/2006/main" xmlns:r="http://schemas.openxmlformats.org/officeDocument/2006/relationships" xmlns:p="http://schemas.openxmlformats.org/presentationml/2006/main">
-  <p:cSld>
-    <p:spTree>
-      <p:nvGrpSpPr>
-        <p:cNvPr id="1" name=""/>
-        <p:cNvGrpSpPr/>
-        <p:nvPr/>
-      </p:nvGrpSpPr>
-      <p:grpSpPr>
-        <a:xfrm>
-          <a:off x="0" y="0"/>
-          <a:ext cx="0" cy="0"/>
-          <a:chOff x="0" y="0"/>
-          <a:chExt cx="0" cy="0"/>
-        </a:xfrm>
-      </p:grpSpPr>
-      <p:sp>
-        <p:nvSpPr>
-          <p:cNvPr id="2" name="Title 1"/>
-          <p:cNvSpPr>
-            <a:spLocks noGrp="1"/>
-          </p:cNvSpPr>
-          <p:nvPr>
-            <p:ph type="title"/>
-          </p:nvPr>
-        </p:nvSpPr>
-        <p:spPr/>
-        <p:txBody>
-          <a:bodyPr/>
-          <a:lstStyle/>
-          <a:p>
-            <a:r>
-              <a:rPr lang="en-US" b="1" dirty="0" err="1" smtClean="0">
-                <a:latin typeface="Helvetica" charset="0"/>
-                <a:ea typeface="Helvetica" charset="0"/>
-                <a:cs typeface="Helvetica" charset="0"/>
-              </a:rPr>
-              <a:t>Análises</a:t>
-            </a:r>
-            <a:r>
-              <a:rPr lang="en-US" b="1" dirty="0" smtClean="0">
-                <a:latin typeface="Helvetica" charset="0"/>
-                <a:ea typeface="Helvetica" charset="0"/>
-                <a:cs typeface="Helvetica" charset="0"/>
-              </a:rPr>
-              <a:t> e </a:t>
-            </a:r>
-            <a:r>
-              <a:rPr lang="en-US" b="1" dirty="0" err="1" smtClean="0">
-                <a:latin typeface="Helvetica" charset="0"/>
-                <a:ea typeface="Helvetica" charset="0"/>
-                <a:cs typeface="Helvetica" charset="0"/>
-              </a:rPr>
-              <a:t>Resultados</a:t>
-            </a:r>
-            <a:endParaRPr lang="en-US" sz="2800" b="1" dirty="0">
-              <a:latin typeface="Helvetica" charset="0"/>
-              <a:ea typeface="Helvetica" charset="0"/>
-              <a:cs typeface="Helvetica" charset="0"/>
-            </a:endParaRPr>
-          </a:p>
-        </p:txBody>
-      </p:sp>
-      <p:sp>
-        <p:nvSpPr>
-          <p:cNvPr id="3" name="Content Placeholder 2"/>
-          <p:cNvSpPr>
-            <a:spLocks noGrp="1"/>
-          </p:cNvSpPr>
-          <p:nvPr>
-            <p:ph idx="1"/>
-          </p:nvPr>
-        </p:nvSpPr>
-        <p:spPr>
-          <a:xfrm>
-            <a:off x="1154954" y="2603500"/>
-            <a:ext cx="9647158" cy="4126484"/>
-          </a:xfrm>
-        </p:spPr>
-        <p:txBody>
-          <a:bodyPr>
-            <a:normAutofit/>
-          </a:bodyPr>
-          <a:lstStyle/>
-          <a:p>
-            <a:r>
-              <a:rPr lang="en-US" dirty="0" err="1">
-                <a:solidFill>
-                  <a:schemeClr val="tx1"/>
-                </a:solidFill>
-                <a:latin typeface="Helvetica" charset="0"/>
-                <a:ea typeface="Helvetica" charset="0"/>
-                <a:cs typeface="Helvetica" charset="0"/>
-              </a:rPr>
-              <a:t>T</a:t>
-            </a:r>
-            <a:r>
-              <a:rPr lang="en-US" dirty="0" err="1" smtClean="0">
-                <a:solidFill>
-                  <a:schemeClr val="tx1"/>
-                </a:solidFill>
-                <a:latin typeface="Helvetica" charset="0"/>
-                <a:ea typeface="Helvetica" charset="0"/>
-                <a:cs typeface="Helvetica" charset="0"/>
-              </a:rPr>
-              <a:t>exto</a:t>
-            </a:r>
-            <a:r>
-              <a:rPr lang="en-US" dirty="0" smtClean="0">
-                <a:solidFill>
-                  <a:schemeClr val="tx1"/>
-                </a:solidFill>
-                <a:latin typeface="Helvetica" charset="0"/>
-                <a:ea typeface="Helvetica" charset="0"/>
-                <a:cs typeface="Helvetica" charset="0"/>
-              </a:rPr>
-              <a:t> </a:t>
-            </a:r>
-            <a:r>
-              <a:rPr lang="en-US" dirty="0" err="1" smtClean="0">
-                <a:solidFill>
-                  <a:schemeClr val="tx1"/>
-                </a:solidFill>
-                <a:latin typeface="Helvetica" charset="0"/>
-                <a:ea typeface="Helvetica" charset="0"/>
-                <a:cs typeface="Helvetica" charset="0"/>
-              </a:rPr>
-              <a:t>aqui</a:t>
-            </a:r>
-            <a:endParaRPr lang="en-US" i="1" baseline="-25000" dirty="0" smtClean="0">
-              <a:solidFill>
-                <a:schemeClr val="tx1"/>
-              </a:solidFill>
-              <a:latin typeface="Helvetica" charset="0"/>
-              <a:ea typeface="Helvetica" charset="0"/>
-              <a:cs typeface="Helvetica" charset="0"/>
-            </a:endParaRPr>
-          </a:p>
-        </p:txBody>
-      </p:sp>
-      <p:sp>
-        <p:nvSpPr>
-          <p:cNvPr id="5" name="Slide Number Placeholder 4"/>
-          <p:cNvSpPr>
-            <a:spLocks noGrp="1"/>
-          </p:cNvSpPr>
-          <p:nvPr>
-            <p:ph type="sldNum" sz="quarter" idx="12"/>
-          </p:nvPr>
-        </p:nvSpPr>
-        <p:spPr/>
-        <p:txBody>
-          <a:bodyPr/>
-          <a:lstStyle/>
-          <a:p>
-            <a:fld id="{55774153-6BEA-8641-B7A1-86CE42693FE2}" type="slidenum">
-              <a:rPr lang="en-US" smtClean="0"/>
-              <a:t>23</a:t>
-            </a:fld>
-            <a:endParaRPr lang="en-US"/>
-          </a:p>
-        </p:txBody>
-      </p:sp>
-    </p:spTree>
-    <p:extLst>
-      <p:ext uri="{BB962C8B-B14F-4D97-AF65-F5344CB8AC3E}">
-        <p14:creationId xmlns:p14="http://schemas.microsoft.com/office/powerpoint/2010/main" val="1732599681"/>
-      </p:ext>
-    </p:extLst>
-  </p:cSld>
-  <p:clrMapOvr>
-    <a:masterClrMapping/>
-  </p:clrMapOvr>
-  <p:timing>
-    <p:tnLst>
-      <p:par>
-        <p:cTn id="1" dur="indefinite" restart="never" nodeType="tmRoot"/>
-      </p:par>
-    </p:tnLst>
-  </p:timing>
-</p:sld>
-</file>
-
-<file path=ppt/slides/slide25.xml><?xml version="1.0" encoding="utf-8"?>
-<p:sld xmlns:a="http://schemas.openxmlformats.org/drawingml/2006/main" xmlns:r="http://schemas.openxmlformats.org/officeDocument/2006/relationships" xmlns:p="http://schemas.openxmlformats.org/presentationml/2006/main">
-  <p:cSld>
-    <p:spTree>
-      <p:nvGrpSpPr>
-        <p:cNvPr id="1" name=""/>
-        <p:cNvGrpSpPr/>
-        <p:nvPr/>
-      </p:nvGrpSpPr>
-      <p:grpSpPr>
-        <a:xfrm>
-          <a:off x="0" y="0"/>
-          <a:ext cx="0" cy="0"/>
-          <a:chOff x="0" y="0"/>
-          <a:chExt cx="0" cy="0"/>
-        </a:xfrm>
-      </p:grpSpPr>
-      <p:sp>
-        <p:nvSpPr>
-          <p:cNvPr id="2" name="Title 1"/>
-          <p:cNvSpPr>
-            <a:spLocks noGrp="1"/>
-          </p:cNvSpPr>
-          <p:nvPr>
-            <p:ph type="title"/>
-          </p:nvPr>
-        </p:nvSpPr>
-        <p:spPr/>
-        <p:txBody>
-          <a:bodyPr/>
-          <a:lstStyle/>
-          <a:p>
-            <a:r>
-              <a:rPr lang="en-US" b="1" dirty="0" err="1" smtClean="0">
-                <a:latin typeface="Helvetica" charset="0"/>
-                <a:ea typeface="Helvetica" charset="0"/>
-                <a:cs typeface="Helvetica" charset="0"/>
-              </a:rPr>
-              <a:t>Referências</a:t>
-            </a:r>
-            <a:endParaRPr lang="en-US" b="1" dirty="0">
-              <a:latin typeface="Helvetica" charset="0"/>
-              <a:ea typeface="Helvetica" charset="0"/>
-              <a:cs typeface="Helvetica" charset="0"/>
-            </a:endParaRPr>
-          </a:p>
-        </p:txBody>
-      </p:sp>
-      <p:sp>
-        <p:nvSpPr>
-          <p:cNvPr id="3" name="Content Placeholder 2"/>
-          <p:cNvSpPr>
-            <a:spLocks noGrp="1"/>
-          </p:cNvSpPr>
-          <p:nvPr>
-            <p:ph idx="1"/>
-          </p:nvPr>
-        </p:nvSpPr>
-        <p:spPr>
-          <a:xfrm>
-            <a:off x="1154954" y="2603500"/>
-            <a:ext cx="10035785" cy="4102100"/>
-          </a:xfrm>
-        </p:spPr>
-        <p:txBody>
-          <a:bodyPr>
-            <a:normAutofit/>
-          </a:bodyPr>
-          <a:lstStyle/>
-          <a:p>
-            <a:r>
-              <a:rPr lang="en-US" dirty="0" smtClean="0">
-                <a:solidFill>
-                  <a:schemeClr val="tx1"/>
-                </a:solidFill>
-                <a:latin typeface="Helvetica" charset="0"/>
-                <a:ea typeface="Helvetica" charset="0"/>
-                <a:cs typeface="Helvetica" charset="0"/>
-              </a:rPr>
-              <a:t>[1] </a:t>
-            </a:r>
-            <a:r>
-              <a:rPr lang="en-US" dirty="0">
-                <a:solidFill>
-                  <a:schemeClr val="tx1"/>
-                </a:solidFill>
-                <a:latin typeface="Helvetica" charset="0"/>
-                <a:ea typeface="Helvetica" charset="0"/>
-                <a:cs typeface="Helvetica" charset="0"/>
-              </a:rPr>
-              <a:t>A. E. </a:t>
-            </a:r>
-            <a:r>
-              <a:rPr lang="en-US" dirty="0" err="1" smtClean="0">
-                <a:solidFill>
-                  <a:schemeClr val="tx1"/>
-                </a:solidFill>
-                <a:latin typeface="Helvetica" charset="0"/>
-                <a:ea typeface="Helvetica" charset="0"/>
-                <a:cs typeface="Helvetica" charset="0"/>
-              </a:rPr>
-              <a:t>Eiben</a:t>
-            </a:r>
-            <a:r>
-              <a:rPr lang="en-US" dirty="0" smtClean="0">
-                <a:solidFill>
-                  <a:schemeClr val="tx1"/>
-                </a:solidFill>
-                <a:latin typeface="Helvetica" charset="0"/>
-                <a:ea typeface="Helvetica" charset="0"/>
-                <a:cs typeface="Helvetica" charset="0"/>
-              </a:rPr>
-              <a:t>, J</a:t>
-            </a:r>
-            <a:r>
-              <a:rPr lang="en-US" dirty="0">
-                <a:solidFill>
-                  <a:schemeClr val="tx1"/>
-                </a:solidFill>
-                <a:latin typeface="Helvetica" charset="0"/>
-                <a:ea typeface="Helvetica" charset="0"/>
-                <a:cs typeface="Helvetica" charset="0"/>
-              </a:rPr>
-              <a:t>. E. Smith. </a:t>
-            </a:r>
-            <a:r>
-              <a:rPr lang="en-US" dirty="0" smtClean="0">
-                <a:solidFill>
-                  <a:schemeClr val="tx1"/>
-                </a:solidFill>
-                <a:latin typeface="Helvetica" charset="0"/>
-                <a:ea typeface="Helvetica" charset="0"/>
-                <a:cs typeface="Helvetica" charset="0"/>
-              </a:rPr>
-              <a:t>“</a:t>
-            </a:r>
-            <a:r>
-              <a:rPr lang="en-US" i="1" dirty="0" smtClean="0">
-                <a:solidFill>
-                  <a:schemeClr val="tx1"/>
-                </a:solidFill>
-                <a:latin typeface="Helvetica" charset="0"/>
-                <a:ea typeface="Helvetica" charset="0"/>
-                <a:cs typeface="Helvetica" charset="0"/>
-              </a:rPr>
-              <a:t>Introduction </a:t>
-            </a:r>
-            <a:r>
-              <a:rPr lang="en-US" i="1" dirty="0">
-                <a:solidFill>
-                  <a:schemeClr val="tx1"/>
-                </a:solidFill>
-                <a:latin typeface="Helvetica" charset="0"/>
-                <a:ea typeface="Helvetica" charset="0"/>
-                <a:cs typeface="Helvetica" charset="0"/>
-              </a:rPr>
-              <a:t>To Evolutionary </a:t>
-            </a:r>
-            <a:r>
-              <a:rPr lang="en-US" i="1" dirty="0" smtClean="0">
-                <a:solidFill>
-                  <a:schemeClr val="tx1"/>
-                </a:solidFill>
-                <a:latin typeface="Helvetica" charset="0"/>
-                <a:ea typeface="Helvetica" charset="0"/>
-                <a:cs typeface="Helvetica" charset="0"/>
-              </a:rPr>
-              <a:t>Computing”</a:t>
-            </a:r>
-            <a:r>
-              <a:rPr lang="en-US" dirty="0" smtClean="0">
-                <a:solidFill>
-                  <a:schemeClr val="tx1"/>
-                </a:solidFill>
-                <a:latin typeface="Helvetica" charset="0"/>
-                <a:ea typeface="Helvetica" charset="0"/>
-                <a:cs typeface="Helvetica" charset="0"/>
-              </a:rPr>
-              <a:t>. </a:t>
-            </a:r>
-            <a:r>
-              <a:rPr lang="en-US" dirty="0">
-                <a:solidFill>
-                  <a:schemeClr val="tx1"/>
-                </a:solidFill>
-                <a:latin typeface="Helvetica" charset="0"/>
-                <a:ea typeface="Helvetica" charset="0"/>
-                <a:cs typeface="Helvetica" charset="0"/>
-              </a:rPr>
-              <a:t>V</a:t>
-            </a:r>
-            <a:r>
-              <a:rPr lang="en-US" dirty="0" smtClean="0">
-                <a:solidFill>
-                  <a:schemeClr val="tx1"/>
-                </a:solidFill>
-                <a:latin typeface="Helvetica" charset="0"/>
-                <a:ea typeface="Helvetica" charset="0"/>
-                <a:cs typeface="Helvetica" charset="0"/>
-              </a:rPr>
-              <a:t>olume 53. </a:t>
-            </a:r>
-            <a:r>
-              <a:rPr lang="en-US" dirty="0">
-                <a:solidFill>
-                  <a:schemeClr val="tx1"/>
-                </a:solidFill>
-                <a:latin typeface="Helvetica" charset="0"/>
-                <a:ea typeface="Helvetica" charset="0"/>
-                <a:cs typeface="Helvetica" charset="0"/>
-              </a:rPr>
-              <a:t>Springer-</a:t>
-            </a:r>
-            <a:r>
-              <a:rPr lang="en-US" dirty="0" err="1">
-                <a:solidFill>
-                  <a:schemeClr val="tx1"/>
-                </a:solidFill>
-                <a:latin typeface="Helvetica" charset="0"/>
-                <a:ea typeface="Helvetica" charset="0"/>
-                <a:cs typeface="Helvetica" charset="0"/>
-              </a:rPr>
-              <a:t>Verlag</a:t>
-            </a:r>
-            <a:r>
-              <a:rPr lang="en-US" dirty="0">
-                <a:solidFill>
-                  <a:schemeClr val="tx1"/>
-                </a:solidFill>
-                <a:latin typeface="Helvetica" charset="0"/>
-                <a:ea typeface="Helvetica" charset="0"/>
-                <a:cs typeface="Helvetica" charset="0"/>
-              </a:rPr>
-              <a:t>, 2003. </a:t>
-            </a:r>
-            <a:endParaRPr lang="en-US" dirty="0" smtClean="0">
-              <a:solidFill>
-                <a:schemeClr val="tx1"/>
-              </a:solidFill>
-              <a:latin typeface="Helvetica" charset="0"/>
-              <a:ea typeface="Helvetica" charset="0"/>
-              <a:cs typeface="Helvetica" charset="0"/>
-            </a:endParaRPr>
-          </a:p>
-          <a:p>
-            <a:r>
-              <a:rPr lang="en-US" dirty="0" smtClean="0">
-                <a:solidFill>
-                  <a:schemeClr val="tx1"/>
-                </a:solidFill>
-                <a:latin typeface="Helvetica" charset="0"/>
-                <a:ea typeface="Helvetica" charset="0"/>
-                <a:cs typeface="Helvetica" charset="0"/>
-              </a:rPr>
-              <a:t>[2] A</a:t>
-            </a:r>
-            <a:r>
-              <a:rPr lang="en-US" dirty="0">
-                <a:solidFill>
-                  <a:schemeClr val="tx1"/>
-                </a:solidFill>
-                <a:latin typeface="Helvetica" charset="0"/>
-                <a:ea typeface="Helvetica" charset="0"/>
-                <a:cs typeface="Helvetica" charset="0"/>
-              </a:rPr>
-              <a:t>. E. </a:t>
-            </a:r>
-            <a:r>
-              <a:rPr lang="en-US" dirty="0" err="1" smtClean="0">
-                <a:solidFill>
-                  <a:schemeClr val="tx1"/>
-                </a:solidFill>
-                <a:latin typeface="Helvetica" charset="0"/>
-                <a:ea typeface="Helvetica" charset="0"/>
-                <a:cs typeface="Helvetica" charset="0"/>
-              </a:rPr>
-              <a:t>Eiben</a:t>
-            </a:r>
-            <a:r>
-              <a:rPr lang="en-US" dirty="0" smtClean="0">
-                <a:solidFill>
-                  <a:schemeClr val="tx1"/>
-                </a:solidFill>
-                <a:latin typeface="Helvetica" charset="0"/>
-                <a:ea typeface="Helvetica" charset="0"/>
-                <a:cs typeface="Helvetica" charset="0"/>
-              </a:rPr>
-              <a:t>, S</a:t>
-            </a:r>
-            <a:r>
-              <a:rPr lang="en-US" dirty="0">
-                <a:solidFill>
-                  <a:schemeClr val="tx1"/>
-                </a:solidFill>
-                <a:latin typeface="Helvetica" charset="0"/>
-                <a:ea typeface="Helvetica" charset="0"/>
-                <a:cs typeface="Helvetica" charset="0"/>
-              </a:rPr>
-              <a:t>. K. </a:t>
-            </a:r>
-            <a:r>
-              <a:rPr lang="en-US" dirty="0" err="1">
-                <a:solidFill>
-                  <a:schemeClr val="tx1"/>
-                </a:solidFill>
-                <a:latin typeface="Helvetica" charset="0"/>
-                <a:ea typeface="Helvetica" charset="0"/>
-                <a:cs typeface="Helvetica" charset="0"/>
-              </a:rPr>
-              <a:t>Smit</a:t>
-            </a:r>
-            <a:r>
-              <a:rPr lang="en-US" dirty="0">
-                <a:solidFill>
-                  <a:schemeClr val="tx1"/>
-                </a:solidFill>
-                <a:latin typeface="Helvetica" charset="0"/>
-                <a:ea typeface="Helvetica" charset="0"/>
-                <a:cs typeface="Helvetica" charset="0"/>
-              </a:rPr>
-              <a:t>. </a:t>
-            </a:r>
-            <a:r>
-              <a:rPr lang="en-US" dirty="0" smtClean="0">
-                <a:solidFill>
-                  <a:schemeClr val="tx1"/>
-                </a:solidFill>
-                <a:latin typeface="Helvetica" charset="0"/>
-                <a:ea typeface="Helvetica" charset="0"/>
-                <a:cs typeface="Helvetica" charset="0"/>
-              </a:rPr>
-              <a:t>“Parameter </a:t>
-            </a:r>
-            <a:r>
-              <a:rPr lang="en-US" dirty="0">
-                <a:solidFill>
-                  <a:schemeClr val="tx1"/>
-                </a:solidFill>
-                <a:latin typeface="Helvetica" charset="0"/>
-                <a:ea typeface="Helvetica" charset="0"/>
-                <a:cs typeface="Helvetica" charset="0"/>
-              </a:rPr>
-              <a:t>tuning for configuring and analyzing evolutionary </a:t>
-            </a:r>
-            <a:r>
-              <a:rPr lang="en-US" dirty="0" smtClean="0">
-                <a:solidFill>
-                  <a:schemeClr val="tx1"/>
-                </a:solidFill>
-                <a:latin typeface="Helvetica" charset="0"/>
-                <a:ea typeface="Helvetica" charset="0"/>
-                <a:cs typeface="Helvetica" charset="0"/>
-              </a:rPr>
-              <a:t>algorithms”. </a:t>
-            </a:r>
-            <a:r>
-              <a:rPr lang="en-US" i="1" dirty="0">
-                <a:solidFill>
-                  <a:schemeClr val="tx1"/>
-                </a:solidFill>
-                <a:latin typeface="Helvetica" charset="0"/>
-                <a:ea typeface="Helvetica" charset="0"/>
-                <a:cs typeface="Helvetica" charset="0"/>
-              </a:rPr>
-              <a:t>Swarm and Evolutionary Computation</a:t>
-            </a:r>
-            <a:r>
-              <a:rPr lang="en-US" dirty="0">
-                <a:solidFill>
-                  <a:schemeClr val="tx1"/>
-                </a:solidFill>
-                <a:latin typeface="Helvetica" charset="0"/>
-                <a:ea typeface="Helvetica" charset="0"/>
-                <a:cs typeface="Helvetica" charset="0"/>
-              </a:rPr>
-              <a:t>, 1(1):19–31, 2011</a:t>
-            </a:r>
-            <a:r>
-              <a:rPr lang="en-US" dirty="0" smtClean="0">
-                <a:solidFill>
-                  <a:schemeClr val="tx1"/>
-                </a:solidFill>
-                <a:latin typeface="Helvetica" charset="0"/>
-                <a:ea typeface="Helvetica" charset="0"/>
-                <a:cs typeface="Helvetica" charset="0"/>
-              </a:rPr>
-              <a:t>.</a:t>
-            </a:r>
-          </a:p>
-          <a:p>
-            <a:r>
-              <a:rPr lang="en-US" dirty="0" smtClean="0">
-                <a:solidFill>
-                  <a:schemeClr val="tx1"/>
-                </a:solidFill>
-                <a:latin typeface="Helvetica" charset="0"/>
-                <a:ea typeface="Helvetica" charset="0"/>
-                <a:cs typeface="Helvetica" charset="0"/>
-              </a:rPr>
-              <a:t>[3] </a:t>
-            </a:r>
-            <a:r>
-              <a:rPr lang="en-US" dirty="0">
-                <a:solidFill>
-                  <a:schemeClr val="tx1"/>
-                </a:solidFill>
-                <a:latin typeface="Helvetica" charset="0"/>
-                <a:ea typeface="Helvetica" charset="0"/>
-                <a:cs typeface="Helvetica" charset="0"/>
-              </a:rPr>
-              <a:t>K. Matthias, T. </a:t>
-            </a:r>
-            <a:r>
-              <a:rPr lang="en-US" dirty="0" err="1">
-                <a:solidFill>
-                  <a:schemeClr val="tx1"/>
-                </a:solidFill>
-                <a:latin typeface="Helvetica" charset="0"/>
-                <a:ea typeface="Helvetica" charset="0"/>
-                <a:cs typeface="Helvetica" charset="0"/>
-              </a:rPr>
-              <a:t>Severin</a:t>
-            </a:r>
-            <a:r>
-              <a:rPr lang="en-US" dirty="0">
-                <a:solidFill>
-                  <a:schemeClr val="tx1"/>
-                </a:solidFill>
-                <a:latin typeface="Helvetica" charset="0"/>
-                <a:ea typeface="Helvetica" charset="0"/>
-                <a:cs typeface="Helvetica" charset="0"/>
-              </a:rPr>
-              <a:t>, and H. </a:t>
-            </a:r>
-            <a:r>
-              <a:rPr lang="en-US" dirty="0" err="1">
-                <a:solidFill>
-                  <a:schemeClr val="tx1"/>
-                </a:solidFill>
-                <a:latin typeface="Helvetica" charset="0"/>
-                <a:ea typeface="Helvetica" charset="0"/>
-                <a:cs typeface="Helvetica" charset="0"/>
-              </a:rPr>
-              <a:t>Salzwedel</a:t>
-            </a:r>
-            <a:r>
-              <a:rPr lang="en-US" dirty="0">
-                <a:solidFill>
-                  <a:schemeClr val="tx1"/>
-                </a:solidFill>
-                <a:latin typeface="Helvetica" charset="0"/>
-                <a:ea typeface="Helvetica" charset="0"/>
-                <a:cs typeface="Helvetica" charset="0"/>
-              </a:rPr>
-              <a:t>. </a:t>
-            </a:r>
-            <a:r>
-              <a:rPr lang="en-US" dirty="0" smtClean="0">
-                <a:solidFill>
-                  <a:schemeClr val="tx1"/>
-                </a:solidFill>
-                <a:latin typeface="Helvetica" charset="0"/>
-                <a:ea typeface="Helvetica" charset="0"/>
-                <a:cs typeface="Helvetica" charset="0"/>
-              </a:rPr>
-              <a:t>"Variable </a:t>
-            </a:r>
-            <a:r>
-              <a:rPr lang="en-US" dirty="0">
-                <a:solidFill>
-                  <a:schemeClr val="tx1"/>
-                </a:solidFill>
-                <a:latin typeface="Helvetica" charset="0"/>
-                <a:ea typeface="Helvetica" charset="0"/>
-                <a:cs typeface="Helvetica" charset="0"/>
-              </a:rPr>
-              <a:t>mutation rate at genetic algorithms: introduction of chromosome fitness in connection with multi-chromosome </a:t>
-            </a:r>
-            <a:r>
-              <a:rPr lang="en-US" dirty="0" smtClean="0">
-                <a:solidFill>
-                  <a:schemeClr val="tx1"/>
-                </a:solidFill>
-                <a:latin typeface="Helvetica" charset="0"/>
-                <a:ea typeface="Helvetica" charset="0"/>
-                <a:cs typeface="Helvetica" charset="0"/>
-              </a:rPr>
-              <a:t>representation". </a:t>
-            </a:r>
-            <a:r>
-              <a:rPr lang="en-US" i="1" dirty="0">
-                <a:solidFill>
-                  <a:schemeClr val="tx1"/>
-                </a:solidFill>
-                <a:latin typeface="Helvetica" charset="0"/>
-                <a:ea typeface="Helvetica" charset="0"/>
-                <a:cs typeface="Helvetica" charset="0"/>
-              </a:rPr>
-              <a:t>International Journal of Computer Applications</a:t>
-            </a:r>
-            <a:r>
-              <a:rPr lang="en-US" dirty="0">
-                <a:solidFill>
-                  <a:schemeClr val="tx1"/>
-                </a:solidFill>
-                <a:latin typeface="Helvetica" charset="0"/>
-                <a:ea typeface="Helvetica" charset="0"/>
-                <a:cs typeface="Helvetica" charset="0"/>
-              </a:rPr>
-              <a:t>, 72(17), 2013. </a:t>
-            </a:r>
-            <a:endParaRPr lang="en-US" dirty="0" smtClean="0">
-              <a:solidFill>
-                <a:schemeClr val="tx1"/>
-              </a:solidFill>
-              <a:latin typeface="Helvetica" charset="0"/>
-              <a:ea typeface="Helvetica" charset="0"/>
-              <a:cs typeface="Helvetica" charset="0"/>
-            </a:endParaRPr>
-          </a:p>
-          <a:p>
-            <a:r>
-              <a:rPr lang="en-US" dirty="0" smtClean="0">
-                <a:solidFill>
-                  <a:schemeClr val="tx1"/>
-                </a:solidFill>
-                <a:latin typeface="Helvetica" charset="0"/>
-                <a:ea typeface="Helvetica" charset="0"/>
-                <a:cs typeface="Helvetica" charset="0"/>
-              </a:rPr>
-              <a:t>[4] </a:t>
-            </a:r>
-            <a:r>
-              <a:rPr lang="en-US" dirty="0">
-                <a:solidFill>
-                  <a:schemeClr val="tx1"/>
-                </a:solidFill>
-                <a:latin typeface="Helvetica" charset="0"/>
-                <a:ea typeface="Helvetica" charset="0"/>
-                <a:cs typeface="Helvetica" charset="0"/>
-              </a:rPr>
-              <a:t>M. </a:t>
-            </a:r>
-            <a:r>
-              <a:rPr lang="en-US" dirty="0" err="1">
-                <a:solidFill>
-                  <a:schemeClr val="tx1"/>
-                </a:solidFill>
-                <a:latin typeface="Helvetica" charset="0"/>
-                <a:ea typeface="Helvetica" charset="0"/>
-                <a:cs typeface="Helvetica" charset="0"/>
-              </a:rPr>
-              <a:t>Obitko</a:t>
-            </a:r>
-            <a:r>
-              <a:rPr lang="en-US" dirty="0">
-                <a:solidFill>
-                  <a:schemeClr val="tx1"/>
-                </a:solidFill>
-                <a:latin typeface="Helvetica" charset="0"/>
-                <a:ea typeface="Helvetica" charset="0"/>
-                <a:cs typeface="Helvetica" charset="0"/>
-              </a:rPr>
-              <a:t>. </a:t>
-            </a:r>
-            <a:r>
-              <a:rPr lang="en-US" dirty="0" smtClean="0">
-                <a:solidFill>
-                  <a:schemeClr val="tx1"/>
-                </a:solidFill>
-                <a:latin typeface="Helvetica" charset="0"/>
-                <a:ea typeface="Helvetica" charset="0"/>
-                <a:cs typeface="Helvetica" charset="0"/>
-              </a:rPr>
-              <a:t>"Introduction </a:t>
-            </a:r>
-            <a:r>
-              <a:rPr lang="en-US" dirty="0">
-                <a:solidFill>
-                  <a:schemeClr val="tx1"/>
-                </a:solidFill>
-                <a:latin typeface="Helvetica" charset="0"/>
-                <a:ea typeface="Helvetica" charset="0"/>
-                <a:cs typeface="Helvetica" charset="0"/>
-              </a:rPr>
-              <a:t>to genetic algorithms - </a:t>
-            </a:r>
-            <a:r>
-              <a:rPr lang="en-US" dirty="0" smtClean="0">
-                <a:solidFill>
-                  <a:schemeClr val="tx1"/>
-                </a:solidFill>
-                <a:latin typeface="Helvetica" charset="0"/>
-                <a:ea typeface="Helvetica" charset="0"/>
-                <a:cs typeface="Helvetica" charset="0"/>
-              </a:rPr>
-              <a:t>XIII. Recommendations". </a:t>
-            </a:r>
-            <a:r>
-              <a:rPr lang="en-US" dirty="0">
-                <a:solidFill>
-                  <a:srgbClr val="0432FF"/>
-                </a:solidFill>
-                <a:latin typeface="Helvetica" charset="0"/>
-                <a:ea typeface="Helvetica" charset="0"/>
-                <a:cs typeface="Helvetica" charset="0"/>
-                <a:hlinkClick r:id="rId2"/>
-              </a:rPr>
-              <a:t>http://www.obitko.com/tutorials/genetic-algorithms/recommendations.php</a:t>
-            </a:r>
-            <a:r>
-              <a:rPr lang="en-US" dirty="0" smtClean="0">
-                <a:solidFill>
-                  <a:srgbClr val="0432FF"/>
-                </a:solidFill>
-                <a:latin typeface="Helvetica" charset="0"/>
-                <a:ea typeface="Helvetica" charset="0"/>
-                <a:cs typeface="Helvetica" charset="0"/>
-                <a:hlinkClick r:id="rId2"/>
-              </a:rPr>
-              <a:t>/</a:t>
-            </a:r>
-            <a:r>
-              <a:rPr lang="en-US" dirty="0" smtClean="0">
-                <a:solidFill>
-                  <a:srgbClr val="0432FF"/>
-                </a:solidFill>
-                <a:latin typeface="Helvetica" charset="0"/>
-                <a:ea typeface="Helvetica" charset="0"/>
-                <a:cs typeface="Helvetica" charset="0"/>
-              </a:rPr>
-              <a:t> </a:t>
-            </a:r>
-            <a:r>
-              <a:rPr lang="en-US" dirty="0" smtClean="0">
-                <a:solidFill>
-                  <a:schemeClr val="tx1"/>
-                </a:solidFill>
-                <a:latin typeface="Helvetica" charset="0"/>
-                <a:ea typeface="Helvetica" charset="0"/>
-                <a:cs typeface="Helvetica" charset="0"/>
-              </a:rPr>
-              <a:t>[</a:t>
-            </a:r>
-            <a:r>
-              <a:rPr lang="en-US" dirty="0">
-                <a:solidFill>
-                  <a:schemeClr val="tx1"/>
-                </a:solidFill>
-                <a:latin typeface="Helvetica" charset="0"/>
-                <a:ea typeface="Helvetica" charset="0"/>
-                <a:cs typeface="Helvetica" charset="0"/>
-              </a:rPr>
-              <a:t>Online; </a:t>
-            </a:r>
-            <a:r>
-              <a:rPr lang="en-US" dirty="0" err="1">
-                <a:solidFill>
-                  <a:schemeClr val="tx1"/>
-                </a:solidFill>
-                <a:latin typeface="Helvetica" charset="0"/>
-                <a:ea typeface="Helvetica" charset="0"/>
-                <a:cs typeface="Helvetica" charset="0"/>
-              </a:rPr>
-              <a:t>acessado</a:t>
-            </a:r>
-            <a:r>
-              <a:rPr lang="en-US" dirty="0">
-                <a:solidFill>
-                  <a:schemeClr val="tx1"/>
-                </a:solidFill>
-                <a:latin typeface="Helvetica" charset="0"/>
-                <a:ea typeface="Helvetica" charset="0"/>
-                <a:cs typeface="Helvetica" charset="0"/>
-              </a:rPr>
-              <a:t> </a:t>
-            </a:r>
-            <a:r>
-              <a:rPr lang="en-US" dirty="0" err="1">
-                <a:solidFill>
-                  <a:schemeClr val="tx1"/>
-                </a:solidFill>
-                <a:latin typeface="Helvetica" charset="0"/>
-                <a:ea typeface="Helvetica" charset="0"/>
-                <a:cs typeface="Helvetica" charset="0"/>
-              </a:rPr>
-              <a:t>em</a:t>
-            </a:r>
-            <a:r>
-              <a:rPr lang="en-US" dirty="0">
-                <a:solidFill>
-                  <a:schemeClr val="tx1"/>
-                </a:solidFill>
-                <a:latin typeface="Helvetica" charset="0"/>
-                <a:ea typeface="Helvetica" charset="0"/>
-                <a:cs typeface="Helvetica" charset="0"/>
-              </a:rPr>
-              <a:t> 17 de </a:t>
-            </a:r>
-            <a:r>
-              <a:rPr lang="en-US" dirty="0" err="1">
-                <a:solidFill>
-                  <a:schemeClr val="tx1"/>
-                </a:solidFill>
-                <a:latin typeface="Helvetica" charset="0"/>
-                <a:ea typeface="Helvetica" charset="0"/>
-                <a:cs typeface="Helvetica" charset="0"/>
-              </a:rPr>
-              <a:t>novembro</a:t>
-            </a:r>
-            <a:r>
-              <a:rPr lang="en-US" dirty="0">
-                <a:solidFill>
-                  <a:schemeClr val="tx1"/>
-                </a:solidFill>
-                <a:latin typeface="Helvetica" charset="0"/>
-                <a:ea typeface="Helvetica" charset="0"/>
-                <a:cs typeface="Helvetica" charset="0"/>
-              </a:rPr>
-              <a:t> de 2016</a:t>
-            </a:r>
-            <a:r>
-              <a:rPr lang="en-US" dirty="0" smtClean="0">
-                <a:solidFill>
-                  <a:schemeClr val="tx1"/>
-                </a:solidFill>
-                <a:latin typeface="Helvetica" charset="0"/>
-                <a:ea typeface="Helvetica" charset="0"/>
-                <a:cs typeface="Helvetica" charset="0"/>
-              </a:rPr>
-              <a:t>].</a:t>
-            </a:r>
-          </a:p>
-          <a:p>
-            <a:r>
-              <a:rPr lang="en-US" dirty="0" smtClean="0">
-                <a:solidFill>
-                  <a:schemeClr val="tx1"/>
-                </a:solidFill>
-                <a:latin typeface="Helvetica" charset="0"/>
-                <a:ea typeface="Helvetica" charset="0"/>
-                <a:cs typeface="Helvetica" charset="0"/>
-              </a:rPr>
-              <a:t>[5] </a:t>
-            </a:r>
-            <a:r>
-              <a:rPr lang="en-US" dirty="0">
-                <a:solidFill>
-                  <a:schemeClr val="tx1"/>
-                </a:solidFill>
-                <a:latin typeface="Helvetica" charset="0"/>
-                <a:ea typeface="Helvetica" charset="0"/>
-                <a:cs typeface="Helvetica" charset="0"/>
-              </a:rPr>
-              <a:t>K. </a:t>
-            </a:r>
-            <a:r>
-              <a:rPr lang="en-US" dirty="0" err="1">
-                <a:solidFill>
-                  <a:schemeClr val="tx1"/>
-                </a:solidFill>
-                <a:latin typeface="Helvetica" charset="0"/>
-                <a:ea typeface="Helvetica" charset="0"/>
-                <a:cs typeface="Helvetica" charset="0"/>
-              </a:rPr>
-              <a:t>DeJong</a:t>
-            </a:r>
-            <a:r>
-              <a:rPr lang="en-US" dirty="0">
-                <a:solidFill>
-                  <a:schemeClr val="tx1"/>
-                </a:solidFill>
-                <a:latin typeface="Helvetica" charset="0"/>
-                <a:ea typeface="Helvetica" charset="0"/>
-                <a:cs typeface="Helvetica" charset="0"/>
-              </a:rPr>
-              <a:t>. </a:t>
-            </a:r>
-            <a:r>
-              <a:rPr lang="en-US" dirty="0" smtClean="0">
-                <a:solidFill>
-                  <a:schemeClr val="tx1"/>
-                </a:solidFill>
-                <a:latin typeface="Helvetica" charset="0"/>
-                <a:ea typeface="Helvetica" charset="0"/>
-                <a:cs typeface="Helvetica" charset="0"/>
-              </a:rPr>
-              <a:t>“An </a:t>
-            </a:r>
-            <a:r>
-              <a:rPr lang="en-US" dirty="0">
-                <a:solidFill>
-                  <a:schemeClr val="tx1"/>
-                </a:solidFill>
-                <a:latin typeface="Helvetica" charset="0"/>
-                <a:ea typeface="Helvetica" charset="0"/>
-                <a:cs typeface="Helvetica" charset="0"/>
-              </a:rPr>
-              <a:t>analysis of the behavior of a class of genetic adaptive </a:t>
-            </a:r>
-            <a:r>
-              <a:rPr lang="en-US" dirty="0" smtClean="0">
-                <a:solidFill>
-                  <a:schemeClr val="tx1"/>
-                </a:solidFill>
-                <a:latin typeface="Helvetica" charset="0"/>
-                <a:ea typeface="Helvetica" charset="0"/>
-                <a:cs typeface="Helvetica" charset="0"/>
-              </a:rPr>
-              <a:t>systems”. </a:t>
-            </a:r>
-            <a:r>
-              <a:rPr lang="en-US" i="1" dirty="0" smtClean="0">
-                <a:solidFill>
-                  <a:schemeClr val="tx1"/>
-                </a:solidFill>
-                <a:latin typeface="Helvetica" charset="0"/>
-                <a:ea typeface="Helvetica" charset="0"/>
-                <a:cs typeface="Helvetica" charset="0"/>
-              </a:rPr>
-              <a:t>Ph.D</a:t>
-            </a:r>
-            <a:r>
-              <a:rPr lang="en-US" i="1" dirty="0">
-                <a:solidFill>
-                  <a:schemeClr val="tx1"/>
-                </a:solidFill>
-                <a:latin typeface="Helvetica" charset="0"/>
-                <a:ea typeface="Helvetica" charset="0"/>
-                <a:cs typeface="Helvetica" charset="0"/>
-              </a:rPr>
-              <a:t>. </a:t>
-            </a:r>
-            <a:r>
-              <a:rPr lang="en-US" i="1" dirty="0" smtClean="0">
-                <a:solidFill>
-                  <a:schemeClr val="tx1"/>
-                </a:solidFill>
-                <a:latin typeface="Helvetica" charset="0"/>
-                <a:ea typeface="Helvetica" charset="0"/>
-                <a:cs typeface="Helvetica" charset="0"/>
-              </a:rPr>
-              <a:t>Thesis</a:t>
-            </a:r>
-            <a:r>
-              <a:rPr lang="en-US" dirty="0">
-                <a:solidFill>
-                  <a:schemeClr val="tx1"/>
-                </a:solidFill>
-                <a:latin typeface="Helvetica" charset="0"/>
-                <a:ea typeface="Helvetica" charset="0"/>
-                <a:cs typeface="Helvetica" charset="0"/>
-              </a:rPr>
-              <a:t>, University of Michigan, 1975</a:t>
-            </a:r>
-            <a:r>
-              <a:rPr lang="en-US" dirty="0" smtClean="0">
-                <a:solidFill>
-                  <a:schemeClr val="tx1"/>
-                </a:solidFill>
-                <a:latin typeface="Helvetica" charset="0"/>
-                <a:ea typeface="Helvetica" charset="0"/>
-                <a:cs typeface="Helvetica" charset="0"/>
-              </a:rPr>
-              <a:t>.</a:t>
-            </a:r>
-            <a:endParaRPr lang="en-US" dirty="0">
-              <a:solidFill>
-                <a:schemeClr val="tx1"/>
-              </a:solidFill>
-              <a:latin typeface="Helvetica" charset="0"/>
-              <a:ea typeface="Helvetica" charset="0"/>
-              <a:cs typeface="Helvetica" charset="0"/>
-            </a:endParaRPr>
-          </a:p>
-          <a:p>
-            <a:endParaRPr lang="en-US" dirty="0"/>
-          </a:p>
-          <a:p>
-            <a:endParaRPr lang="en-US" dirty="0"/>
-          </a:p>
-        </p:txBody>
-      </p:sp>
-      <p:sp>
-        <p:nvSpPr>
-          <p:cNvPr id="5" name="Slide Number Placeholder 4"/>
-          <p:cNvSpPr>
-            <a:spLocks noGrp="1"/>
-          </p:cNvSpPr>
-          <p:nvPr>
-            <p:ph type="sldNum" sz="quarter" idx="12"/>
-          </p:nvPr>
-        </p:nvSpPr>
-        <p:spPr/>
-        <p:txBody>
-          <a:bodyPr/>
-          <a:lstStyle/>
-          <a:p>
-            <a:fld id="{55774153-6BEA-8641-B7A1-86CE42693FE2}" type="slidenum">
-              <a:rPr lang="en-US" smtClean="0"/>
-              <a:t>24</a:t>
-            </a:fld>
-            <a:endParaRPr lang="en-US"/>
-          </a:p>
-        </p:txBody>
-      </p:sp>
-    </p:spTree>
-    <p:extLst>
-      <p:ext uri="{BB962C8B-B14F-4D97-AF65-F5344CB8AC3E}">
-        <p14:creationId xmlns:p14="http://schemas.microsoft.com/office/powerpoint/2010/main" val="530941430"/>
-      </p:ext>
-    </p:extLst>
-  </p:cSld>
-  <p:clrMapOvr>
-    <a:masterClrMapping/>
-  </p:clrMapOvr>
-  <p:timing>
-    <p:tnLst>
-      <p:par>
-        <p:cTn id="1" dur="indefinite" restart="never" nodeType="tmRoot"/>
-      </p:par>
-    </p:tnLst>
-  </p:timing>
-</p:sld>
-</file>
-
 <file path=ppt/slides/slide26.xml><?xml version="1.0" encoding="utf-8"?>
 <p:sld xmlns:a="http://schemas.openxmlformats.org/drawingml/2006/main" xmlns:r="http://schemas.openxmlformats.org/officeDocument/2006/relationships" xmlns:p="http://schemas.openxmlformats.org/presentationml/2006/main">
   <p:cSld>
@@ -28533,9 +28014,57 @@
                 <a:ea typeface="Helvetica" charset="0"/>
                 <a:cs typeface="Helvetica" charset="0"/>
               </a:rPr>
-              <a:t>Referências</a:t>
-            </a:r>
-            <a:endParaRPr lang="en-US" b="1" dirty="0">
+              <a:t>Otimizações</a:t>
+            </a:r>
+            <a:r>
+              <a:rPr lang="en-US" b="1" dirty="0" smtClean="0">
+                <a:latin typeface="Helvetica" charset="0"/>
+                <a:ea typeface="Helvetica" charset="0"/>
+                <a:cs typeface="Helvetica" charset="0"/>
+              </a:rPr>
+              <a:t> </a:t>
+            </a:r>
+            <a:r>
+              <a:rPr lang="mr-IN" b="1" dirty="0" smtClean="0">
+                <a:latin typeface="Helvetica" charset="0"/>
+                <a:ea typeface="Helvetica" charset="0"/>
+                <a:cs typeface="Helvetica" charset="0"/>
+              </a:rPr>
+              <a:t>–</a:t>
+            </a:r>
+            <a:r>
+              <a:rPr lang="en-US" b="1" dirty="0" smtClean="0">
+                <a:latin typeface="Helvetica" charset="0"/>
+                <a:ea typeface="Helvetica" charset="0"/>
+                <a:cs typeface="Helvetica" charset="0"/>
+              </a:rPr>
+              <a:t> </a:t>
+            </a:r>
+            <a:r>
+              <a:rPr lang="en-US" b="1" dirty="0" smtClean="0">
+                <a:latin typeface="Helvetica" charset="0"/>
+                <a:ea typeface="Helvetica" charset="0"/>
+                <a:cs typeface="Helvetica" charset="0"/>
+              </a:rPr>
+              <a:t>AGA (</a:t>
+            </a:r>
+            <a:r>
+              <a:rPr lang="en-US" b="1" dirty="0" err="1" smtClean="0">
+                <a:latin typeface="Helvetica" charset="0"/>
+                <a:ea typeface="Helvetica" charset="0"/>
+                <a:cs typeface="Helvetica" charset="0"/>
+              </a:rPr>
+              <a:t>Exemplos</a:t>
+            </a:r>
+            <a:r>
+              <a:rPr lang="en-US" b="1" dirty="0" smtClean="0">
+                <a:latin typeface="Helvetica" charset="0"/>
+                <a:ea typeface="Helvetica" charset="0"/>
+                <a:cs typeface="Helvetica" charset="0"/>
+              </a:rPr>
+              <a:t>)</a:t>
+            </a:r>
+            <a:endParaRPr lang="en-US" sz="2800" b="1" dirty="0">
               <a:latin typeface="Helvetica" charset="0"/>
               <a:ea typeface="Helvetica" charset="0"/>
               <a:cs typeface="Helvetica" charset="0"/>
@@ -28545,676 +28074,7 @@
       </p:sp>
       <p:sp>
         <p:nvSpPr>
-          <p:cNvPr id="3" name="Content Placeholder 2"/>
-          <p:cNvSpPr>
-            <a:spLocks noGrp="1"/>
-          </p:cNvSpPr>
-          <p:nvPr>
-            <p:ph idx="1"/>
-          </p:nvPr>
-        </p:nvSpPr>
-        <p:spPr>
-          <a:xfrm>
-            <a:off x="1154954" y="2603500"/>
-            <a:ext cx="10035785" cy="3416300"/>
-          </a:xfrm>
-        </p:spPr>
-        <p:txBody>
-          <a:bodyPr/>
-          <a:lstStyle/>
-          <a:p>
-            <a:r>
-              <a:rPr lang="en-US" dirty="0">
-                <a:solidFill>
-                  <a:schemeClr val="tx1"/>
-                </a:solidFill>
-                <a:latin typeface="Helvetica" charset="0"/>
-                <a:ea typeface="Helvetica" charset="0"/>
-                <a:cs typeface="Helvetica" charset="0"/>
-              </a:rPr>
-              <a:t>[6] </a:t>
-            </a:r>
-            <a:r>
-              <a:rPr lang="en-US" dirty="0" smtClean="0">
-                <a:solidFill>
-                  <a:schemeClr val="tx1"/>
-                </a:solidFill>
-                <a:latin typeface="Helvetica" charset="0"/>
-                <a:ea typeface="Helvetica" charset="0"/>
-                <a:cs typeface="Helvetica" charset="0"/>
-              </a:rPr>
-              <a:t>P</a:t>
-            </a:r>
-            <a:r>
-              <a:rPr lang="en-US" dirty="0">
-                <a:solidFill>
-                  <a:schemeClr val="tx1"/>
-                </a:solidFill>
-                <a:latin typeface="Helvetica" charset="0"/>
-                <a:ea typeface="Helvetica" charset="0"/>
-                <a:cs typeface="Helvetica" charset="0"/>
-              </a:rPr>
-              <a:t>. </a:t>
-            </a:r>
-            <a:r>
-              <a:rPr lang="en-US" dirty="0" err="1">
-                <a:solidFill>
-                  <a:schemeClr val="tx1"/>
-                </a:solidFill>
-                <a:latin typeface="Helvetica" charset="0"/>
-                <a:ea typeface="Helvetica" charset="0"/>
-                <a:cs typeface="Helvetica" charset="0"/>
-              </a:rPr>
-              <a:t>Giguere</a:t>
-            </a:r>
-            <a:r>
-              <a:rPr lang="en-US" dirty="0">
-                <a:solidFill>
-                  <a:schemeClr val="tx1"/>
-                </a:solidFill>
-                <a:latin typeface="Helvetica" charset="0"/>
-                <a:ea typeface="Helvetica" charset="0"/>
-                <a:cs typeface="Helvetica" charset="0"/>
-              </a:rPr>
-              <a:t> and D. E. Goldberg. “Population sizing for optimum sampling with genetic algorithms: A case study of the </a:t>
-            </a:r>
-            <a:r>
-              <a:rPr lang="en-US" dirty="0" err="1">
-                <a:solidFill>
-                  <a:schemeClr val="tx1"/>
-                </a:solidFill>
-                <a:latin typeface="Helvetica" charset="0"/>
-                <a:ea typeface="Helvetica" charset="0"/>
-                <a:cs typeface="Helvetica" charset="0"/>
-              </a:rPr>
-              <a:t>onemax</a:t>
-            </a:r>
-            <a:r>
-              <a:rPr lang="en-US" dirty="0">
-                <a:solidFill>
-                  <a:schemeClr val="tx1"/>
-                </a:solidFill>
-                <a:latin typeface="Helvetica" charset="0"/>
-                <a:ea typeface="Helvetica" charset="0"/>
-                <a:cs typeface="Helvetica" charset="0"/>
-              </a:rPr>
-              <a:t> problem”. </a:t>
-            </a:r>
-            <a:r>
-              <a:rPr lang="en-US" i="1" dirty="0">
-                <a:solidFill>
-                  <a:schemeClr val="tx1"/>
-                </a:solidFill>
-                <a:latin typeface="Helvetica" charset="0"/>
-                <a:ea typeface="Helvetica" charset="0"/>
-                <a:cs typeface="Helvetica" charset="0"/>
-              </a:rPr>
-              <a:t>Genetic Programming</a:t>
-            </a:r>
-            <a:r>
-              <a:rPr lang="en-US" dirty="0">
-                <a:solidFill>
-                  <a:schemeClr val="tx1"/>
-                </a:solidFill>
-                <a:latin typeface="Helvetica" charset="0"/>
-                <a:ea typeface="Helvetica" charset="0"/>
-                <a:cs typeface="Helvetica" charset="0"/>
-              </a:rPr>
-              <a:t>, 98:496–503, 1998. </a:t>
-            </a:r>
-          </a:p>
-          <a:p>
-            <a:r>
-              <a:rPr lang="en-US" dirty="0" smtClean="0">
-                <a:solidFill>
-                  <a:schemeClr val="tx1"/>
-                </a:solidFill>
-                <a:latin typeface="Helvetica" charset="0"/>
-                <a:ea typeface="Helvetica" charset="0"/>
-                <a:cs typeface="Helvetica" charset="0"/>
-              </a:rPr>
-              <a:t>[7]</a:t>
-            </a:r>
-            <a:r>
-              <a:rPr lang="en-US" dirty="0">
-                <a:solidFill>
-                  <a:schemeClr val="tx1"/>
-                </a:solidFill>
-                <a:latin typeface="Helvetica" charset="0"/>
-                <a:ea typeface="Helvetica" charset="0"/>
-                <a:cs typeface="Helvetica" charset="0"/>
-              </a:rPr>
-              <a:t> D. L. Applegate, R. E. Bixby, V. </a:t>
-            </a:r>
-            <a:r>
-              <a:rPr lang="en-US" dirty="0" err="1">
-                <a:solidFill>
-                  <a:schemeClr val="tx1"/>
-                </a:solidFill>
-                <a:latin typeface="Helvetica" charset="0"/>
-                <a:ea typeface="Helvetica" charset="0"/>
-                <a:cs typeface="Helvetica" charset="0"/>
-              </a:rPr>
-              <a:t>Chvatal</a:t>
-            </a:r>
-            <a:r>
-              <a:rPr lang="en-US" dirty="0">
-                <a:solidFill>
-                  <a:schemeClr val="tx1"/>
-                </a:solidFill>
-                <a:latin typeface="Helvetica" charset="0"/>
-                <a:ea typeface="Helvetica" charset="0"/>
-                <a:cs typeface="Helvetica" charset="0"/>
-              </a:rPr>
-              <a:t>, and W. J. Cook. </a:t>
-            </a:r>
-            <a:r>
-              <a:rPr lang="en-US" dirty="0" smtClean="0">
-                <a:solidFill>
-                  <a:schemeClr val="tx1"/>
-                </a:solidFill>
-                <a:latin typeface="Helvetica" charset="0"/>
-                <a:ea typeface="Helvetica" charset="0"/>
-                <a:cs typeface="Helvetica" charset="0"/>
-              </a:rPr>
-              <a:t>"The </a:t>
-            </a:r>
-            <a:r>
-              <a:rPr lang="en-US" dirty="0">
-                <a:solidFill>
-                  <a:schemeClr val="tx1"/>
-                </a:solidFill>
-                <a:latin typeface="Helvetica" charset="0"/>
-                <a:ea typeface="Helvetica" charset="0"/>
-                <a:cs typeface="Helvetica" charset="0"/>
-              </a:rPr>
-              <a:t>Traveling Salesman Problem: a computational </a:t>
-            </a:r>
-            <a:r>
-              <a:rPr lang="en-US" dirty="0" smtClean="0">
-                <a:solidFill>
-                  <a:schemeClr val="tx1"/>
-                </a:solidFill>
-                <a:latin typeface="Helvetica" charset="0"/>
-                <a:ea typeface="Helvetica" charset="0"/>
-                <a:cs typeface="Helvetica" charset="0"/>
-              </a:rPr>
-              <a:t>study". </a:t>
-            </a:r>
-            <a:r>
-              <a:rPr lang="en-US" i="1" dirty="0">
-                <a:solidFill>
-                  <a:schemeClr val="tx1"/>
-                </a:solidFill>
-                <a:latin typeface="Helvetica" charset="0"/>
-                <a:ea typeface="Helvetica" charset="0"/>
-                <a:cs typeface="Helvetica" charset="0"/>
-              </a:rPr>
-              <a:t>Princeton </a:t>
-            </a:r>
-            <a:r>
-              <a:rPr lang="en-US" i="1" dirty="0" smtClean="0">
-                <a:solidFill>
-                  <a:schemeClr val="tx1"/>
-                </a:solidFill>
-                <a:latin typeface="Helvetica" charset="0"/>
-                <a:ea typeface="Helvetica" charset="0"/>
-                <a:cs typeface="Helvetica" charset="0"/>
-              </a:rPr>
-              <a:t>University </a:t>
-            </a:r>
-            <a:r>
-              <a:rPr lang="en-US" i="1" dirty="0">
-                <a:solidFill>
-                  <a:schemeClr val="tx1"/>
-                </a:solidFill>
-                <a:latin typeface="Helvetica" charset="0"/>
-                <a:ea typeface="Helvetica" charset="0"/>
-                <a:cs typeface="Helvetica" charset="0"/>
-              </a:rPr>
-              <a:t>P</a:t>
-            </a:r>
-            <a:r>
-              <a:rPr lang="en-US" i="1" dirty="0" smtClean="0">
-                <a:solidFill>
-                  <a:schemeClr val="tx1"/>
-                </a:solidFill>
-                <a:latin typeface="Helvetica" charset="0"/>
-                <a:ea typeface="Helvetica" charset="0"/>
-                <a:cs typeface="Helvetica" charset="0"/>
-              </a:rPr>
-              <a:t>ress</a:t>
-            </a:r>
-            <a:r>
-              <a:rPr lang="en-US" dirty="0">
-                <a:solidFill>
-                  <a:schemeClr val="tx1"/>
-                </a:solidFill>
-                <a:latin typeface="Helvetica" charset="0"/>
-                <a:ea typeface="Helvetica" charset="0"/>
-                <a:cs typeface="Helvetica" charset="0"/>
-              </a:rPr>
-              <a:t>, 2011. </a:t>
-            </a:r>
-            <a:endParaRPr lang="en-US" dirty="0" smtClean="0">
-              <a:solidFill>
-                <a:schemeClr val="tx1"/>
-              </a:solidFill>
-              <a:latin typeface="Helvetica" charset="0"/>
-              <a:ea typeface="Helvetica" charset="0"/>
-              <a:cs typeface="Helvetica" charset="0"/>
-            </a:endParaRPr>
-          </a:p>
-          <a:p>
-            <a:r>
-              <a:rPr lang="en-US" dirty="0" smtClean="0">
-                <a:solidFill>
-                  <a:schemeClr val="tx1"/>
-                </a:solidFill>
-                <a:latin typeface="Helvetica" charset="0"/>
-                <a:ea typeface="Helvetica" charset="0"/>
-                <a:cs typeface="Helvetica" charset="0"/>
-              </a:rPr>
-              <a:t>[8] </a:t>
-            </a:r>
-            <a:r>
-              <a:rPr lang="en-US" dirty="0">
-                <a:solidFill>
-                  <a:schemeClr val="tx1"/>
-                </a:solidFill>
-                <a:latin typeface="Helvetica" charset="0"/>
-                <a:ea typeface="Helvetica" charset="0"/>
-                <a:cs typeface="Helvetica" charset="0"/>
-              </a:rPr>
-              <a:t>T. H. </a:t>
-            </a:r>
-            <a:r>
-              <a:rPr lang="en-US" dirty="0" err="1">
-                <a:solidFill>
-                  <a:schemeClr val="tx1"/>
-                </a:solidFill>
-                <a:latin typeface="Helvetica" charset="0"/>
-                <a:ea typeface="Helvetica" charset="0"/>
-                <a:cs typeface="Helvetica" charset="0"/>
-              </a:rPr>
-              <a:t>Cormen</a:t>
-            </a:r>
-            <a:r>
-              <a:rPr lang="en-US" dirty="0">
-                <a:solidFill>
-                  <a:schemeClr val="tx1"/>
-                </a:solidFill>
-                <a:latin typeface="Helvetica" charset="0"/>
-                <a:ea typeface="Helvetica" charset="0"/>
-                <a:cs typeface="Helvetica" charset="0"/>
-              </a:rPr>
-              <a:t>, C. E. </a:t>
-            </a:r>
-            <a:r>
-              <a:rPr lang="en-US" dirty="0" err="1">
-                <a:solidFill>
-                  <a:schemeClr val="tx1"/>
-                </a:solidFill>
-                <a:latin typeface="Helvetica" charset="0"/>
-                <a:ea typeface="Helvetica" charset="0"/>
-                <a:cs typeface="Helvetica" charset="0"/>
-              </a:rPr>
-              <a:t>Leiserson</a:t>
-            </a:r>
-            <a:r>
-              <a:rPr lang="en-US" dirty="0">
-                <a:solidFill>
-                  <a:schemeClr val="tx1"/>
-                </a:solidFill>
-                <a:latin typeface="Helvetica" charset="0"/>
-                <a:ea typeface="Helvetica" charset="0"/>
-                <a:cs typeface="Helvetica" charset="0"/>
-              </a:rPr>
-              <a:t>, R. L. </a:t>
-            </a:r>
-            <a:r>
-              <a:rPr lang="en-US" dirty="0" err="1">
-                <a:solidFill>
-                  <a:schemeClr val="tx1"/>
-                </a:solidFill>
-                <a:latin typeface="Helvetica" charset="0"/>
-                <a:ea typeface="Helvetica" charset="0"/>
-                <a:cs typeface="Helvetica" charset="0"/>
-              </a:rPr>
-              <a:t>Rivest</a:t>
-            </a:r>
-            <a:r>
-              <a:rPr lang="en-US" dirty="0">
-                <a:solidFill>
-                  <a:schemeClr val="tx1"/>
-                </a:solidFill>
-                <a:latin typeface="Helvetica" charset="0"/>
-                <a:ea typeface="Helvetica" charset="0"/>
-                <a:cs typeface="Helvetica" charset="0"/>
-              </a:rPr>
-              <a:t>, et al. </a:t>
-            </a:r>
-            <a:r>
-              <a:rPr lang="en-US" dirty="0" smtClean="0">
-                <a:solidFill>
-                  <a:schemeClr val="tx1"/>
-                </a:solidFill>
-                <a:latin typeface="Helvetica" charset="0"/>
-                <a:ea typeface="Helvetica" charset="0"/>
-                <a:cs typeface="Helvetica" charset="0"/>
-              </a:rPr>
-              <a:t>"Section </a:t>
-            </a:r>
-            <a:r>
-              <a:rPr lang="en-US" dirty="0">
-                <a:solidFill>
-                  <a:schemeClr val="tx1"/>
-                </a:solidFill>
-                <a:latin typeface="Helvetica" charset="0"/>
-                <a:ea typeface="Helvetica" charset="0"/>
-                <a:cs typeface="Helvetica" charset="0"/>
-              </a:rPr>
-              <a:t>24.3: </a:t>
-            </a:r>
-            <a:r>
-              <a:rPr lang="en-US" dirty="0" err="1">
-                <a:solidFill>
-                  <a:schemeClr val="tx1"/>
-                </a:solidFill>
-                <a:latin typeface="Helvetica" charset="0"/>
-                <a:ea typeface="Helvetica" charset="0"/>
-                <a:cs typeface="Helvetica" charset="0"/>
-              </a:rPr>
-              <a:t>Dijkstra’s</a:t>
-            </a:r>
-            <a:r>
-              <a:rPr lang="en-US" dirty="0">
-                <a:solidFill>
-                  <a:schemeClr val="tx1"/>
-                </a:solidFill>
-                <a:latin typeface="Helvetica" charset="0"/>
-                <a:ea typeface="Helvetica" charset="0"/>
-                <a:cs typeface="Helvetica" charset="0"/>
-              </a:rPr>
-              <a:t> </a:t>
-            </a:r>
-            <a:r>
-              <a:rPr lang="en-US" dirty="0" smtClean="0">
-                <a:solidFill>
-                  <a:schemeClr val="tx1"/>
-                </a:solidFill>
-                <a:latin typeface="Helvetica" charset="0"/>
-                <a:ea typeface="Helvetica" charset="0"/>
-                <a:cs typeface="Helvetica" charset="0"/>
-              </a:rPr>
-              <a:t>algorithm”. </a:t>
-            </a:r>
-            <a:r>
-              <a:rPr lang="en-US" i="1" dirty="0" smtClean="0">
-                <a:solidFill>
-                  <a:schemeClr val="tx1"/>
-                </a:solidFill>
-                <a:latin typeface="Helvetica" charset="0"/>
-                <a:ea typeface="Helvetica" charset="0"/>
-                <a:cs typeface="Helvetica" charset="0"/>
-              </a:rPr>
-              <a:t>MIT Press </a:t>
-            </a:r>
-            <a:r>
-              <a:rPr lang="en-US" i="1" dirty="0">
-                <a:solidFill>
-                  <a:schemeClr val="tx1"/>
-                </a:solidFill>
-                <a:latin typeface="Helvetica" charset="0"/>
-                <a:ea typeface="Helvetica" charset="0"/>
-                <a:cs typeface="Helvetica" charset="0"/>
-              </a:rPr>
-              <a:t>and McGraw-Hill</a:t>
-            </a:r>
-            <a:r>
-              <a:rPr lang="en-US" dirty="0">
-                <a:solidFill>
-                  <a:schemeClr val="tx1"/>
-                </a:solidFill>
-                <a:latin typeface="Helvetica" charset="0"/>
-                <a:ea typeface="Helvetica" charset="0"/>
-                <a:cs typeface="Helvetica" charset="0"/>
-              </a:rPr>
-              <a:t>, 2001. </a:t>
-            </a:r>
-            <a:endParaRPr lang="en-US" dirty="0" smtClean="0">
-              <a:solidFill>
-                <a:schemeClr val="tx1"/>
-              </a:solidFill>
-              <a:latin typeface="Helvetica" charset="0"/>
-              <a:ea typeface="Helvetica" charset="0"/>
-              <a:cs typeface="Helvetica" charset="0"/>
-            </a:endParaRPr>
-          </a:p>
-          <a:p>
-            <a:r>
-              <a:rPr lang="en-US" dirty="0" smtClean="0">
-                <a:solidFill>
-                  <a:schemeClr val="tx1"/>
-                </a:solidFill>
-                <a:latin typeface="Helvetica" charset="0"/>
-                <a:ea typeface="Helvetica" charset="0"/>
-                <a:cs typeface="Helvetica" charset="0"/>
-              </a:rPr>
-              <a:t>[9] </a:t>
-            </a:r>
-            <a:r>
-              <a:rPr lang="en-US" dirty="0">
-                <a:solidFill>
-                  <a:schemeClr val="tx1"/>
-                </a:solidFill>
-                <a:latin typeface="Helvetica" charset="0"/>
-                <a:ea typeface="Helvetica" charset="0"/>
-                <a:cs typeface="Helvetica" charset="0"/>
-              </a:rPr>
-              <a:t>M. Mitchell. </a:t>
-            </a:r>
-            <a:r>
-              <a:rPr lang="en-US" dirty="0" smtClean="0">
-                <a:solidFill>
-                  <a:schemeClr val="tx1"/>
-                </a:solidFill>
-                <a:latin typeface="Helvetica" charset="0"/>
-                <a:ea typeface="Helvetica" charset="0"/>
-                <a:cs typeface="Helvetica" charset="0"/>
-              </a:rPr>
-              <a:t>"An </a:t>
-            </a:r>
-            <a:r>
-              <a:rPr lang="en-US" dirty="0">
-                <a:solidFill>
-                  <a:schemeClr val="tx1"/>
-                </a:solidFill>
-                <a:latin typeface="Helvetica" charset="0"/>
-                <a:ea typeface="Helvetica" charset="0"/>
-                <a:cs typeface="Helvetica" charset="0"/>
-              </a:rPr>
-              <a:t>introduction to genetic </a:t>
-            </a:r>
-            <a:r>
-              <a:rPr lang="en-US" dirty="0" smtClean="0">
-                <a:solidFill>
-                  <a:schemeClr val="tx1"/>
-                </a:solidFill>
-                <a:latin typeface="Helvetica" charset="0"/>
-                <a:ea typeface="Helvetica" charset="0"/>
-                <a:cs typeface="Helvetica" charset="0"/>
-              </a:rPr>
-              <a:t>algorithms". </a:t>
-            </a:r>
-            <a:r>
-              <a:rPr lang="en-US" i="1" dirty="0">
-                <a:solidFill>
-                  <a:schemeClr val="tx1"/>
-                </a:solidFill>
-                <a:latin typeface="Helvetica" charset="0"/>
-                <a:ea typeface="Helvetica" charset="0"/>
-                <a:cs typeface="Helvetica" charset="0"/>
-              </a:rPr>
-              <a:t>MIT </a:t>
-            </a:r>
-            <a:r>
-              <a:rPr lang="en-US" i="1" dirty="0" smtClean="0">
-                <a:solidFill>
-                  <a:schemeClr val="tx1"/>
-                </a:solidFill>
-                <a:latin typeface="Helvetica" charset="0"/>
-                <a:ea typeface="Helvetica" charset="0"/>
-                <a:cs typeface="Helvetica" charset="0"/>
-              </a:rPr>
-              <a:t>Press</a:t>
-            </a:r>
-            <a:r>
-              <a:rPr lang="en-US" dirty="0">
-                <a:solidFill>
-                  <a:schemeClr val="tx1"/>
-                </a:solidFill>
-                <a:latin typeface="Helvetica" charset="0"/>
-                <a:ea typeface="Helvetica" charset="0"/>
-                <a:cs typeface="Helvetica" charset="0"/>
-              </a:rPr>
-              <a:t>, 1998. </a:t>
-            </a:r>
-            <a:endParaRPr lang="en-US" dirty="0" smtClean="0">
-              <a:solidFill>
-                <a:schemeClr val="tx1"/>
-              </a:solidFill>
-              <a:latin typeface="Helvetica" charset="0"/>
-              <a:ea typeface="Helvetica" charset="0"/>
-              <a:cs typeface="Helvetica" charset="0"/>
-            </a:endParaRPr>
-          </a:p>
-          <a:p>
-            <a:r>
-              <a:rPr lang="en-US" dirty="0" smtClean="0">
-                <a:solidFill>
-                  <a:schemeClr val="tx1"/>
-                </a:solidFill>
-                <a:latin typeface="Helvetica" charset="0"/>
-                <a:ea typeface="Helvetica" charset="0"/>
-                <a:cs typeface="Helvetica" charset="0"/>
-              </a:rPr>
-              <a:t>[10] M</a:t>
-            </a:r>
-            <a:r>
-              <a:rPr lang="en-US" dirty="0">
-                <a:solidFill>
-                  <a:schemeClr val="tx1"/>
-                </a:solidFill>
-                <a:latin typeface="Helvetica" charset="0"/>
-                <a:ea typeface="Helvetica" charset="0"/>
-                <a:cs typeface="Helvetica" charset="0"/>
-              </a:rPr>
-              <a:t>. Srinivas and L. M. </a:t>
-            </a:r>
-            <a:r>
-              <a:rPr lang="en-US" dirty="0" err="1">
-                <a:solidFill>
-                  <a:schemeClr val="tx1"/>
-                </a:solidFill>
-                <a:latin typeface="Helvetica" charset="0"/>
-                <a:ea typeface="Helvetica" charset="0"/>
-                <a:cs typeface="Helvetica" charset="0"/>
-              </a:rPr>
-              <a:t>Patnaik</a:t>
-            </a:r>
-            <a:r>
-              <a:rPr lang="en-US" dirty="0">
-                <a:solidFill>
-                  <a:schemeClr val="tx1"/>
-                </a:solidFill>
-                <a:latin typeface="Helvetica" charset="0"/>
-                <a:ea typeface="Helvetica" charset="0"/>
-                <a:cs typeface="Helvetica" charset="0"/>
-              </a:rPr>
-              <a:t>. </a:t>
-            </a:r>
-            <a:r>
-              <a:rPr lang="en-US" dirty="0" smtClean="0">
-                <a:solidFill>
-                  <a:schemeClr val="tx1"/>
-                </a:solidFill>
-                <a:latin typeface="Helvetica" charset="0"/>
-                <a:ea typeface="Helvetica" charset="0"/>
-                <a:cs typeface="Helvetica" charset="0"/>
-              </a:rPr>
-              <a:t>"Adaptive </a:t>
-            </a:r>
-            <a:r>
-              <a:rPr lang="en-US" dirty="0">
-                <a:solidFill>
-                  <a:schemeClr val="tx1"/>
-                </a:solidFill>
-                <a:latin typeface="Helvetica" charset="0"/>
-                <a:ea typeface="Helvetica" charset="0"/>
-                <a:cs typeface="Helvetica" charset="0"/>
-              </a:rPr>
-              <a:t>probabilities of crossover and mutation in genetic </a:t>
-            </a:r>
-            <a:r>
-              <a:rPr lang="en-US" dirty="0" smtClean="0">
-                <a:solidFill>
-                  <a:schemeClr val="tx1"/>
-                </a:solidFill>
-                <a:latin typeface="Helvetica" charset="0"/>
-                <a:ea typeface="Helvetica" charset="0"/>
-                <a:cs typeface="Helvetica" charset="0"/>
-              </a:rPr>
-              <a:t>algorithms". </a:t>
-            </a:r>
-            <a:r>
-              <a:rPr lang="en-US" i="1" dirty="0">
-                <a:solidFill>
-                  <a:schemeClr val="tx1"/>
-                </a:solidFill>
-                <a:latin typeface="Helvetica" charset="0"/>
-                <a:ea typeface="Helvetica" charset="0"/>
-                <a:cs typeface="Helvetica" charset="0"/>
-              </a:rPr>
-              <a:t>IEEE Transactions on Systems, Man, and Cybernetics</a:t>
-            </a:r>
-            <a:r>
-              <a:rPr lang="en-US" dirty="0">
-                <a:solidFill>
-                  <a:schemeClr val="tx1"/>
-                </a:solidFill>
-                <a:latin typeface="Helvetica" charset="0"/>
-                <a:ea typeface="Helvetica" charset="0"/>
-                <a:cs typeface="Helvetica" charset="0"/>
-              </a:rPr>
-              <a:t>, 24(4):656–667, 1994. </a:t>
-            </a:r>
-          </a:p>
-          <a:p>
-            <a:endParaRPr lang="en-US" dirty="0">
-              <a:solidFill>
-                <a:schemeClr val="tx1"/>
-              </a:solidFill>
-              <a:latin typeface="Helvetica" charset="0"/>
-              <a:ea typeface="Helvetica" charset="0"/>
-              <a:cs typeface="Helvetica" charset="0"/>
-            </a:endParaRPr>
-          </a:p>
-          <a:p>
-            <a:endParaRPr lang="en-US" dirty="0">
-              <a:solidFill>
-                <a:schemeClr val="tx1"/>
-              </a:solidFill>
-              <a:latin typeface="Helvetica" charset="0"/>
-              <a:ea typeface="Helvetica" charset="0"/>
-              <a:cs typeface="Helvetica" charset="0"/>
-            </a:endParaRPr>
-          </a:p>
-        </p:txBody>
-      </p:sp>
-      <p:sp>
-        <p:nvSpPr>
-          <p:cNvPr id="4" name="Slide Number Placeholder 3"/>
+          <p:cNvPr id="5" name="Slide Number Placeholder 4"/>
           <p:cNvSpPr>
             <a:spLocks noGrp="1"/>
           </p:cNvSpPr>
@@ -29235,10 +28095,39 @@
           </a:p>
         </p:txBody>
       </p:sp>
+      <p:pic>
+        <p:nvPicPr>
+          <p:cNvPr id="8" name="Content Placeholder 7"/>
+          <p:cNvPicPr>
+            <a:picLocks noGrp="1" noChangeAspect="1"/>
+          </p:cNvPicPr>
+          <p:nvPr>
+            <p:ph idx="1"/>
+          </p:nvPr>
+        </p:nvPicPr>
+        <p:blipFill>
+          <a:blip r:embed="rId3">
+            <a:extLst>
+              <a:ext uri="{28A0092B-C50C-407E-A947-70E740481C1C}">
+                <a14:useLocalDpi xmlns:a14="http://schemas.microsoft.com/office/drawing/2010/main" val="0"/>
+              </a:ext>
+            </a:extLst>
+          </a:blip>
+          <a:stretch>
+            <a:fillRect/>
+          </a:stretch>
+        </p:blipFill>
+        <p:spPr>
+          <a:xfrm>
+            <a:off x="2261470" y="2603500"/>
+            <a:ext cx="6613372" cy="3416300"/>
+          </a:xfrm>
+        </p:spPr>
+      </p:pic>
     </p:spTree>
     <p:extLst>
       <p:ext uri="{BB962C8B-B14F-4D97-AF65-F5344CB8AC3E}">
-        <p14:creationId xmlns:p14="http://schemas.microsoft.com/office/powerpoint/2010/main" val="2080831962"/>
+        <p14:creationId xmlns:p14="http://schemas.microsoft.com/office/powerpoint/2010/main" val="516589236"/>
       </p:ext>
     </p:extLst>
   </p:cSld>
@@ -29293,6 +28182,1116 @@
                 <a:ea typeface="Helvetica" charset="0"/>
                 <a:cs typeface="Helvetica" charset="0"/>
               </a:rPr>
+              <a:t>Análises</a:t>
+            </a:r>
+            <a:r>
+              <a:rPr lang="en-US" b="1" dirty="0" smtClean="0">
+                <a:latin typeface="Helvetica" charset="0"/>
+                <a:ea typeface="Helvetica" charset="0"/>
+                <a:cs typeface="Helvetica" charset="0"/>
+              </a:rPr>
+              <a:t> e </a:t>
+            </a:r>
+            <a:r>
+              <a:rPr lang="en-US" b="1" dirty="0" err="1" smtClean="0">
+                <a:latin typeface="Helvetica" charset="0"/>
+                <a:ea typeface="Helvetica" charset="0"/>
+                <a:cs typeface="Helvetica" charset="0"/>
+              </a:rPr>
+              <a:t>Resultados</a:t>
+            </a:r>
+            <a:endParaRPr lang="en-US" sz="2800" b="1" dirty="0">
+              <a:latin typeface="Helvetica" charset="0"/>
+              <a:ea typeface="Helvetica" charset="0"/>
+              <a:cs typeface="Helvetica" charset="0"/>
+            </a:endParaRPr>
+          </a:p>
+        </p:txBody>
+      </p:sp>
+      <p:sp>
+        <p:nvSpPr>
+          <p:cNvPr id="3" name="Content Placeholder 2"/>
+          <p:cNvSpPr>
+            <a:spLocks noGrp="1"/>
+          </p:cNvSpPr>
+          <p:nvPr>
+            <p:ph idx="1"/>
+          </p:nvPr>
+        </p:nvSpPr>
+        <p:spPr>
+          <a:xfrm>
+            <a:off x="1154954" y="2603500"/>
+            <a:ext cx="9647158" cy="4126484"/>
+          </a:xfrm>
+        </p:spPr>
+        <p:txBody>
+          <a:bodyPr>
+            <a:normAutofit/>
+          </a:bodyPr>
+          <a:lstStyle/>
+          <a:p>
+            <a:r>
+              <a:rPr lang="en-US" dirty="0" err="1">
+                <a:solidFill>
+                  <a:schemeClr val="tx1"/>
+                </a:solidFill>
+                <a:latin typeface="Helvetica" charset="0"/>
+                <a:ea typeface="Helvetica" charset="0"/>
+                <a:cs typeface="Helvetica" charset="0"/>
+              </a:rPr>
+              <a:t>T</a:t>
+            </a:r>
+            <a:r>
+              <a:rPr lang="en-US" dirty="0" err="1" smtClean="0">
+                <a:solidFill>
+                  <a:schemeClr val="tx1"/>
+                </a:solidFill>
+                <a:latin typeface="Helvetica" charset="0"/>
+                <a:ea typeface="Helvetica" charset="0"/>
+                <a:cs typeface="Helvetica" charset="0"/>
+              </a:rPr>
+              <a:t>exto</a:t>
+            </a:r>
+            <a:r>
+              <a:rPr lang="en-US" dirty="0" smtClean="0">
+                <a:solidFill>
+                  <a:schemeClr val="tx1"/>
+                </a:solidFill>
+                <a:latin typeface="Helvetica" charset="0"/>
+                <a:ea typeface="Helvetica" charset="0"/>
+                <a:cs typeface="Helvetica" charset="0"/>
+              </a:rPr>
+              <a:t> </a:t>
+            </a:r>
+            <a:r>
+              <a:rPr lang="en-US" dirty="0" err="1" smtClean="0">
+                <a:solidFill>
+                  <a:schemeClr val="tx1"/>
+                </a:solidFill>
+                <a:latin typeface="Helvetica" charset="0"/>
+                <a:ea typeface="Helvetica" charset="0"/>
+                <a:cs typeface="Helvetica" charset="0"/>
+              </a:rPr>
+              <a:t>aqui</a:t>
+            </a:r>
+            <a:endParaRPr lang="en-US" i="1" baseline="-25000" dirty="0" smtClean="0">
+              <a:solidFill>
+                <a:schemeClr val="tx1"/>
+              </a:solidFill>
+              <a:latin typeface="Helvetica" charset="0"/>
+              <a:ea typeface="Helvetica" charset="0"/>
+              <a:cs typeface="Helvetica" charset="0"/>
+            </a:endParaRPr>
+          </a:p>
+        </p:txBody>
+      </p:sp>
+      <p:sp>
+        <p:nvSpPr>
+          <p:cNvPr id="5" name="Slide Number Placeholder 4"/>
+          <p:cNvSpPr>
+            <a:spLocks noGrp="1"/>
+          </p:cNvSpPr>
+          <p:nvPr>
+            <p:ph type="sldNum" sz="quarter" idx="12"/>
+          </p:nvPr>
+        </p:nvSpPr>
+        <p:spPr/>
+        <p:txBody>
+          <a:bodyPr/>
+          <a:lstStyle/>
+          <a:p>
+            <a:fld id="{55774153-6BEA-8641-B7A1-86CE42693FE2}" type="slidenum">
+              <a:rPr lang="en-US" smtClean="0"/>
+              <a:t>26</a:t>
+            </a:fld>
+            <a:endParaRPr lang="en-US"/>
+          </a:p>
+        </p:txBody>
+      </p:sp>
+    </p:spTree>
+    <p:extLst>
+      <p:ext uri="{BB962C8B-B14F-4D97-AF65-F5344CB8AC3E}">
+        <p14:creationId xmlns:p14="http://schemas.microsoft.com/office/powerpoint/2010/main" val="1732599681"/>
+      </p:ext>
+    </p:extLst>
+  </p:cSld>
+  <p:clrMapOvr>
+    <a:masterClrMapping/>
+  </p:clrMapOvr>
+  <p:timing>
+    <p:tnLst>
+      <p:par>
+        <p:cTn id="1" dur="indefinite" restart="never" nodeType="tmRoot"/>
+      </p:par>
+    </p:tnLst>
+  </p:timing>
+</p:sld>
+</file>
+
+<file path=ppt/slides/slide28.xml><?xml version="1.0" encoding="utf-8"?>
+<p:sld xmlns:a="http://schemas.openxmlformats.org/drawingml/2006/main" xmlns:r="http://schemas.openxmlformats.org/officeDocument/2006/relationships" xmlns:p="http://schemas.openxmlformats.org/presentationml/2006/main">
+  <p:cSld>
+    <p:spTree>
+      <p:nvGrpSpPr>
+        <p:cNvPr id="1" name=""/>
+        <p:cNvGrpSpPr/>
+        <p:nvPr/>
+      </p:nvGrpSpPr>
+      <p:grpSpPr>
+        <a:xfrm>
+          <a:off x="0" y="0"/>
+          <a:ext cx="0" cy="0"/>
+          <a:chOff x="0" y="0"/>
+          <a:chExt cx="0" cy="0"/>
+        </a:xfrm>
+      </p:grpSpPr>
+      <p:sp>
+        <p:nvSpPr>
+          <p:cNvPr id="2" name="Title 1"/>
+          <p:cNvSpPr>
+            <a:spLocks noGrp="1"/>
+          </p:cNvSpPr>
+          <p:nvPr>
+            <p:ph type="title"/>
+          </p:nvPr>
+        </p:nvSpPr>
+        <p:spPr/>
+        <p:txBody>
+          <a:bodyPr/>
+          <a:lstStyle/>
+          <a:p>
+            <a:r>
+              <a:rPr lang="en-US" b="1" dirty="0" err="1" smtClean="0">
+                <a:latin typeface="Helvetica" charset="0"/>
+                <a:ea typeface="Helvetica" charset="0"/>
+                <a:cs typeface="Helvetica" charset="0"/>
+              </a:rPr>
+              <a:t>Referências</a:t>
+            </a:r>
+            <a:endParaRPr lang="en-US" b="1" dirty="0">
+              <a:latin typeface="Helvetica" charset="0"/>
+              <a:ea typeface="Helvetica" charset="0"/>
+              <a:cs typeface="Helvetica" charset="0"/>
+            </a:endParaRPr>
+          </a:p>
+        </p:txBody>
+      </p:sp>
+      <p:sp>
+        <p:nvSpPr>
+          <p:cNvPr id="3" name="Content Placeholder 2"/>
+          <p:cNvSpPr>
+            <a:spLocks noGrp="1"/>
+          </p:cNvSpPr>
+          <p:nvPr>
+            <p:ph idx="1"/>
+          </p:nvPr>
+        </p:nvSpPr>
+        <p:spPr>
+          <a:xfrm>
+            <a:off x="1154954" y="2603500"/>
+            <a:ext cx="10035785" cy="4102100"/>
+          </a:xfrm>
+        </p:spPr>
+        <p:txBody>
+          <a:bodyPr>
+            <a:normAutofit/>
+          </a:bodyPr>
+          <a:lstStyle/>
+          <a:p>
+            <a:r>
+              <a:rPr lang="en-US" dirty="0" smtClean="0">
+                <a:solidFill>
+                  <a:schemeClr val="tx1"/>
+                </a:solidFill>
+                <a:latin typeface="Helvetica" charset="0"/>
+                <a:ea typeface="Helvetica" charset="0"/>
+                <a:cs typeface="Helvetica" charset="0"/>
+              </a:rPr>
+              <a:t>[1] </a:t>
+            </a:r>
+            <a:r>
+              <a:rPr lang="en-US" dirty="0">
+                <a:solidFill>
+                  <a:schemeClr val="tx1"/>
+                </a:solidFill>
+                <a:latin typeface="Helvetica" charset="0"/>
+                <a:ea typeface="Helvetica" charset="0"/>
+                <a:cs typeface="Helvetica" charset="0"/>
+              </a:rPr>
+              <a:t>A. E. </a:t>
+            </a:r>
+            <a:r>
+              <a:rPr lang="en-US" dirty="0" err="1" smtClean="0">
+                <a:solidFill>
+                  <a:schemeClr val="tx1"/>
+                </a:solidFill>
+                <a:latin typeface="Helvetica" charset="0"/>
+                <a:ea typeface="Helvetica" charset="0"/>
+                <a:cs typeface="Helvetica" charset="0"/>
+              </a:rPr>
+              <a:t>Eiben</a:t>
+            </a:r>
+            <a:r>
+              <a:rPr lang="en-US" dirty="0" smtClean="0">
+                <a:solidFill>
+                  <a:schemeClr val="tx1"/>
+                </a:solidFill>
+                <a:latin typeface="Helvetica" charset="0"/>
+                <a:ea typeface="Helvetica" charset="0"/>
+                <a:cs typeface="Helvetica" charset="0"/>
+              </a:rPr>
+              <a:t>, J</a:t>
+            </a:r>
+            <a:r>
+              <a:rPr lang="en-US" dirty="0">
+                <a:solidFill>
+                  <a:schemeClr val="tx1"/>
+                </a:solidFill>
+                <a:latin typeface="Helvetica" charset="0"/>
+                <a:ea typeface="Helvetica" charset="0"/>
+                <a:cs typeface="Helvetica" charset="0"/>
+              </a:rPr>
+              <a:t>. E. Smith. </a:t>
+            </a:r>
+            <a:r>
+              <a:rPr lang="en-US" dirty="0" smtClean="0">
+                <a:solidFill>
+                  <a:schemeClr val="tx1"/>
+                </a:solidFill>
+                <a:latin typeface="Helvetica" charset="0"/>
+                <a:ea typeface="Helvetica" charset="0"/>
+                <a:cs typeface="Helvetica" charset="0"/>
+              </a:rPr>
+              <a:t>“</a:t>
+            </a:r>
+            <a:r>
+              <a:rPr lang="en-US" i="1" dirty="0" smtClean="0">
+                <a:solidFill>
+                  <a:schemeClr val="tx1"/>
+                </a:solidFill>
+                <a:latin typeface="Helvetica" charset="0"/>
+                <a:ea typeface="Helvetica" charset="0"/>
+                <a:cs typeface="Helvetica" charset="0"/>
+              </a:rPr>
+              <a:t>Introduction </a:t>
+            </a:r>
+            <a:r>
+              <a:rPr lang="en-US" i="1" dirty="0">
+                <a:solidFill>
+                  <a:schemeClr val="tx1"/>
+                </a:solidFill>
+                <a:latin typeface="Helvetica" charset="0"/>
+                <a:ea typeface="Helvetica" charset="0"/>
+                <a:cs typeface="Helvetica" charset="0"/>
+              </a:rPr>
+              <a:t>To Evolutionary </a:t>
+            </a:r>
+            <a:r>
+              <a:rPr lang="en-US" i="1" dirty="0" smtClean="0">
+                <a:solidFill>
+                  <a:schemeClr val="tx1"/>
+                </a:solidFill>
+                <a:latin typeface="Helvetica" charset="0"/>
+                <a:ea typeface="Helvetica" charset="0"/>
+                <a:cs typeface="Helvetica" charset="0"/>
+              </a:rPr>
+              <a:t>Computing”</a:t>
+            </a:r>
+            <a:r>
+              <a:rPr lang="en-US" dirty="0" smtClean="0">
+                <a:solidFill>
+                  <a:schemeClr val="tx1"/>
+                </a:solidFill>
+                <a:latin typeface="Helvetica" charset="0"/>
+                <a:ea typeface="Helvetica" charset="0"/>
+                <a:cs typeface="Helvetica" charset="0"/>
+              </a:rPr>
+              <a:t>. </a:t>
+            </a:r>
+            <a:r>
+              <a:rPr lang="en-US" dirty="0">
+                <a:solidFill>
+                  <a:schemeClr val="tx1"/>
+                </a:solidFill>
+                <a:latin typeface="Helvetica" charset="0"/>
+                <a:ea typeface="Helvetica" charset="0"/>
+                <a:cs typeface="Helvetica" charset="0"/>
+              </a:rPr>
+              <a:t>V</a:t>
+            </a:r>
+            <a:r>
+              <a:rPr lang="en-US" dirty="0" smtClean="0">
+                <a:solidFill>
+                  <a:schemeClr val="tx1"/>
+                </a:solidFill>
+                <a:latin typeface="Helvetica" charset="0"/>
+                <a:ea typeface="Helvetica" charset="0"/>
+                <a:cs typeface="Helvetica" charset="0"/>
+              </a:rPr>
+              <a:t>olume 53. </a:t>
+            </a:r>
+            <a:r>
+              <a:rPr lang="en-US" dirty="0">
+                <a:solidFill>
+                  <a:schemeClr val="tx1"/>
+                </a:solidFill>
+                <a:latin typeface="Helvetica" charset="0"/>
+                <a:ea typeface="Helvetica" charset="0"/>
+                <a:cs typeface="Helvetica" charset="0"/>
+              </a:rPr>
+              <a:t>Springer-</a:t>
+            </a:r>
+            <a:r>
+              <a:rPr lang="en-US" dirty="0" err="1">
+                <a:solidFill>
+                  <a:schemeClr val="tx1"/>
+                </a:solidFill>
+                <a:latin typeface="Helvetica" charset="0"/>
+                <a:ea typeface="Helvetica" charset="0"/>
+                <a:cs typeface="Helvetica" charset="0"/>
+              </a:rPr>
+              <a:t>Verlag</a:t>
+            </a:r>
+            <a:r>
+              <a:rPr lang="en-US" dirty="0">
+                <a:solidFill>
+                  <a:schemeClr val="tx1"/>
+                </a:solidFill>
+                <a:latin typeface="Helvetica" charset="0"/>
+                <a:ea typeface="Helvetica" charset="0"/>
+                <a:cs typeface="Helvetica" charset="0"/>
+              </a:rPr>
+              <a:t>, 2003. </a:t>
+            </a:r>
+            <a:endParaRPr lang="en-US" dirty="0" smtClean="0">
+              <a:solidFill>
+                <a:schemeClr val="tx1"/>
+              </a:solidFill>
+              <a:latin typeface="Helvetica" charset="0"/>
+              <a:ea typeface="Helvetica" charset="0"/>
+              <a:cs typeface="Helvetica" charset="0"/>
+            </a:endParaRPr>
+          </a:p>
+          <a:p>
+            <a:r>
+              <a:rPr lang="en-US" dirty="0" smtClean="0">
+                <a:solidFill>
+                  <a:schemeClr val="tx1"/>
+                </a:solidFill>
+                <a:latin typeface="Helvetica" charset="0"/>
+                <a:ea typeface="Helvetica" charset="0"/>
+                <a:cs typeface="Helvetica" charset="0"/>
+              </a:rPr>
+              <a:t>[2] A</a:t>
+            </a:r>
+            <a:r>
+              <a:rPr lang="en-US" dirty="0">
+                <a:solidFill>
+                  <a:schemeClr val="tx1"/>
+                </a:solidFill>
+                <a:latin typeface="Helvetica" charset="0"/>
+                <a:ea typeface="Helvetica" charset="0"/>
+                <a:cs typeface="Helvetica" charset="0"/>
+              </a:rPr>
+              <a:t>. E. </a:t>
+            </a:r>
+            <a:r>
+              <a:rPr lang="en-US" dirty="0" err="1" smtClean="0">
+                <a:solidFill>
+                  <a:schemeClr val="tx1"/>
+                </a:solidFill>
+                <a:latin typeface="Helvetica" charset="0"/>
+                <a:ea typeface="Helvetica" charset="0"/>
+                <a:cs typeface="Helvetica" charset="0"/>
+              </a:rPr>
+              <a:t>Eiben</a:t>
+            </a:r>
+            <a:r>
+              <a:rPr lang="en-US" dirty="0" smtClean="0">
+                <a:solidFill>
+                  <a:schemeClr val="tx1"/>
+                </a:solidFill>
+                <a:latin typeface="Helvetica" charset="0"/>
+                <a:ea typeface="Helvetica" charset="0"/>
+                <a:cs typeface="Helvetica" charset="0"/>
+              </a:rPr>
+              <a:t>, S</a:t>
+            </a:r>
+            <a:r>
+              <a:rPr lang="en-US" dirty="0">
+                <a:solidFill>
+                  <a:schemeClr val="tx1"/>
+                </a:solidFill>
+                <a:latin typeface="Helvetica" charset="0"/>
+                <a:ea typeface="Helvetica" charset="0"/>
+                <a:cs typeface="Helvetica" charset="0"/>
+              </a:rPr>
+              <a:t>. K. </a:t>
+            </a:r>
+            <a:r>
+              <a:rPr lang="en-US" dirty="0" err="1">
+                <a:solidFill>
+                  <a:schemeClr val="tx1"/>
+                </a:solidFill>
+                <a:latin typeface="Helvetica" charset="0"/>
+                <a:ea typeface="Helvetica" charset="0"/>
+                <a:cs typeface="Helvetica" charset="0"/>
+              </a:rPr>
+              <a:t>Smit</a:t>
+            </a:r>
+            <a:r>
+              <a:rPr lang="en-US" dirty="0">
+                <a:solidFill>
+                  <a:schemeClr val="tx1"/>
+                </a:solidFill>
+                <a:latin typeface="Helvetica" charset="0"/>
+                <a:ea typeface="Helvetica" charset="0"/>
+                <a:cs typeface="Helvetica" charset="0"/>
+              </a:rPr>
+              <a:t>. </a:t>
+            </a:r>
+            <a:r>
+              <a:rPr lang="en-US" dirty="0" smtClean="0">
+                <a:solidFill>
+                  <a:schemeClr val="tx1"/>
+                </a:solidFill>
+                <a:latin typeface="Helvetica" charset="0"/>
+                <a:ea typeface="Helvetica" charset="0"/>
+                <a:cs typeface="Helvetica" charset="0"/>
+              </a:rPr>
+              <a:t>“Parameter </a:t>
+            </a:r>
+            <a:r>
+              <a:rPr lang="en-US" dirty="0">
+                <a:solidFill>
+                  <a:schemeClr val="tx1"/>
+                </a:solidFill>
+                <a:latin typeface="Helvetica" charset="0"/>
+                <a:ea typeface="Helvetica" charset="0"/>
+                <a:cs typeface="Helvetica" charset="0"/>
+              </a:rPr>
+              <a:t>tuning for configuring and analyzing evolutionary </a:t>
+            </a:r>
+            <a:r>
+              <a:rPr lang="en-US" dirty="0" smtClean="0">
+                <a:solidFill>
+                  <a:schemeClr val="tx1"/>
+                </a:solidFill>
+                <a:latin typeface="Helvetica" charset="0"/>
+                <a:ea typeface="Helvetica" charset="0"/>
+                <a:cs typeface="Helvetica" charset="0"/>
+              </a:rPr>
+              <a:t>algorithms”. </a:t>
+            </a:r>
+            <a:r>
+              <a:rPr lang="en-US" i="1" dirty="0">
+                <a:solidFill>
+                  <a:schemeClr val="tx1"/>
+                </a:solidFill>
+                <a:latin typeface="Helvetica" charset="0"/>
+                <a:ea typeface="Helvetica" charset="0"/>
+                <a:cs typeface="Helvetica" charset="0"/>
+              </a:rPr>
+              <a:t>Swarm and Evolutionary Computation</a:t>
+            </a:r>
+            <a:r>
+              <a:rPr lang="en-US" dirty="0">
+                <a:solidFill>
+                  <a:schemeClr val="tx1"/>
+                </a:solidFill>
+                <a:latin typeface="Helvetica" charset="0"/>
+                <a:ea typeface="Helvetica" charset="0"/>
+                <a:cs typeface="Helvetica" charset="0"/>
+              </a:rPr>
+              <a:t>, 1(1):19–31, 2011</a:t>
+            </a:r>
+            <a:r>
+              <a:rPr lang="en-US" dirty="0" smtClean="0">
+                <a:solidFill>
+                  <a:schemeClr val="tx1"/>
+                </a:solidFill>
+                <a:latin typeface="Helvetica" charset="0"/>
+                <a:ea typeface="Helvetica" charset="0"/>
+                <a:cs typeface="Helvetica" charset="0"/>
+              </a:rPr>
+              <a:t>.</a:t>
+            </a:r>
+          </a:p>
+          <a:p>
+            <a:r>
+              <a:rPr lang="en-US" dirty="0" smtClean="0">
+                <a:solidFill>
+                  <a:schemeClr val="tx1"/>
+                </a:solidFill>
+                <a:latin typeface="Helvetica" charset="0"/>
+                <a:ea typeface="Helvetica" charset="0"/>
+                <a:cs typeface="Helvetica" charset="0"/>
+              </a:rPr>
+              <a:t>[3] </a:t>
+            </a:r>
+            <a:r>
+              <a:rPr lang="en-US" dirty="0">
+                <a:solidFill>
+                  <a:schemeClr val="tx1"/>
+                </a:solidFill>
+                <a:latin typeface="Helvetica" charset="0"/>
+                <a:ea typeface="Helvetica" charset="0"/>
+                <a:cs typeface="Helvetica" charset="0"/>
+              </a:rPr>
+              <a:t>K. Matthias, T. </a:t>
+            </a:r>
+            <a:r>
+              <a:rPr lang="en-US" dirty="0" err="1">
+                <a:solidFill>
+                  <a:schemeClr val="tx1"/>
+                </a:solidFill>
+                <a:latin typeface="Helvetica" charset="0"/>
+                <a:ea typeface="Helvetica" charset="0"/>
+                <a:cs typeface="Helvetica" charset="0"/>
+              </a:rPr>
+              <a:t>Severin</a:t>
+            </a:r>
+            <a:r>
+              <a:rPr lang="en-US" dirty="0">
+                <a:solidFill>
+                  <a:schemeClr val="tx1"/>
+                </a:solidFill>
+                <a:latin typeface="Helvetica" charset="0"/>
+                <a:ea typeface="Helvetica" charset="0"/>
+                <a:cs typeface="Helvetica" charset="0"/>
+              </a:rPr>
+              <a:t>, and H. </a:t>
+            </a:r>
+            <a:r>
+              <a:rPr lang="en-US" dirty="0" err="1">
+                <a:solidFill>
+                  <a:schemeClr val="tx1"/>
+                </a:solidFill>
+                <a:latin typeface="Helvetica" charset="0"/>
+                <a:ea typeface="Helvetica" charset="0"/>
+                <a:cs typeface="Helvetica" charset="0"/>
+              </a:rPr>
+              <a:t>Salzwedel</a:t>
+            </a:r>
+            <a:r>
+              <a:rPr lang="en-US" dirty="0">
+                <a:solidFill>
+                  <a:schemeClr val="tx1"/>
+                </a:solidFill>
+                <a:latin typeface="Helvetica" charset="0"/>
+                <a:ea typeface="Helvetica" charset="0"/>
+                <a:cs typeface="Helvetica" charset="0"/>
+              </a:rPr>
+              <a:t>. </a:t>
+            </a:r>
+            <a:r>
+              <a:rPr lang="en-US" dirty="0" smtClean="0">
+                <a:solidFill>
+                  <a:schemeClr val="tx1"/>
+                </a:solidFill>
+                <a:latin typeface="Helvetica" charset="0"/>
+                <a:ea typeface="Helvetica" charset="0"/>
+                <a:cs typeface="Helvetica" charset="0"/>
+              </a:rPr>
+              <a:t>"Variable </a:t>
+            </a:r>
+            <a:r>
+              <a:rPr lang="en-US" dirty="0">
+                <a:solidFill>
+                  <a:schemeClr val="tx1"/>
+                </a:solidFill>
+                <a:latin typeface="Helvetica" charset="0"/>
+                <a:ea typeface="Helvetica" charset="0"/>
+                <a:cs typeface="Helvetica" charset="0"/>
+              </a:rPr>
+              <a:t>mutation rate at genetic algorithms: introduction of chromosome fitness in connection with multi-chromosome </a:t>
+            </a:r>
+            <a:r>
+              <a:rPr lang="en-US" dirty="0" smtClean="0">
+                <a:solidFill>
+                  <a:schemeClr val="tx1"/>
+                </a:solidFill>
+                <a:latin typeface="Helvetica" charset="0"/>
+                <a:ea typeface="Helvetica" charset="0"/>
+                <a:cs typeface="Helvetica" charset="0"/>
+              </a:rPr>
+              <a:t>representation". </a:t>
+            </a:r>
+            <a:r>
+              <a:rPr lang="en-US" i="1" dirty="0">
+                <a:solidFill>
+                  <a:schemeClr val="tx1"/>
+                </a:solidFill>
+                <a:latin typeface="Helvetica" charset="0"/>
+                <a:ea typeface="Helvetica" charset="0"/>
+                <a:cs typeface="Helvetica" charset="0"/>
+              </a:rPr>
+              <a:t>International Journal of Computer Applications</a:t>
+            </a:r>
+            <a:r>
+              <a:rPr lang="en-US" dirty="0">
+                <a:solidFill>
+                  <a:schemeClr val="tx1"/>
+                </a:solidFill>
+                <a:latin typeface="Helvetica" charset="0"/>
+                <a:ea typeface="Helvetica" charset="0"/>
+                <a:cs typeface="Helvetica" charset="0"/>
+              </a:rPr>
+              <a:t>, 72(17), 2013. </a:t>
+            </a:r>
+            <a:endParaRPr lang="en-US" dirty="0" smtClean="0">
+              <a:solidFill>
+                <a:schemeClr val="tx1"/>
+              </a:solidFill>
+              <a:latin typeface="Helvetica" charset="0"/>
+              <a:ea typeface="Helvetica" charset="0"/>
+              <a:cs typeface="Helvetica" charset="0"/>
+            </a:endParaRPr>
+          </a:p>
+          <a:p>
+            <a:r>
+              <a:rPr lang="en-US" dirty="0" smtClean="0">
+                <a:solidFill>
+                  <a:schemeClr val="tx1"/>
+                </a:solidFill>
+                <a:latin typeface="Helvetica" charset="0"/>
+                <a:ea typeface="Helvetica" charset="0"/>
+                <a:cs typeface="Helvetica" charset="0"/>
+              </a:rPr>
+              <a:t>[4] </a:t>
+            </a:r>
+            <a:r>
+              <a:rPr lang="en-US" dirty="0">
+                <a:solidFill>
+                  <a:schemeClr val="tx1"/>
+                </a:solidFill>
+                <a:latin typeface="Helvetica" charset="0"/>
+                <a:ea typeface="Helvetica" charset="0"/>
+                <a:cs typeface="Helvetica" charset="0"/>
+              </a:rPr>
+              <a:t>M. </a:t>
+            </a:r>
+            <a:r>
+              <a:rPr lang="en-US" dirty="0" err="1">
+                <a:solidFill>
+                  <a:schemeClr val="tx1"/>
+                </a:solidFill>
+                <a:latin typeface="Helvetica" charset="0"/>
+                <a:ea typeface="Helvetica" charset="0"/>
+                <a:cs typeface="Helvetica" charset="0"/>
+              </a:rPr>
+              <a:t>Obitko</a:t>
+            </a:r>
+            <a:r>
+              <a:rPr lang="en-US" dirty="0">
+                <a:solidFill>
+                  <a:schemeClr val="tx1"/>
+                </a:solidFill>
+                <a:latin typeface="Helvetica" charset="0"/>
+                <a:ea typeface="Helvetica" charset="0"/>
+                <a:cs typeface="Helvetica" charset="0"/>
+              </a:rPr>
+              <a:t>. </a:t>
+            </a:r>
+            <a:r>
+              <a:rPr lang="en-US" dirty="0" smtClean="0">
+                <a:solidFill>
+                  <a:schemeClr val="tx1"/>
+                </a:solidFill>
+                <a:latin typeface="Helvetica" charset="0"/>
+                <a:ea typeface="Helvetica" charset="0"/>
+                <a:cs typeface="Helvetica" charset="0"/>
+              </a:rPr>
+              <a:t>"Introduction </a:t>
+            </a:r>
+            <a:r>
+              <a:rPr lang="en-US" dirty="0">
+                <a:solidFill>
+                  <a:schemeClr val="tx1"/>
+                </a:solidFill>
+                <a:latin typeface="Helvetica" charset="0"/>
+                <a:ea typeface="Helvetica" charset="0"/>
+                <a:cs typeface="Helvetica" charset="0"/>
+              </a:rPr>
+              <a:t>to genetic algorithms - </a:t>
+            </a:r>
+            <a:r>
+              <a:rPr lang="en-US" dirty="0" smtClean="0">
+                <a:solidFill>
+                  <a:schemeClr val="tx1"/>
+                </a:solidFill>
+                <a:latin typeface="Helvetica" charset="0"/>
+                <a:ea typeface="Helvetica" charset="0"/>
+                <a:cs typeface="Helvetica" charset="0"/>
+              </a:rPr>
+              <a:t>XIII. Recommendations". </a:t>
+            </a:r>
+            <a:r>
+              <a:rPr lang="en-US" dirty="0">
+                <a:solidFill>
+                  <a:srgbClr val="0432FF"/>
+                </a:solidFill>
+                <a:latin typeface="Helvetica" charset="0"/>
+                <a:ea typeface="Helvetica" charset="0"/>
+                <a:cs typeface="Helvetica" charset="0"/>
+                <a:hlinkClick r:id="rId2"/>
+              </a:rPr>
+              <a:t>http://www.obitko.com/tutorials/genetic-algorithms/recommendations.php</a:t>
+            </a:r>
+            <a:r>
+              <a:rPr lang="en-US" dirty="0" smtClean="0">
+                <a:solidFill>
+                  <a:srgbClr val="0432FF"/>
+                </a:solidFill>
+                <a:latin typeface="Helvetica" charset="0"/>
+                <a:ea typeface="Helvetica" charset="0"/>
+                <a:cs typeface="Helvetica" charset="0"/>
+                <a:hlinkClick r:id="rId2"/>
+              </a:rPr>
+              <a:t>/</a:t>
+            </a:r>
+            <a:r>
+              <a:rPr lang="en-US" dirty="0" smtClean="0">
+                <a:solidFill>
+                  <a:srgbClr val="0432FF"/>
+                </a:solidFill>
+                <a:latin typeface="Helvetica" charset="0"/>
+                <a:ea typeface="Helvetica" charset="0"/>
+                <a:cs typeface="Helvetica" charset="0"/>
+              </a:rPr>
+              <a:t> </a:t>
+            </a:r>
+            <a:r>
+              <a:rPr lang="en-US" dirty="0" smtClean="0">
+                <a:solidFill>
+                  <a:schemeClr val="tx1"/>
+                </a:solidFill>
+                <a:latin typeface="Helvetica" charset="0"/>
+                <a:ea typeface="Helvetica" charset="0"/>
+                <a:cs typeface="Helvetica" charset="0"/>
+              </a:rPr>
+              <a:t>[</a:t>
+            </a:r>
+            <a:r>
+              <a:rPr lang="en-US" dirty="0">
+                <a:solidFill>
+                  <a:schemeClr val="tx1"/>
+                </a:solidFill>
+                <a:latin typeface="Helvetica" charset="0"/>
+                <a:ea typeface="Helvetica" charset="0"/>
+                <a:cs typeface="Helvetica" charset="0"/>
+              </a:rPr>
+              <a:t>Online; </a:t>
+            </a:r>
+            <a:r>
+              <a:rPr lang="en-US" dirty="0" err="1">
+                <a:solidFill>
+                  <a:schemeClr val="tx1"/>
+                </a:solidFill>
+                <a:latin typeface="Helvetica" charset="0"/>
+                <a:ea typeface="Helvetica" charset="0"/>
+                <a:cs typeface="Helvetica" charset="0"/>
+              </a:rPr>
+              <a:t>acessado</a:t>
+            </a:r>
+            <a:r>
+              <a:rPr lang="en-US" dirty="0">
+                <a:solidFill>
+                  <a:schemeClr val="tx1"/>
+                </a:solidFill>
+                <a:latin typeface="Helvetica" charset="0"/>
+                <a:ea typeface="Helvetica" charset="0"/>
+                <a:cs typeface="Helvetica" charset="0"/>
+              </a:rPr>
+              <a:t> </a:t>
+            </a:r>
+            <a:r>
+              <a:rPr lang="en-US" dirty="0" err="1">
+                <a:solidFill>
+                  <a:schemeClr val="tx1"/>
+                </a:solidFill>
+                <a:latin typeface="Helvetica" charset="0"/>
+                <a:ea typeface="Helvetica" charset="0"/>
+                <a:cs typeface="Helvetica" charset="0"/>
+              </a:rPr>
+              <a:t>em</a:t>
+            </a:r>
+            <a:r>
+              <a:rPr lang="en-US" dirty="0">
+                <a:solidFill>
+                  <a:schemeClr val="tx1"/>
+                </a:solidFill>
+                <a:latin typeface="Helvetica" charset="0"/>
+                <a:ea typeface="Helvetica" charset="0"/>
+                <a:cs typeface="Helvetica" charset="0"/>
+              </a:rPr>
+              <a:t> 17 de </a:t>
+            </a:r>
+            <a:r>
+              <a:rPr lang="en-US" dirty="0" err="1">
+                <a:solidFill>
+                  <a:schemeClr val="tx1"/>
+                </a:solidFill>
+                <a:latin typeface="Helvetica" charset="0"/>
+                <a:ea typeface="Helvetica" charset="0"/>
+                <a:cs typeface="Helvetica" charset="0"/>
+              </a:rPr>
+              <a:t>novembro</a:t>
+            </a:r>
+            <a:r>
+              <a:rPr lang="en-US" dirty="0">
+                <a:solidFill>
+                  <a:schemeClr val="tx1"/>
+                </a:solidFill>
+                <a:latin typeface="Helvetica" charset="0"/>
+                <a:ea typeface="Helvetica" charset="0"/>
+                <a:cs typeface="Helvetica" charset="0"/>
+              </a:rPr>
+              <a:t> de 2016</a:t>
+            </a:r>
+            <a:r>
+              <a:rPr lang="en-US" dirty="0" smtClean="0">
+                <a:solidFill>
+                  <a:schemeClr val="tx1"/>
+                </a:solidFill>
+                <a:latin typeface="Helvetica" charset="0"/>
+                <a:ea typeface="Helvetica" charset="0"/>
+                <a:cs typeface="Helvetica" charset="0"/>
+              </a:rPr>
+              <a:t>].</a:t>
+            </a:r>
+          </a:p>
+          <a:p>
+            <a:r>
+              <a:rPr lang="en-US" dirty="0" smtClean="0">
+                <a:solidFill>
+                  <a:schemeClr val="tx1"/>
+                </a:solidFill>
+                <a:latin typeface="Helvetica" charset="0"/>
+                <a:ea typeface="Helvetica" charset="0"/>
+                <a:cs typeface="Helvetica" charset="0"/>
+              </a:rPr>
+              <a:t>[5] </a:t>
+            </a:r>
+            <a:r>
+              <a:rPr lang="en-US" dirty="0">
+                <a:solidFill>
+                  <a:schemeClr val="tx1"/>
+                </a:solidFill>
+                <a:latin typeface="Helvetica" charset="0"/>
+                <a:ea typeface="Helvetica" charset="0"/>
+                <a:cs typeface="Helvetica" charset="0"/>
+              </a:rPr>
+              <a:t>K. </a:t>
+            </a:r>
+            <a:r>
+              <a:rPr lang="en-US" dirty="0" err="1">
+                <a:solidFill>
+                  <a:schemeClr val="tx1"/>
+                </a:solidFill>
+                <a:latin typeface="Helvetica" charset="0"/>
+                <a:ea typeface="Helvetica" charset="0"/>
+                <a:cs typeface="Helvetica" charset="0"/>
+              </a:rPr>
+              <a:t>DeJong</a:t>
+            </a:r>
+            <a:r>
+              <a:rPr lang="en-US" dirty="0">
+                <a:solidFill>
+                  <a:schemeClr val="tx1"/>
+                </a:solidFill>
+                <a:latin typeface="Helvetica" charset="0"/>
+                <a:ea typeface="Helvetica" charset="0"/>
+                <a:cs typeface="Helvetica" charset="0"/>
+              </a:rPr>
+              <a:t>. </a:t>
+            </a:r>
+            <a:r>
+              <a:rPr lang="en-US" dirty="0" smtClean="0">
+                <a:solidFill>
+                  <a:schemeClr val="tx1"/>
+                </a:solidFill>
+                <a:latin typeface="Helvetica" charset="0"/>
+                <a:ea typeface="Helvetica" charset="0"/>
+                <a:cs typeface="Helvetica" charset="0"/>
+              </a:rPr>
+              <a:t>“An </a:t>
+            </a:r>
+            <a:r>
+              <a:rPr lang="en-US" dirty="0">
+                <a:solidFill>
+                  <a:schemeClr val="tx1"/>
+                </a:solidFill>
+                <a:latin typeface="Helvetica" charset="0"/>
+                <a:ea typeface="Helvetica" charset="0"/>
+                <a:cs typeface="Helvetica" charset="0"/>
+              </a:rPr>
+              <a:t>analysis of the behavior of a class of genetic adaptive </a:t>
+            </a:r>
+            <a:r>
+              <a:rPr lang="en-US" dirty="0" smtClean="0">
+                <a:solidFill>
+                  <a:schemeClr val="tx1"/>
+                </a:solidFill>
+                <a:latin typeface="Helvetica" charset="0"/>
+                <a:ea typeface="Helvetica" charset="0"/>
+                <a:cs typeface="Helvetica" charset="0"/>
+              </a:rPr>
+              <a:t>systems”. </a:t>
+            </a:r>
+            <a:r>
+              <a:rPr lang="en-US" i="1" dirty="0" smtClean="0">
+                <a:solidFill>
+                  <a:schemeClr val="tx1"/>
+                </a:solidFill>
+                <a:latin typeface="Helvetica" charset="0"/>
+                <a:ea typeface="Helvetica" charset="0"/>
+                <a:cs typeface="Helvetica" charset="0"/>
+              </a:rPr>
+              <a:t>Ph.D</a:t>
+            </a:r>
+            <a:r>
+              <a:rPr lang="en-US" i="1" dirty="0">
+                <a:solidFill>
+                  <a:schemeClr val="tx1"/>
+                </a:solidFill>
+                <a:latin typeface="Helvetica" charset="0"/>
+                <a:ea typeface="Helvetica" charset="0"/>
+                <a:cs typeface="Helvetica" charset="0"/>
+              </a:rPr>
+              <a:t>. </a:t>
+            </a:r>
+            <a:r>
+              <a:rPr lang="en-US" i="1" dirty="0" smtClean="0">
+                <a:solidFill>
+                  <a:schemeClr val="tx1"/>
+                </a:solidFill>
+                <a:latin typeface="Helvetica" charset="0"/>
+                <a:ea typeface="Helvetica" charset="0"/>
+                <a:cs typeface="Helvetica" charset="0"/>
+              </a:rPr>
+              <a:t>Thesis</a:t>
+            </a:r>
+            <a:r>
+              <a:rPr lang="en-US" dirty="0">
+                <a:solidFill>
+                  <a:schemeClr val="tx1"/>
+                </a:solidFill>
+                <a:latin typeface="Helvetica" charset="0"/>
+                <a:ea typeface="Helvetica" charset="0"/>
+                <a:cs typeface="Helvetica" charset="0"/>
+              </a:rPr>
+              <a:t>, University of Michigan, 1975</a:t>
+            </a:r>
+            <a:r>
+              <a:rPr lang="en-US" dirty="0" smtClean="0">
+                <a:solidFill>
+                  <a:schemeClr val="tx1"/>
+                </a:solidFill>
+                <a:latin typeface="Helvetica" charset="0"/>
+                <a:ea typeface="Helvetica" charset="0"/>
+                <a:cs typeface="Helvetica" charset="0"/>
+              </a:rPr>
+              <a:t>.</a:t>
+            </a:r>
+            <a:endParaRPr lang="en-US" dirty="0">
+              <a:solidFill>
+                <a:schemeClr val="tx1"/>
+              </a:solidFill>
+              <a:latin typeface="Helvetica" charset="0"/>
+              <a:ea typeface="Helvetica" charset="0"/>
+              <a:cs typeface="Helvetica" charset="0"/>
+            </a:endParaRPr>
+          </a:p>
+          <a:p>
+            <a:endParaRPr lang="en-US" dirty="0"/>
+          </a:p>
+          <a:p>
+            <a:endParaRPr lang="en-US" dirty="0"/>
+          </a:p>
+        </p:txBody>
+      </p:sp>
+      <p:sp>
+        <p:nvSpPr>
+          <p:cNvPr id="5" name="Slide Number Placeholder 4"/>
+          <p:cNvSpPr>
+            <a:spLocks noGrp="1"/>
+          </p:cNvSpPr>
+          <p:nvPr>
+            <p:ph type="sldNum" sz="quarter" idx="12"/>
+          </p:nvPr>
+        </p:nvSpPr>
+        <p:spPr/>
+        <p:txBody>
+          <a:bodyPr/>
+          <a:lstStyle/>
+          <a:p>
+            <a:fld id="{55774153-6BEA-8641-B7A1-86CE42693FE2}" type="slidenum">
+              <a:rPr lang="en-US" smtClean="0"/>
+              <a:t>27</a:t>
+            </a:fld>
+            <a:endParaRPr lang="en-US"/>
+          </a:p>
+        </p:txBody>
+      </p:sp>
+    </p:spTree>
+    <p:extLst>
+      <p:ext uri="{BB962C8B-B14F-4D97-AF65-F5344CB8AC3E}">
+        <p14:creationId xmlns:p14="http://schemas.microsoft.com/office/powerpoint/2010/main" val="530941430"/>
+      </p:ext>
+    </p:extLst>
+  </p:cSld>
+  <p:clrMapOvr>
+    <a:masterClrMapping/>
+  </p:clrMapOvr>
+  <p:timing>
+    <p:tnLst>
+      <p:par>
+        <p:cTn id="1" dur="indefinite" restart="never" nodeType="tmRoot"/>
+      </p:par>
+    </p:tnLst>
+  </p:timing>
+</p:sld>
+</file>
+
+<file path=ppt/slides/slide29.xml><?xml version="1.0" encoding="utf-8"?>
+<p:sld xmlns:a="http://schemas.openxmlformats.org/drawingml/2006/main" xmlns:r="http://schemas.openxmlformats.org/officeDocument/2006/relationships" xmlns:p="http://schemas.openxmlformats.org/presentationml/2006/main">
+  <p:cSld>
+    <p:spTree>
+      <p:nvGrpSpPr>
+        <p:cNvPr id="1" name=""/>
+        <p:cNvGrpSpPr/>
+        <p:nvPr/>
+      </p:nvGrpSpPr>
+      <p:grpSpPr>
+        <a:xfrm>
+          <a:off x="0" y="0"/>
+          <a:ext cx="0" cy="0"/>
+          <a:chOff x="0" y="0"/>
+          <a:chExt cx="0" cy="0"/>
+        </a:xfrm>
+      </p:grpSpPr>
+      <p:sp>
+        <p:nvSpPr>
+          <p:cNvPr id="2" name="Title 1"/>
+          <p:cNvSpPr>
+            <a:spLocks noGrp="1"/>
+          </p:cNvSpPr>
+          <p:nvPr>
+            <p:ph type="title"/>
+          </p:nvPr>
+        </p:nvSpPr>
+        <p:spPr/>
+        <p:txBody>
+          <a:bodyPr/>
+          <a:lstStyle/>
+          <a:p>
+            <a:r>
+              <a:rPr lang="en-US" b="1" dirty="0" err="1" smtClean="0">
+                <a:latin typeface="Helvetica" charset="0"/>
+                <a:ea typeface="Helvetica" charset="0"/>
+                <a:cs typeface="Helvetica" charset="0"/>
+              </a:rPr>
               <a:t>Referências</a:t>
             </a:r>
             <a:endParaRPr lang="en-US" b="1" dirty="0">
@@ -29324,17 +29323,6 @@
           <a:lstStyle/>
           <a:p>
             <a:r>
-              <a:rPr lang="en-US" dirty="0" smtClean="0">
-                <a:solidFill>
-                  <a:schemeClr val="tx1"/>
-                </a:solidFill>
-                <a:latin typeface="Helvetica" charset="0"/>
-                <a:ea typeface="Helvetica" charset="0"/>
-                <a:cs typeface="Helvetica" charset="0"/>
-              </a:rPr>
-              <a:t>[11] </a:t>
-            </a:r>
-            <a:r>
               <a:rPr lang="en-US" dirty="0">
                 <a:solidFill>
                   <a:schemeClr val="tx1"/>
@@ -29343,7 +29331,29 @@
                 <a:ea typeface="Helvetica" charset="0"/>
                 <a:cs typeface="Helvetica" charset="0"/>
               </a:rPr>
-              <a:t>D. </a:t>
+              <a:t>[6] </a:t>
+            </a:r>
+            <a:r>
+              <a:rPr lang="en-US" dirty="0" smtClean="0">
+                <a:solidFill>
+                  <a:schemeClr val="tx1"/>
+                </a:solidFill>
+                <a:latin typeface="Helvetica" charset="0"/>
+                <a:ea typeface="Helvetica" charset="0"/>
+                <a:cs typeface="Helvetica" charset="0"/>
+              </a:rPr>
+              <a:t>P</a:t>
+            </a:r>
+            <a:r>
+              <a:rPr lang="en-US" dirty="0">
+                <a:solidFill>
+                  <a:schemeClr val="tx1"/>
+                </a:solidFill>
+                <a:latin typeface="Helvetica" charset="0"/>
+                <a:ea typeface="Helvetica" charset="0"/>
+                <a:cs typeface="Helvetica" charset="0"/>
+              </a:rPr>
+              <a:t>. </a:t>
             </a:r>
             <a:r>
               <a:rPr lang="en-US" dirty="0" err="1">
@@ -29354,7 +29364,7 @@
                 <a:ea typeface="Helvetica" charset="0"/>
                 <a:cs typeface="Helvetica" charset="0"/>
               </a:rPr>
-              <a:t>Jakobovic</a:t>
+              <a:t>Giguere</a:t>
             </a:r>
             <a:r>
               <a:rPr lang="en-US" dirty="0">
@@ -29365,7 +29375,7 @@
                 <a:ea typeface="Helvetica" charset="0"/>
                 <a:cs typeface="Helvetica" charset="0"/>
               </a:rPr>
-              <a:t>́ and M. </a:t>
+              <a:t> and D. E. Goldberg. “Population sizing for optimum sampling with genetic algorithms: A case study of the </a:t>
             </a:r>
             <a:r>
               <a:rPr lang="en-US" dirty="0" err="1">
@@ -29376,7 +29386,7 @@
                 <a:ea typeface="Helvetica" charset="0"/>
                 <a:cs typeface="Helvetica" charset="0"/>
               </a:rPr>
-              <a:t>Golub</a:t>
+              <a:t>onemax</a:t>
             </a:r>
             <a:r>
               <a:rPr lang="en-US" dirty="0">
@@ -29387,18 +29397,18 @@
                 <a:ea typeface="Helvetica" charset="0"/>
                 <a:cs typeface="Helvetica" charset="0"/>
               </a:rPr>
-              <a:t>. </a:t>
-            </a:r>
-            <a:r>
-              <a:rPr lang="en-US" dirty="0" smtClean="0">
-                <a:solidFill>
-                  <a:schemeClr val="tx1"/>
-                </a:solidFill>
-                <a:latin typeface="Helvetica" charset="0"/>
-                <a:ea typeface="Helvetica" charset="0"/>
-                <a:cs typeface="Helvetica" charset="0"/>
-              </a:rPr>
-              <a:t>“Adaptive </a:t>
+              <a:t> problem”. </a:t>
+            </a:r>
+            <a:r>
+              <a:rPr lang="en-US" i="1" dirty="0">
+                <a:solidFill>
+                  <a:schemeClr val="tx1"/>
+                </a:solidFill>
+                <a:latin typeface="Helvetica" charset="0"/>
+                <a:ea typeface="Helvetica" charset="0"/>
+                <a:cs typeface="Helvetica" charset="0"/>
+              </a:rPr>
+              <a:t>Genetic Programming</a:t>
             </a:r>
             <a:r>
               <a:rPr lang="en-US" dirty="0">
@@ -29409,18 +29419,86 @@
                 <a:ea typeface="Helvetica" charset="0"/>
                 <a:cs typeface="Helvetica" charset="0"/>
               </a:rPr>
-              <a:t>G</a:t>
-            </a:r>
-            <a:r>
-              <a:rPr lang="en-US" dirty="0" smtClean="0">
-                <a:solidFill>
-                  <a:schemeClr val="tx1"/>
-                </a:solidFill>
-                <a:latin typeface="Helvetica" charset="0"/>
-                <a:ea typeface="Helvetica" charset="0"/>
-                <a:cs typeface="Helvetica" charset="0"/>
-              </a:rPr>
-              <a:t>enetic Algorithm”. </a:t>
+              <a:t>, 98:496–503, 1998. </a:t>
+            </a:r>
+          </a:p>
+          <a:p>
+            <a:r>
+              <a:rPr lang="en-US" dirty="0" smtClean="0">
+                <a:solidFill>
+                  <a:schemeClr val="tx1"/>
+                </a:solidFill>
+                <a:latin typeface="Helvetica" charset="0"/>
+                <a:ea typeface="Helvetica" charset="0"/>
+                <a:cs typeface="Helvetica" charset="0"/>
+              </a:rPr>
+              <a:t>[7]</a:t>
+            </a:r>
+            <a:r>
+              <a:rPr lang="en-US" dirty="0">
+                <a:solidFill>
+                  <a:schemeClr val="tx1"/>
+                </a:solidFill>
+                <a:latin typeface="Helvetica" charset="0"/>
+                <a:ea typeface="Helvetica" charset="0"/>
+                <a:cs typeface="Helvetica" charset="0"/>
+              </a:rPr>
+              <a:t> D. L. Applegate, R. E. Bixby, V. </a:t>
+            </a:r>
+            <a:r>
+              <a:rPr lang="en-US" dirty="0" err="1">
+                <a:solidFill>
+                  <a:schemeClr val="tx1"/>
+                </a:solidFill>
+                <a:latin typeface="Helvetica" charset="0"/>
+                <a:ea typeface="Helvetica" charset="0"/>
+                <a:cs typeface="Helvetica" charset="0"/>
+              </a:rPr>
+              <a:t>Chvatal</a:t>
+            </a:r>
+            <a:r>
+              <a:rPr lang="en-US" dirty="0">
+                <a:solidFill>
+                  <a:schemeClr val="tx1"/>
+                </a:solidFill>
+                <a:latin typeface="Helvetica" charset="0"/>
+                <a:ea typeface="Helvetica" charset="0"/>
+                <a:cs typeface="Helvetica" charset="0"/>
+              </a:rPr>
+              <a:t>, and W. J. Cook. </a:t>
+            </a:r>
+            <a:r>
+              <a:rPr lang="en-US" dirty="0" smtClean="0">
+                <a:solidFill>
+                  <a:schemeClr val="tx1"/>
+                </a:solidFill>
+                <a:latin typeface="Helvetica" charset="0"/>
+                <a:ea typeface="Helvetica" charset="0"/>
+                <a:cs typeface="Helvetica" charset="0"/>
+              </a:rPr>
+              <a:t>"The </a:t>
+            </a:r>
+            <a:r>
+              <a:rPr lang="en-US" dirty="0">
+                <a:solidFill>
+                  <a:schemeClr val="tx1"/>
+                </a:solidFill>
+                <a:latin typeface="Helvetica" charset="0"/>
+                <a:ea typeface="Helvetica" charset="0"/>
+                <a:cs typeface="Helvetica" charset="0"/>
+              </a:rPr>
+              <a:t>Traveling Salesman Problem: a computational </a:t>
+            </a:r>
+            <a:r>
+              <a:rPr lang="en-US" dirty="0" smtClean="0">
+                <a:solidFill>
+                  <a:schemeClr val="tx1"/>
+                </a:solidFill>
+                <a:latin typeface="Helvetica" charset="0"/>
+                <a:ea typeface="Helvetica" charset="0"/>
+                <a:cs typeface="Helvetica" charset="0"/>
+              </a:rPr>
+              <a:t>study". </a:t>
             </a:r>
             <a:r>
               <a:rPr lang="en-US" i="1" dirty="0">
@@ -29431,7 +29509,40 @@
                 <a:ea typeface="Helvetica" charset="0"/>
                 <a:cs typeface="Helvetica" charset="0"/>
               </a:rPr>
-              <a:t>CIT. Journal of computing and information technology</a:t>
+              <a:t>Princeton </a:t>
+            </a:r>
+            <a:r>
+              <a:rPr lang="en-US" i="1" dirty="0" smtClean="0">
+                <a:solidFill>
+                  <a:schemeClr val="tx1"/>
+                </a:solidFill>
+                <a:latin typeface="Helvetica" charset="0"/>
+                <a:ea typeface="Helvetica" charset="0"/>
+                <a:cs typeface="Helvetica" charset="0"/>
+              </a:rPr>
+              <a:t>University </a:t>
+            </a:r>
+            <a:r>
+              <a:rPr lang="en-US" i="1" dirty="0">
+                <a:solidFill>
+                  <a:schemeClr val="tx1"/>
+                </a:solidFill>
+                <a:latin typeface="Helvetica" charset="0"/>
+                <a:ea typeface="Helvetica" charset="0"/>
+                <a:cs typeface="Helvetica" charset="0"/>
+              </a:rPr>
+              <a:t>P</a:t>
+            </a:r>
+            <a:r>
+              <a:rPr lang="en-US" i="1" dirty="0" smtClean="0">
+                <a:solidFill>
+                  <a:schemeClr val="tx1"/>
+                </a:solidFill>
+                <a:latin typeface="Helvetica" charset="0"/>
+                <a:ea typeface="Helvetica" charset="0"/>
+                <a:cs typeface="Helvetica" charset="0"/>
+              </a:rPr>
+              <a:t>ress</a:t>
             </a:r>
             <a:r>
               <a:rPr lang="en-US" dirty="0">
@@ -29442,86 +29553,7 @@
                 <a:ea typeface="Helvetica" charset="0"/>
                 <a:cs typeface="Helvetica" charset="0"/>
               </a:rPr>
-              <a:t>, 7(3):229–235, 1999. </a:t>
-            </a:r>
-          </a:p>
-          <a:p>
-            <a:r>
-              <a:rPr lang="en-US" dirty="0" smtClean="0">
-                <a:solidFill>
-                  <a:schemeClr val="tx1"/>
-                </a:solidFill>
-                <a:latin typeface="Helvetica" charset="0"/>
-                <a:ea typeface="Helvetica" charset="0"/>
-                <a:cs typeface="Helvetica" charset="0"/>
-              </a:rPr>
-              <a:t>[12] </a:t>
-            </a:r>
-            <a:r>
-              <a:rPr lang="en-US" dirty="0">
-                <a:solidFill>
-                  <a:schemeClr val="tx1"/>
-                </a:solidFill>
-                <a:latin typeface="Helvetica" charset="0"/>
-                <a:ea typeface="Helvetica" charset="0"/>
-                <a:cs typeface="Helvetica" charset="0"/>
-              </a:rPr>
-              <a:t>L. Wang and T. Shen. </a:t>
-            </a:r>
-            <a:r>
-              <a:rPr lang="en-US" dirty="0" smtClean="0">
-                <a:solidFill>
-                  <a:schemeClr val="tx1"/>
-                </a:solidFill>
-                <a:latin typeface="Helvetica" charset="0"/>
-                <a:ea typeface="Helvetica" charset="0"/>
-                <a:cs typeface="Helvetica" charset="0"/>
-              </a:rPr>
-              <a:t>"Improved </a:t>
-            </a:r>
-            <a:r>
-              <a:rPr lang="en-US" dirty="0">
-                <a:solidFill>
-                  <a:schemeClr val="tx1"/>
-                </a:solidFill>
-                <a:latin typeface="Helvetica" charset="0"/>
-                <a:ea typeface="Helvetica" charset="0"/>
-                <a:cs typeface="Helvetica" charset="0"/>
-              </a:rPr>
-              <a:t>adaptive genetic algorithm and its application to image </a:t>
-            </a:r>
-            <a:r>
-              <a:rPr lang="en-US" dirty="0" smtClean="0">
-                <a:solidFill>
-                  <a:schemeClr val="tx1"/>
-                </a:solidFill>
-                <a:latin typeface="Helvetica" charset="0"/>
-                <a:ea typeface="Helvetica" charset="0"/>
-                <a:cs typeface="Helvetica" charset="0"/>
-              </a:rPr>
-              <a:t>segmentation". </a:t>
-            </a:r>
-            <a:r>
-              <a:rPr lang="en-US" i="1" dirty="0">
-                <a:solidFill>
-                  <a:schemeClr val="tx1"/>
-                </a:solidFill>
-                <a:latin typeface="Helvetica" charset="0"/>
-                <a:ea typeface="Helvetica" charset="0"/>
-                <a:cs typeface="Helvetica" charset="0"/>
-              </a:rPr>
-              <a:t>In Multispectral Image Processing and Pattern Recognition</a:t>
-            </a:r>
-            <a:r>
-              <a:rPr lang="en-US" dirty="0">
-                <a:solidFill>
-                  <a:schemeClr val="tx1"/>
-                </a:solidFill>
-                <a:latin typeface="Helvetica" charset="0"/>
-                <a:ea typeface="Helvetica" charset="0"/>
-                <a:cs typeface="Helvetica" charset="0"/>
-              </a:rPr>
-              <a:t>, pages 115–120. International Society for Optics and Photonics, 2001. </a:t>
+              <a:t>, 2011. </a:t>
             </a:r>
             <a:endParaRPr lang="en-US" dirty="0" smtClean="0">
               <a:solidFill>
@@ -29542,7 +29574,7 @@
                 <a:ea typeface="Helvetica" charset="0"/>
                 <a:cs typeface="Helvetica" charset="0"/>
               </a:rPr>
-              <a:t>[13] </a:t>
+              <a:t>[8] </a:t>
             </a:r>
             <a:r>
               <a:rPr lang="en-US" dirty="0">
@@ -29553,7 +29585,7 @@
                 <a:ea typeface="Helvetica" charset="0"/>
                 <a:cs typeface="Helvetica" charset="0"/>
               </a:rPr>
-              <a:t>K. Matthias, T. </a:t>
+              <a:t>T. H. </a:t>
             </a:r>
             <a:r>
               <a:rPr lang="en-US" dirty="0" err="1">
@@ -29564,7 +29596,7 @@
                 <a:ea typeface="Helvetica" charset="0"/>
                 <a:cs typeface="Helvetica" charset="0"/>
               </a:rPr>
-              <a:t>Severin</a:t>
+              <a:t>Cormen</a:t>
             </a:r>
             <a:r>
               <a:rPr lang="en-US" dirty="0">
@@ -29575,7 +29607,7 @@
                 <a:ea typeface="Helvetica" charset="0"/>
                 <a:cs typeface="Helvetica" charset="0"/>
               </a:rPr>
-              <a:t>, and H. </a:t>
+              <a:t>, C. E. </a:t>
             </a:r>
             <a:r>
               <a:rPr lang="en-US" dirty="0" err="1">
@@ -29586,7 +29618,7 @@
                 <a:ea typeface="Helvetica" charset="0"/>
                 <a:cs typeface="Helvetica" charset="0"/>
               </a:rPr>
-              <a:t>Salzwedel</a:t>
+              <a:t>Leiserson</a:t>
             </a:r>
             <a:r>
               <a:rPr lang="en-US" dirty="0">
@@ -29597,6 +29629,268 @@
                 <a:ea typeface="Helvetica" charset="0"/>
                 <a:cs typeface="Helvetica" charset="0"/>
               </a:rPr>
+              <a:t>, R. L. </a:t>
+            </a:r>
+            <a:r>
+              <a:rPr lang="en-US" dirty="0" err="1">
+                <a:solidFill>
+                  <a:schemeClr val="tx1"/>
+                </a:solidFill>
+                <a:latin typeface="Helvetica" charset="0"/>
+                <a:ea typeface="Helvetica" charset="0"/>
+                <a:cs typeface="Helvetica" charset="0"/>
+              </a:rPr>
+              <a:t>Rivest</a:t>
+            </a:r>
+            <a:r>
+              <a:rPr lang="en-US" dirty="0">
+                <a:solidFill>
+                  <a:schemeClr val="tx1"/>
+                </a:solidFill>
+                <a:latin typeface="Helvetica" charset="0"/>
+                <a:ea typeface="Helvetica" charset="0"/>
+                <a:cs typeface="Helvetica" charset="0"/>
+              </a:rPr>
+              <a:t>, et al. </a:t>
+            </a:r>
+            <a:r>
+              <a:rPr lang="en-US" dirty="0" smtClean="0">
+                <a:solidFill>
+                  <a:schemeClr val="tx1"/>
+                </a:solidFill>
+                <a:latin typeface="Helvetica" charset="0"/>
+                <a:ea typeface="Helvetica" charset="0"/>
+                <a:cs typeface="Helvetica" charset="0"/>
+              </a:rPr>
+              <a:t>"Section </a:t>
+            </a:r>
+            <a:r>
+              <a:rPr lang="en-US" dirty="0">
+                <a:solidFill>
+                  <a:schemeClr val="tx1"/>
+                </a:solidFill>
+                <a:latin typeface="Helvetica" charset="0"/>
+                <a:ea typeface="Helvetica" charset="0"/>
+                <a:cs typeface="Helvetica" charset="0"/>
+              </a:rPr>
+              <a:t>24.3: </a:t>
+            </a:r>
+            <a:r>
+              <a:rPr lang="en-US" dirty="0" err="1">
+                <a:solidFill>
+                  <a:schemeClr val="tx1"/>
+                </a:solidFill>
+                <a:latin typeface="Helvetica" charset="0"/>
+                <a:ea typeface="Helvetica" charset="0"/>
+                <a:cs typeface="Helvetica" charset="0"/>
+              </a:rPr>
+              <a:t>Dijkstra’s</a:t>
+            </a:r>
+            <a:r>
+              <a:rPr lang="en-US" dirty="0">
+                <a:solidFill>
+                  <a:schemeClr val="tx1"/>
+                </a:solidFill>
+                <a:latin typeface="Helvetica" charset="0"/>
+                <a:ea typeface="Helvetica" charset="0"/>
+                <a:cs typeface="Helvetica" charset="0"/>
+              </a:rPr>
+              <a:t> </a:t>
+            </a:r>
+            <a:r>
+              <a:rPr lang="en-US" dirty="0" smtClean="0">
+                <a:solidFill>
+                  <a:schemeClr val="tx1"/>
+                </a:solidFill>
+                <a:latin typeface="Helvetica" charset="0"/>
+                <a:ea typeface="Helvetica" charset="0"/>
+                <a:cs typeface="Helvetica" charset="0"/>
+              </a:rPr>
+              <a:t>algorithm”. </a:t>
+            </a:r>
+            <a:r>
+              <a:rPr lang="en-US" i="1" dirty="0" smtClean="0">
+                <a:solidFill>
+                  <a:schemeClr val="tx1"/>
+                </a:solidFill>
+                <a:latin typeface="Helvetica" charset="0"/>
+                <a:ea typeface="Helvetica" charset="0"/>
+                <a:cs typeface="Helvetica" charset="0"/>
+              </a:rPr>
+              <a:t>MIT Press </a:t>
+            </a:r>
+            <a:r>
+              <a:rPr lang="en-US" i="1" dirty="0">
+                <a:solidFill>
+                  <a:schemeClr val="tx1"/>
+                </a:solidFill>
+                <a:latin typeface="Helvetica" charset="0"/>
+                <a:ea typeface="Helvetica" charset="0"/>
+                <a:cs typeface="Helvetica" charset="0"/>
+              </a:rPr>
+              <a:t>and McGraw-Hill</a:t>
+            </a:r>
+            <a:r>
+              <a:rPr lang="en-US" dirty="0">
+                <a:solidFill>
+                  <a:schemeClr val="tx1"/>
+                </a:solidFill>
+                <a:latin typeface="Helvetica" charset="0"/>
+                <a:ea typeface="Helvetica" charset="0"/>
+                <a:cs typeface="Helvetica" charset="0"/>
+              </a:rPr>
+              <a:t>, 2001. </a:t>
+            </a:r>
+            <a:endParaRPr lang="en-US" dirty="0" smtClean="0">
+              <a:solidFill>
+                <a:schemeClr val="tx1"/>
+              </a:solidFill>
+              <a:latin typeface="Helvetica" charset="0"/>
+              <a:ea typeface="Helvetica" charset="0"/>
+              <a:cs typeface="Helvetica" charset="0"/>
+            </a:endParaRPr>
+          </a:p>
+          <a:p>
+            <a:r>
+              <a:rPr lang="en-US" dirty="0" smtClean="0">
+                <a:solidFill>
+                  <a:schemeClr val="tx1"/>
+                </a:solidFill>
+                <a:latin typeface="Helvetica" charset="0"/>
+                <a:ea typeface="Helvetica" charset="0"/>
+                <a:cs typeface="Helvetica" charset="0"/>
+              </a:rPr>
+              <a:t>[9] </a:t>
+            </a:r>
+            <a:r>
+              <a:rPr lang="en-US" dirty="0">
+                <a:solidFill>
+                  <a:schemeClr val="tx1"/>
+                </a:solidFill>
+                <a:latin typeface="Helvetica" charset="0"/>
+                <a:ea typeface="Helvetica" charset="0"/>
+                <a:cs typeface="Helvetica" charset="0"/>
+              </a:rPr>
+              <a:t>M. Mitchell. </a:t>
+            </a:r>
+            <a:r>
+              <a:rPr lang="en-US" dirty="0" smtClean="0">
+                <a:solidFill>
+                  <a:schemeClr val="tx1"/>
+                </a:solidFill>
+                <a:latin typeface="Helvetica" charset="0"/>
+                <a:ea typeface="Helvetica" charset="0"/>
+                <a:cs typeface="Helvetica" charset="0"/>
+              </a:rPr>
+              <a:t>"An </a:t>
+            </a:r>
+            <a:r>
+              <a:rPr lang="en-US" dirty="0">
+                <a:solidFill>
+                  <a:schemeClr val="tx1"/>
+                </a:solidFill>
+                <a:latin typeface="Helvetica" charset="0"/>
+                <a:ea typeface="Helvetica" charset="0"/>
+                <a:cs typeface="Helvetica" charset="0"/>
+              </a:rPr>
+              <a:t>introduction to genetic </a:t>
+            </a:r>
+            <a:r>
+              <a:rPr lang="en-US" dirty="0" smtClean="0">
+                <a:solidFill>
+                  <a:schemeClr val="tx1"/>
+                </a:solidFill>
+                <a:latin typeface="Helvetica" charset="0"/>
+                <a:ea typeface="Helvetica" charset="0"/>
+                <a:cs typeface="Helvetica" charset="0"/>
+              </a:rPr>
+              <a:t>algorithms". </a:t>
+            </a:r>
+            <a:r>
+              <a:rPr lang="en-US" i="1" dirty="0">
+                <a:solidFill>
+                  <a:schemeClr val="tx1"/>
+                </a:solidFill>
+                <a:latin typeface="Helvetica" charset="0"/>
+                <a:ea typeface="Helvetica" charset="0"/>
+                <a:cs typeface="Helvetica" charset="0"/>
+              </a:rPr>
+              <a:t>MIT </a:t>
+            </a:r>
+            <a:r>
+              <a:rPr lang="en-US" i="1" dirty="0" smtClean="0">
+                <a:solidFill>
+                  <a:schemeClr val="tx1"/>
+                </a:solidFill>
+                <a:latin typeface="Helvetica" charset="0"/>
+                <a:ea typeface="Helvetica" charset="0"/>
+                <a:cs typeface="Helvetica" charset="0"/>
+              </a:rPr>
+              <a:t>Press</a:t>
+            </a:r>
+            <a:r>
+              <a:rPr lang="en-US" dirty="0">
+                <a:solidFill>
+                  <a:schemeClr val="tx1"/>
+                </a:solidFill>
+                <a:latin typeface="Helvetica" charset="0"/>
+                <a:ea typeface="Helvetica" charset="0"/>
+                <a:cs typeface="Helvetica" charset="0"/>
+              </a:rPr>
+              <a:t>, 1998. </a:t>
+            </a:r>
+            <a:endParaRPr lang="en-US" dirty="0" smtClean="0">
+              <a:solidFill>
+                <a:schemeClr val="tx1"/>
+              </a:solidFill>
+              <a:latin typeface="Helvetica" charset="0"/>
+              <a:ea typeface="Helvetica" charset="0"/>
+              <a:cs typeface="Helvetica" charset="0"/>
+            </a:endParaRPr>
+          </a:p>
+          <a:p>
+            <a:r>
+              <a:rPr lang="en-US" dirty="0" smtClean="0">
+                <a:solidFill>
+                  <a:schemeClr val="tx1"/>
+                </a:solidFill>
+                <a:latin typeface="Helvetica" charset="0"/>
+                <a:ea typeface="Helvetica" charset="0"/>
+                <a:cs typeface="Helvetica" charset="0"/>
+              </a:rPr>
+              <a:t>[10] M</a:t>
+            </a:r>
+            <a:r>
+              <a:rPr lang="en-US" dirty="0">
+                <a:solidFill>
+                  <a:schemeClr val="tx1"/>
+                </a:solidFill>
+                <a:latin typeface="Helvetica" charset="0"/>
+                <a:ea typeface="Helvetica" charset="0"/>
+                <a:cs typeface="Helvetica" charset="0"/>
+              </a:rPr>
+              <a:t>. Srinivas and L. M. </a:t>
+            </a:r>
+            <a:r>
+              <a:rPr lang="en-US" dirty="0" err="1">
+                <a:solidFill>
+                  <a:schemeClr val="tx1"/>
+                </a:solidFill>
+                <a:latin typeface="Helvetica" charset="0"/>
+                <a:ea typeface="Helvetica" charset="0"/>
+                <a:cs typeface="Helvetica" charset="0"/>
+              </a:rPr>
+              <a:t>Patnaik</a:t>
+            </a:r>
+            <a:r>
+              <a:rPr lang="en-US" dirty="0">
+                <a:solidFill>
+                  <a:schemeClr val="tx1"/>
+                </a:solidFill>
+                <a:latin typeface="Helvetica" charset="0"/>
+                <a:ea typeface="Helvetica" charset="0"/>
+                <a:cs typeface="Helvetica" charset="0"/>
+              </a:rPr>
               <a:t>. </a:t>
             </a:r>
             <a:r>
@@ -29608,7 +29902,7 @@
                 <a:ea typeface="Helvetica" charset="0"/>
                 <a:cs typeface="Helvetica" charset="0"/>
               </a:rPr>
-              <a:t>"Variable </a:t>
+              <a:t>"Adaptive </a:t>
             </a:r>
             <a:r>
               <a:rPr lang="en-US" dirty="0">
@@ -29619,18 +29913,18 @@
                 <a:ea typeface="Helvetica" charset="0"/>
                 <a:cs typeface="Helvetica" charset="0"/>
               </a:rPr>
-              <a:t>mutation rate at genetic algorithms: introduction of chromosome fitness in connection with multi-chromosome </a:t>
-            </a:r>
-            <a:r>
-              <a:rPr lang="en-US" dirty="0" smtClean="0">
-                <a:solidFill>
-                  <a:schemeClr val="tx1"/>
-                </a:solidFill>
-                <a:latin typeface="Helvetica" charset="0"/>
-                <a:ea typeface="Helvetica" charset="0"/>
-                <a:cs typeface="Helvetica" charset="0"/>
-              </a:rPr>
-              <a:t>representation". </a:t>
+              <a:t>probabilities of crossover and mutation in genetic </a:t>
+            </a:r>
+            <a:r>
+              <a:rPr lang="en-US" dirty="0" smtClean="0">
+                <a:solidFill>
+                  <a:schemeClr val="tx1"/>
+                </a:solidFill>
+                <a:latin typeface="Helvetica" charset="0"/>
+                <a:ea typeface="Helvetica" charset="0"/>
+                <a:cs typeface="Helvetica" charset="0"/>
+              </a:rPr>
+              <a:t>algorithms". </a:t>
             </a:r>
             <a:r>
               <a:rPr lang="en-US" i="1" dirty="0">
@@ -29641,7 +29935,7 @@
                 <a:ea typeface="Helvetica" charset="0"/>
                 <a:cs typeface="Helvetica" charset="0"/>
               </a:rPr>
-              <a:t>International Journal of Computer Applications</a:t>
+              <a:t>IEEE Transactions on Systems, Man, and Cybernetics</a:t>
             </a:r>
             <a:r>
               <a:rPr lang="en-US" dirty="0">
@@ -29652,18 +29946,7 @@
                 <a:ea typeface="Helvetica" charset="0"/>
                 <a:cs typeface="Helvetica" charset="0"/>
               </a:rPr>
-              <a:t>, 72(17), 2013</a:t>
-            </a:r>
-            <a:r>
-              <a:rPr lang="en-US" dirty="0" smtClean="0">
-                <a:solidFill>
-                  <a:schemeClr val="tx1"/>
-                </a:solidFill>
-                <a:latin typeface="Helvetica" charset="0"/>
-                <a:ea typeface="Helvetica" charset="0"/>
-                <a:cs typeface="Helvetica" charset="0"/>
-              </a:rPr>
-              <a:t>.</a:t>
+              <a:t>, 24(4):656–667, 1994. </a:t>
             </a:r>
           </a:p>
           <a:p>
@@ -29705,7 +29988,7 @@
           <a:p>
             <a:fld id="{55774153-6BEA-8641-B7A1-86CE42693FE2}" type="slidenum">
               <a:rPr lang="en-US" smtClean="0"/>
-              <a:t>26</a:t>
+              <a:t>28</a:t>
             </a:fld>
             <a:endParaRPr lang="en-US"/>
           </a:p>
@@ -29714,7 +29997,7 @@
     </p:spTree>
     <p:extLst>
       <p:ext uri="{BB962C8B-B14F-4D97-AF65-F5344CB8AC3E}">
-        <p14:creationId xmlns:p14="http://schemas.microsoft.com/office/powerpoint/2010/main" val="823118128"/>
+        <p14:creationId xmlns:p14="http://schemas.microsoft.com/office/powerpoint/2010/main" val="2080831962"/>
       </p:ext>
     </p:extLst>
   </p:cSld>
@@ -30671,6 +30954,482 @@
     <p:extLst>
       <p:ext uri="{BB962C8B-B14F-4D97-AF65-F5344CB8AC3E}">
         <p14:creationId xmlns:p14="http://schemas.microsoft.com/office/powerpoint/2010/main" val="653190879"/>
+      </p:ext>
+    </p:extLst>
+  </p:cSld>
+  <p:clrMapOvr>
+    <a:masterClrMapping/>
+  </p:clrMapOvr>
+  <p:timing>
+    <p:tnLst>
+      <p:par>
+        <p:cTn id="1" dur="indefinite" restart="never" nodeType="tmRoot"/>
+      </p:par>
+    </p:tnLst>
+  </p:timing>
+</p:sld>
+</file>
+
+<file path=ppt/slides/slide30.xml><?xml version="1.0" encoding="utf-8"?>
+<p:sld xmlns:a="http://schemas.openxmlformats.org/drawingml/2006/main" xmlns:r="http://schemas.openxmlformats.org/officeDocument/2006/relationships" xmlns:p="http://schemas.openxmlformats.org/presentationml/2006/main">
+  <p:cSld>
+    <p:spTree>
+      <p:nvGrpSpPr>
+        <p:cNvPr id="1" name=""/>
+        <p:cNvGrpSpPr/>
+        <p:nvPr/>
+      </p:nvGrpSpPr>
+      <p:grpSpPr>
+        <a:xfrm>
+          <a:off x="0" y="0"/>
+          <a:ext cx="0" cy="0"/>
+          <a:chOff x="0" y="0"/>
+          <a:chExt cx="0" cy="0"/>
+        </a:xfrm>
+      </p:grpSpPr>
+      <p:sp>
+        <p:nvSpPr>
+          <p:cNvPr id="2" name="Title 1"/>
+          <p:cNvSpPr>
+            <a:spLocks noGrp="1"/>
+          </p:cNvSpPr>
+          <p:nvPr>
+            <p:ph type="title"/>
+          </p:nvPr>
+        </p:nvSpPr>
+        <p:spPr/>
+        <p:txBody>
+          <a:bodyPr/>
+          <a:lstStyle/>
+          <a:p>
+            <a:r>
+              <a:rPr lang="en-US" b="1" dirty="0" err="1" smtClean="0">
+                <a:latin typeface="Helvetica" charset="0"/>
+                <a:ea typeface="Helvetica" charset="0"/>
+                <a:cs typeface="Helvetica" charset="0"/>
+              </a:rPr>
+              <a:t>Referências</a:t>
+            </a:r>
+            <a:endParaRPr lang="en-US" b="1" dirty="0">
+              <a:latin typeface="Helvetica" charset="0"/>
+              <a:ea typeface="Helvetica" charset="0"/>
+              <a:cs typeface="Helvetica" charset="0"/>
+            </a:endParaRPr>
+          </a:p>
+        </p:txBody>
+      </p:sp>
+      <p:sp>
+        <p:nvSpPr>
+          <p:cNvPr id="3" name="Content Placeholder 2"/>
+          <p:cNvSpPr>
+            <a:spLocks noGrp="1"/>
+          </p:cNvSpPr>
+          <p:nvPr>
+            <p:ph idx="1"/>
+          </p:nvPr>
+        </p:nvSpPr>
+        <p:spPr>
+          <a:xfrm>
+            <a:off x="1154954" y="2603500"/>
+            <a:ext cx="10035785" cy="3416300"/>
+          </a:xfrm>
+        </p:spPr>
+        <p:txBody>
+          <a:bodyPr/>
+          <a:lstStyle/>
+          <a:p>
+            <a:r>
+              <a:rPr lang="en-US" dirty="0" smtClean="0">
+                <a:solidFill>
+                  <a:schemeClr val="tx1"/>
+                </a:solidFill>
+                <a:latin typeface="Helvetica" charset="0"/>
+                <a:ea typeface="Helvetica" charset="0"/>
+                <a:cs typeface="Helvetica" charset="0"/>
+              </a:rPr>
+              <a:t>[11] </a:t>
+            </a:r>
+            <a:r>
+              <a:rPr lang="en-US" dirty="0">
+                <a:solidFill>
+                  <a:schemeClr val="tx1"/>
+                </a:solidFill>
+                <a:latin typeface="Helvetica" charset="0"/>
+                <a:ea typeface="Helvetica" charset="0"/>
+                <a:cs typeface="Helvetica" charset="0"/>
+              </a:rPr>
+              <a:t>D. </a:t>
+            </a:r>
+            <a:r>
+              <a:rPr lang="en-US" dirty="0" err="1">
+                <a:solidFill>
+                  <a:schemeClr val="tx1"/>
+                </a:solidFill>
+                <a:latin typeface="Helvetica" charset="0"/>
+                <a:ea typeface="Helvetica" charset="0"/>
+                <a:cs typeface="Helvetica" charset="0"/>
+              </a:rPr>
+              <a:t>Jakobovic</a:t>
+            </a:r>
+            <a:r>
+              <a:rPr lang="en-US" dirty="0">
+                <a:solidFill>
+                  <a:schemeClr val="tx1"/>
+                </a:solidFill>
+                <a:latin typeface="Helvetica" charset="0"/>
+                <a:ea typeface="Helvetica" charset="0"/>
+                <a:cs typeface="Helvetica" charset="0"/>
+              </a:rPr>
+              <a:t>́ and M. </a:t>
+            </a:r>
+            <a:r>
+              <a:rPr lang="en-US" dirty="0" err="1">
+                <a:solidFill>
+                  <a:schemeClr val="tx1"/>
+                </a:solidFill>
+                <a:latin typeface="Helvetica" charset="0"/>
+                <a:ea typeface="Helvetica" charset="0"/>
+                <a:cs typeface="Helvetica" charset="0"/>
+              </a:rPr>
+              <a:t>Golub</a:t>
+            </a:r>
+            <a:r>
+              <a:rPr lang="en-US" dirty="0">
+                <a:solidFill>
+                  <a:schemeClr val="tx1"/>
+                </a:solidFill>
+                <a:latin typeface="Helvetica" charset="0"/>
+                <a:ea typeface="Helvetica" charset="0"/>
+                <a:cs typeface="Helvetica" charset="0"/>
+              </a:rPr>
+              <a:t>. </a:t>
+            </a:r>
+            <a:r>
+              <a:rPr lang="en-US" dirty="0" smtClean="0">
+                <a:solidFill>
+                  <a:schemeClr val="tx1"/>
+                </a:solidFill>
+                <a:latin typeface="Helvetica" charset="0"/>
+                <a:ea typeface="Helvetica" charset="0"/>
+                <a:cs typeface="Helvetica" charset="0"/>
+              </a:rPr>
+              <a:t>“Adaptive </a:t>
+            </a:r>
+            <a:r>
+              <a:rPr lang="en-US" dirty="0">
+                <a:solidFill>
+                  <a:schemeClr val="tx1"/>
+                </a:solidFill>
+                <a:latin typeface="Helvetica" charset="0"/>
+                <a:ea typeface="Helvetica" charset="0"/>
+                <a:cs typeface="Helvetica" charset="0"/>
+              </a:rPr>
+              <a:t>G</a:t>
+            </a:r>
+            <a:r>
+              <a:rPr lang="en-US" dirty="0" smtClean="0">
+                <a:solidFill>
+                  <a:schemeClr val="tx1"/>
+                </a:solidFill>
+                <a:latin typeface="Helvetica" charset="0"/>
+                <a:ea typeface="Helvetica" charset="0"/>
+                <a:cs typeface="Helvetica" charset="0"/>
+              </a:rPr>
+              <a:t>enetic Algorithm”. </a:t>
+            </a:r>
+            <a:r>
+              <a:rPr lang="en-US" i="1" dirty="0">
+                <a:solidFill>
+                  <a:schemeClr val="tx1"/>
+                </a:solidFill>
+                <a:latin typeface="Helvetica" charset="0"/>
+                <a:ea typeface="Helvetica" charset="0"/>
+                <a:cs typeface="Helvetica" charset="0"/>
+              </a:rPr>
+              <a:t>CIT. Journal of computing and information technology</a:t>
+            </a:r>
+            <a:r>
+              <a:rPr lang="en-US" dirty="0">
+                <a:solidFill>
+                  <a:schemeClr val="tx1"/>
+                </a:solidFill>
+                <a:latin typeface="Helvetica" charset="0"/>
+                <a:ea typeface="Helvetica" charset="0"/>
+                <a:cs typeface="Helvetica" charset="0"/>
+              </a:rPr>
+              <a:t>, 7(3):229–235, 1999. </a:t>
+            </a:r>
+          </a:p>
+          <a:p>
+            <a:r>
+              <a:rPr lang="en-US" dirty="0" smtClean="0">
+                <a:solidFill>
+                  <a:schemeClr val="tx1"/>
+                </a:solidFill>
+                <a:latin typeface="Helvetica" charset="0"/>
+                <a:ea typeface="Helvetica" charset="0"/>
+                <a:cs typeface="Helvetica" charset="0"/>
+              </a:rPr>
+              <a:t>[12] </a:t>
+            </a:r>
+            <a:r>
+              <a:rPr lang="en-US" dirty="0">
+                <a:solidFill>
+                  <a:schemeClr val="tx1"/>
+                </a:solidFill>
+                <a:latin typeface="Helvetica" charset="0"/>
+                <a:ea typeface="Helvetica" charset="0"/>
+                <a:cs typeface="Helvetica" charset="0"/>
+              </a:rPr>
+              <a:t>L. Wang and T. Shen. </a:t>
+            </a:r>
+            <a:r>
+              <a:rPr lang="en-US" dirty="0" smtClean="0">
+                <a:solidFill>
+                  <a:schemeClr val="tx1"/>
+                </a:solidFill>
+                <a:latin typeface="Helvetica" charset="0"/>
+                <a:ea typeface="Helvetica" charset="0"/>
+                <a:cs typeface="Helvetica" charset="0"/>
+              </a:rPr>
+              <a:t>"Improved </a:t>
+            </a:r>
+            <a:r>
+              <a:rPr lang="en-US" dirty="0">
+                <a:solidFill>
+                  <a:schemeClr val="tx1"/>
+                </a:solidFill>
+                <a:latin typeface="Helvetica" charset="0"/>
+                <a:ea typeface="Helvetica" charset="0"/>
+                <a:cs typeface="Helvetica" charset="0"/>
+              </a:rPr>
+              <a:t>adaptive genetic algorithm and its application to image </a:t>
+            </a:r>
+            <a:r>
+              <a:rPr lang="en-US" dirty="0" smtClean="0">
+                <a:solidFill>
+                  <a:schemeClr val="tx1"/>
+                </a:solidFill>
+                <a:latin typeface="Helvetica" charset="0"/>
+                <a:ea typeface="Helvetica" charset="0"/>
+                <a:cs typeface="Helvetica" charset="0"/>
+              </a:rPr>
+              <a:t>segmentation". </a:t>
+            </a:r>
+            <a:r>
+              <a:rPr lang="en-US" i="1" dirty="0">
+                <a:solidFill>
+                  <a:schemeClr val="tx1"/>
+                </a:solidFill>
+                <a:latin typeface="Helvetica" charset="0"/>
+                <a:ea typeface="Helvetica" charset="0"/>
+                <a:cs typeface="Helvetica" charset="0"/>
+              </a:rPr>
+              <a:t>In Multispectral Image Processing and Pattern Recognition</a:t>
+            </a:r>
+            <a:r>
+              <a:rPr lang="en-US" dirty="0">
+                <a:solidFill>
+                  <a:schemeClr val="tx1"/>
+                </a:solidFill>
+                <a:latin typeface="Helvetica" charset="0"/>
+                <a:ea typeface="Helvetica" charset="0"/>
+                <a:cs typeface="Helvetica" charset="0"/>
+              </a:rPr>
+              <a:t>, pages 115–120. International Society for Optics and Photonics, 2001. </a:t>
+            </a:r>
+            <a:endParaRPr lang="en-US" dirty="0" smtClean="0">
+              <a:solidFill>
+                <a:schemeClr val="tx1"/>
+              </a:solidFill>
+              <a:latin typeface="Helvetica" charset="0"/>
+              <a:ea typeface="Helvetica" charset="0"/>
+              <a:cs typeface="Helvetica" charset="0"/>
+            </a:endParaRPr>
+          </a:p>
+          <a:p>
+            <a:r>
+              <a:rPr lang="en-US" dirty="0" smtClean="0">
+                <a:solidFill>
+                  <a:schemeClr val="tx1"/>
+                </a:solidFill>
+                <a:latin typeface="Helvetica" charset="0"/>
+                <a:ea typeface="Helvetica" charset="0"/>
+                <a:cs typeface="Helvetica" charset="0"/>
+              </a:rPr>
+              <a:t>[13] </a:t>
+            </a:r>
+            <a:r>
+              <a:rPr lang="en-US" dirty="0">
+                <a:solidFill>
+                  <a:schemeClr val="tx1"/>
+                </a:solidFill>
+                <a:latin typeface="Helvetica" charset="0"/>
+                <a:ea typeface="Helvetica" charset="0"/>
+                <a:cs typeface="Helvetica" charset="0"/>
+              </a:rPr>
+              <a:t>K. Matthias, T. </a:t>
+            </a:r>
+            <a:r>
+              <a:rPr lang="en-US" dirty="0" err="1">
+                <a:solidFill>
+                  <a:schemeClr val="tx1"/>
+                </a:solidFill>
+                <a:latin typeface="Helvetica" charset="0"/>
+                <a:ea typeface="Helvetica" charset="0"/>
+                <a:cs typeface="Helvetica" charset="0"/>
+              </a:rPr>
+              <a:t>Severin</a:t>
+            </a:r>
+            <a:r>
+              <a:rPr lang="en-US" dirty="0">
+                <a:solidFill>
+                  <a:schemeClr val="tx1"/>
+                </a:solidFill>
+                <a:latin typeface="Helvetica" charset="0"/>
+                <a:ea typeface="Helvetica" charset="0"/>
+                <a:cs typeface="Helvetica" charset="0"/>
+              </a:rPr>
+              <a:t>, and H. </a:t>
+            </a:r>
+            <a:r>
+              <a:rPr lang="en-US" dirty="0" err="1">
+                <a:solidFill>
+                  <a:schemeClr val="tx1"/>
+                </a:solidFill>
+                <a:latin typeface="Helvetica" charset="0"/>
+                <a:ea typeface="Helvetica" charset="0"/>
+                <a:cs typeface="Helvetica" charset="0"/>
+              </a:rPr>
+              <a:t>Salzwedel</a:t>
+            </a:r>
+            <a:r>
+              <a:rPr lang="en-US" dirty="0">
+                <a:solidFill>
+                  <a:schemeClr val="tx1"/>
+                </a:solidFill>
+                <a:latin typeface="Helvetica" charset="0"/>
+                <a:ea typeface="Helvetica" charset="0"/>
+                <a:cs typeface="Helvetica" charset="0"/>
+              </a:rPr>
+              <a:t>. </a:t>
+            </a:r>
+            <a:r>
+              <a:rPr lang="en-US" dirty="0" smtClean="0">
+                <a:solidFill>
+                  <a:schemeClr val="tx1"/>
+                </a:solidFill>
+                <a:latin typeface="Helvetica" charset="0"/>
+                <a:ea typeface="Helvetica" charset="0"/>
+                <a:cs typeface="Helvetica" charset="0"/>
+              </a:rPr>
+              <a:t>"Variable </a:t>
+            </a:r>
+            <a:r>
+              <a:rPr lang="en-US" dirty="0">
+                <a:solidFill>
+                  <a:schemeClr val="tx1"/>
+                </a:solidFill>
+                <a:latin typeface="Helvetica" charset="0"/>
+                <a:ea typeface="Helvetica" charset="0"/>
+                <a:cs typeface="Helvetica" charset="0"/>
+              </a:rPr>
+              <a:t>mutation rate at genetic algorithms: introduction of chromosome fitness in connection with multi-chromosome </a:t>
+            </a:r>
+            <a:r>
+              <a:rPr lang="en-US" dirty="0" smtClean="0">
+                <a:solidFill>
+                  <a:schemeClr val="tx1"/>
+                </a:solidFill>
+                <a:latin typeface="Helvetica" charset="0"/>
+                <a:ea typeface="Helvetica" charset="0"/>
+                <a:cs typeface="Helvetica" charset="0"/>
+              </a:rPr>
+              <a:t>representation". </a:t>
+            </a:r>
+            <a:r>
+              <a:rPr lang="en-US" i="1" dirty="0">
+                <a:solidFill>
+                  <a:schemeClr val="tx1"/>
+                </a:solidFill>
+                <a:latin typeface="Helvetica" charset="0"/>
+                <a:ea typeface="Helvetica" charset="0"/>
+                <a:cs typeface="Helvetica" charset="0"/>
+              </a:rPr>
+              <a:t>International Journal of Computer Applications</a:t>
+            </a:r>
+            <a:r>
+              <a:rPr lang="en-US" dirty="0">
+                <a:solidFill>
+                  <a:schemeClr val="tx1"/>
+                </a:solidFill>
+                <a:latin typeface="Helvetica" charset="0"/>
+                <a:ea typeface="Helvetica" charset="0"/>
+                <a:cs typeface="Helvetica" charset="0"/>
+              </a:rPr>
+              <a:t>, 72(17), 2013</a:t>
+            </a:r>
+            <a:r>
+              <a:rPr lang="en-US" dirty="0" smtClean="0">
+                <a:solidFill>
+                  <a:schemeClr val="tx1"/>
+                </a:solidFill>
+                <a:latin typeface="Helvetica" charset="0"/>
+                <a:ea typeface="Helvetica" charset="0"/>
+                <a:cs typeface="Helvetica" charset="0"/>
+              </a:rPr>
+              <a:t>.</a:t>
+            </a:r>
+          </a:p>
+          <a:p>
+            <a:endParaRPr lang="en-US" dirty="0">
+              <a:solidFill>
+                <a:schemeClr val="tx1"/>
+              </a:solidFill>
+              <a:latin typeface="Helvetica" charset="0"/>
+              <a:ea typeface="Helvetica" charset="0"/>
+              <a:cs typeface="Helvetica" charset="0"/>
+            </a:endParaRPr>
+          </a:p>
+          <a:p>
+            <a:endParaRPr lang="en-US" dirty="0">
+              <a:solidFill>
+                <a:schemeClr val="tx1"/>
+              </a:solidFill>
+              <a:latin typeface="Helvetica" charset="0"/>
+              <a:ea typeface="Helvetica" charset="0"/>
+              <a:cs typeface="Helvetica" charset="0"/>
+            </a:endParaRPr>
+          </a:p>
+        </p:txBody>
+      </p:sp>
+      <p:sp>
+        <p:nvSpPr>
+          <p:cNvPr id="4" name="Slide Number Placeholder 3"/>
+          <p:cNvSpPr>
+            <a:spLocks noGrp="1"/>
+          </p:cNvSpPr>
+          <p:nvPr>
+            <p:ph type="sldNum" sz="quarter" idx="12"/>
+          </p:nvPr>
+        </p:nvSpPr>
+        <p:spPr/>
+        <p:txBody>
+          <a:bodyPr/>
+          <a:lstStyle/>
+          <a:p>
+            <a:fld id="{55774153-6BEA-8641-B7A1-86CE42693FE2}" type="slidenum">
+              <a:rPr lang="en-US" smtClean="0"/>
+              <a:t>29</a:t>
+            </a:fld>
+            <a:endParaRPr lang="en-US"/>
+          </a:p>
+        </p:txBody>
+      </p:sp>
+    </p:spTree>
+    <p:extLst>
+      <p:ext uri="{BB962C8B-B14F-4D97-AF65-F5344CB8AC3E}">
+        <p14:creationId xmlns:p14="http://schemas.microsoft.com/office/powerpoint/2010/main" val="823118128"/>
       </p:ext>
     </p:extLst>
   </p:cSld>

</xml_diff>

<commit_message>
Changed AGA algorithm a bit
</commit_message>
<xml_diff>
--- a/presentations/TG2_Apresentacao_Cassio.pptx
+++ b/presentations/TG2_Apresentacao_Cassio.pptx
@@ -27089,7 +27089,7 @@
       </p:sp>
       <p:pic>
         <p:nvPicPr>
-          <p:cNvPr id="12" name="Content Placeholder 11"/>
+          <p:cNvPr id="11" name="Content Placeholder 10"/>
           <p:cNvPicPr>
             <a:picLocks noGrp="1" noChangeAspect="1"/>
           </p:cNvPicPr>
@@ -27111,8 +27111,8 @@
         </p:blipFill>
         <p:spPr>
           <a:xfrm>
-            <a:off x="1880243" y="2603500"/>
-            <a:ext cx="7375827" cy="3416300"/>
+            <a:off x="2122406" y="2603500"/>
+            <a:ext cx="6891501" cy="3416300"/>
           </a:xfrm>
         </p:spPr>
       </p:pic>
@@ -27257,7 +27257,7 @@
       </p:sp>
       <p:pic>
         <p:nvPicPr>
-          <p:cNvPr id="7" name="Content Placeholder 6"/>
+          <p:cNvPr id="10" name="Content Placeholder 9"/>
           <p:cNvPicPr>
             <a:picLocks noGrp="1" noChangeAspect="1"/>
           </p:cNvPicPr>
@@ -27929,7 +27929,7 @@
       </p:sp>
       <p:pic>
         <p:nvPicPr>
-          <p:cNvPr id="4" name="Content Placeholder 3"/>
+          <p:cNvPr id="8" name="Content Placeholder 7"/>
           <p:cNvPicPr>
             <a:picLocks noGrp="1" noChangeAspect="1"/>
           </p:cNvPicPr>

</xml_diff>

<commit_message>
Updated optimization image and added the remaining chapters for the presentation
</commit_message>
<xml_diff>
--- a/presentations/TG2_Apresentacao_Cassio.pptx
+++ b/presentations/TG2_Apresentacao_Cassio.pptx
@@ -5,7 +5,7 @@
     <p:sldMasterId id="2147484198" r:id="rId1"/>
   </p:sldMasterIdLst>
   <p:notesMasterIdLst>
-    <p:notesMasterId r:id="rId32"/>
+    <p:notesMasterId r:id="rId34"/>
   </p:notesMasterIdLst>
   <p:sldIdLst>
     <p:sldId id="256" r:id="rId2"/>
@@ -35,9 +35,11 @@
     <p:sldId id="294" r:id="rId26"/>
     <p:sldId id="295" r:id="rId27"/>
     <p:sldId id="291" r:id="rId28"/>
-    <p:sldId id="269" r:id="rId29"/>
-    <p:sldId id="271" r:id="rId30"/>
-    <p:sldId id="289" r:id="rId31"/>
+    <p:sldId id="298" r:id="rId29"/>
+    <p:sldId id="299" r:id="rId30"/>
+    <p:sldId id="269" r:id="rId31"/>
+    <p:sldId id="271" r:id="rId32"/>
+    <p:sldId id="289" r:id="rId33"/>
   </p:sldIdLst>
   <p:sldSz cx="12192000" cy="6858000"/>
   <p:notesSz cx="6858000" cy="9144000"/>
@@ -1829,6 +1831,174 @@
     <p:extLst>
       <p:ext uri="{BB962C8B-B14F-4D97-AF65-F5344CB8AC3E}">
         <p14:creationId xmlns:p14="http://schemas.microsoft.com/office/powerpoint/2010/main" val="2072068894"/>
+      </p:ext>
+    </p:extLst>
+  </p:cSld>
+  <p:clrMapOvr>
+    <a:masterClrMapping/>
+  </p:clrMapOvr>
+</p:notes>
+</file>
+
+<file path=ppt/notesSlides/notesSlide24.xml><?xml version="1.0" encoding="utf-8"?>
+<p:notes xmlns:a="http://schemas.openxmlformats.org/drawingml/2006/main" xmlns:r="http://schemas.openxmlformats.org/officeDocument/2006/relationships" xmlns:p="http://schemas.openxmlformats.org/presentationml/2006/main">
+  <p:cSld>
+    <p:spTree>
+      <p:nvGrpSpPr>
+        <p:cNvPr id="1" name=""/>
+        <p:cNvGrpSpPr/>
+        <p:nvPr/>
+      </p:nvGrpSpPr>
+      <p:grpSpPr>
+        <a:xfrm>
+          <a:off x="0" y="0"/>
+          <a:ext cx="0" cy="0"/>
+          <a:chOff x="0" y="0"/>
+          <a:chExt cx="0" cy="0"/>
+        </a:xfrm>
+      </p:grpSpPr>
+      <p:sp>
+        <p:nvSpPr>
+          <p:cNvPr id="2" name="Slide Image Placeholder 1"/>
+          <p:cNvSpPr>
+            <a:spLocks noGrp="1" noRot="1" noChangeAspect="1"/>
+          </p:cNvSpPr>
+          <p:nvPr>
+            <p:ph type="sldImg"/>
+          </p:nvPr>
+        </p:nvSpPr>
+        <p:spPr/>
+      </p:sp>
+      <p:sp>
+        <p:nvSpPr>
+          <p:cNvPr id="3" name="Notes Placeholder 2"/>
+          <p:cNvSpPr>
+            <a:spLocks noGrp="1"/>
+          </p:cNvSpPr>
+          <p:nvPr>
+            <p:ph type="body" idx="1"/>
+          </p:nvPr>
+        </p:nvSpPr>
+        <p:spPr/>
+        <p:txBody>
+          <a:bodyPr/>
+          <a:lstStyle/>
+          <a:p>
+            <a:endParaRPr lang="en-US"/>
+          </a:p>
+        </p:txBody>
+      </p:sp>
+      <p:sp>
+        <p:nvSpPr>
+          <p:cNvPr id="4" name="Slide Number Placeholder 3"/>
+          <p:cNvSpPr>
+            <a:spLocks noGrp="1"/>
+          </p:cNvSpPr>
+          <p:nvPr>
+            <p:ph type="sldNum" sz="quarter" idx="10"/>
+          </p:nvPr>
+        </p:nvSpPr>
+        <p:spPr/>
+        <p:txBody>
+          <a:bodyPr/>
+          <a:lstStyle/>
+          <a:p>
+            <a:fld id="{728E3497-A358-B14F-AE0E-969A2D296615}" type="slidenum">
+              <a:rPr lang="en-US" smtClean="0"/>
+              <a:t>27</a:t>
+            </a:fld>
+            <a:endParaRPr lang="en-US"/>
+          </a:p>
+        </p:txBody>
+      </p:sp>
+    </p:spTree>
+    <p:extLst>
+      <p:ext uri="{BB962C8B-B14F-4D97-AF65-F5344CB8AC3E}">
+        <p14:creationId xmlns:p14="http://schemas.microsoft.com/office/powerpoint/2010/main" val="1831207497"/>
+      </p:ext>
+    </p:extLst>
+  </p:cSld>
+  <p:clrMapOvr>
+    <a:masterClrMapping/>
+  </p:clrMapOvr>
+</p:notes>
+</file>
+
+<file path=ppt/notesSlides/notesSlide25.xml><?xml version="1.0" encoding="utf-8"?>
+<p:notes xmlns:a="http://schemas.openxmlformats.org/drawingml/2006/main" xmlns:r="http://schemas.openxmlformats.org/officeDocument/2006/relationships" xmlns:p="http://schemas.openxmlformats.org/presentationml/2006/main">
+  <p:cSld>
+    <p:spTree>
+      <p:nvGrpSpPr>
+        <p:cNvPr id="1" name=""/>
+        <p:cNvGrpSpPr/>
+        <p:nvPr/>
+      </p:nvGrpSpPr>
+      <p:grpSpPr>
+        <a:xfrm>
+          <a:off x="0" y="0"/>
+          <a:ext cx="0" cy="0"/>
+          <a:chOff x="0" y="0"/>
+          <a:chExt cx="0" cy="0"/>
+        </a:xfrm>
+      </p:grpSpPr>
+      <p:sp>
+        <p:nvSpPr>
+          <p:cNvPr id="2" name="Slide Image Placeholder 1"/>
+          <p:cNvSpPr>
+            <a:spLocks noGrp="1" noRot="1" noChangeAspect="1"/>
+          </p:cNvSpPr>
+          <p:nvPr>
+            <p:ph type="sldImg"/>
+          </p:nvPr>
+        </p:nvSpPr>
+        <p:spPr/>
+      </p:sp>
+      <p:sp>
+        <p:nvSpPr>
+          <p:cNvPr id="3" name="Notes Placeholder 2"/>
+          <p:cNvSpPr>
+            <a:spLocks noGrp="1"/>
+          </p:cNvSpPr>
+          <p:nvPr>
+            <p:ph type="body" idx="1"/>
+          </p:nvPr>
+        </p:nvSpPr>
+        <p:spPr/>
+        <p:txBody>
+          <a:bodyPr/>
+          <a:lstStyle/>
+          <a:p>
+            <a:endParaRPr lang="en-US"/>
+          </a:p>
+        </p:txBody>
+      </p:sp>
+      <p:sp>
+        <p:nvSpPr>
+          <p:cNvPr id="4" name="Slide Number Placeholder 3"/>
+          <p:cNvSpPr>
+            <a:spLocks noGrp="1"/>
+          </p:cNvSpPr>
+          <p:nvPr>
+            <p:ph type="sldNum" sz="quarter" idx="10"/>
+          </p:nvPr>
+        </p:nvSpPr>
+        <p:spPr/>
+        <p:txBody>
+          <a:bodyPr/>
+          <a:lstStyle/>
+          <a:p>
+            <a:fld id="{728E3497-A358-B14F-AE0E-969A2D296615}" type="slidenum">
+              <a:rPr lang="en-US" smtClean="0"/>
+              <a:t>28</a:t>
+            </a:fld>
+            <a:endParaRPr lang="en-US"/>
+          </a:p>
+        </p:txBody>
+      </p:sp>
+    </p:spTree>
+    <p:extLst>
+      <p:ext uri="{BB962C8B-B14F-4D97-AF65-F5344CB8AC3E}">
+        <p14:creationId xmlns:p14="http://schemas.microsoft.com/office/powerpoint/2010/main" val="651020841"/>
       </p:ext>
     </p:extLst>
   </p:cSld>
@@ -24687,7 +24857,7 @@
               <a:t> </a:t>
             </a:r>
             <a:r>
-              <a:rPr lang="en-US" smtClean="0">
+              <a:rPr lang="en-US" dirty="0" err="1" smtClean="0">
                 <a:solidFill>
                   <a:schemeClr val="tx1"/>
                 </a:solidFill>
@@ -28294,9 +28464,25 @@
                 <a:ea typeface="Helvetica" charset="0"/>
                 <a:cs typeface="Helvetica" charset="0"/>
               </a:rPr>
-              <a:t>Referências</a:t>
-            </a:r>
-            <a:endParaRPr lang="en-US" b="1" dirty="0">
+              <a:t>Conclus</a:t>
+            </a:r>
+            <a:r>
+              <a:rPr lang="en-US" b="1" dirty="0" smtClean="0">
+                <a:latin typeface="Helvetica" charset="0"/>
+                <a:ea typeface="Helvetica" charset="0"/>
+                <a:cs typeface="Helvetica" charset="0"/>
+              </a:rPr>
+              <a:t>	</a:t>
+            </a:r>
+            <a:r>
+              <a:rPr lang="en-US" b="1" dirty="0" err="1" smtClean="0">
+                <a:latin typeface="Helvetica" charset="0"/>
+                <a:ea typeface="Helvetica" charset="0"/>
+                <a:cs typeface="Helvetica" charset="0"/>
+              </a:rPr>
+              <a:t>ões</a:t>
+            </a:r>
+            <a:endParaRPr lang="en-US" sz="2800" b="1" dirty="0">
               <a:latin typeface="Helvetica" charset="0"/>
               <a:ea typeface="Helvetica" charset="0"/>
               <a:cs typeface="Helvetica" charset="0"/>
@@ -28317,7 +28503,7 @@
         <p:spPr>
           <a:xfrm>
             <a:off x="1154954" y="2603500"/>
-            <a:ext cx="10035785" cy="4102100"/>
+            <a:ext cx="9647158" cy="4126484"/>
           </a:xfrm>
         </p:spPr>
         <p:txBody>
@@ -28327,149 +28513,6 @@
           <a:lstStyle/>
           <a:p>
             <a:r>
-              <a:rPr lang="en-US" dirty="0" smtClean="0">
-                <a:solidFill>
-                  <a:schemeClr val="tx1"/>
-                </a:solidFill>
-                <a:latin typeface="Helvetica" charset="0"/>
-                <a:ea typeface="Helvetica" charset="0"/>
-                <a:cs typeface="Helvetica" charset="0"/>
-              </a:rPr>
-              <a:t>[1] </a:t>
-            </a:r>
-            <a:r>
-              <a:rPr lang="en-US" dirty="0">
-                <a:solidFill>
-                  <a:schemeClr val="tx1"/>
-                </a:solidFill>
-                <a:latin typeface="Helvetica" charset="0"/>
-                <a:ea typeface="Helvetica" charset="0"/>
-                <a:cs typeface="Helvetica" charset="0"/>
-              </a:rPr>
-              <a:t>A. E. </a:t>
-            </a:r>
-            <a:r>
-              <a:rPr lang="en-US" dirty="0" err="1" smtClean="0">
-                <a:solidFill>
-                  <a:schemeClr val="tx1"/>
-                </a:solidFill>
-                <a:latin typeface="Helvetica" charset="0"/>
-                <a:ea typeface="Helvetica" charset="0"/>
-                <a:cs typeface="Helvetica" charset="0"/>
-              </a:rPr>
-              <a:t>Eiben</a:t>
-            </a:r>
-            <a:r>
-              <a:rPr lang="en-US" dirty="0" smtClean="0">
-                <a:solidFill>
-                  <a:schemeClr val="tx1"/>
-                </a:solidFill>
-                <a:latin typeface="Helvetica" charset="0"/>
-                <a:ea typeface="Helvetica" charset="0"/>
-                <a:cs typeface="Helvetica" charset="0"/>
-              </a:rPr>
-              <a:t>, J</a:t>
-            </a:r>
-            <a:r>
-              <a:rPr lang="en-US" dirty="0">
-                <a:solidFill>
-                  <a:schemeClr val="tx1"/>
-                </a:solidFill>
-                <a:latin typeface="Helvetica" charset="0"/>
-                <a:ea typeface="Helvetica" charset="0"/>
-                <a:cs typeface="Helvetica" charset="0"/>
-              </a:rPr>
-              <a:t>. E. Smith. </a:t>
-            </a:r>
-            <a:r>
-              <a:rPr lang="en-US" dirty="0" smtClean="0">
-                <a:solidFill>
-                  <a:schemeClr val="tx1"/>
-                </a:solidFill>
-                <a:latin typeface="Helvetica" charset="0"/>
-                <a:ea typeface="Helvetica" charset="0"/>
-                <a:cs typeface="Helvetica" charset="0"/>
-              </a:rPr>
-              <a:t>“</a:t>
-            </a:r>
-            <a:r>
-              <a:rPr lang="en-US" i="1" dirty="0" smtClean="0">
-                <a:solidFill>
-                  <a:schemeClr val="tx1"/>
-                </a:solidFill>
-                <a:latin typeface="Helvetica" charset="0"/>
-                <a:ea typeface="Helvetica" charset="0"/>
-                <a:cs typeface="Helvetica" charset="0"/>
-              </a:rPr>
-              <a:t>Introduction </a:t>
-            </a:r>
-            <a:r>
-              <a:rPr lang="en-US" i="1" dirty="0">
-                <a:solidFill>
-                  <a:schemeClr val="tx1"/>
-                </a:solidFill>
-                <a:latin typeface="Helvetica" charset="0"/>
-                <a:ea typeface="Helvetica" charset="0"/>
-                <a:cs typeface="Helvetica" charset="0"/>
-              </a:rPr>
-              <a:t>To Evolutionary </a:t>
-            </a:r>
-            <a:r>
-              <a:rPr lang="en-US" i="1" dirty="0" smtClean="0">
-                <a:solidFill>
-                  <a:schemeClr val="tx1"/>
-                </a:solidFill>
-                <a:latin typeface="Helvetica" charset="0"/>
-                <a:ea typeface="Helvetica" charset="0"/>
-                <a:cs typeface="Helvetica" charset="0"/>
-              </a:rPr>
-              <a:t>Computing”</a:t>
-            </a:r>
-            <a:r>
-              <a:rPr lang="en-US" dirty="0" smtClean="0">
-                <a:solidFill>
-                  <a:schemeClr val="tx1"/>
-                </a:solidFill>
-                <a:latin typeface="Helvetica" charset="0"/>
-                <a:ea typeface="Helvetica" charset="0"/>
-                <a:cs typeface="Helvetica" charset="0"/>
-              </a:rPr>
-              <a:t>. </a:t>
-            </a:r>
-            <a:r>
-              <a:rPr lang="en-US" dirty="0">
-                <a:solidFill>
-                  <a:schemeClr val="tx1"/>
-                </a:solidFill>
-                <a:latin typeface="Helvetica" charset="0"/>
-                <a:ea typeface="Helvetica" charset="0"/>
-                <a:cs typeface="Helvetica" charset="0"/>
-              </a:rPr>
-              <a:t>V</a:t>
-            </a:r>
-            <a:r>
-              <a:rPr lang="en-US" dirty="0" smtClean="0">
-                <a:solidFill>
-                  <a:schemeClr val="tx1"/>
-                </a:solidFill>
-                <a:latin typeface="Helvetica" charset="0"/>
-                <a:ea typeface="Helvetica" charset="0"/>
-                <a:cs typeface="Helvetica" charset="0"/>
-              </a:rPr>
-              <a:t>olume 53. </a:t>
-            </a:r>
-            <a:r>
-              <a:rPr lang="en-US" dirty="0">
-                <a:solidFill>
-                  <a:schemeClr val="tx1"/>
-                </a:solidFill>
-                <a:latin typeface="Helvetica" charset="0"/>
-                <a:ea typeface="Helvetica" charset="0"/>
-                <a:cs typeface="Helvetica" charset="0"/>
-              </a:rPr>
-              <a:t>Springer-</a:t>
-            </a:r>
-            <a:r>
               <a:rPr lang="en-US" dirty="0" err="1">
                 <a:solidFill>
                   <a:schemeClr val="tx1"/>
@@ -28478,20 +28521,42 @@
                 <a:ea typeface="Helvetica" charset="0"/>
                 <a:cs typeface="Helvetica" charset="0"/>
               </a:rPr>
-              <a:t>Verlag</a:t>
-            </a:r>
-            <a:r>
-              <a:rPr lang="en-US" dirty="0">
-                <a:solidFill>
-                  <a:schemeClr val="tx1"/>
-                </a:solidFill>
-                <a:latin typeface="Helvetica" charset="0"/>
-                <a:ea typeface="Helvetica" charset="0"/>
-                <a:cs typeface="Helvetica" charset="0"/>
-              </a:rPr>
-              <a:t>, 2003. </a:t>
-            </a:r>
-            <a:endParaRPr lang="en-US" dirty="0" smtClean="0">
+              <a:t>T</a:t>
+            </a:r>
+            <a:r>
+              <a:rPr lang="en-US" dirty="0" err="1" smtClean="0">
+                <a:solidFill>
+                  <a:schemeClr val="tx1"/>
+                </a:solidFill>
+                <a:latin typeface="Helvetica" charset="0"/>
+                <a:ea typeface="Helvetica" charset="0"/>
+                <a:cs typeface="Helvetica" charset="0"/>
+              </a:rPr>
+              <a:t>exto</a:t>
+            </a:r>
+            <a:r>
+              <a:rPr lang="en-US" dirty="0" smtClean="0">
+                <a:solidFill>
+                  <a:schemeClr val="tx1"/>
+                </a:solidFill>
+                <a:latin typeface="Helvetica" charset="0"/>
+                <a:ea typeface="Helvetica" charset="0"/>
+                <a:cs typeface="Helvetica" charset="0"/>
+              </a:rPr>
+              <a:t> </a:t>
+            </a:r>
+            <a:r>
+              <a:rPr lang="en-US" dirty="0" err="1" smtClean="0">
+                <a:solidFill>
+                  <a:schemeClr val="tx1"/>
+                </a:solidFill>
+                <a:latin typeface="Helvetica" charset="0"/>
+                <a:ea typeface="Helvetica" charset="0"/>
+                <a:cs typeface="Helvetica" charset="0"/>
+              </a:rPr>
+              <a:t>aqui</a:t>
+            </a:r>
+            <a:endParaRPr lang="en-US" i="1" baseline="-25000" dirty="0" smtClean="0">
               <a:solidFill>
                 <a:schemeClr val="tx1"/>
               </a:solidFill>
@@ -28499,643 +28564,6 @@
               <a:ea typeface="Helvetica" charset="0"/>
               <a:cs typeface="Helvetica" charset="0"/>
             </a:endParaRPr>
-          </a:p>
-          <a:p>
-            <a:r>
-              <a:rPr lang="en-US" dirty="0" smtClean="0">
-                <a:solidFill>
-                  <a:schemeClr val="tx1"/>
-                </a:solidFill>
-                <a:latin typeface="Helvetica" charset="0"/>
-                <a:ea typeface="Helvetica" charset="0"/>
-                <a:cs typeface="Helvetica" charset="0"/>
-              </a:rPr>
-              <a:t>[2] A</a:t>
-            </a:r>
-            <a:r>
-              <a:rPr lang="en-US" dirty="0">
-                <a:solidFill>
-                  <a:schemeClr val="tx1"/>
-                </a:solidFill>
-                <a:latin typeface="Helvetica" charset="0"/>
-                <a:ea typeface="Helvetica" charset="0"/>
-                <a:cs typeface="Helvetica" charset="0"/>
-              </a:rPr>
-              <a:t>. E. </a:t>
-            </a:r>
-            <a:r>
-              <a:rPr lang="en-US" dirty="0" err="1" smtClean="0">
-                <a:solidFill>
-                  <a:schemeClr val="tx1"/>
-                </a:solidFill>
-                <a:latin typeface="Helvetica" charset="0"/>
-                <a:ea typeface="Helvetica" charset="0"/>
-                <a:cs typeface="Helvetica" charset="0"/>
-              </a:rPr>
-              <a:t>Eiben</a:t>
-            </a:r>
-            <a:r>
-              <a:rPr lang="en-US" dirty="0" smtClean="0">
-                <a:solidFill>
-                  <a:schemeClr val="tx1"/>
-                </a:solidFill>
-                <a:latin typeface="Helvetica" charset="0"/>
-                <a:ea typeface="Helvetica" charset="0"/>
-                <a:cs typeface="Helvetica" charset="0"/>
-              </a:rPr>
-              <a:t>, S</a:t>
-            </a:r>
-            <a:r>
-              <a:rPr lang="en-US" dirty="0">
-                <a:solidFill>
-                  <a:schemeClr val="tx1"/>
-                </a:solidFill>
-                <a:latin typeface="Helvetica" charset="0"/>
-                <a:ea typeface="Helvetica" charset="0"/>
-                <a:cs typeface="Helvetica" charset="0"/>
-              </a:rPr>
-              <a:t>. K. </a:t>
-            </a:r>
-            <a:r>
-              <a:rPr lang="en-US" dirty="0" err="1">
-                <a:solidFill>
-                  <a:schemeClr val="tx1"/>
-                </a:solidFill>
-                <a:latin typeface="Helvetica" charset="0"/>
-                <a:ea typeface="Helvetica" charset="0"/>
-                <a:cs typeface="Helvetica" charset="0"/>
-              </a:rPr>
-              <a:t>Smit</a:t>
-            </a:r>
-            <a:r>
-              <a:rPr lang="en-US" dirty="0">
-                <a:solidFill>
-                  <a:schemeClr val="tx1"/>
-                </a:solidFill>
-                <a:latin typeface="Helvetica" charset="0"/>
-                <a:ea typeface="Helvetica" charset="0"/>
-                <a:cs typeface="Helvetica" charset="0"/>
-              </a:rPr>
-              <a:t>. </a:t>
-            </a:r>
-            <a:r>
-              <a:rPr lang="en-US" dirty="0" smtClean="0">
-                <a:solidFill>
-                  <a:schemeClr val="tx1"/>
-                </a:solidFill>
-                <a:latin typeface="Helvetica" charset="0"/>
-                <a:ea typeface="Helvetica" charset="0"/>
-                <a:cs typeface="Helvetica" charset="0"/>
-              </a:rPr>
-              <a:t>“Parameter </a:t>
-            </a:r>
-            <a:r>
-              <a:rPr lang="en-US" dirty="0">
-                <a:solidFill>
-                  <a:schemeClr val="tx1"/>
-                </a:solidFill>
-                <a:latin typeface="Helvetica" charset="0"/>
-                <a:ea typeface="Helvetica" charset="0"/>
-                <a:cs typeface="Helvetica" charset="0"/>
-              </a:rPr>
-              <a:t>tuning for configuring and analyzing evolutionary </a:t>
-            </a:r>
-            <a:r>
-              <a:rPr lang="en-US" dirty="0" smtClean="0">
-                <a:solidFill>
-                  <a:schemeClr val="tx1"/>
-                </a:solidFill>
-                <a:latin typeface="Helvetica" charset="0"/>
-                <a:ea typeface="Helvetica" charset="0"/>
-                <a:cs typeface="Helvetica" charset="0"/>
-              </a:rPr>
-              <a:t>algorithms”. </a:t>
-            </a:r>
-            <a:r>
-              <a:rPr lang="en-US" i="1" dirty="0">
-                <a:solidFill>
-                  <a:schemeClr val="tx1"/>
-                </a:solidFill>
-                <a:latin typeface="Helvetica" charset="0"/>
-                <a:ea typeface="Helvetica" charset="0"/>
-                <a:cs typeface="Helvetica" charset="0"/>
-              </a:rPr>
-              <a:t>Swarm and Evolutionary Computation</a:t>
-            </a:r>
-            <a:r>
-              <a:rPr lang="en-US" dirty="0">
-                <a:solidFill>
-                  <a:schemeClr val="tx1"/>
-                </a:solidFill>
-                <a:latin typeface="Helvetica" charset="0"/>
-                <a:ea typeface="Helvetica" charset="0"/>
-                <a:cs typeface="Helvetica" charset="0"/>
-              </a:rPr>
-              <a:t>, 1(1):19–31, 2011</a:t>
-            </a:r>
-            <a:r>
-              <a:rPr lang="en-US" dirty="0" smtClean="0">
-                <a:solidFill>
-                  <a:schemeClr val="tx1"/>
-                </a:solidFill>
-                <a:latin typeface="Helvetica" charset="0"/>
-                <a:ea typeface="Helvetica" charset="0"/>
-                <a:cs typeface="Helvetica" charset="0"/>
-              </a:rPr>
-              <a:t>.</a:t>
-            </a:r>
-          </a:p>
-          <a:p>
-            <a:r>
-              <a:rPr lang="en-US" dirty="0" smtClean="0">
-                <a:solidFill>
-                  <a:schemeClr val="tx1"/>
-                </a:solidFill>
-                <a:latin typeface="Helvetica" charset="0"/>
-                <a:ea typeface="Helvetica" charset="0"/>
-                <a:cs typeface="Helvetica" charset="0"/>
-              </a:rPr>
-              <a:t>[3] </a:t>
-            </a:r>
-            <a:r>
-              <a:rPr lang="en-US" dirty="0">
-                <a:solidFill>
-                  <a:schemeClr val="tx1"/>
-                </a:solidFill>
-                <a:latin typeface="Helvetica" charset="0"/>
-                <a:ea typeface="Helvetica" charset="0"/>
-                <a:cs typeface="Helvetica" charset="0"/>
-              </a:rPr>
-              <a:t>K. Matthias, T. </a:t>
-            </a:r>
-            <a:r>
-              <a:rPr lang="en-US" dirty="0" err="1">
-                <a:solidFill>
-                  <a:schemeClr val="tx1"/>
-                </a:solidFill>
-                <a:latin typeface="Helvetica" charset="0"/>
-                <a:ea typeface="Helvetica" charset="0"/>
-                <a:cs typeface="Helvetica" charset="0"/>
-              </a:rPr>
-              <a:t>Severin</a:t>
-            </a:r>
-            <a:r>
-              <a:rPr lang="en-US" dirty="0">
-                <a:solidFill>
-                  <a:schemeClr val="tx1"/>
-                </a:solidFill>
-                <a:latin typeface="Helvetica" charset="0"/>
-                <a:ea typeface="Helvetica" charset="0"/>
-                <a:cs typeface="Helvetica" charset="0"/>
-              </a:rPr>
-              <a:t>, and H. </a:t>
-            </a:r>
-            <a:r>
-              <a:rPr lang="en-US" dirty="0" err="1">
-                <a:solidFill>
-                  <a:schemeClr val="tx1"/>
-                </a:solidFill>
-                <a:latin typeface="Helvetica" charset="0"/>
-                <a:ea typeface="Helvetica" charset="0"/>
-                <a:cs typeface="Helvetica" charset="0"/>
-              </a:rPr>
-              <a:t>Salzwedel</a:t>
-            </a:r>
-            <a:r>
-              <a:rPr lang="en-US" dirty="0">
-                <a:solidFill>
-                  <a:schemeClr val="tx1"/>
-                </a:solidFill>
-                <a:latin typeface="Helvetica" charset="0"/>
-                <a:ea typeface="Helvetica" charset="0"/>
-                <a:cs typeface="Helvetica" charset="0"/>
-              </a:rPr>
-              <a:t>. </a:t>
-            </a:r>
-            <a:r>
-              <a:rPr lang="en-US" dirty="0" smtClean="0">
-                <a:solidFill>
-                  <a:schemeClr val="tx1"/>
-                </a:solidFill>
-                <a:latin typeface="Helvetica" charset="0"/>
-                <a:ea typeface="Helvetica" charset="0"/>
-                <a:cs typeface="Helvetica" charset="0"/>
-              </a:rPr>
-              <a:t>"Variable </a:t>
-            </a:r>
-            <a:r>
-              <a:rPr lang="en-US" dirty="0">
-                <a:solidFill>
-                  <a:schemeClr val="tx1"/>
-                </a:solidFill>
-                <a:latin typeface="Helvetica" charset="0"/>
-                <a:ea typeface="Helvetica" charset="0"/>
-                <a:cs typeface="Helvetica" charset="0"/>
-              </a:rPr>
-              <a:t>mutation rate at genetic algorithms: introduction of chromosome fitness in connection with multi-chromosome </a:t>
-            </a:r>
-            <a:r>
-              <a:rPr lang="en-US" dirty="0" smtClean="0">
-                <a:solidFill>
-                  <a:schemeClr val="tx1"/>
-                </a:solidFill>
-                <a:latin typeface="Helvetica" charset="0"/>
-                <a:ea typeface="Helvetica" charset="0"/>
-                <a:cs typeface="Helvetica" charset="0"/>
-              </a:rPr>
-              <a:t>representation". </a:t>
-            </a:r>
-            <a:r>
-              <a:rPr lang="en-US" i="1" dirty="0">
-                <a:solidFill>
-                  <a:schemeClr val="tx1"/>
-                </a:solidFill>
-                <a:latin typeface="Helvetica" charset="0"/>
-                <a:ea typeface="Helvetica" charset="0"/>
-                <a:cs typeface="Helvetica" charset="0"/>
-              </a:rPr>
-              <a:t>International Journal of Computer Applications</a:t>
-            </a:r>
-            <a:r>
-              <a:rPr lang="en-US" dirty="0">
-                <a:solidFill>
-                  <a:schemeClr val="tx1"/>
-                </a:solidFill>
-                <a:latin typeface="Helvetica" charset="0"/>
-                <a:ea typeface="Helvetica" charset="0"/>
-                <a:cs typeface="Helvetica" charset="0"/>
-              </a:rPr>
-              <a:t>, 72(17), 2013. </a:t>
-            </a:r>
-            <a:endParaRPr lang="en-US" dirty="0" smtClean="0">
-              <a:solidFill>
-                <a:schemeClr val="tx1"/>
-              </a:solidFill>
-              <a:latin typeface="Helvetica" charset="0"/>
-              <a:ea typeface="Helvetica" charset="0"/>
-              <a:cs typeface="Helvetica" charset="0"/>
-            </a:endParaRPr>
-          </a:p>
-          <a:p>
-            <a:r>
-              <a:rPr lang="en-US" dirty="0" smtClean="0">
-                <a:solidFill>
-                  <a:schemeClr val="tx1"/>
-                </a:solidFill>
-                <a:latin typeface="Helvetica" charset="0"/>
-                <a:ea typeface="Helvetica" charset="0"/>
-                <a:cs typeface="Helvetica" charset="0"/>
-              </a:rPr>
-              <a:t>[4] </a:t>
-            </a:r>
-            <a:r>
-              <a:rPr lang="en-US" dirty="0">
-                <a:solidFill>
-                  <a:schemeClr val="tx1"/>
-                </a:solidFill>
-                <a:latin typeface="Helvetica" charset="0"/>
-                <a:ea typeface="Helvetica" charset="0"/>
-                <a:cs typeface="Helvetica" charset="0"/>
-              </a:rPr>
-              <a:t>M. </a:t>
-            </a:r>
-            <a:r>
-              <a:rPr lang="en-US" dirty="0" err="1">
-                <a:solidFill>
-                  <a:schemeClr val="tx1"/>
-                </a:solidFill>
-                <a:latin typeface="Helvetica" charset="0"/>
-                <a:ea typeface="Helvetica" charset="0"/>
-                <a:cs typeface="Helvetica" charset="0"/>
-              </a:rPr>
-              <a:t>Obitko</a:t>
-            </a:r>
-            <a:r>
-              <a:rPr lang="en-US" dirty="0">
-                <a:solidFill>
-                  <a:schemeClr val="tx1"/>
-                </a:solidFill>
-                <a:latin typeface="Helvetica" charset="0"/>
-                <a:ea typeface="Helvetica" charset="0"/>
-                <a:cs typeface="Helvetica" charset="0"/>
-              </a:rPr>
-              <a:t>. </a:t>
-            </a:r>
-            <a:r>
-              <a:rPr lang="en-US" dirty="0" smtClean="0">
-                <a:solidFill>
-                  <a:schemeClr val="tx1"/>
-                </a:solidFill>
-                <a:latin typeface="Helvetica" charset="0"/>
-                <a:ea typeface="Helvetica" charset="0"/>
-                <a:cs typeface="Helvetica" charset="0"/>
-              </a:rPr>
-              <a:t>"Introduction </a:t>
-            </a:r>
-            <a:r>
-              <a:rPr lang="en-US" dirty="0">
-                <a:solidFill>
-                  <a:schemeClr val="tx1"/>
-                </a:solidFill>
-                <a:latin typeface="Helvetica" charset="0"/>
-                <a:ea typeface="Helvetica" charset="0"/>
-                <a:cs typeface="Helvetica" charset="0"/>
-              </a:rPr>
-              <a:t>to genetic algorithms - </a:t>
-            </a:r>
-            <a:r>
-              <a:rPr lang="en-US" dirty="0" smtClean="0">
-                <a:solidFill>
-                  <a:schemeClr val="tx1"/>
-                </a:solidFill>
-                <a:latin typeface="Helvetica" charset="0"/>
-                <a:ea typeface="Helvetica" charset="0"/>
-                <a:cs typeface="Helvetica" charset="0"/>
-              </a:rPr>
-              <a:t>XIII. Recommendations". </a:t>
-            </a:r>
-            <a:r>
-              <a:rPr lang="en-US" dirty="0">
-                <a:solidFill>
-                  <a:srgbClr val="0432FF"/>
-                </a:solidFill>
-                <a:latin typeface="Helvetica" charset="0"/>
-                <a:ea typeface="Helvetica" charset="0"/>
-                <a:cs typeface="Helvetica" charset="0"/>
-                <a:hlinkClick r:id="rId2"/>
-              </a:rPr>
-              <a:t>http://www.obitko.com/tutorials/genetic-algorithms/recommendations.php</a:t>
-            </a:r>
-            <a:r>
-              <a:rPr lang="en-US" dirty="0" smtClean="0">
-                <a:solidFill>
-                  <a:srgbClr val="0432FF"/>
-                </a:solidFill>
-                <a:latin typeface="Helvetica" charset="0"/>
-                <a:ea typeface="Helvetica" charset="0"/>
-                <a:cs typeface="Helvetica" charset="0"/>
-                <a:hlinkClick r:id="rId2"/>
-              </a:rPr>
-              <a:t>/</a:t>
-            </a:r>
-            <a:r>
-              <a:rPr lang="en-US" dirty="0" smtClean="0">
-                <a:solidFill>
-                  <a:srgbClr val="0432FF"/>
-                </a:solidFill>
-                <a:latin typeface="Helvetica" charset="0"/>
-                <a:ea typeface="Helvetica" charset="0"/>
-                <a:cs typeface="Helvetica" charset="0"/>
-              </a:rPr>
-              <a:t> </a:t>
-            </a:r>
-            <a:r>
-              <a:rPr lang="en-US" dirty="0" smtClean="0">
-                <a:solidFill>
-                  <a:schemeClr val="tx1"/>
-                </a:solidFill>
-                <a:latin typeface="Helvetica" charset="0"/>
-                <a:ea typeface="Helvetica" charset="0"/>
-                <a:cs typeface="Helvetica" charset="0"/>
-              </a:rPr>
-              <a:t>[</a:t>
-            </a:r>
-            <a:r>
-              <a:rPr lang="en-US" dirty="0">
-                <a:solidFill>
-                  <a:schemeClr val="tx1"/>
-                </a:solidFill>
-                <a:latin typeface="Helvetica" charset="0"/>
-                <a:ea typeface="Helvetica" charset="0"/>
-                <a:cs typeface="Helvetica" charset="0"/>
-              </a:rPr>
-              <a:t>Online; </a:t>
-            </a:r>
-            <a:r>
-              <a:rPr lang="en-US" dirty="0" err="1">
-                <a:solidFill>
-                  <a:schemeClr val="tx1"/>
-                </a:solidFill>
-                <a:latin typeface="Helvetica" charset="0"/>
-                <a:ea typeface="Helvetica" charset="0"/>
-                <a:cs typeface="Helvetica" charset="0"/>
-              </a:rPr>
-              <a:t>acessado</a:t>
-            </a:r>
-            <a:r>
-              <a:rPr lang="en-US" dirty="0">
-                <a:solidFill>
-                  <a:schemeClr val="tx1"/>
-                </a:solidFill>
-                <a:latin typeface="Helvetica" charset="0"/>
-                <a:ea typeface="Helvetica" charset="0"/>
-                <a:cs typeface="Helvetica" charset="0"/>
-              </a:rPr>
-              <a:t> </a:t>
-            </a:r>
-            <a:r>
-              <a:rPr lang="en-US" dirty="0" err="1">
-                <a:solidFill>
-                  <a:schemeClr val="tx1"/>
-                </a:solidFill>
-                <a:latin typeface="Helvetica" charset="0"/>
-                <a:ea typeface="Helvetica" charset="0"/>
-                <a:cs typeface="Helvetica" charset="0"/>
-              </a:rPr>
-              <a:t>em</a:t>
-            </a:r>
-            <a:r>
-              <a:rPr lang="en-US" dirty="0">
-                <a:solidFill>
-                  <a:schemeClr val="tx1"/>
-                </a:solidFill>
-                <a:latin typeface="Helvetica" charset="0"/>
-                <a:ea typeface="Helvetica" charset="0"/>
-                <a:cs typeface="Helvetica" charset="0"/>
-              </a:rPr>
-              <a:t> 17 de </a:t>
-            </a:r>
-            <a:r>
-              <a:rPr lang="en-US" dirty="0" err="1">
-                <a:solidFill>
-                  <a:schemeClr val="tx1"/>
-                </a:solidFill>
-                <a:latin typeface="Helvetica" charset="0"/>
-                <a:ea typeface="Helvetica" charset="0"/>
-                <a:cs typeface="Helvetica" charset="0"/>
-              </a:rPr>
-              <a:t>novembro</a:t>
-            </a:r>
-            <a:r>
-              <a:rPr lang="en-US" dirty="0">
-                <a:solidFill>
-                  <a:schemeClr val="tx1"/>
-                </a:solidFill>
-                <a:latin typeface="Helvetica" charset="0"/>
-                <a:ea typeface="Helvetica" charset="0"/>
-                <a:cs typeface="Helvetica" charset="0"/>
-              </a:rPr>
-              <a:t> de 2016</a:t>
-            </a:r>
-            <a:r>
-              <a:rPr lang="en-US" dirty="0" smtClean="0">
-                <a:solidFill>
-                  <a:schemeClr val="tx1"/>
-                </a:solidFill>
-                <a:latin typeface="Helvetica" charset="0"/>
-                <a:ea typeface="Helvetica" charset="0"/>
-                <a:cs typeface="Helvetica" charset="0"/>
-              </a:rPr>
-              <a:t>].</a:t>
-            </a:r>
-          </a:p>
-          <a:p>
-            <a:r>
-              <a:rPr lang="en-US" dirty="0" smtClean="0">
-                <a:solidFill>
-                  <a:schemeClr val="tx1"/>
-                </a:solidFill>
-                <a:latin typeface="Helvetica" charset="0"/>
-                <a:ea typeface="Helvetica" charset="0"/>
-                <a:cs typeface="Helvetica" charset="0"/>
-              </a:rPr>
-              <a:t>[5] </a:t>
-            </a:r>
-            <a:r>
-              <a:rPr lang="en-US" dirty="0">
-                <a:solidFill>
-                  <a:schemeClr val="tx1"/>
-                </a:solidFill>
-                <a:latin typeface="Helvetica" charset="0"/>
-                <a:ea typeface="Helvetica" charset="0"/>
-                <a:cs typeface="Helvetica" charset="0"/>
-              </a:rPr>
-              <a:t>K. </a:t>
-            </a:r>
-            <a:r>
-              <a:rPr lang="en-US" dirty="0" err="1">
-                <a:solidFill>
-                  <a:schemeClr val="tx1"/>
-                </a:solidFill>
-                <a:latin typeface="Helvetica" charset="0"/>
-                <a:ea typeface="Helvetica" charset="0"/>
-                <a:cs typeface="Helvetica" charset="0"/>
-              </a:rPr>
-              <a:t>DeJong</a:t>
-            </a:r>
-            <a:r>
-              <a:rPr lang="en-US" dirty="0">
-                <a:solidFill>
-                  <a:schemeClr val="tx1"/>
-                </a:solidFill>
-                <a:latin typeface="Helvetica" charset="0"/>
-                <a:ea typeface="Helvetica" charset="0"/>
-                <a:cs typeface="Helvetica" charset="0"/>
-              </a:rPr>
-              <a:t>. </a:t>
-            </a:r>
-            <a:r>
-              <a:rPr lang="en-US" dirty="0" smtClean="0">
-                <a:solidFill>
-                  <a:schemeClr val="tx1"/>
-                </a:solidFill>
-                <a:latin typeface="Helvetica" charset="0"/>
-                <a:ea typeface="Helvetica" charset="0"/>
-                <a:cs typeface="Helvetica" charset="0"/>
-              </a:rPr>
-              <a:t>“An </a:t>
-            </a:r>
-            <a:r>
-              <a:rPr lang="en-US" dirty="0">
-                <a:solidFill>
-                  <a:schemeClr val="tx1"/>
-                </a:solidFill>
-                <a:latin typeface="Helvetica" charset="0"/>
-                <a:ea typeface="Helvetica" charset="0"/>
-                <a:cs typeface="Helvetica" charset="0"/>
-              </a:rPr>
-              <a:t>analysis of the behavior of a class of genetic adaptive </a:t>
-            </a:r>
-            <a:r>
-              <a:rPr lang="en-US" dirty="0" smtClean="0">
-                <a:solidFill>
-                  <a:schemeClr val="tx1"/>
-                </a:solidFill>
-                <a:latin typeface="Helvetica" charset="0"/>
-                <a:ea typeface="Helvetica" charset="0"/>
-                <a:cs typeface="Helvetica" charset="0"/>
-              </a:rPr>
-              <a:t>systems”. </a:t>
-            </a:r>
-            <a:r>
-              <a:rPr lang="en-US" i="1" dirty="0" smtClean="0">
-                <a:solidFill>
-                  <a:schemeClr val="tx1"/>
-                </a:solidFill>
-                <a:latin typeface="Helvetica" charset="0"/>
-                <a:ea typeface="Helvetica" charset="0"/>
-                <a:cs typeface="Helvetica" charset="0"/>
-              </a:rPr>
-              <a:t>Ph.D</a:t>
-            </a:r>
-            <a:r>
-              <a:rPr lang="en-US" i="1" dirty="0">
-                <a:solidFill>
-                  <a:schemeClr val="tx1"/>
-                </a:solidFill>
-                <a:latin typeface="Helvetica" charset="0"/>
-                <a:ea typeface="Helvetica" charset="0"/>
-                <a:cs typeface="Helvetica" charset="0"/>
-              </a:rPr>
-              <a:t>. </a:t>
-            </a:r>
-            <a:r>
-              <a:rPr lang="en-US" i="1" dirty="0" smtClean="0">
-                <a:solidFill>
-                  <a:schemeClr val="tx1"/>
-                </a:solidFill>
-                <a:latin typeface="Helvetica" charset="0"/>
-                <a:ea typeface="Helvetica" charset="0"/>
-                <a:cs typeface="Helvetica" charset="0"/>
-              </a:rPr>
-              <a:t>Thesis</a:t>
-            </a:r>
-            <a:r>
-              <a:rPr lang="en-US" dirty="0">
-                <a:solidFill>
-                  <a:schemeClr val="tx1"/>
-                </a:solidFill>
-                <a:latin typeface="Helvetica" charset="0"/>
-                <a:ea typeface="Helvetica" charset="0"/>
-                <a:cs typeface="Helvetica" charset="0"/>
-              </a:rPr>
-              <a:t>, University of Michigan, 1975</a:t>
-            </a:r>
-            <a:r>
-              <a:rPr lang="en-US" dirty="0" smtClean="0">
-                <a:solidFill>
-                  <a:schemeClr val="tx1"/>
-                </a:solidFill>
-                <a:latin typeface="Helvetica" charset="0"/>
-                <a:ea typeface="Helvetica" charset="0"/>
-                <a:cs typeface="Helvetica" charset="0"/>
-              </a:rPr>
-              <a:t>.</a:t>
-            </a:r>
-            <a:endParaRPr lang="en-US" dirty="0">
-              <a:solidFill>
-                <a:schemeClr val="tx1"/>
-              </a:solidFill>
-              <a:latin typeface="Helvetica" charset="0"/>
-              <a:ea typeface="Helvetica" charset="0"/>
-              <a:cs typeface="Helvetica" charset="0"/>
-            </a:endParaRPr>
-          </a:p>
-          <a:p>
-            <a:endParaRPr lang="en-US" dirty="0"/>
-          </a:p>
-          <a:p>
-            <a:endParaRPr lang="en-US" dirty="0"/>
           </a:p>
         </p:txBody>
       </p:sp>
@@ -29165,7 +28593,7 @@
     </p:spTree>
     <p:extLst>
       <p:ext uri="{BB962C8B-B14F-4D97-AF65-F5344CB8AC3E}">
-        <p14:creationId xmlns:p14="http://schemas.microsoft.com/office/powerpoint/2010/main" val="530941430"/>
+        <p14:creationId xmlns:p14="http://schemas.microsoft.com/office/powerpoint/2010/main" val="572532751"/>
       </p:ext>
     </p:extLst>
   </p:cSld>
@@ -29220,9 +28648,25 @@
                 <a:ea typeface="Helvetica" charset="0"/>
                 <a:cs typeface="Helvetica" charset="0"/>
               </a:rPr>
-              <a:t>Referências</a:t>
-            </a:r>
-            <a:endParaRPr lang="en-US" b="1" dirty="0">
+              <a:t>Trabalhos</a:t>
+            </a:r>
+            <a:r>
+              <a:rPr lang="en-US" b="1" dirty="0" smtClean="0">
+                <a:latin typeface="Helvetica" charset="0"/>
+                <a:ea typeface="Helvetica" charset="0"/>
+                <a:cs typeface="Helvetica" charset="0"/>
+              </a:rPr>
+              <a:t> </a:t>
+            </a:r>
+            <a:r>
+              <a:rPr lang="en-US" b="1" smtClean="0">
+                <a:latin typeface="Helvetica" charset="0"/>
+                <a:ea typeface="Helvetica" charset="0"/>
+                <a:cs typeface="Helvetica" charset="0"/>
+              </a:rPr>
+              <a:t>Futuros</a:t>
+            </a:r>
+            <a:endParaRPr lang="en-US" sz="2800" b="1" dirty="0">
               <a:latin typeface="Helvetica" charset="0"/>
               <a:ea typeface="Helvetica" charset="0"/>
               <a:cs typeface="Helvetica" charset="0"/>
@@ -29243,47 +28687,16 @@
         <p:spPr>
           <a:xfrm>
             <a:off x="1154954" y="2603500"/>
-            <a:ext cx="10035785" cy="3416300"/>
+            <a:ext cx="9647158" cy="4126484"/>
           </a:xfrm>
         </p:spPr>
         <p:txBody>
-          <a:bodyPr/>
+          <a:bodyPr>
+            <a:normAutofit/>
+          </a:bodyPr>
           <a:lstStyle/>
           <a:p>
             <a:r>
-              <a:rPr lang="en-US" dirty="0">
-                <a:solidFill>
-                  <a:schemeClr val="tx1"/>
-                </a:solidFill>
-                <a:latin typeface="Helvetica" charset="0"/>
-                <a:ea typeface="Helvetica" charset="0"/>
-                <a:cs typeface="Helvetica" charset="0"/>
-              </a:rPr>
-              <a:t>[6] </a:t>
-            </a:r>
-            <a:r>
-              <a:rPr lang="en-US" dirty="0" smtClean="0">
-                <a:solidFill>
-                  <a:schemeClr val="tx1"/>
-                </a:solidFill>
-                <a:latin typeface="Helvetica" charset="0"/>
-                <a:ea typeface="Helvetica" charset="0"/>
-                <a:cs typeface="Helvetica" charset="0"/>
-              </a:rPr>
-              <a:t>P</a:t>
-            </a:r>
-            <a:r>
-              <a:rPr lang="en-US" dirty="0">
-                <a:solidFill>
-                  <a:schemeClr val="tx1"/>
-                </a:solidFill>
-                <a:latin typeface="Helvetica" charset="0"/>
-                <a:ea typeface="Helvetica" charset="0"/>
-                <a:cs typeface="Helvetica" charset="0"/>
-              </a:rPr>
-              <a:t>. </a:t>
-            </a:r>
-            <a:r>
               <a:rPr lang="en-US" dirty="0" err="1">
                 <a:solidFill>
                   <a:schemeClr val="tx1"/>
@@ -29292,198 +28705,42 @@
                 <a:ea typeface="Helvetica" charset="0"/>
                 <a:cs typeface="Helvetica" charset="0"/>
               </a:rPr>
-              <a:t>Giguere</a:t>
-            </a:r>
-            <a:r>
-              <a:rPr lang="en-US" dirty="0">
-                <a:solidFill>
-                  <a:schemeClr val="tx1"/>
-                </a:solidFill>
-                <a:latin typeface="Helvetica" charset="0"/>
-                <a:ea typeface="Helvetica" charset="0"/>
-                <a:cs typeface="Helvetica" charset="0"/>
-              </a:rPr>
-              <a:t> and D. E. Goldberg. “Population sizing for optimum sampling with genetic algorithms: A case study of the </a:t>
-            </a:r>
-            <a:r>
-              <a:rPr lang="en-US" dirty="0" err="1">
-                <a:solidFill>
-                  <a:schemeClr val="tx1"/>
-                </a:solidFill>
-                <a:latin typeface="Helvetica" charset="0"/>
-                <a:ea typeface="Helvetica" charset="0"/>
-                <a:cs typeface="Helvetica" charset="0"/>
-              </a:rPr>
-              <a:t>onemax</a:t>
-            </a:r>
-            <a:r>
-              <a:rPr lang="en-US" dirty="0">
-                <a:solidFill>
-                  <a:schemeClr val="tx1"/>
-                </a:solidFill>
-                <a:latin typeface="Helvetica" charset="0"/>
-                <a:ea typeface="Helvetica" charset="0"/>
-                <a:cs typeface="Helvetica" charset="0"/>
-              </a:rPr>
-              <a:t> problem”. </a:t>
-            </a:r>
-            <a:r>
-              <a:rPr lang="en-US" i="1" dirty="0">
-                <a:solidFill>
-                  <a:schemeClr val="tx1"/>
-                </a:solidFill>
-                <a:latin typeface="Helvetica" charset="0"/>
-                <a:ea typeface="Helvetica" charset="0"/>
-                <a:cs typeface="Helvetica" charset="0"/>
-              </a:rPr>
-              <a:t>Genetic Programming</a:t>
-            </a:r>
-            <a:r>
-              <a:rPr lang="en-US" dirty="0">
-                <a:solidFill>
-                  <a:schemeClr val="tx1"/>
-                </a:solidFill>
-                <a:latin typeface="Helvetica" charset="0"/>
-                <a:ea typeface="Helvetica" charset="0"/>
-                <a:cs typeface="Helvetica" charset="0"/>
-              </a:rPr>
-              <a:t>, 98:496–503, 1998. </a:t>
-            </a:r>
-          </a:p>
-          <a:p>
-            <a:r>
-              <a:rPr lang="en-US" dirty="0" smtClean="0">
-                <a:solidFill>
-                  <a:schemeClr val="tx1"/>
-                </a:solidFill>
-                <a:latin typeface="Helvetica" charset="0"/>
-                <a:ea typeface="Helvetica" charset="0"/>
-                <a:cs typeface="Helvetica" charset="0"/>
-              </a:rPr>
-              <a:t>[7]</a:t>
-            </a:r>
-            <a:r>
-              <a:rPr lang="en-US" dirty="0">
-                <a:solidFill>
-                  <a:schemeClr val="tx1"/>
-                </a:solidFill>
-                <a:latin typeface="Helvetica" charset="0"/>
-                <a:ea typeface="Helvetica" charset="0"/>
-                <a:cs typeface="Helvetica" charset="0"/>
-              </a:rPr>
-              <a:t> D. L. Applegate, R. E. Bixby, V. </a:t>
-            </a:r>
-            <a:r>
-              <a:rPr lang="en-US" dirty="0" err="1">
-                <a:solidFill>
-                  <a:schemeClr val="tx1"/>
-                </a:solidFill>
-                <a:latin typeface="Helvetica" charset="0"/>
-                <a:ea typeface="Helvetica" charset="0"/>
-                <a:cs typeface="Helvetica" charset="0"/>
-              </a:rPr>
-              <a:t>Chvatal</a:t>
-            </a:r>
-            <a:r>
-              <a:rPr lang="en-US" dirty="0">
-                <a:solidFill>
-                  <a:schemeClr val="tx1"/>
-                </a:solidFill>
-                <a:latin typeface="Helvetica" charset="0"/>
-                <a:ea typeface="Helvetica" charset="0"/>
-                <a:cs typeface="Helvetica" charset="0"/>
-              </a:rPr>
-              <a:t>, and W. J. Cook. </a:t>
-            </a:r>
-            <a:r>
-              <a:rPr lang="en-US" dirty="0" smtClean="0">
-                <a:solidFill>
-                  <a:schemeClr val="tx1"/>
-                </a:solidFill>
-                <a:latin typeface="Helvetica" charset="0"/>
-                <a:ea typeface="Helvetica" charset="0"/>
-                <a:cs typeface="Helvetica" charset="0"/>
-              </a:rPr>
-              <a:t>"The </a:t>
-            </a:r>
-            <a:r>
-              <a:rPr lang="en-US" dirty="0">
-                <a:solidFill>
-                  <a:schemeClr val="tx1"/>
-                </a:solidFill>
-                <a:latin typeface="Helvetica" charset="0"/>
-                <a:ea typeface="Helvetica" charset="0"/>
-                <a:cs typeface="Helvetica" charset="0"/>
-              </a:rPr>
-              <a:t>Traveling Salesman Problem: a computational </a:t>
-            </a:r>
-            <a:r>
-              <a:rPr lang="en-US" dirty="0" smtClean="0">
-                <a:solidFill>
-                  <a:schemeClr val="tx1"/>
-                </a:solidFill>
-                <a:latin typeface="Helvetica" charset="0"/>
-                <a:ea typeface="Helvetica" charset="0"/>
-                <a:cs typeface="Helvetica" charset="0"/>
-              </a:rPr>
-              <a:t>study". </a:t>
-            </a:r>
-            <a:r>
-              <a:rPr lang="en-US" i="1" dirty="0">
-                <a:solidFill>
-                  <a:schemeClr val="tx1"/>
-                </a:solidFill>
-                <a:latin typeface="Helvetica" charset="0"/>
-                <a:ea typeface="Helvetica" charset="0"/>
-                <a:cs typeface="Helvetica" charset="0"/>
-              </a:rPr>
-              <a:t>Princeton </a:t>
-            </a:r>
-            <a:r>
-              <a:rPr lang="en-US" i="1" dirty="0" smtClean="0">
-                <a:solidFill>
-                  <a:schemeClr val="tx1"/>
-                </a:solidFill>
-                <a:latin typeface="Helvetica" charset="0"/>
-                <a:ea typeface="Helvetica" charset="0"/>
-                <a:cs typeface="Helvetica" charset="0"/>
-              </a:rPr>
-              <a:t>University </a:t>
-            </a:r>
-            <a:r>
-              <a:rPr lang="en-US" i="1" dirty="0">
-                <a:solidFill>
-                  <a:schemeClr val="tx1"/>
-                </a:solidFill>
-                <a:latin typeface="Helvetica" charset="0"/>
-                <a:ea typeface="Helvetica" charset="0"/>
-                <a:cs typeface="Helvetica" charset="0"/>
-              </a:rPr>
-              <a:t>P</a:t>
-            </a:r>
-            <a:r>
-              <a:rPr lang="en-US" i="1" dirty="0" smtClean="0">
-                <a:solidFill>
-                  <a:schemeClr val="tx1"/>
-                </a:solidFill>
-                <a:latin typeface="Helvetica" charset="0"/>
-                <a:ea typeface="Helvetica" charset="0"/>
-                <a:cs typeface="Helvetica" charset="0"/>
-              </a:rPr>
-              <a:t>ress</a:t>
-            </a:r>
-            <a:r>
-              <a:rPr lang="en-US" dirty="0">
-                <a:solidFill>
-                  <a:schemeClr val="tx1"/>
-                </a:solidFill>
-                <a:latin typeface="Helvetica" charset="0"/>
-                <a:ea typeface="Helvetica" charset="0"/>
-                <a:cs typeface="Helvetica" charset="0"/>
-              </a:rPr>
-              <a:t>, 2011. </a:t>
-            </a:r>
-            <a:endParaRPr lang="en-US" dirty="0" smtClean="0">
+              <a:t>T</a:t>
+            </a:r>
+            <a:r>
+              <a:rPr lang="en-US" dirty="0" err="1" smtClean="0">
+                <a:solidFill>
+                  <a:schemeClr val="tx1"/>
+                </a:solidFill>
+                <a:latin typeface="Helvetica" charset="0"/>
+                <a:ea typeface="Helvetica" charset="0"/>
+                <a:cs typeface="Helvetica" charset="0"/>
+              </a:rPr>
+              <a:t>exto</a:t>
+            </a:r>
+            <a:r>
+              <a:rPr lang="en-US" dirty="0" smtClean="0">
+                <a:solidFill>
+                  <a:schemeClr val="tx1"/>
+                </a:solidFill>
+                <a:latin typeface="Helvetica" charset="0"/>
+                <a:ea typeface="Helvetica" charset="0"/>
+                <a:cs typeface="Helvetica" charset="0"/>
+              </a:rPr>
+              <a:t> </a:t>
+            </a:r>
+            <a:r>
+              <a:rPr lang="en-US" dirty="0" err="1" smtClean="0">
+                <a:solidFill>
+                  <a:schemeClr val="tx1"/>
+                </a:solidFill>
+                <a:latin typeface="Helvetica" charset="0"/>
+                <a:ea typeface="Helvetica" charset="0"/>
+                <a:cs typeface="Helvetica" charset="0"/>
+              </a:rPr>
+              <a:t>aqui</a:t>
+            </a:r>
+            <a:endParaRPr lang="en-US" i="1" baseline="-25000" dirty="0" smtClean="0">
               <a:solidFill>
                 <a:schemeClr val="tx1"/>
               </a:solidFill>
@@ -29492,416 +28749,11 @@
               <a:cs typeface="Helvetica" charset="0"/>
             </a:endParaRPr>
           </a:p>
-          <a:p>
-            <a:r>
-              <a:rPr lang="en-US" dirty="0" smtClean="0">
-                <a:solidFill>
-                  <a:schemeClr val="tx1"/>
-                </a:solidFill>
-                <a:latin typeface="Helvetica" charset="0"/>
-                <a:ea typeface="Helvetica" charset="0"/>
-                <a:cs typeface="Helvetica" charset="0"/>
-              </a:rPr>
-              <a:t>[8] </a:t>
-            </a:r>
-            <a:r>
-              <a:rPr lang="en-US" dirty="0">
-                <a:solidFill>
-                  <a:schemeClr val="tx1"/>
-                </a:solidFill>
-                <a:latin typeface="Helvetica" charset="0"/>
-                <a:ea typeface="Helvetica" charset="0"/>
-                <a:cs typeface="Helvetica" charset="0"/>
-              </a:rPr>
-              <a:t>T. H. </a:t>
-            </a:r>
-            <a:r>
-              <a:rPr lang="en-US" dirty="0" err="1">
-                <a:solidFill>
-                  <a:schemeClr val="tx1"/>
-                </a:solidFill>
-                <a:latin typeface="Helvetica" charset="0"/>
-                <a:ea typeface="Helvetica" charset="0"/>
-                <a:cs typeface="Helvetica" charset="0"/>
-              </a:rPr>
-              <a:t>Cormen</a:t>
-            </a:r>
-            <a:r>
-              <a:rPr lang="en-US" dirty="0">
-                <a:solidFill>
-                  <a:schemeClr val="tx1"/>
-                </a:solidFill>
-                <a:latin typeface="Helvetica" charset="0"/>
-                <a:ea typeface="Helvetica" charset="0"/>
-                <a:cs typeface="Helvetica" charset="0"/>
-              </a:rPr>
-              <a:t>, C. E. </a:t>
-            </a:r>
-            <a:r>
-              <a:rPr lang="en-US" dirty="0" err="1">
-                <a:solidFill>
-                  <a:schemeClr val="tx1"/>
-                </a:solidFill>
-                <a:latin typeface="Helvetica" charset="0"/>
-                <a:ea typeface="Helvetica" charset="0"/>
-                <a:cs typeface="Helvetica" charset="0"/>
-              </a:rPr>
-              <a:t>Leiserson</a:t>
-            </a:r>
-            <a:r>
-              <a:rPr lang="en-US" dirty="0">
-                <a:solidFill>
-                  <a:schemeClr val="tx1"/>
-                </a:solidFill>
-                <a:latin typeface="Helvetica" charset="0"/>
-                <a:ea typeface="Helvetica" charset="0"/>
-                <a:cs typeface="Helvetica" charset="0"/>
-              </a:rPr>
-              <a:t>, R. L. </a:t>
-            </a:r>
-            <a:r>
-              <a:rPr lang="en-US" dirty="0" err="1">
-                <a:solidFill>
-                  <a:schemeClr val="tx1"/>
-                </a:solidFill>
-                <a:latin typeface="Helvetica" charset="0"/>
-                <a:ea typeface="Helvetica" charset="0"/>
-                <a:cs typeface="Helvetica" charset="0"/>
-              </a:rPr>
-              <a:t>Rivest</a:t>
-            </a:r>
-            <a:r>
-              <a:rPr lang="en-US" dirty="0">
-                <a:solidFill>
-                  <a:schemeClr val="tx1"/>
-                </a:solidFill>
-                <a:latin typeface="Helvetica" charset="0"/>
-                <a:ea typeface="Helvetica" charset="0"/>
-                <a:cs typeface="Helvetica" charset="0"/>
-              </a:rPr>
-              <a:t>, et al. </a:t>
-            </a:r>
-            <a:r>
-              <a:rPr lang="en-US" dirty="0" smtClean="0">
-                <a:solidFill>
-                  <a:schemeClr val="tx1"/>
-                </a:solidFill>
-                <a:latin typeface="Helvetica" charset="0"/>
-                <a:ea typeface="Helvetica" charset="0"/>
-                <a:cs typeface="Helvetica" charset="0"/>
-              </a:rPr>
-              <a:t>"Section </a:t>
-            </a:r>
-            <a:r>
-              <a:rPr lang="en-US" dirty="0">
-                <a:solidFill>
-                  <a:schemeClr val="tx1"/>
-                </a:solidFill>
-                <a:latin typeface="Helvetica" charset="0"/>
-                <a:ea typeface="Helvetica" charset="0"/>
-                <a:cs typeface="Helvetica" charset="0"/>
-              </a:rPr>
-              <a:t>24.3: </a:t>
-            </a:r>
-            <a:r>
-              <a:rPr lang="en-US" dirty="0" err="1">
-                <a:solidFill>
-                  <a:schemeClr val="tx1"/>
-                </a:solidFill>
-                <a:latin typeface="Helvetica" charset="0"/>
-                <a:ea typeface="Helvetica" charset="0"/>
-                <a:cs typeface="Helvetica" charset="0"/>
-              </a:rPr>
-              <a:t>Dijkstra’s</a:t>
-            </a:r>
-            <a:r>
-              <a:rPr lang="en-US" dirty="0">
-                <a:solidFill>
-                  <a:schemeClr val="tx1"/>
-                </a:solidFill>
-                <a:latin typeface="Helvetica" charset="0"/>
-                <a:ea typeface="Helvetica" charset="0"/>
-                <a:cs typeface="Helvetica" charset="0"/>
-              </a:rPr>
-              <a:t> </a:t>
-            </a:r>
-            <a:r>
-              <a:rPr lang="en-US" dirty="0" smtClean="0">
-                <a:solidFill>
-                  <a:schemeClr val="tx1"/>
-                </a:solidFill>
-                <a:latin typeface="Helvetica" charset="0"/>
-                <a:ea typeface="Helvetica" charset="0"/>
-                <a:cs typeface="Helvetica" charset="0"/>
-              </a:rPr>
-              <a:t>algorithm”. </a:t>
-            </a:r>
-            <a:r>
-              <a:rPr lang="en-US" i="1" dirty="0" smtClean="0">
-                <a:solidFill>
-                  <a:schemeClr val="tx1"/>
-                </a:solidFill>
-                <a:latin typeface="Helvetica" charset="0"/>
-                <a:ea typeface="Helvetica" charset="0"/>
-                <a:cs typeface="Helvetica" charset="0"/>
-              </a:rPr>
-              <a:t>MIT Press </a:t>
-            </a:r>
-            <a:r>
-              <a:rPr lang="en-US" i="1" dirty="0">
-                <a:solidFill>
-                  <a:schemeClr val="tx1"/>
-                </a:solidFill>
-                <a:latin typeface="Helvetica" charset="0"/>
-                <a:ea typeface="Helvetica" charset="0"/>
-                <a:cs typeface="Helvetica" charset="0"/>
-              </a:rPr>
-              <a:t>and McGraw-Hill</a:t>
-            </a:r>
-            <a:r>
-              <a:rPr lang="en-US" dirty="0">
-                <a:solidFill>
-                  <a:schemeClr val="tx1"/>
-                </a:solidFill>
-                <a:latin typeface="Helvetica" charset="0"/>
-                <a:ea typeface="Helvetica" charset="0"/>
-                <a:cs typeface="Helvetica" charset="0"/>
-              </a:rPr>
-              <a:t>, 2001. </a:t>
-            </a:r>
-            <a:endParaRPr lang="en-US" dirty="0" smtClean="0">
-              <a:solidFill>
-                <a:schemeClr val="tx1"/>
-              </a:solidFill>
-              <a:latin typeface="Helvetica" charset="0"/>
-              <a:ea typeface="Helvetica" charset="0"/>
-              <a:cs typeface="Helvetica" charset="0"/>
-            </a:endParaRPr>
-          </a:p>
-          <a:p>
-            <a:r>
-              <a:rPr lang="en-US" dirty="0" smtClean="0">
-                <a:solidFill>
-                  <a:schemeClr val="tx1"/>
-                </a:solidFill>
-                <a:latin typeface="Helvetica" charset="0"/>
-                <a:ea typeface="Helvetica" charset="0"/>
-                <a:cs typeface="Helvetica" charset="0"/>
-              </a:rPr>
-              <a:t>[9] </a:t>
-            </a:r>
-            <a:r>
-              <a:rPr lang="en-US" dirty="0">
-                <a:solidFill>
-                  <a:schemeClr val="tx1"/>
-                </a:solidFill>
-                <a:latin typeface="Helvetica" charset="0"/>
-                <a:ea typeface="Helvetica" charset="0"/>
-                <a:cs typeface="Helvetica" charset="0"/>
-              </a:rPr>
-              <a:t>M. Mitchell. </a:t>
-            </a:r>
-            <a:r>
-              <a:rPr lang="en-US" dirty="0" smtClean="0">
-                <a:solidFill>
-                  <a:schemeClr val="tx1"/>
-                </a:solidFill>
-                <a:latin typeface="Helvetica" charset="0"/>
-                <a:ea typeface="Helvetica" charset="0"/>
-                <a:cs typeface="Helvetica" charset="0"/>
-              </a:rPr>
-              <a:t>"An </a:t>
-            </a:r>
-            <a:r>
-              <a:rPr lang="en-US" dirty="0">
-                <a:solidFill>
-                  <a:schemeClr val="tx1"/>
-                </a:solidFill>
-                <a:latin typeface="Helvetica" charset="0"/>
-                <a:ea typeface="Helvetica" charset="0"/>
-                <a:cs typeface="Helvetica" charset="0"/>
-              </a:rPr>
-              <a:t>introduction to genetic </a:t>
-            </a:r>
-            <a:r>
-              <a:rPr lang="en-US" dirty="0" smtClean="0">
-                <a:solidFill>
-                  <a:schemeClr val="tx1"/>
-                </a:solidFill>
-                <a:latin typeface="Helvetica" charset="0"/>
-                <a:ea typeface="Helvetica" charset="0"/>
-                <a:cs typeface="Helvetica" charset="0"/>
-              </a:rPr>
-              <a:t>algorithms". </a:t>
-            </a:r>
-            <a:r>
-              <a:rPr lang="en-US" i="1" dirty="0">
-                <a:solidFill>
-                  <a:schemeClr val="tx1"/>
-                </a:solidFill>
-                <a:latin typeface="Helvetica" charset="0"/>
-                <a:ea typeface="Helvetica" charset="0"/>
-                <a:cs typeface="Helvetica" charset="0"/>
-              </a:rPr>
-              <a:t>MIT </a:t>
-            </a:r>
-            <a:r>
-              <a:rPr lang="en-US" i="1" dirty="0" smtClean="0">
-                <a:solidFill>
-                  <a:schemeClr val="tx1"/>
-                </a:solidFill>
-                <a:latin typeface="Helvetica" charset="0"/>
-                <a:ea typeface="Helvetica" charset="0"/>
-                <a:cs typeface="Helvetica" charset="0"/>
-              </a:rPr>
-              <a:t>Press</a:t>
-            </a:r>
-            <a:r>
-              <a:rPr lang="en-US" dirty="0">
-                <a:solidFill>
-                  <a:schemeClr val="tx1"/>
-                </a:solidFill>
-                <a:latin typeface="Helvetica" charset="0"/>
-                <a:ea typeface="Helvetica" charset="0"/>
-                <a:cs typeface="Helvetica" charset="0"/>
-              </a:rPr>
-              <a:t>, 1998. </a:t>
-            </a:r>
-            <a:endParaRPr lang="en-US" dirty="0" smtClean="0">
-              <a:solidFill>
-                <a:schemeClr val="tx1"/>
-              </a:solidFill>
-              <a:latin typeface="Helvetica" charset="0"/>
-              <a:ea typeface="Helvetica" charset="0"/>
-              <a:cs typeface="Helvetica" charset="0"/>
-            </a:endParaRPr>
-          </a:p>
-          <a:p>
-            <a:r>
-              <a:rPr lang="en-US" dirty="0" smtClean="0">
-                <a:solidFill>
-                  <a:schemeClr val="tx1"/>
-                </a:solidFill>
-                <a:latin typeface="Helvetica" charset="0"/>
-                <a:ea typeface="Helvetica" charset="0"/>
-                <a:cs typeface="Helvetica" charset="0"/>
-              </a:rPr>
-              <a:t>[10] M</a:t>
-            </a:r>
-            <a:r>
-              <a:rPr lang="en-US" dirty="0">
-                <a:solidFill>
-                  <a:schemeClr val="tx1"/>
-                </a:solidFill>
-                <a:latin typeface="Helvetica" charset="0"/>
-                <a:ea typeface="Helvetica" charset="0"/>
-                <a:cs typeface="Helvetica" charset="0"/>
-              </a:rPr>
-              <a:t>. Srinivas and L. M. </a:t>
-            </a:r>
-            <a:r>
-              <a:rPr lang="en-US" dirty="0" err="1">
-                <a:solidFill>
-                  <a:schemeClr val="tx1"/>
-                </a:solidFill>
-                <a:latin typeface="Helvetica" charset="0"/>
-                <a:ea typeface="Helvetica" charset="0"/>
-                <a:cs typeface="Helvetica" charset="0"/>
-              </a:rPr>
-              <a:t>Patnaik</a:t>
-            </a:r>
-            <a:r>
-              <a:rPr lang="en-US" dirty="0">
-                <a:solidFill>
-                  <a:schemeClr val="tx1"/>
-                </a:solidFill>
-                <a:latin typeface="Helvetica" charset="0"/>
-                <a:ea typeface="Helvetica" charset="0"/>
-                <a:cs typeface="Helvetica" charset="0"/>
-              </a:rPr>
-              <a:t>. </a:t>
-            </a:r>
-            <a:r>
-              <a:rPr lang="en-US" dirty="0" smtClean="0">
-                <a:solidFill>
-                  <a:schemeClr val="tx1"/>
-                </a:solidFill>
-                <a:latin typeface="Helvetica" charset="0"/>
-                <a:ea typeface="Helvetica" charset="0"/>
-                <a:cs typeface="Helvetica" charset="0"/>
-              </a:rPr>
-              <a:t>"Adaptive </a:t>
-            </a:r>
-            <a:r>
-              <a:rPr lang="en-US" dirty="0">
-                <a:solidFill>
-                  <a:schemeClr val="tx1"/>
-                </a:solidFill>
-                <a:latin typeface="Helvetica" charset="0"/>
-                <a:ea typeface="Helvetica" charset="0"/>
-                <a:cs typeface="Helvetica" charset="0"/>
-              </a:rPr>
-              <a:t>probabilities of crossover and mutation in genetic </a:t>
-            </a:r>
-            <a:r>
-              <a:rPr lang="en-US" dirty="0" smtClean="0">
-                <a:solidFill>
-                  <a:schemeClr val="tx1"/>
-                </a:solidFill>
-                <a:latin typeface="Helvetica" charset="0"/>
-                <a:ea typeface="Helvetica" charset="0"/>
-                <a:cs typeface="Helvetica" charset="0"/>
-              </a:rPr>
-              <a:t>algorithms". </a:t>
-            </a:r>
-            <a:r>
-              <a:rPr lang="en-US" i="1" dirty="0">
-                <a:solidFill>
-                  <a:schemeClr val="tx1"/>
-                </a:solidFill>
-                <a:latin typeface="Helvetica" charset="0"/>
-                <a:ea typeface="Helvetica" charset="0"/>
-                <a:cs typeface="Helvetica" charset="0"/>
-              </a:rPr>
-              <a:t>IEEE Transactions on Systems, Man, and Cybernetics</a:t>
-            </a:r>
-            <a:r>
-              <a:rPr lang="en-US" dirty="0">
-                <a:solidFill>
-                  <a:schemeClr val="tx1"/>
-                </a:solidFill>
-                <a:latin typeface="Helvetica" charset="0"/>
-                <a:ea typeface="Helvetica" charset="0"/>
-                <a:cs typeface="Helvetica" charset="0"/>
-              </a:rPr>
-              <a:t>, 24(4):656–667, 1994. </a:t>
-            </a:r>
-          </a:p>
-          <a:p>
-            <a:endParaRPr lang="en-US" dirty="0">
-              <a:solidFill>
-                <a:schemeClr val="tx1"/>
-              </a:solidFill>
-              <a:latin typeface="Helvetica" charset="0"/>
-              <a:ea typeface="Helvetica" charset="0"/>
-              <a:cs typeface="Helvetica" charset="0"/>
-            </a:endParaRPr>
-          </a:p>
-          <a:p>
-            <a:endParaRPr lang="en-US" dirty="0">
-              <a:solidFill>
-                <a:schemeClr val="tx1"/>
-              </a:solidFill>
-              <a:latin typeface="Helvetica" charset="0"/>
-              <a:ea typeface="Helvetica" charset="0"/>
-              <a:cs typeface="Helvetica" charset="0"/>
-            </a:endParaRPr>
-          </a:p>
         </p:txBody>
       </p:sp>
       <p:sp>
         <p:nvSpPr>
-          <p:cNvPr id="4" name="Slide Number Placeholder 3"/>
+          <p:cNvPr id="5" name="Slide Number Placeholder 4"/>
           <p:cNvSpPr>
             <a:spLocks noGrp="1"/>
           </p:cNvSpPr>
@@ -29925,7 +28777,7 @@
     </p:spTree>
     <p:extLst>
       <p:ext uri="{BB962C8B-B14F-4D97-AF65-F5344CB8AC3E}">
-        <p14:creationId xmlns:p14="http://schemas.microsoft.com/office/powerpoint/2010/main" val="2080831962"/>
+        <p14:creationId xmlns:p14="http://schemas.microsoft.com/office/powerpoint/2010/main" val="1565898918"/>
       </p:ext>
     </p:extLst>
   </p:cSld>
@@ -30959,11 +29811,13 @@
         <p:spPr>
           <a:xfrm>
             <a:off x="1154954" y="2603500"/>
-            <a:ext cx="10035785" cy="3416300"/>
+            <a:ext cx="10035785" cy="4102100"/>
           </a:xfrm>
         </p:spPr>
         <p:txBody>
-          <a:bodyPr/>
+          <a:bodyPr>
+            <a:normAutofit/>
+          </a:bodyPr>
           <a:lstStyle/>
           <a:p>
             <a:r>
@@ -30975,7 +29829,7 @@
                 <a:ea typeface="Helvetica" charset="0"/>
                 <a:cs typeface="Helvetica" charset="0"/>
               </a:rPr>
-              <a:t>[11] </a:t>
+              <a:t>[1] </a:t>
             </a:r>
             <a:r>
               <a:rPr lang="en-US" dirty="0">
@@ -30986,7 +29840,128 @@
                 <a:ea typeface="Helvetica" charset="0"/>
                 <a:cs typeface="Helvetica" charset="0"/>
               </a:rPr>
-              <a:t>D. </a:t>
+              <a:t>A. E. </a:t>
+            </a:r>
+            <a:r>
+              <a:rPr lang="en-US" dirty="0" err="1" smtClean="0">
+                <a:solidFill>
+                  <a:schemeClr val="tx1"/>
+                </a:solidFill>
+                <a:latin typeface="Helvetica" charset="0"/>
+                <a:ea typeface="Helvetica" charset="0"/>
+                <a:cs typeface="Helvetica" charset="0"/>
+              </a:rPr>
+              <a:t>Eiben</a:t>
+            </a:r>
+            <a:r>
+              <a:rPr lang="en-US" dirty="0" smtClean="0">
+                <a:solidFill>
+                  <a:schemeClr val="tx1"/>
+                </a:solidFill>
+                <a:latin typeface="Helvetica" charset="0"/>
+                <a:ea typeface="Helvetica" charset="0"/>
+                <a:cs typeface="Helvetica" charset="0"/>
+              </a:rPr>
+              <a:t>, J</a:t>
+            </a:r>
+            <a:r>
+              <a:rPr lang="en-US" dirty="0">
+                <a:solidFill>
+                  <a:schemeClr val="tx1"/>
+                </a:solidFill>
+                <a:latin typeface="Helvetica" charset="0"/>
+                <a:ea typeface="Helvetica" charset="0"/>
+                <a:cs typeface="Helvetica" charset="0"/>
+              </a:rPr>
+              <a:t>. E. Smith. </a:t>
+            </a:r>
+            <a:r>
+              <a:rPr lang="en-US" dirty="0" smtClean="0">
+                <a:solidFill>
+                  <a:schemeClr val="tx1"/>
+                </a:solidFill>
+                <a:latin typeface="Helvetica" charset="0"/>
+                <a:ea typeface="Helvetica" charset="0"/>
+                <a:cs typeface="Helvetica" charset="0"/>
+              </a:rPr>
+              <a:t>“</a:t>
+            </a:r>
+            <a:r>
+              <a:rPr lang="en-US" i="1" dirty="0" smtClean="0">
+                <a:solidFill>
+                  <a:schemeClr val="tx1"/>
+                </a:solidFill>
+                <a:latin typeface="Helvetica" charset="0"/>
+                <a:ea typeface="Helvetica" charset="0"/>
+                <a:cs typeface="Helvetica" charset="0"/>
+              </a:rPr>
+              <a:t>Introduction </a:t>
+            </a:r>
+            <a:r>
+              <a:rPr lang="en-US" i="1" dirty="0">
+                <a:solidFill>
+                  <a:schemeClr val="tx1"/>
+                </a:solidFill>
+                <a:latin typeface="Helvetica" charset="0"/>
+                <a:ea typeface="Helvetica" charset="0"/>
+                <a:cs typeface="Helvetica" charset="0"/>
+              </a:rPr>
+              <a:t>To Evolutionary </a:t>
+            </a:r>
+            <a:r>
+              <a:rPr lang="en-US" i="1" dirty="0" smtClean="0">
+                <a:solidFill>
+                  <a:schemeClr val="tx1"/>
+                </a:solidFill>
+                <a:latin typeface="Helvetica" charset="0"/>
+                <a:ea typeface="Helvetica" charset="0"/>
+                <a:cs typeface="Helvetica" charset="0"/>
+              </a:rPr>
+              <a:t>Computing”</a:t>
+            </a:r>
+            <a:r>
+              <a:rPr lang="en-US" dirty="0" smtClean="0">
+                <a:solidFill>
+                  <a:schemeClr val="tx1"/>
+                </a:solidFill>
+                <a:latin typeface="Helvetica" charset="0"/>
+                <a:ea typeface="Helvetica" charset="0"/>
+                <a:cs typeface="Helvetica" charset="0"/>
+              </a:rPr>
+              <a:t>. </a:t>
+            </a:r>
+            <a:r>
+              <a:rPr lang="en-US" dirty="0">
+                <a:solidFill>
+                  <a:schemeClr val="tx1"/>
+                </a:solidFill>
+                <a:latin typeface="Helvetica" charset="0"/>
+                <a:ea typeface="Helvetica" charset="0"/>
+                <a:cs typeface="Helvetica" charset="0"/>
+              </a:rPr>
+              <a:t>V</a:t>
+            </a:r>
+            <a:r>
+              <a:rPr lang="en-US" dirty="0" smtClean="0">
+                <a:solidFill>
+                  <a:schemeClr val="tx1"/>
+                </a:solidFill>
+                <a:latin typeface="Helvetica" charset="0"/>
+                <a:ea typeface="Helvetica" charset="0"/>
+                <a:cs typeface="Helvetica" charset="0"/>
+              </a:rPr>
+              <a:t>olume 53. </a:t>
+            </a:r>
+            <a:r>
+              <a:rPr lang="en-US" dirty="0">
+                <a:solidFill>
+                  <a:schemeClr val="tx1"/>
+                </a:solidFill>
+                <a:latin typeface="Helvetica" charset="0"/>
+                <a:ea typeface="Helvetica" charset="0"/>
+                <a:cs typeface="Helvetica" charset="0"/>
+              </a:rPr>
+              <a:t>Springer-</a:t>
             </a:r>
             <a:r>
               <a:rPr lang="en-US" dirty="0" err="1">
@@ -30997,7 +29972,7 @@
                 <a:ea typeface="Helvetica" charset="0"/>
                 <a:cs typeface="Helvetica" charset="0"/>
               </a:rPr>
-              <a:t>Jakobovic</a:t>
+              <a:t>Verlag</a:t>
             </a:r>
             <a:r>
               <a:rPr lang="en-US" dirty="0">
@@ -31008,163 +29983,7 @@
                 <a:ea typeface="Helvetica" charset="0"/>
                 <a:cs typeface="Helvetica" charset="0"/>
               </a:rPr>
-              <a:t>́ and M. </a:t>
-            </a:r>
-            <a:r>
-              <a:rPr lang="en-US" dirty="0" err="1">
-                <a:solidFill>
-                  <a:schemeClr val="tx1"/>
-                </a:solidFill>
-                <a:latin typeface="Helvetica" charset="0"/>
-                <a:ea typeface="Helvetica" charset="0"/>
-                <a:cs typeface="Helvetica" charset="0"/>
-              </a:rPr>
-              <a:t>Golub</a:t>
-            </a:r>
-            <a:r>
-              <a:rPr lang="en-US" dirty="0">
-                <a:solidFill>
-                  <a:schemeClr val="tx1"/>
-                </a:solidFill>
-                <a:latin typeface="Helvetica" charset="0"/>
-                <a:ea typeface="Helvetica" charset="0"/>
-                <a:cs typeface="Helvetica" charset="0"/>
-              </a:rPr>
-              <a:t>. </a:t>
-            </a:r>
-            <a:r>
-              <a:rPr lang="en-US" dirty="0" smtClean="0">
-                <a:solidFill>
-                  <a:schemeClr val="tx1"/>
-                </a:solidFill>
-                <a:latin typeface="Helvetica" charset="0"/>
-                <a:ea typeface="Helvetica" charset="0"/>
-                <a:cs typeface="Helvetica" charset="0"/>
-              </a:rPr>
-              <a:t>“Adaptive </a:t>
-            </a:r>
-            <a:r>
-              <a:rPr lang="en-US" dirty="0">
-                <a:solidFill>
-                  <a:schemeClr val="tx1"/>
-                </a:solidFill>
-                <a:latin typeface="Helvetica" charset="0"/>
-                <a:ea typeface="Helvetica" charset="0"/>
-                <a:cs typeface="Helvetica" charset="0"/>
-              </a:rPr>
-              <a:t>G</a:t>
-            </a:r>
-            <a:r>
-              <a:rPr lang="en-US" dirty="0" smtClean="0">
-                <a:solidFill>
-                  <a:schemeClr val="tx1"/>
-                </a:solidFill>
-                <a:latin typeface="Helvetica" charset="0"/>
-                <a:ea typeface="Helvetica" charset="0"/>
-                <a:cs typeface="Helvetica" charset="0"/>
-              </a:rPr>
-              <a:t>enetic Algorithm”. </a:t>
-            </a:r>
-            <a:r>
-              <a:rPr lang="en-US" i="1" dirty="0">
-                <a:solidFill>
-                  <a:schemeClr val="tx1"/>
-                </a:solidFill>
-                <a:latin typeface="Helvetica" charset="0"/>
-                <a:ea typeface="Helvetica" charset="0"/>
-                <a:cs typeface="Helvetica" charset="0"/>
-              </a:rPr>
-              <a:t>CIT. Journal of computing and information technology</a:t>
-            </a:r>
-            <a:r>
-              <a:rPr lang="en-US" dirty="0">
-                <a:solidFill>
-                  <a:schemeClr val="tx1"/>
-                </a:solidFill>
-                <a:latin typeface="Helvetica" charset="0"/>
-                <a:ea typeface="Helvetica" charset="0"/>
-                <a:cs typeface="Helvetica" charset="0"/>
-              </a:rPr>
-              <a:t>, 7(3):229–235, 1999. </a:t>
-            </a:r>
-          </a:p>
-          <a:p>
-            <a:r>
-              <a:rPr lang="en-US" dirty="0" smtClean="0">
-                <a:solidFill>
-                  <a:schemeClr val="tx1"/>
-                </a:solidFill>
-                <a:latin typeface="Helvetica" charset="0"/>
-                <a:ea typeface="Helvetica" charset="0"/>
-                <a:cs typeface="Helvetica" charset="0"/>
-              </a:rPr>
-              <a:t>[12] </a:t>
-            </a:r>
-            <a:r>
-              <a:rPr lang="en-US" dirty="0">
-                <a:solidFill>
-                  <a:schemeClr val="tx1"/>
-                </a:solidFill>
-                <a:latin typeface="Helvetica" charset="0"/>
-                <a:ea typeface="Helvetica" charset="0"/>
-                <a:cs typeface="Helvetica" charset="0"/>
-              </a:rPr>
-              <a:t>L. Wang and T. Shen. </a:t>
-            </a:r>
-            <a:r>
-              <a:rPr lang="en-US" dirty="0" smtClean="0">
-                <a:solidFill>
-                  <a:schemeClr val="tx1"/>
-                </a:solidFill>
-                <a:latin typeface="Helvetica" charset="0"/>
-                <a:ea typeface="Helvetica" charset="0"/>
-                <a:cs typeface="Helvetica" charset="0"/>
-              </a:rPr>
-              <a:t>"Improved </a:t>
-            </a:r>
-            <a:r>
-              <a:rPr lang="en-US" dirty="0">
-                <a:solidFill>
-                  <a:schemeClr val="tx1"/>
-                </a:solidFill>
-                <a:latin typeface="Helvetica" charset="0"/>
-                <a:ea typeface="Helvetica" charset="0"/>
-                <a:cs typeface="Helvetica" charset="0"/>
-              </a:rPr>
-              <a:t>adaptive genetic algorithm and its application to image </a:t>
-            </a:r>
-            <a:r>
-              <a:rPr lang="en-US" dirty="0" smtClean="0">
-                <a:solidFill>
-                  <a:schemeClr val="tx1"/>
-                </a:solidFill>
-                <a:latin typeface="Helvetica" charset="0"/>
-                <a:ea typeface="Helvetica" charset="0"/>
-                <a:cs typeface="Helvetica" charset="0"/>
-              </a:rPr>
-              <a:t>segmentation". </a:t>
-            </a:r>
-            <a:r>
-              <a:rPr lang="en-US" i="1" dirty="0">
-                <a:solidFill>
-                  <a:schemeClr val="tx1"/>
-                </a:solidFill>
-                <a:latin typeface="Helvetica" charset="0"/>
-                <a:ea typeface="Helvetica" charset="0"/>
-                <a:cs typeface="Helvetica" charset="0"/>
-              </a:rPr>
-              <a:t>In Multispectral Image Processing and Pattern Recognition</a:t>
-            </a:r>
-            <a:r>
-              <a:rPr lang="en-US" dirty="0">
-                <a:solidFill>
-                  <a:schemeClr val="tx1"/>
-                </a:solidFill>
-                <a:latin typeface="Helvetica" charset="0"/>
-                <a:ea typeface="Helvetica" charset="0"/>
-                <a:cs typeface="Helvetica" charset="0"/>
-              </a:rPr>
-              <a:t>, pages 115–120. International Society for Optics and Photonics, 2001. </a:t>
+              <a:t>, 2003. </a:t>
             </a:r>
             <a:endParaRPr lang="en-US" dirty="0" smtClean="0">
               <a:solidFill>
@@ -31185,7 +30004,7 @@
                 <a:ea typeface="Helvetica" charset="0"/>
                 <a:cs typeface="Helvetica" charset="0"/>
               </a:rPr>
-              <a:t>[13] </a:t>
+              <a:t>[2] A</a:t>
             </a:r>
             <a:r>
               <a:rPr lang="en-US" dirty="0">
@@ -31196,6 +30015,151 @@
                 <a:ea typeface="Helvetica" charset="0"/>
                 <a:cs typeface="Helvetica" charset="0"/>
               </a:rPr>
+              <a:t>. E. </a:t>
+            </a:r>
+            <a:r>
+              <a:rPr lang="en-US" dirty="0" err="1" smtClean="0">
+                <a:solidFill>
+                  <a:schemeClr val="tx1"/>
+                </a:solidFill>
+                <a:latin typeface="Helvetica" charset="0"/>
+                <a:ea typeface="Helvetica" charset="0"/>
+                <a:cs typeface="Helvetica" charset="0"/>
+              </a:rPr>
+              <a:t>Eiben</a:t>
+            </a:r>
+            <a:r>
+              <a:rPr lang="en-US" dirty="0" smtClean="0">
+                <a:solidFill>
+                  <a:schemeClr val="tx1"/>
+                </a:solidFill>
+                <a:latin typeface="Helvetica" charset="0"/>
+                <a:ea typeface="Helvetica" charset="0"/>
+                <a:cs typeface="Helvetica" charset="0"/>
+              </a:rPr>
+              <a:t>, S</a:t>
+            </a:r>
+            <a:r>
+              <a:rPr lang="en-US" dirty="0">
+                <a:solidFill>
+                  <a:schemeClr val="tx1"/>
+                </a:solidFill>
+                <a:latin typeface="Helvetica" charset="0"/>
+                <a:ea typeface="Helvetica" charset="0"/>
+                <a:cs typeface="Helvetica" charset="0"/>
+              </a:rPr>
+              <a:t>. K. </a:t>
+            </a:r>
+            <a:r>
+              <a:rPr lang="en-US" dirty="0" err="1">
+                <a:solidFill>
+                  <a:schemeClr val="tx1"/>
+                </a:solidFill>
+                <a:latin typeface="Helvetica" charset="0"/>
+                <a:ea typeface="Helvetica" charset="0"/>
+                <a:cs typeface="Helvetica" charset="0"/>
+              </a:rPr>
+              <a:t>Smit</a:t>
+            </a:r>
+            <a:r>
+              <a:rPr lang="en-US" dirty="0">
+                <a:solidFill>
+                  <a:schemeClr val="tx1"/>
+                </a:solidFill>
+                <a:latin typeface="Helvetica" charset="0"/>
+                <a:ea typeface="Helvetica" charset="0"/>
+                <a:cs typeface="Helvetica" charset="0"/>
+              </a:rPr>
+              <a:t>. </a:t>
+            </a:r>
+            <a:r>
+              <a:rPr lang="en-US" dirty="0" smtClean="0">
+                <a:solidFill>
+                  <a:schemeClr val="tx1"/>
+                </a:solidFill>
+                <a:latin typeface="Helvetica" charset="0"/>
+                <a:ea typeface="Helvetica" charset="0"/>
+                <a:cs typeface="Helvetica" charset="0"/>
+              </a:rPr>
+              <a:t>“Parameter </a:t>
+            </a:r>
+            <a:r>
+              <a:rPr lang="en-US" dirty="0">
+                <a:solidFill>
+                  <a:schemeClr val="tx1"/>
+                </a:solidFill>
+                <a:latin typeface="Helvetica" charset="0"/>
+                <a:ea typeface="Helvetica" charset="0"/>
+                <a:cs typeface="Helvetica" charset="0"/>
+              </a:rPr>
+              <a:t>tuning for configuring and analyzing evolutionary </a:t>
+            </a:r>
+            <a:r>
+              <a:rPr lang="en-US" dirty="0" smtClean="0">
+                <a:solidFill>
+                  <a:schemeClr val="tx1"/>
+                </a:solidFill>
+                <a:latin typeface="Helvetica" charset="0"/>
+                <a:ea typeface="Helvetica" charset="0"/>
+                <a:cs typeface="Helvetica" charset="0"/>
+              </a:rPr>
+              <a:t>algorithms”. </a:t>
+            </a:r>
+            <a:r>
+              <a:rPr lang="en-US" i="1" dirty="0">
+                <a:solidFill>
+                  <a:schemeClr val="tx1"/>
+                </a:solidFill>
+                <a:latin typeface="Helvetica" charset="0"/>
+                <a:ea typeface="Helvetica" charset="0"/>
+                <a:cs typeface="Helvetica" charset="0"/>
+              </a:rPr>
+              <a:t>Swarm and Evolutionary Computation</a:t>
+            </a:r>
+            <a:r>
+              <a:rPr lang="en-US" dirty="0">
+                <a:solidFill>
+                  <a:schemeClr val="tx1"/>
+                </a:solidFill>
+                <a:latin typeface="Helvetica" charset="0"/>
+                <a:ea typeface="Helvetica" charset="0"/>
+                <a:cs typeface="Helvetica" charset="0"/>
+              </a:rPr>
+              <a:t>, 1(1):19–31, 2011</a:t>
+            </a:r>
+            <a:r>
+              <a:rPr lang="en-US" dirty="0" smtClean="0">
+                <a:solidFill>
+                  <a:schemeClr val="tx1"/>
+                </a:solidFill>
+                <a:latin typeface="Helvetica" charset="0"/>
+                <a:ea typeface="Helvetica" charset="0"/>
+                <a:cs typeface="Helvetica" charset="0"/>
+              </a:rPr>
+              <a:t>.</a:t>
+            </a:r>
+          </a:p>
+          <a:p>
+            <a:r>
+              <a:rPr lang="en-US" dirty="0" smtClean="0">
+                <a:solidFill>
+                  <a:schemeClr val="tx1"/>
+                </a:solidFill>
+                <a:latin typeface="Helvetica" charset="0"/>
+                <a:ea typeface="Helvetica" charset="0"/>
+                <a:cs typeface="Helvetica" charset="0"/>
+              </a:rPr>
+              <a:t>[3] </a:t>
+            </a:r>
+            <a:r>
+              <a:rPr lang="en-US" dirty="0">
+                <a:solidFill>
+                  <a:schemeClr val="tx1"/>
+                </a:solidFill>
+                <a:latin typeface="Helvetica" charset="0"/>
+                <a:ea typeface="Helvetica" charset="0"/>
+                <a:cs typeface="Helvetica" charset="0"/>
+              </a:rPr>
               <a:t>K. Matthias, T. </a:t>
             </a:r>
             <a:r>
@@ -31295,7 +30259,351 @@
                 <a:ea typeface="Helvetica" charset="0"/>
                 <a:cs typeface="Helvetica" charset="0"/>
               </a:rPr>
-              <a:t>, 72(17), 2013</a:t>
+              <a:t>, 72(17), 2013. </a:t>
+            </a:r>
+            <a:endParaRPr lang="en-US" dirty="0" smtClean="0">
+              <a:solidFill>
+                <a:schemeClr val="tx1"/>
+              </a:solidFill>
+              <a:latin typeface="Helvetica" charset="0"/>
+              <a:ea typeface="Helvetica" charset="0"/>
+              <a:cs typeface="Helvetica" charset="0"/>
+            </a:endParaRPr>
+          </a:p>
+          <a:p>
+            <a:r>
+              <a:rPr lang="en-US" dirty="0" smtClean="0">
+                <a:solidFill>
+                  <a:schemeClr val="tx1"/>
+                </a:solidFill>
+                <a:latin typeface="Helvetica" charset="0"/>
+                <a:ea typeface="Helvetica" charset="0"/>
+                <a:cs typeface="Helvetica" charset="0"/>
+              </a:rPr>
+              <a:t>[4] </a:t>
+            </a:r>
+            <a:r>
+              <a:rPr lang="en-US" dirty="0">
+                <a:solidFill>
+                  <a:schemeClr val="tx1"/>
+                </a:solidFill>
+                <a:latin typeface="Helvetica" charset="0"/>
+                <a:ea typeface="Helvetica" charset="0"/>
+                <a:cs typeface="Helvetica" charset="0"/>
+              </a:rPr>
+              <a:t>M. </a:t>
+            </a:r>
+            <a:r>
+              <a:rPr lang="en-US" dirty="0" err="1">
+                <a:solidFill>
+                  <a:schemeClr val="tx1"/>
+                </a:solidFill>
+                <a:latin typeface="Helvetica" charset="0"/>
+                <a:ea typeface="Helvetica" charset="0"/>
+                <a:cs typeface="Helvetica" charset="0"/>
+              </a:rPr>
+              <a:t>Obitko</a:t>
+            </a:r>
+            <a:r>
+              <a:rPr lang="en-US" dirty="0">
+                <a:solidFill>
+                  <a:schemeClr val="tx1"/>
+                </a:solidFill>
+                <a:latin typeface="Helvetica" charset="0"/>
+                <a:ea typeface="Helvetica" charset="0"/>
+                <a:cs typeface="Helvetica" charset="0"/>
+              </a:rPr>
+              <a:t>. </a:t>
+            </a:r>
+            <a:r>
+              <a:rPr lang="en-US" dirty="0" smtClean="0">
+                <a:solidFill>
+                  <a:schemeClr val="tx1"/>
+                </a:solidFill>
+                <a:latin typeface="Helvetica" charset="0"/>
+                <a:ea typeface="Helvetica" charset="0"/>
+                <a:cs typeface="Helvetica" charset="0"/>
+              </a:rPr>
+              <a:t>"Introduction </a:t>
+            </a:r>
+            <a:r>
+              <a:rPr lang="en-US" dirty="0">
+                <a:solidFill>
+                  <a:schemeClr val="tx1"/>
+                </a:solidFill>
+                <a:latin typeface="Helvetica" charset="0"/>
+                <a:ea typeface="Helvetica" charset="0"/>
+                <a:cs typeface="Helvetica" charset="0"/>
+              </a:rPr>
+              <a:t>to genetic algorithms - </a:t>
+            </a:r>
+            <a:r>
+              <a:rPr lang="en-US" dirty="0" smtClean="0">
+                <a:solidFill>
+                  <a:schemeClr val="tx1"/>
+                </a:solidFill>
+                <a:latin typeface="Helvetica" charset="0"/>
+                <a:ea typeface="Helvetica" charset="0"/>
+                <a:cs typeface="Helvetica" charset="0"/>
+              </a:rPr>
+              <a:t>XIII. Recommendations". </a:t>
+            </a:r>
+            <a:r>
+              <a:rPr lang="en-US" dirty="0">
+                <a:solidFill>
+                  <a:srgbClr val="0432FF"/>
+                </a:solidFill>
+                <a:latin typeface="Helvetica" charset="0"/>
+                <a:ea typeface="Helvetica" charset="0"/>
+                <a:cs typeface="Helvetica" charset="0"/>
+                <a:hlinkClick r:id="rId2"/>
+              </a:rPr>
+              <a:t>http://www.obitko.com/tutorials/genetic-algorithms/recommendations.php</a:t>
+            </a:r>
+            <a:r>
+              <a:rPr lang="en-US" dirty="0" smtClean="0">
+                <a:solidFill>
+                  <a:srgbClr val="0432FF"/>
+                </a:solidFill>
+                <a:latin typeface="Helvetica" charset="0"/>
+                <a:ea typeface="Helvetica" charset="0"/>
+                <a:cs typeface="Helvetica" charset="0"/>
+                <a:hlinkClick r:id="rId2"/>
+              </a:rPr>
+              <a:t>/</a:t>
+            </a:r>
+            <a:r>
+              <a:rPr lang="en-US" dirty="0" smtClean="0">
+                <a:solidFill>
+                  <a:srgbClr val="0432FF"/>
+                </a:solidFill>
+                <a:latin typeface="Helvetica" charset="0"/>
+                <a:ea typeface="Helvetica" charset="0"/>
+                <a:cs typeface="Helvetica" charset="0"/>
+              </a:rPr>
+              <a:t> </a:t>
+            </a:r>
+            <a:r>
+              <a:rPr lang="en-US" dirty="0" smtClean="0">
+                <a:solidFill>
+                  <a:schemeClr val="tx1"/>
+                </a:solidFill>
+                <a:latin typeface="Helvetica" charset="0"/>
+                <a:ea typeface="Helvetica" charset="0"/>
+                <a:cs typeface="Helvetica" charset="0"/>
+              </a:rPr>
+              <a:t>[</a:t>
+            </a:r>
+            <a:r>
+              <a:rPr lang="en-US" dirty="0">
+                <a:solidFill>
+                  <a:schemeClr val="tx1"/>
+                </a:solidFill>
+                <a:latin typeface="Helvetica" charset="0"/>
+                <a:ea typeface="Helvetica" charset="0"/>
+                <a:cs typeface="Helvetica" charset="0"/>
+              </a:rPr>
+              <a:t>Online; </a:t>
+            </a:r>
+            <a:r>
+              <a:rPr lang="en-US" dirty="0" err="1">
+                <a:solidFill>
+                  <a:schemeClr val="tx1"/>
+                </a:solidFill>
+                <a:latin typeface="Helvetica" charset="0"/>
+                <a:ea typeface="Helvetica" charset="0"/>
+                <a:cs typeface="Helvetica" charset="0"/>
+              </a:rPr>
+              <a:t>acessado</a:t>
+            </a:r>
+            <a:r>
+              <a:rPr lang="en-US" dirty="0">
+                <a:solidFill>
+                  <a:schemeClr val="tx1"/>
+                </a:solidFill>
+                <a:latin typeface="Helvetica" charset="0"/>
+                <a:ea typeface="Helvetica" charset="0"/>
+                <a:cs typeface="Helvetica" charset="0"/>
+              </a:rPr>
+              <a:t> </a:t>
+            </a:r>
+            <a:r>
+              <a:rPr lang="en-US" dirty="0" err="1">
+                <a:solidFill>
+                  <a:schemeClr val="tx1"/>
+                </a:solidFill>
+                <a:latin typeface="Helvetica" charset="0"/>
+                <a:ea typeface="Helvetica" charset="0"/>
+                <a:cs typeface="Helvetica" charset="0"/>
+              </a:rPr>
+              <a:t>em</a:t>
+            </a:r>
+            <a:r>
+              <a:rPr lang="en-US" dirty="0">
+                <a:solidFill>
+                  <a:schemeClr val="tx1"/>
+                </a:solidFill>
+                <a:latin typeface="Helvetica" charset="0"/>
+                <a:ea typeface="Helvetica" charset="0"/>
+                <a:cs typeface="Helvetica" charset="0"/>
+              </a:rPr>
+              <a:t> 17 de </a:t>
+            </a:r>
+            <a:r>
+              <a:rPr lang="en-US" dirty="0" err="1">
+                <a:solidFill>
+                  <a:schemeClr val="tx1"/>
+                </a:solidFill>
+                <a:latin typeface="Helvetica" charset="0"/>
+                <a:ea typeface="Helvetica" charset="0"/>
+                <a:cs typeface="Helvetica" charset="0"/>
+              </a:rPr>
+              <a:t>novembro</a:t>
+            </a:r>
+            <a:r>
+              <a:rPr lang="en-US" dirty="0">
+                <a:solidFill>
+                  <a:schemeClr val="tx1"/>
+                </a:solidFill>
+                <a:latin typeface="Helvetica" charset="0"/>
+                <a:ea typeface="Helvetica" charset="0"/>
+                <a:cs typeface="Helvetica" charset="0"/>
+              </a:rPr>
+              <a:t> de 2016</a:t>
+            </a:r>
+            <a:r>
+              <a:rPr lang="en-US" dirty="0" smtClean="0">
+                <a:solidFill>
+                  <a:schemeClr val="tx1"/>
+                </a:solidFill>
+                <a:latin typeface="Helvetica" charset="0"/>
+                <a:ea typeface="Helvetica" charset="0"/>
+                <a:cs typeface="Helvetica" charset="0"/>
+              </a:rPr>
+              <a:t>].</a:t>
+            </a:r>
+          </a:p>
+          <a:p>
+            <a:r>
+              <a:rPr lang="en-US" dirty="0" smtClean="0">
+                <a:solidFill>
+                  <a:schemeClr val="tx1"/>
+                </a:solidFill>
+                <a:latin typeface="Helvetica" charset="0"/>
+                <a:ea typeface="Helvetica" charset="0"/>
+                <a:cs typeface="Helvetica" charset="0"/>
+              </a:rPr>
+              <a:t>[5] </a:t>
+            </a:r>
+            <a:r>
+              <a:rPr lang="en-US" dirty="0">
+                <a:solidFill>
+                  <a:schemeClr val="tx1"/>
+                </a:solidFill>
+                <a:latin typeface="Helvetica" charset="0"/>
+                <a:ea typeface="Helvetica" charset="0"/>
+                <a:cs typeface="Helvetica" charset="0"/>
+              </a:rPr>
+              <a:t>K. </a:t>
+            </a:r>
+            <a:r>
+              <a:rPr lang="en-US" dirty="0" err="1">
+                <a:solidFill>
+                  <a:schemeClr val="tx1"/>
+                </a:solidFill>
+                <a:latin typeface="Helvetica" charset="0"/>
+                <a:ea typeface="Helvetica" charset="0"/>
+                <a:cs typeface="Helvetica" charset="0"/>
+              </a:rPr>
+              <a:t>DeJong</a:t>
+            </a:r>
+            <a:r>
+              <a:rPr lang="en-US" dirty="0">
+                <a:solidFill>
+                  <a:schemeClr val="tx1"/>
+                </a:solidFill>
+                <a:latin typeface="Helvetica" charset="0"/>
+                <a:ea typeface="Helvetica" charset="0"/>
+                <a:cs typeface="Helvetica" charset="0"/>
+              </a:rPr>
+              <a:t>. </a:t>
+            </a:r>
+            <a:r>
+              <a:rPr lang="en-US" dirty="0" smtClean="0">
+                <a:solidFill>
+                  <a:schemeClr val="tx1"/>
+                </a:solidFill>
+                <a:latin typeface="Helvetica" charset="0"/>
+                <a:ea typeface="Helvetica" charset="0"/>
+                <a:cs typeface="Helvetica" charset="0"/>
+              </a:rPr>
+              <a:t>“An </a:t>
+            </a:r>
+            <a:r>
+              <a:rPr lang="en-US" dirty="0">
+                <a:solidFill>
+                  <a:schemeClr val="tx1"/>
+                </a:solidFill>
+                <a:latin typeface="Helvetica" charset="0"/>
+                <a:ea typeface="Helvetica" charset="0"/>
+                <a:cs typeface="Helvetica" charset="0"/>
+              </a:rPr>
+              <a:t>analysis of the behavior of a class of genetic adaptive </a:t>
+            </a:r>
+            <a:r>
+              <a:rPr lang="en-US" dirty="0" smtClean="0">
+                <a:solidFill>
+                  <a:schemeClr val="tx1"/>
+                </a:solidFill>
+                <a:latin typeface="Helvetica" charset="0"/>
+                <a:ea typeface="Helvetica" charset="0"/>
+                <a:cs typeface="Helvetica" charset="0"/>
+              </a:rPr>
+              <a:t>systems”. </a:t>
+            </a:r>
+            <a:r>
+              <a:rPr lang="en-US" i="1" dirty="0" smtClean="0">
+                <a:solidFill>
+                  <a:schemeClr val="tx1"/>
+                </a:solidFill>
+                <a:latin typeface="Helvetica" charset="0"/>
+                <a:ea typeface="Helvetica" charset="0"/>
+                <a:cs typeface="Helvetica" charset="0"/>
+              </a:rPr>
+              <a:t>Ph.D</a:t>
+            </a:r>
+            <a:r>
+              <a:rPr lang="en-US" i="1" dirty="0">
+                <a:solidFill>
+                  <a:schemeClr val="tx1"/>
+                </a:solidFill>
+                <a:latin typeface="Helvetica" charset="0"/>
+                <a:ea typeface="Helvetica" charset="0"/>
+                <a:cs typeface="Helvetica" charset="0"/>
+              </a:rPr>
+              <a:t>. </a:t>
+            </a:r>
+            <a:r>
+              <a:rPr lang="en-US" i="1" dirty="0" smtClean="0">
+                <a:solidFill>
+                  <a:schemeClr val="tx1"/>
+                </a:solidFill>
+                <a:latin typeface="Helvetica" charset="0"/>
+                <a:ea typeface="Helvetica" charset="0"/>
+                <a:cs typeface="Helvetica" charset="0"/>
+              </a:rPr>
+              <a:t>Thesis</a:t>
+            </a:r>
+            <a:r>
+              <a:rPr lang="en-US" dirty="0">
+                <a:solidFill>
+                  <a:schemeClr val="tx1"/>
+                </a:solidFill>
+                <a:latin typeface="Helvetica" charset="0"/>
+                <a:ea typeface="Helvetica" charset="0"/>
+                <a:cs typeface="Helvetica" charset="0"/>
+              </a:rPr>
+              <a:t>, University of Michigan, 1975</a:t>
             </a:r>
             <a:r>
               <a:rPr lang="en-US" dirty="0" smtClean="0">
@@ -31307,6 +30615,760 @@
                 <a:cs typeface="Helvetica" charset="0"/>
               </a:rPr>
               <a:t>.</a:t>
+            </a:r>
+            <a:endParaRPr lang="en-US" dirty="0">
+              <a:solidFill>
+                <a:schemeClr val="tx1"/>
+              </a:solidFill>
+              <a:latin typeface="Helvetica" charset="0"/>
+              <a:ea typeface="Helvetica" charset="0"/>
+              <a:cs typeface="Helvetica" charset="0"/>
+            </a:endParaRPr>
+          </a:p>
+          <a:p>
+            <a:endParaRPr lang="en-US" dirty="0"/>
+          </a:p>
+          <a:p>
+            <a:endParaRPr lang="en-US" dirty="0"/>
+          </a:p>
+        </p:txBody>
+      </p:sp>
+      <p:sp>
+        <p:nvSpPr>
+          <p:cNvPr id="5" name="Slide Number Placeholder 4"/>
+          <p:cNvSpPr>
+            <a:spLocks noGrp="1"/>
+          </p:cNvSpPr>
+          <p:nvPr>
+            <p:ph type="sldNum" sz="quarter" idx="12"/>
+          </p:nvPr>
+        </p:nvSpPr>
+        <p:spPr/>
+        <p:txBody>
+          <a:bodyPr/>
+          <a:lstStyle/>
+          <a:p>
+            <a:fld id="{55774153-6BEA-8641-B7A1-86CE42693FE2}" type="slidenum">
+              <a:rPr lang="en-US" smtClean="0"/>
+              <a:t>29</a:t>
+            </a:fld>
+            <a:endParaRPr lang="en-US"/>
+          </a:p>
+        </p:txBody>
+      </p:sp>
+    </p:spTree>
+    <p:extLst>
+      <p:ext uri="{BB962C8B-B14F-4D97-AF65-F5344CB8AC3E}">
+        <p14:creationId xmlns:p14="http://schemas.microsoft.com/office/powerpoint/2010/main" val="530941430"/>
+      </p:ext>
+    </p:extLst>
+  </p:cSld>
+  <p:clrMapOvr>
+    <a:masterClrMapping/>
+  </p:clrMapOvr>
+  <p:timing>
+    <p:tnLst>
+      <p:par>
+        <p:cTn id="1" dur="indefinite" restart="never" nodeType="tmRoot"/>
+      </p:par>
+    </p:tnLst>
+  </p:timing>
+</p:sld>
+</file>
+
+<file path=ppt/slides/slide31.xml><?xml version="1.0" encoding="utf-8"?>
+<p:sld xmlns:a="http://schemas.openxmlformats.org/drawingml/2006/main" xmlns:r="http://schemas.openxmlformats.org/officeDocument/2006/relationships" xmlns:p="http://schemas.openxmlformats.org/presentationml/2006/main">
+  <p:cSld>
+    <p:spTree>
+      <p:nvGrpSpPr>
+        <p:cNvPr id="1" name=""/>
+        <p:cNvGrpSpPr/>
+        <p:nvPr/>
+      </p:nvGrpSpPr>
+      <p:grpSpPr>
+        <a:xfrm>
+          <a:off x="0" y="0"/>
+          <a:ext cx="0" cy="0"/>
+          <a:chOff x="0" y="0"/>
+          <a:chExt cx="0" cy="0"/>
+        </a:xfrm>
+      </p:grpSpPr>
+      <p:sp>
+        <p:nvSpPr>
+          <p:cNvPr id="2" name="Title 1"/>
+          <p:cNvSpPr>
+            <a:spLocks noGrp="1"/>
+          </p:cNvSpPr>
+          <p:nvPr>
+            <p:ph type="title"/>
+          </p:nvPr>
+        </p:nvSpPr>
+        <p:spPr/>
+        <p:txBody>
+          <a:bodyPr/>
+          <a:lstStyle/>
+          <a:p>
+            <a:r>
+              <a:rPr lang="en-US" b="1" dirty="0" err="1" smtClean="0">
+                <a:latin typeface="Helvetica" charset="0"/>
+                <a:ea typeface="Helvetica" charset="0"/>
+                <a:cs typeface="Helvetica" charset="0"/>
+              </a:rPr>
+              <a:t>Referências</a:t>
+            </a:r>
+            <a:endParaRPr lang="en-US" b="1" dirty="0">
+              <a:latin typeface="Helvetica" charset="0"/>
+              <a:ea typeface="Helvetica" charset="0"/>
+              <a:cs typeface="Helvetica" charset="0"/>
+            </a:endParaRPr>
+          </a:p>
+        </p:txBody>
+      </p:sp>
+      <p:sp>
+        <p:nvSpPr>
+          <p:cNvPr id="3" name="Content Placeholder 2"/>
+          <p:cNvSpPr>
+            <a:spLocks noGrp="1"/>
+          </p:cNvSpPr>
+          <p:nvPr>
+            <p:ph idx="1"/>
+          </p:nvPr>
+        </p:nvSpPr>
+        <p:spPr>
+          <a:xfrm>
+            <a:off x="1154954" y="2603500"/>
+            <a:ext cx="10035785" cy="3416300"/>
+          </a:xfrm>
+        </p:spPr>
+        <p:txBody>
+          <a:bodyPr/>
+          <a:lstStyle/>
+          <a:p>
+            <a:r>
+              <a:rPr lang="en-US" dirty="0">
+                <a:solidFill>
+                  <a:schemeClr val="tx1"/>
+                </a:solidFill>
+                <a:latin typeface="Helvetica" charset="0"/>
+                <a:ea typeface="Helvetica" charset="0"/>
+                <a:cs typeface="Helvetica" charset="0"/>
+              </a:rPr>
+              <a:t>[6] </a:t>
+            </a:r>
+            <a:r>
+              <a:rPr lang="en-US" dirty="0" smtClean="0">
+                <a:solidFill>
+                  <a:schemeClr val="tx1"/>
+                </a:solidFill>
+                <a:latin typeface="Helvetica" charset="0"/>
+                <a:ea typeface="Helvetica" charset="0"/>
+                <a:cs typeface="Helvetica" charset="0"/>
+              </a:rPr>
+              <a:t>P</a:t>
+            </a:r>
+            <a:r>
+              <a:rPr lang="en-US" dirty="0">
+                <a:solidFill>
+                  <a:schemeClr val="tx1"/>
+                </a:solidFill>
+                <a:latin typeface="Helvetica" charset="0"/>
+                <a:ea typeface="Helvetica" charset="0"/>
+                <a:cs typeface="Helvetica" charset="0"/>
+              </a:rPr>
+              <a:t>. </a:t>
+            </a:r>
+            <a:r>
+              <a:rPr lang="en-US" dirty="0" err="1">
+                <a:solidFill>
+                  <a:schemeClr val="tx1"/>
+                </a:solidFill>
+                <a:latin typeface="Helvetica" charset="0"/>
+                <a:ea typeface="Helvetica" charset="0"/>
+                <a:cs typeface="Helvetica" charset="0"/>
+              </a:rPr>
+              <a:t>Giguere</a:t>
+            </a:r>
+            <a:r>
+              <a:rPr lang="en-US" dirty="0">
+                <a:solidFill>
+                  <a:schemeClr val="tx1"/>
+                </a:solidFill>
+                <a:latin typeface="Helvetica" charset="0"/>
+                <a:ea typeface="Helvetica" charset="0"/>
+                <a:cs typeface="Helvetica" charset="0"/>
+              </a:rPr>
+              <a:t> and D. E. Goldberg. “Population sizing for optimum sampling with genetic algorithms: A case study of the </a:t>
+            </a:r>
+            <a:r>
+              <a:rPr lang="en-US" dirty="0" err="1">
+                <a:solidFill>
+                  <a:schemeClr val="tx1"/>
+                </a:solidFill>
+                <a:latin typeface="Helvetica" charset="0"/>
+                <a:ea typeface="Helvetica" charset="0"/>
+                <a:cs typeface="Helvetica" charset="0"/>
+              </a:rPr>
+              <a:t>onemax</a:t>
+            </a:r>
+            <a:r>
+              <a:rPr lang="en-US" dirty="0">
+                <a:solidFill>
+                  <a:schemeClr val="tx1"/>
+                </a:solidFill>
+                <a:latin typeface="Helvetica" charset="0"/>
+                <a:ea typeface="Helvetica" charset="0"/>
+                <a:cs typeface="Helvetica" charset="0"/>
+              </a:rPr>
+              <a:t> problem”. </a:t>
+            </a:r>
+            <a:r>
+              <a:rPr lang="en-US" i="1" dirty="0">
+                <a:solidFill>
+                  <a:schemeClr val="tx1"/>
+                </a:solidFill>
+                <a:latin typeface="Helvetica" charset="0"/>
+                <a:ea typeface="Helvetica" charset="0"/>
+                <a:cs typeface="Helvetica" charset="0"/>
+              </a:rPr>
+              <a:t>Genetic Programming</a:t>
+            </a:r>
+            <a:r>
+              <a:rPr lang="en-US" dirty="0">
+                <a:solidFill>
+                  <a:schemeClr val="tx1"/>
+                </a:solidFill>
+                <a:latin typeface="Helvetica" charset="0"/>
+                <a:ea typeface="Helvetica" charset="0"/>
+                <a:cs typeface="Helvetica" charset="0"/>
+              </a:rPr>
+              <a:t>, 98:496–503, 1998. </a:t>
+            </a:r>
+          </a:p>
+          <a:p>
+            <a:r>
+              <a:rPr lang="en-US" dirty="0" smtClean="0">
+                <a:solidFill>
+                  <a:schemeClr val="tx1"/>
+                </a:solidFill>
+                <a:latin typeface="Helvetica" charset="0"/>
+                <a:ea typeface="Helvetica" charset="0"/>
+                <a:cs typeface="Helvetica" charset="0"/>
+              </a:rPr>
+              <a:t>[7]</a:t>
+            </a:r>
+            <a:r>
+              <a:rPr lang="en-US" dirty="0">
+                <a:solidFill>
+                  <a:schemeClr val="tx1"/>
+                </a:solidFill>
+                <a:latin typeface="Helvetica" charset="0"/>
+                <a:ea typeface="Helvetica" charset="0"/>
+                <a:cs typeface="Helvetica" charset="0"/>
+              </a:rPr>
+              <a:t> D. L. Applegate, R. E. Bixby, V. </a:t>
+            </a:r>
+            <a:r>
+              <a:rPr lang="en-US" dirty="0" err="1">
+                <a:solidFill>
+                  <a:schemeClr val="tx1"/>
+                </a:solidFill>
+                <a:latin typeface="Helvetica" charset="0"/>
+                <a:ea typeface="Helvetica" charset="0"/>
+                <a:cs typeface="Helvetica" charset="0"/>
+              </a:rPr>
+              <a:t>Chvatal</a:t>
+            </a:r>
+            <a:r>
+              <a:rPr lang="en-US" dirty="0">
+                <a:solidFill>
+                  <a:schemeClr val="tx1"/>
+                </a:solidFill>
+                <a:latin typeface="Helvetica" charset="0"/>
+                <a:ea typeface="Helvetica" charset="0"/>
+                <a:cs typeface="Helvetica" charset="0"/>
+              </a:rPr>
+              <a:t>, and W. J. Cook. </a:t>
+            </a:r>
+            <a:r>
+              <a:rPr lang="en-US" dirty="0" smtClean="0">
+                <a:solidFill>
+                  <a:schemeClr val="tx1"/>
+                </a:solidFill>
+                <a:latin typeface="Helvetica" charset="0"/>
+                <a:ea typeface="Helvetica" charset="0"/>
+                <a:cs typeface="Helvetica" charset="0"/>
+              </a:rPr>
+              <a:t>"The </a:t>
+            </a:r>
+            <a:r>
+              <a:rPr lang="en-US" dirty="0">
+                <a:solidFill>
+                  <a:schemeClr val="tx1"/>
+                </a:solidFill>
+                <a:latin typeface="Helvetica" charset="0"/>
+                <a:ea typeface="Helvetica" charset="0"/>
+                <a:cs typeface="Helvetica" charset="0"/>
+              </a:rPr>
+              <a:t>Traveling Salesman Problem: a computational </a:t>
+            </a:r>
+            <a:r>
+              <a:rPr lang="en-US" dirty="0" smtClean="0">
+                <a:solidFill>
+                  <a:schemeClr val="tx1"/>
+                </a:solidFill>
+                <a:latin typeface="Helvetica" charset="0"/>
+                <a:ea typeface="Helvetica" charset="0"/>
+                <a:cs typeface="Helvetica" charset="0"/>
+              </a:rPr>
+              <a:t>study". </a:t>
+            </a:r>
+            <a:r>
+              <a:rPr lang="en-US" i="1" dirty="0">
+                <a:solidFill>
+                  <a:schemeClr val="tx1"/>
+                </a:solidFill>
+                <a:latin typeface="Helvetica" charset="0"/>
+                <a:ea typeface="Helvetica" charset="0"/>
+                <a:cs typeface="Helvetica" charset="0"/>
+              </a:rPr>
+              <a:t>Princeton </a:t>
+            </a:r>
+            <a:r>
+              <a:rPr lang="en-US" i="1" dirty="0" smtClean="0">
+                <a:solidFill>
+                  <a:schemeClr val="tx1"/>
+                </a:solidFill>
+                <a:latin typeface="Helvetica" charset="0"/>
+                <a:ea typeface="Helvetica" charset="0"/>
+                <a:cs typeface="Helvetica" charset="0"/>
+              </a:rPr>
+              <a:t>University </a:t>
+            </a:r>
+            <a:r>
+              <a:rPr lang="en-US" i="1" dirty="0">
+                <a:solidFill>
+                  <a:schemeClr val="tx1"/>
+                </a:solidFill>
+                <a:latin typeface="Helvetica" charset="0"/>
+                <a:ea typeface="Helvetica" charset="0"/>
+                <a:cs typeface="Helvetica" charset="0"/>
+              </a:rPr>
+              <a:t>P</a:t>
+            </a:r>
+            <a:r>
+              <a:rPr lang="en-US" i="1" dirty="0" smtClean="0">
+                <a:solidFill>
+                  <a:schemeClr val="tx1"/>
+                </a:solidFill>
+                <a:latin typeface="Helvetica" charset="0"/>
+                <a:ea typeface="Helvetica" charset="0"/>
+                <a:cs typeface="Helvetica" charset="0"/>
+              </a:rPr>
+              <a:t>ress</a:t>
+            </a:r>
+            <a:r>
+              <a:rPr lang="en-US" dirty="0">
+                <a:solidFill>
+                  <a:schemeClr val="tx1"/>
+                </a:solidFill>
+                <a:latin typeface="Helvetica" charset="0"/>
+                <a:ea typeface="Helvetica" charset="0"/>
+                <a:cs typeface="Helvetica" charset="0"/>
+              </a:rPr>
+              <a:t>, 2011. </a:t>
+            </a:r>
+            <a:endParaRPr lang="en-US" dirty="0" smtClean="0">
+              <a:solidFill>
+                <a:schemeClr val="tx1"/>
+              </a:solidFill>
+              <a:latin typeface="Helvetica" charset="0"/>
+              <a:ea typeface="Helvetica" charset="0"/>
+              <a:cs typeface="Helvetica" charset="0"/>
+            </a:endParaRPr>
+          </a:p>
+          <a:p>
+            <a:r>
+              <a:rPr lang="en-US" dirty="0" smtClean="0">
+                <a:solidFill>
+                  <a:schemeClr val="tx1"/>
+                </a:solidFill>
+                <a:latin typeface="Helvetica" charset="0"/>
+                <a:ea typeface="Helvetica" charset="0"/>
+                <a:cs typeface="Helvetica" charset="0"/>
+              </a:rPr>
+              <a:t>[8] </a:t>
+            </a:r>
+            <a:r>
+              <a:rPr lang="en-US" dirty="0">
+                <a:solidFill>
+                  <a:schemeClr val="tx1"/>
+                </a:solidFill>
+                <a:latin typeface="Helvetica" charset="0"/>
+                <a:ea typeface="Helvetica" charset="0"/>
+                <a:cs typeface="Helvetica" charset="0"/>
+              </a:rPr>
+              <a:t>T. H. </a:t>
+            </a:r>
+            <a:r>
+              <a:rPr lang="en-US" dirty="0" err="1">
+                <a:solidFill>
+                  <a:schemeClr val="tx1"/>
+                </a:solidFill>
+                <a:latin typeface="Helvetica" charset="0"/>
+                <a:ea typeface="Helvetica" charset="0"/>
+                <a:cs typeface="Helvetica" charset="0"/>
+              </a:rPr>
+              <a:t>Cormen</a:t>
+            </a:r>
+            <a:r>
+              <a:rPr lang="en-US" dirty="0">
+                <a:solidFill>
+                  <a:schemeClr val="tx1"/>
+                </a:solidFill>
+                <a:latin typeface="Helvetica" charset="0"/>
+                <a:ea typeface="Helvetica" charset="0"/>
+                <a:cs typeface="Helvetica" charset="0"/>
+              </a:rPr>
+              <a:t>, C. E. </a:t>
+            </a:r>
+            <a:r>
+              <a:rPr lang="en-US" dirty="0" err="1">
+                <a:solidFill>
+                  <a:schemeClr val="tx1"/>
+                </a:solidFill>
+                <a:latin typeface="Helvetica" charset="0"/>
+                <a:ea typeface="Helvetica" charset="0"/>
+                <a:cs typeface="Helvetica" charset="0"/>
+              </a:rPr>
+              <a:t>Leiserson</a:t>
+            </a:r>
+            <a:r>
+              <a:rPr lang="en-US" dirty="0">
+                <a:solidFill>
+                  <a:schemeClr val="tx1"/>
+                </a:solidFill>
+                <a:latin typeface="Helvetica" charset="0"/>
+                <a:ea typeface="Helvetica" charset="0"/>
+                <a:cs typeface="Helvetica" charset="0"/>
+              </a:rPr>
+              <a:t>, R. L. </a:t>
+            </a:r>
+            <a:r>
+              <a:rPr lang="en-US" dirty="0" err="1">
+                <a:solidFill>
+                  <a:schemeClr val="tx1"/>
+                </a:solidFill>
+                <a:latin typeface="Helvetica" charset="0"/>
+                <a:ea typeface="Helvetica" charset="0"/>
+                <a:cs typeface="Helvetica" charset="0"/>
+              </a:rPr>
+              <a:t>Rivest</a:t>
+            </a:r>
+            <a:r>
+              <a:rPr lang="en-US" dirty="0">
+                <a:solidFill>
+                  <a:schemeClr val="tx1"/>
+                </a:solidFill>
+                <a:latin typeface="Helvetica" charset="0"/>
+                <a:ea typeface="Helvetica" charset="0"/>
+                <a:cs typeface="Helvetica" charset="0"/>
+              </a:rPr>
+              <a:t>, et al. </a:t>
+            </a:r>
+            <a:r>
+              <a:rPr lang="en-US" dirty="0" smtClean="0">
+                <a:solidFill>
+                  <a:schemeClr val="tx1"/>
+                </a:solidFill>
+                <a:latin typeface="Helvetica" charset="0"/>
+                <a:ea typeface="Helvetica" charset="0"/>
+                <a:cs typeface="Helvetica" charset="0"/>
+              </a:rPr>
+              <a:t>"Section </a:t>
+            </a:r>
+            <a:r>
+              <a:rPr lang="en-US" dirty="0">
+                <a:solidFill>
+                  <a:schemeClr val="tx1"/>
+                </a:solidFill>
+                <a:latin typeface="Helvetica" charset="0"/>
+                <a:ea typeface="Helvetica" charset="0"/>
+                <a:cs typeface="Helvetica" charset="0"/>
+              </a:rPr>
+              <a:t>24.3: </a:t>
+            </a:r>
+            <a:r>
+              <a:rPr lang="en-US" dirty="0" err="1">
+                <a:solidFill>
+                  <a:schemeClr val="tx1"/>
+                </a:solidFill>
+                <a:latin typeface="Helvetica" charset="0"/>
+                <a:ea typeface="Helvetica" charset="0"/>
+                <a:cs typeface="Helvetica" charset="0"/>
+              </a:rPr>
+              <a:t>Dijkstra’s</a:t>
+            </a:r>
+            <a:r>
+              <a:rPr lang="en-US" dirty="0">
+                <a:solidFill>
+                  <a:schemeClr val="tx1"/>
+                </a:solidFill>
+                <a:latin typeface="Helvetica" charset="0"/>
+                <a:ea typeface="Helvetica" charset="0"/>
+                <a:cs typeface="Helvetica" charset="0"/>
+              </a:rPr>
+              <a:t> </a:t>
+            </a:r>
+            <a:r>
+              <a:rPr lang="en-US" dirty="0" smtClean="0">
+                <a:solidFill>
+                  <a:schemeClr val="tx1"/>
+                </a:solidFill>
+                <a:latin typeface="Helvetica" charset="0"/>
+                <a:ea typeface="Helvetica" charset="0"/>
+                <a:cs typeface="Helvetica" charset="0"/>
+              </a:rPr>
+              <a:t>algorithm”. </a:t>
+            </a:r>
+            <a:r>
+              <a:rPr lang="en-US" i="1" dirty="0" smtClean="0">
+                <a:solidFill>
+                  <a:schemeClr val="tx1"/>
+                </a:solidFill>
+                <a:latin typeface="Helvetica" charset="0"/>
+                <a:ea typeface="Helvetica" charset="0"/>
+                <a:cs typeface="Helvetica" charset="0"/>
+              </a:rPr>
+              <a:t>MIT Press </a:t>
+            </a:r>
+            <a:r>
+              <a:rPr lang="en-US" i="1" dirty="0">
+                <a:solidFill>
+                  <a:schemeClr val="tx1"/>
+                </a:solidFill>
+                <a:latin typeface="Helvetica" charset="0"/>
+                <a:ea typeface="Helvetica" charset="0"/>
+                <a:cs typeface="Helvetica" charset="0"/>
+              </a:rPr>
+              <a:t>and McGraw-Hill</a:t>
+            </a:r>
+            <a:r>
+              <a:rPr lang="en-US" dirty="0">
+                <a:solidFill>
+                  <a:schemeClr val="tx1"/>
+                </a:solidFill>
+                <a:latin typeface="Helvetica" charset="0"/>
+                <a:ea typeface="Helvetica" charset="0"/>
+                <a:cs typeface="Helvetica" charset="0"/>
+              </a:rPr>
+              <a:t>, 2001. </a:t>
+            </a:r>
+            <a:endParaRPr lang="en-US" dirty="0" smtClean="0">
+              <a:solidFill>
+                <a:schemeClr val="tx1"/>
+              </a:solidFill>
+              <a:latin typeface="Helvetica" charset="0"/>
+              <a:ea typeface="Helvetica" charset="0"/>
+              <a:cs typeface="Helvetica" charset="0"/>
+            </a:endParaRPr>
+          </a:p>
+          <a:p>
+            <a:r>
+              <a:rPr lang="en-US" dirty="0" smtClean="0">
+                <a:solidFill>
+                  <a:schemeClr val="tx1"/>
+                </a:solidFill>
+                <a:latin typeface="Helvetica" charset="0"/>
+                <a:ea typeface="Helvetica" charset="0"/>
+                <a:cs typeface="Helvetica" charset="0"/>
+              </a:rPr>
+              <a:t>[9] </a:t>
+            </a:r>
+            <a:r>
+              <a:rPr lang="en-US" dirty="0">
+                <a:solidFill>
+                  <a:schemeClr val="tx1"/>
+                </a:solidFill>
+                <a:latin typeface="Helvetica" charset="0"/>
+                <a:ea typeface="Helvetica" charset="0"/>
+                <a:cs typeface="Helvetica" charset="0"/>
+              </a:rPr>
+              <a:t>M. Mitchell. </a:t>
+            </a:r>
+            <a:r>
+              <a:rPr lang="en-US" dirty="0" smtClean="0">
+                <a:solidFill>
+                  <a:schemeClr val="tx1"/>
+                </a:solidFill>
+                <a:latin typeface="Helvetica" charset="0"/>
+                <a:ea typeface="Helvetica" charset="0"/>
+                <a:cs typeface="Helvetica" charset="0"/>
+              </a:rPr>
+              <a:t>"An </a:t>
+            </a:r>
+            <a:r>
+              <a:rPr lang="en-US" dirty="0">
+                <a:solidFill>
+                  <a:schemeClr val="tx1"/>
+                </a:solidFill>
+                <a:latin typeface="Helvetica" charset="0"/>
+                <a:ea typeface="Helvetica" charset="0"/>
+                <a:cs typeface="Helvetica" charset="0"/>
+              </a:rPr>
+              <a:t>introduction to genetic </a:t>
+            </a:r>
+            <a:r>
+              <a:rPr lang="en-US" dirty="0" smtClean="0">
+                <a:solidFill>
+                  <a:schemeClr val="tx1"/>
+                </a:solidFill>
+                <a:latin typeface="Helvetica" charset="0"/>
+                <a:ea typeface="Helvetica" charset="0"/>
+                <a:cs typeface="Helvetica" charset="0"/>
+              </a:rPr>
+              <a:t>algorithms". </a:t>
+            </a:r>
+            <a:r>
+              <a:rPr lang="en-US" i="1" dirty="0">
+                <a:solidFill>
+                  <a:schemeClr val="tx1"/>
+                </a:solidFill>
+                <a:latin typeface="Helvetica" charset="0"/>
+                <a:ea typeface="Helvetica" charset="0"/>
+                <a:cs typeface="Helvetica" charset="0"/>
+              </a:rPr>
+              <a:t>MIT </a:t>
+            </a:r>
+            <a:r>
+              <a:rPr lang="en-US" i="1" dirty="0" smtClean="0">
+                <a:solidFill>
+                  <a:schemeClr val="tx1"/>
+                </a:solidFill>
+                <a:latin typeface="Helvetica" charset="0"/>
+                <a:ea typeface="Helvetica" charset="0"/>
+                <a:cs typeface="Helvetica" charset="0"/>
+              </a:rPr>
+              <a:t>Press</a:t>
+            </a:r>
+            <a:r>
+              <a:rPr lang="en-US" dirty="0">
+                <a:solidFill>
+                  <a:schemeClr val="tx1"/>
+                </a:solidFill>
+                <a:latin typeface="Helvetica" charset="0"/>
+                <a:ea typeface="Helvetica" charset="0"/>
+                <a:cs typeface="Helvetica" charset="0"/>
+              </a:rPr>
+              <a:t>, 1998. </a:t>
+            </a:r>
+            <a:endParaRPr lang="en-US" dirty="0" smtClean="0">
+              <a:solidFill>
+                <a:schemeClr val="tx1"/>
+              </a:solidFill>
+              <a:latin typeface="Helvetica" charset="0"/>
+              <a:ea typeface="Helvetica" charset="0"/>
+              <a:cs typeface="Helvetica" charset="0"/>
+            </a:endParaRPr>
+          </a:p>
+          <a:p>
+            <a:r>
+              <a:rPr lang="en-US" dirty="0" smtClean="0">
+                <a:solidFill>
+                  <a:schemeClr val="tx1"/>
+                </a:solidFill>
+                <a:latin typeface="Helvetica" charset="0"/>
+                <a:ea typeface="Helvetica" charset="0"/>
+                <a:cs typeface="Helvetica" charset="0"/>
+              </a:rPr>
+              <a:t>[10] M</a:t>
+            </a:r>
+            <a:r>
+              <a:rPr lang="en-US" dirty="0">
+                <a:solidFill>
+                  <a:schemeClr val="tx1"/>
+                </a:solidFill>
+                <a:latin typeface="Helvetica" charset="0"/>
+                <a:ea typeface="Helvetica" charset="0"/>
+                <a:cs typeface="Helvetica" charset="0"/>
+              </a:rPr>
+              <a:t>. Srinivas and L. M. </a:t>
+            </a:r>
+            <a:r>
+              <a:rPr lang="en-US" dirty="0" err="1">
+                <a:solidFill>
+                  <a:schemeClr val="tx1"/>
+                </a:solidFill>
+                <a:latin typeface="Helvetica" charset="0"/>
+                <a:ea typeface="Helvetica" charset="0"/>
+                <a:cs typeface="Helvetica" charset="0"/>
+              </a:rPr>
+              <a:t>Patnaik</a:t>
+            </a:r>
+            <a:r>
+              <a:rPr lang="en-US" dirty="0">
+                <a:solidFill>
+                  <a:schemeClr val="tx1"/>
+                </a:solidFill>
+                <a:latin typeface="Helvetica" charset="0"/>
+                <a:ea typeface="Helvetica" charset="0"/>
+                <a:cs typeface="Helvetica" charset="0"/>
+              </a:rPr>
+              <a:t>. </a:t>
+            </a:r>
+            <a:r>
+              <a:rPr lang="en-US" dirty="0" smtClean="0">
+                <a:solidFill>
+                  <a:schemeClr val="tx1"/>
+                </a:solidFill>
+                <a:latin typeface="Helvetica" charset="0"/>
+                <a:ea typeface="Helvetica" charset="0"/>
+                <a:cs typeface="Helvetica" charset="0"/>
+              </a:rPr>
+              <a:t>"Adaptive </a:t>
+            </a:r>
+            <a:r>
+              <a:rPr lang="en-US" dirty="0">
+                <a:solidFill>
+                  <a:schemeClr val="tx1"/>
+                </a:solidFill>
+                <a:latin typeface="Helvetica" charset="0"/>
+                <a:ea typeface="Helvetica" charset="0"/>
+                <a:cs typeface="Helvetica" charset="0"/>
+              </a:rPr>
+              <a:t>probabilities of crossover and mutation in genetic </a:t>
+            </a:r>
+            <a:r>
+              <a:rPr lang="en-US" dirty="0" smtClean="0">
+                <a:solidFill>
+                  <a:schemeClr val="tx1"/>
+                </a:solidFill>
+                <a:latin typeface="Helvetica" charset="0"/>
+                <a:ea typeface="Helvetica" charset="0"/>
+                <a:cs typeface="Helvetica" charset="0"/>
+              </a:rPr>
+              <a:t>algorithms". </a:t>
+            </a:r>
+            <a:r>
+              <a:rPr lang="en-US" i="1" dirty="0">
+                <a:solidFill>
+                  <a:schemeClr val="tx1"/>
+                </a:solidFill>
+                <a:latin typeface="Helvetica" charset="0"/>
+                <a:ea typeface="Helvetica" charset="0"/>
+                <a:cs typeface="Helvetica" charset="0"/>
+              </a:rPr>
+              <a:t>IEEE Transactions on Systems, Man, and Cybernetics</a:t>
+            </a:r>
+            <a:r>
+              <a:rPr lang="en-US" dirty="0">
+                <a:solidFill>
+                  <a:schemeClr val="tx1"/>
+                </a:solidFill>
+                <a:latin typeface="Helvetica" charset="0"/>
+                <a:ea typeface="Helvetica" charset="0"/>
+                <a:cs typeface="Helvetica" charset="0"/>
+              </a:rPr>
+              <a:t>, 24(4):656–667, 1994. </a:t>
             </a:r>
           </a:p>
           <a:p>
@@ -31348,7 +31410,483 @@
           <a:p>
             <a:fld id="{55774153-6BEA-8641-B7A1-86CE42693FE2}" type="slidenum">
               <a:rPr lang="en-US" smtClean="0"/>
-              <a:t>29</a:t>
+              <a:t>30</a:t>
+            </a:fld>
+            <a:endParaRPr lang="en-US"/>
+          </a:p>
+        </p:txBody>
+      </p:sp>
+    </p:spTree>
+    <p:extLst>
+      <p:ext uri="{BB962C8B-B14F-4D97-AF65-F5344CB8AC3E}">
+        <p14:creationId xmlns:p14="http://schemas.microsoft.com/office/powerpoint/2010/main" val="2080831962"/>
+      </p:ext>
+    </p:extLst>
+  </p:cSld>
+  <p:clrMapOvr>
+    <a:masterClrMapping/>
+  </p:clrMapOvr>
+  <p:timing>
+    <p:tnLst>
+      <p:par>
+        <p:cTn id="1" dur="indefinite" restart="never" nodeType="tmRoot"/>
+      </p:par>
+    </p:tnLst>
+  </p:timing>
+</p:sld>
+</file>
+
+<file path=ppt/slides/slide32.xml><?xml version="1.0" encoding="utf-8"?>
+<p:sld xmlns:a="http://schemas.openxmlformats.org/drawingml/2006/main" xmlns:r="http://schemas.openxmlformats.org/officeDocument/2006/relationships" xmlns:p="http://schemas.openxmlformats.org/presentationml/2006/main">
+  <p:cSld>
+    <p:spTree>
+      <p:nvGrpSpPr>
+        <p:cNvPr id="1" name=""/>
+        <p:cNvGrpSpPr/>
+        <p:nvPr/>
+      </p:nvGrpSpPr>
+      <p:grpSpPr>
+        <a:xfrm>
+          <a:off x="0" y="0"/>
+          <a:ext cx="0" cy="0"/>
+          <a:chOff x="0" y="0"/>
+          <a:chExt cx="0" cy="0"/>
+        </a:xfrm>
+      </p:grpSpPr>
+      <p:sp>
+        <p:nvSpPr>
+          <p:cNvPr id="2" name="Title 1"/>
+          <p:cNvSpPr>
+            <a:spLocks noGrp="1"/>
+          </p:cNvSpPr>
+          <p:nvPr>
+            <p:ph type="title"/>
+          </p:nvPr>
+        </p:nvSpPr>
+        <p:spPr/>
+        <p:txBody>
+          <a:bodyPr/>
+          <a:lstStyle/>
+          <a:p>
+            <a:r>
+              <a:rPr lang="en-US" b="1" dirty="0" err="1" smtClean="0">
+                <a:latin typeface="Helvetica" charset="0"/>
+                <a:ea typeface="Helvetica" charset="0"/>
+                <a:cs typeface="Helvetica" charset="0"/>
+              </a:rPr>
+              <a:t>Referências</a:t>
+            </a:r>
+            <a:endParaRPr lang="en-US" b="1" dirty="0">
+              <a:latin typeface="Helvetica" charset="0"/>
+              <a:ea typeface="Helvetica" charset="0"/>
+              <a:cs typeface="Helvetica" charset="0"/>
+            </a:endParaRPr>
+          </a:p>
+        </p:txBody>
+      </p:sp>
+      <p:sp>
+        <p:nvSpPr>
+          <p:cNvPr id="3" name="Content Placeholder 2"/>
+          <p:cNvSpPr>
+            <a:spLocks noGrp="1"/>
+          </p:cNvSpPr>
+          <p:nvPr>
+            <p:ph idx="1"/>
+          </p:nvPr>
+        </p:nvSpPr>
+        <p:spPr>
+          <a:xfrm>
+            <a:off x="1154954" y="2603500"/>
+            <a:ext cx="10035785" cy="3416300"/>
+          </a:xfrm>
+        </p:spPr>
+        <p:txBody>
+          <a:bodyPr/>
+          <a:lstStyle/>
+          <a:p>
+            <a:r>
+              <a:rPr lang="en-US" dirty="0" smtClean="0">
+                <a:solidFill>
+                  <a:schemeClr val="tx1"/>
+                </a:solidFill>
+                <a:latin typeface="Helvetica" charset="0"/>
+                <a:ea typeface="Helvetica" charset="0"/>
+                <a:cs typeface="Helvetica" charset="0"/>
+              </a:rPr>
+              <a:t>[11] </a:t>
+            </a:r>
+            <a:r>
+              <a:rPr lang="en-US" dirty="0">
+                <a:solidFill>
+                  <a:schemeClr val="tx1"/>
+                </a:solidFill>
+                <a:latin typeface="Helvetica" charset="0"/>
+                <a:ea typeface="Helvetica" charset="0"/>
+                <a:cs typeface="Helvetica" charset="0"/>
+              </a:rPr>
+              <a:t>D. </a:t>
+            </a:r>
+            <a:r>
+              <a:rPr lang="en-US" dirty="0" err="1">
+                <a:solidFill>
+                  <a:schemeClr val="tx1"/>
+                </a:solidFill>
+                <a:latin typeface="Helvetica" charset="0"/>
+                <a:ea typeface="Helvetica" charset="0"/>
+                <a:cs typeface="Helvetica" charset="0"/>
+              </a:rPr>
+              <a:t>Jakobovic</a:t>
+            </a:r>
+            <a:r>
+              <a:rPr lang="en-US" dirty="0">
+                <a:solidFill>
+                  <a:schemeClr val="tx1"/>
+                </a:solidFill>
+                <a:latin typeface="Helvetica" charset="0"/>
+                <a:ea typeface="Helvetica" charset="0"/>
+                <a:cs typeface="Helvetica" charset="0"/>
+              </a:rPr>
+              <a:t>́ and M. </a:t>
+            </a:r>
+            <a:r>
+              <a:rPr lang="en-US" dirty="0" err="1">
+                <a:solidFill>
+                  <a:schemeClr val="tx1"/>
+                </a:solidFill>
+                <a:latin typeface="Helvetica" charset="0"/>
+                <a:ea typeface="Helvetica" charset="0"/>
+                <a:cs typeface="Helvetica" charset="0"/>
+              </a:rPr>
+              <a:t>Golub</a:t>
+            </a:r>
+            <a:r>
+              <a:rPr lang="en-US" dirty="0">
+                <a:solidFill>
+                  <a:schemeClr val="tx1"/>
+                </a:solidFill>
+                <a:latin typeface="Helvetica" charset="0"/>
+                <a:ea typeface="Helvetica" charset="0"/>
+                <a:cs typeface="Helvetica" charset="0"/>
+              </a:rPr>
+              <a:t>. </a:t>
+            </a:r>
+            <a:r>
+              <a:rPr lang="en-US" dirty="0" smtClean="0">
+                <a:solidFill>
+                  <a:schemeClr val="tx1"/>
+                </a:solidFill>
+                <a:latin typeface="Helvetica" charset="0"/>
+                <a:ea typeface="Helvetica" charset="0"/>
+                <a:cs typeface="Helvetica" charset="0"/>
+              </a:rPr>
+              <a:t>“Adaptive </a:t>
+            </a:r>
+            <a:r>
+              <a:rPr lang="en-US" dirty="0">
+                <a:solidFill>
+                  <a:schemeClr val="tx1"/>
+                </a:solidFill>
+                <a:latin typeface="Helvetica" charset="0"/>
+                <a:ea typeface="Helvetica" charset="0"/>
+                <a:cs typeface="Helvetica" charset="0"/>
+              </a:rPr>
+              <a:t>G</a:t>
+            </a:r>
+            <a:r>
+              <a:rPr lang="en-US" dirty="0" smtClean="0">
+                <a:solidFill>
+                  <a:schemeClr val="tx1"/>
+                </a:solidFill>
+                <a:latin typeface="Helvetica" charset="0"/>
+                <a:ea typeface="Helvetica" charset="0"/>
+                <a:cs typeface="Helvetica" charset="0"/>
+              </a:rPr>
+              <a:t>enetic Algorithm”. </a:t>
+            </a:r>
+            <a:r>
+              <a:rPr lang="en-US" i="1" dirty="0">
+                <a:solidFill>
+                  <a:schemeClr val="tx1"/>
+                </a:solidFill>
+                <a:latin typeface="Helvetica" charset="0"/>
+                <a:ea typeface="Helvetica" charset="0"/>
+                <a:cs typeface="Helvetica" charset="0"/>
+              </a:rPr>
+              <a:t>CIT. Journal of computing and information technology</a:t>
+            </a:r>
+            <a:r>
+              <a:rPr lang="en-US" dirty="0">
+                <a:solidFill>
+                  <a:schemeClr val="tx1"/>
+                </a:solidFill>
+                <a:latin typeface="Helvetica" charset="0"/>
+                <a:ea typeface="Helvetica" charset="0"/>
+                <a:cs typeface="Helvetica" charset="0"/>
+              </a:rPr>
+              <a:t>, 7(3):229–235, 1999. </a:t>
+            </a:r>
+          </a:p>
+          <a:p>
+            <a:r>
+              <a:rPr lang="en-US" dirty="0" smtClean="0">
+                <a:solidFill>
+                  <a:schemeClr val="tx1"/>
+                </a:solidFill>
+                <a:latin typeface="Helvetica" charset="0"/>
+                <a:ea typeface="Helvetica" charset="0"/>
+                <a:cs typeface="Helvetica" charset="0"/>
+              </a:rPr>
+              <a:t>[12] </a:t>
+            </a:r>
+            <a:r>
+              <a:rPr lang="en-US" dirty="0">
+                <a:solidFill>
+                  <a:schemeClr val="tx1"/>
+                </a:solidFill>
+                <a:latin typeface="Helvetica" charset="0"/>
+                <a:ea typeface="Helvetica" charset="0"/>
+                <a:cs typeface="Helvetica" charset="0"/>
+              </a:rPr>
+              <a:t>L. Wang and T. Shen. </a:t>
+            </a:r>
+            <a:r>
+              <a:rPr lang="en-US" dirty="0" smtClean="0">
+                <a:solidFill>
+                  <a:schemeClr val="tx1"/>
+                </a:solidFill>
+                <a:latin typeface="Helvetica" charset="0"/>
+                <a:ea typeface="Helvetica" charset="0"/>
+                <a:cs typeface="Helvetica" charset="0"/>
+              </a:rPr>
+              <a:t>"Improved </a:t>
+            </a:r>
+            <a:r>
+              <a:rPr lang="en-US" dirty="0">
+                <a:solidFill>
+                  <a:schemeClr val="tx1"/>
+                </a:solidFill>
+                <a:latin typeface="Helvetica" charset="0"/>
+                <a:ea typeface="Helvetica" charset="0"/>
+                <a:cs typeface="Helvetica" charset="0"/>
+              </a:rPr>
+              <a:t>adaptive genetic algorithm and its application to image </a:t>
+            </a:r>
+            <a:r>
+              <a:rPr lang="en-US" dirty="0" smtClean="0">
+                <a:solidFill>
+                  <a:schemeClr val="tx1"/>
+                </a:solidFill>
+                <a:latin typeface="Helvetica" charset="0"/>
+                <a:ea typeface="Helvetica" charset="0"/>
+                <a:cs typeface="Helvetica" charset="0"/>
+              </a:rPr>
+              <a:t>segmentation". </a:t>
+            </a:r>
+            <a:r>
+              <a:rPr lang="en-US" i="1" dirty="0">
+                <a:solidFill>
+                  <a:schemeClr val="tx1"/>
+                </a:solidFill>
+                <a:latin typeface="Helvetica" charset="0"/>
+                <a:ea typeface="Helvetica" charset="0"/>
+                <a:cs typeface="Helvetica" charset="0"/>
+              </a:rPr>
+              <a:t>In Multispectral Image Processing and Pattern Recognition</a:t>
+            </a:r>
+            <a:r>
+              <a:rPr lang="en-US" dirty="0">
+                <a:solidFill>
+                  <a:schemeClr val="tx1"/>
+                </a:solidFill>
+                <a:latin typeface="Helvetica" charset="0"/>
+                <a:ea typeface="Helvetica" charset="0"/>
+                <a:cs typeface="Helvetica" charset="0"/>
+              </a:rPr>
+              <a:t>, pages 115–120. International Society for Optics and Photonics, 2001. </a:t>
+            </a:r>
+            <a:endParaRPr lang="en-US" dirty="0" smtClean="0">
+              <a:solidFill>
+                <a:schemeClr val="tx1"/>
+              </a:solidFill>
+              <a:latin typeface="Helvetica" charset="0"/>
+              <a:ea typeface="Helvetica" charset="0"/>
+              <a:cs typeface="Helvetica" charset="0"/>
+            </a:endParaRPr>
+          </a:p>
+          <a:p>
+            <a:r>
+              <a:rPr lang="en-US" dirty="0" smtClean="0">
+                <a:solidFill>
+                  <a:schemeClr val="tx1"/>
+                </a:solidFill>
+                <a:latin typeface="Helvetica" charset="0"/>
+                <a:ea typeface="Helvetica" charset="0"/>
+                <a:cs typeface="Helvetica" charset="0"/>
+              </a:rPr>
+              <a:t>[13] </a:t>
+            </a:r>
+            <a:r>
+              <a:rPr lang="en-US" dirty="0">
+                <a:solidFill>
+                  <a:schemeClr val="tx1"/>
+                </a:solidFill>
+                <a:latin typeface="Helvetica" charset="0"/>
+                <a:ea typeface="Helvetica" charset="0"/>
+                <a:cs typeface="Helvetica" charset="0"/>
+              </a:rPr>
+              <a:t>K. Matthias, T. </a:t>
+            </a:r>
+            <a:r>
+              <a:rPr lang="en-US" dirty="0" err="1">
+                <a:solidFill>
+                  <a:schemeClr val="tx1"/>
+                </a:solidFill>
+                <a:latin typeface="Helvetica" charset="0"/>
+                <a:ea typeface="Helvetica" charset="0"/>
+                <a:cs typeface="Helvetica" charset="0"/>
+              </a:rPr>
+              <a:t>Severin</a:t>
+            </a:r>
+            <a:r>
+              <a:rPr lang="en-US" dirty="0">
+                <a:solidFill>
+                  <a:schemeClr val="tx1"/>
+                </a:solidFill>
+                <a:latin typeface="Helvetica" charset="0"/>
+                <a:ea typeface="Helvetica" charset="0"/>
+                <a:cs typeface="Helvetica" charset="0"/>
+              </a:rPr>
+              <a:t>, and H. </a:t>
+            </a:r>
+            <a:r>
+              <a:rPr lang="en-US" dirty="0" err="1">
+                <a:solidFill>
+                  <a:schemeClr val="tx1"/>
+                </a:solidFill>
+                <a:latin typeface="Helvetica" charset="0"/>
+                <a:ea typeface="Helvetica" charset="0"/>
+                <a:cs typeface="Helvetica" charset="0"/>
+              </a:rPr>
+              <a:t>Salzwedel</a:t>
+            </a:r>
+            <a:r>
+              <a:rPr lang="en-US" dirty="0">
+                <a:solidFill>
+                  <a:schemeClr val="tx1"/>
+                </a:solidFill>
+                <a:latin typeface="Helvetica" charset="0"/>
+                <a:ea typeface="Helvetica" charset="0"/>
+                <a:cs typeface="Helvetica" charset="0"/>
+              </a:rPr>
+              <a:t>. </a:t>
+            </a:r>
+            <a:r>
+              <a:rPr lang="en-US" dirty="0" smtClean="0">
+                <a:solidFill>
+                  <a:schemeClr val="tx1"/>
+                </a:solidFill>
+                <a:latin typeface="Helvetica" charset="0"/>
+                <a:ea typeface="Helvetica" charset="0"/>
+                <a:cs typeface="Helvetica" charset="0"/>
+              </a:rPr>
+              <a:t>"Variable </a:t>
+            </a:r>
+            <a:r>
+              <a:rPr lang="en-US" dirty="0">
+                <a:solidFill>
+                  <a:schemeClr val="tx1"/>
+                </a:solidFill>
+                <a:latin typeface="Helvetica" charset="0"/>
+                <a:ea typeface="Helvetica" charset="0"/>
+                <a:cs typeface="Helvetica" charset="0"/>
+              </a:rPr>
+              <a:t>mutation rate at genetic algorithms: introduction of chromosome fitness in connection with multi-chromosome </a:t>
+            </a:r>
+            <a:r>
+              <a:rPr lang="en-US" dirty="0" smtClean="0">
+                <a:solidFill>
+                  <a:schemeClr val="tx1"/>
+                </a:solidFill>
+                <a:latin typeface="Helvetica" charset="0"/>
+                <a:ea typeface="Helvetica" charset="0"/>
+                <a:cs typeface="Helvetica" charset="0"/>
+              </a:rPr>
+              <a:t>representation". </a:t>
+            </a:r>
+            <a:r>
+              <a:rPr lang="en-US" i="1" dirty="0">
+                <a:solidFill>
+                  <a:schemeClr val="tx1"/>
+                </a:solidFill>
+                <a:latin typeface="Helvetica" charset="0"/>
+                <a:ea typeface="Helvetica" charset="0"/>
+                <a:cs typeface="Helvetica" charset="0"/>
+              </a:rPr>
+              <a:t>International Journal of Computer Applications</a:t>
+            </a:r>
+            <a:r>
+              <a:rPr lang="en-US" dirty="0">
+                <a:solidFill>
+                  <a:schemeClr val="tx1"/>
+                </a:solidFill>
+                <a:latin typeface="Helvetica" charset="0"/>
+                <a:ea typeface="Helvetica" charset="0"/>
+                <a:cs typeface="Helvetica" charset="0"/>
+              </a:rPr>
+              <a:t>, 72(17), 2013</a:t>
+            </a:r>
+            <a:r>
+              <a:rPr lang="en-US" dirty="0" smtClean="0">
+                <a:solidFill>
+                  <a:schemeClr val="tx1"/>
+                </a:solidFill>
+                <a:latin typeface="Helvetica" charset="0"/>
+                <a:ea typeface="Helvetica" charset="0"/>
+                <a:cs typeface="Helvetica" charset="0"/>
+              </a:rPr>
+              <a:t>.</a:t>
+            </a:r>
+          </a:p>
+          <a:p>
+            <a:endParaRPr lang="en-US" dirty="0">
+              <a:solidFill>
+                <a:schemeClr val="tx1"/>
+              </a:solidFill>
+              <a:latin typeface="Helvetica" charset="0"/>
+              <a:ea typeface="Helvetica" charset="0"/>
+              <a:cs typeface="Helvetica" charset="0"/>
+            </a:endParaRPr>
+          </a:p>
+          <a:p>
+            <a:endParaRPr lang="en-US" dirty="0">
+              <a:solidFill>
+                <a:schemeClr val="tx1"/>
+              </a:solidFill>
+              <a:latin typeface="Helvetica" charset="0"/>
+              <a:ea typeface="Helvetica" charset="0"/>
+              <a:cs typeface="Helvetica" charset="0"/>
+            </a:endParaRPr>
+          </a:p>
+        </p:txBody>
+      </p:sp>
+      <p:sp>
+        <p:nvSpPr>
+          <p:cNvPr id="4" name="Slide Number Placeholder 3"/>
+          <p:cNvSpPr>
+            <a:spLocks noGrp="1"/>
+          </p:cNvSpPr>
+          <p:nvPr>
+            <p:ph type="sldNum" sz="quarter" idx="12"/>
+          </p:nvPr>
+        </p:nvSpPr>
+        <p:spPr/>
+        <p:txBody>
+          <a:bodyPr/>
+          <a:lstStyle/>
+          <a:p>
+            <a:fld id="{55774153-6BEA-8641-B7A1-86CE42693FE2}" type="slidenum">
+              <a:rPr lang="en-US" smtClean="0"/>
+              <a:t>31</a:t>
             </a:fld>
             <a:endParaRPr lang="en-US"/>
           </a:p>

</xml_diff>

<commit_message>
Added future work to presentation
</commit_message>
<xml_diff>
--- a/presentations/TG2_Apresentacao_Cassio.pptx
+++ b/presentations/TG2_Apresentacao_Cassio.pptx
@@ -28659,7 +28659,7 @@
               <a:t> </a:t>
             </a:r>
             <a:r>
-              <a:rPr lang="en-US" b="1" smtClean="0">
+              <a:rPr lang="en-US" b="1" dirty="0" err="1" smtClean="0">
                 <a:latin typeface="Helvetica" charset="0"/>
                 <a:ea typeface="Helvetica" charset="0"/>
                 <a:cs typeface="Helvetica" charset="0"/>
@@ -28697,26 +28697,26 @@
           <a:lstStyle/>
           <a:p>
             <a:r>
-              <a:rPr lang="en-US" dirty="0" err="1">
-                <a:solidFill>
-                  <a:schemeClr val="tx1"/>
-                </a:solidFill>
-                <a:latin typeface="Helvetica" charset="0"/>
-                <a:ea typeface="Helvetica" charset="0"/>
-                <a:cs typeface="Helvetica" charset="0"/>
-              </a:rPr>
-              <a:t>T</a:t>
-            </a:r>
-            <a:r>
-              <a:rPr lang="en-US" dirty="0" err="1" smtClean="0">
-                <a:solidFill>
-                  <a:schemeClr val="tx1"/>
-                </a:solidFill>
-                <a:latin typeface="Helvetica" charset="0"/>
-                <a:ea typeface="Helvetica" charset="0"/>
-                <a:cs typeface="Helvetica" charset="0"/>
-              </a:rPr>
-              <a:t>exto</a:t>
+              <a:rPr lang="en-US" dirty="0" err="1" smtClean="0">
+                <a:solidFill>
+                  <a:schemeClr val="tx1"/>
+                </a:solidFill>
+                <a:latin typeface="Helvetica" charset="0"/>
+                <a:ea typeface="Helvetica" charset="0"/>
+                <a:cs typeface="Helvetica" charset="0"/>
+              </a:rPr>
+              <a:t>An</a:t>
+            </a:r>
+            <a:r>
+              <a:rPr lang="en-US" dirty="0" err="1" smtClean="0">
+                <a:solidFill>
+                  <a:schemeClr val="tx1"/>
+                </a:solidFill>
+                <a:latin typeface="Helvetica" charset="0"/>
+                <a:ea typeface="Helvetica" charset="0"/>
+                <a:cs typeface="Helvetica" charset="0"/>
+              </a:rPr>
+              <a:t>álise</a:t>
             </a:r>
             <a:r>
               <a:rPr lang="en-US" dirty="0" smtClean="0">
@@ -28738,9 +28738,690 @@
                 <a:ea typeface="Helvetica" charset="0"/>
                 <a:cs typeface="Helvetica" charset="0"/>
               </a:rPr>
-              <a:t>aqui</a:t>
-            </a:r>
-            <a:endParaRPr lang="en-US" i="1" baseline="-25000" dirty="0" smtClean="0">
+              <a:t>mais</a:t>
+            </a:r>
+            <a:r>
+              <a:rPr lang="en-US" dirty="0" smtClean="0">
+                <a:solidFill>
+                  <a:schemeClr val="tx1"/>
+                </a:solidFill>
+                <a:latin typeface="Helvetica" charset="0"/>
+                <a:ea typeface="Helvetica" charset="0"/>
+                <a:cs typeface="Helvetica" charset="0"/>
+              </a:rPr>
+              <a:t> </a:t>
+            </a:r>
+            <a:r>
+              <a:rPr lang="en-US" dirty="0" err="1" smtClean="0">
+                <a:solidFill>
+                  <a:schemeClr val="tx1"/>
+                </a:solidFill>
+                <a:latin typeface="Helvetica" charset="0"/>
+                <a:ea typeface="Helvetica" charset="0"/>
+                <a:cs typeface="Helvetica" charset="0"/>
+              </a:rPr>
+              <a:t>detalhada</a:t>
+            </a:r>
+            <a:r>
+              <a:rPr lang="en-US" dirty="0" smtClean="0">
+                <a:solidFill>
+                  <a:schemeClr val="tx1"/>
+                </a:solidFill>
+                <a:latin typeface="Helvetica" charset="0"/>
+                <a:ea typeface="Helvetica" charset="0"/>
+                <a:cs typeface="Helvetica" charset="0"/>
+              </a:rPr>
+              <a:t> do </a:t>
+            </a:r>
+            <a:r>
+              <a:rPr lang="en-US" dirty="0" err="1" smtClean="0">
+                <a:solidFill>
+                  <a:schemeClr val="tx1"/>
+                </a:solidFill>
+                <a:latin typeface="Helvetica" charset="0"/>
+                <a:ea typeface="Helvetica" charset="0"/>
+                <a:cs typeface="Helvetica" charset="0"/>
+              </a:rPr>
+              <a:t>problema</a:t>
+            </a:r>
+            <a:r>
+              <a:rPr lang="en-US" dirty="0" smtClean="0">
+                <a:solidFill>
+                  <a:schemeClr val="tx1"/>
+                </a:solidFill>
+                <a:latin typeface="Helvetica" charset="0"/>
+                <a:ea typeface="Helvetica" charset="0"/>
+                <a:cs typeface="Helvetica" charset="0"/>
+              </a:rPr>
+              <a:t> do </a:t>
+            </a:r>
+            <a:r>
+              <a:rPr lang="en-US" dirty="0" err="1" smtClean="0">
+                <a:solidFill>
+                  <a:schemeClr val="tx1"/>
+                </a:solidFill>
+                <a:latin typeface="Helvetica" charset="0"/>
+                <a:ea typeface="Helvetica" charset="0"/>
+                <a:cs typeface="Helvetica" charset="0"/>
+              </a:rPr>
+              <a:t>OneMax</a:t>
+            </a:r>
+            <a:r>
+              <a:rPr lang="en-US" dirty="0" smtClean="0">
+                <a:solidFill>
+                  <a:schemeClr val="tx1"/>
+                </a:solidFill>
+                <a:latin typeface="Helvetica" charset="0"/>
+                <a:ea typeface="Helvetica" charset="0"/>
+                <a:cs typeface="Helvetica" charset="0"/>
+              </a:rPr>
+              <a:t> Real (</a:t>
+            </a:r>
+            <a:r>
+              <a:rPr lang="en-US" dirty="0" err="1" smtClean="0">
+                <a:solidFill>
+                  <a:schemeClr val="tx1"/>
+                </a:solidFill>
+                <a:latin typeface="Helvetica" charset="0"/>
+                <a:ea typeface="Helvetica" charset="0"/>
+                <a:cs typeface="Helvetica" charset="0"/>
+              </a:rPr>
+              <a:t>interpretação</a:t>
+            </a:r>
+            <a:r>
+              <a:rPr lang="en-US" dirty="0" smtClean="0">
+                <a:solidFill>
+                  <a:schemeClr val="tx1"/>
+                </a:solidFill>
+                <a:latin typeface="Helvetica" charset="0"/>
+                <a:ea typeface="Helvetica" charset="0"/>
+                <a:cs typeface="Helvetica" charset="0"/>
+              </a:rPr>
+              <a:t> </a:t>
+            </a:r>
+            <a:r>
+              <a:rPr lang="en-US" dirty="0" err="1" smtClean="0">
+                <a:solidFill>
+                  <a:schemeClr val="tx1"/>
+                </a:solidFill>
+                <a:latin typeface="Helvetica" charset="0"/>
+                <a:ea typeface="Helvetica" charset="0"/>
+                <a:cs typeface="Helvetica" charset="0"/>
+              </a:rPr>
+              <a:t>matemática</a:t>
+            </a:r>
+            <a:r>
+              <a:rPr lang="en-US" dirty="0" smtClean="0">
+                <a:solidFill>
+                  <a:schemeClr val="tx1"/>
+                </a:solidFill>
+                <a:latin typeface="Helvetica" charset="0"/>
+                <a:ea typeface="Helvetica" charset="0"/>
+                <a:cs typeface="Helvetica" charset="0"/>
+              </a:rPr>
+              <a:t>)</a:t>
+            </a:r>
+            <a:endParaRPr lang="en-US" i="1" baseline="-25000" dirty="0">
+              <a:solidFill>
+                <a:schemeClr val="tx1"/>
+              </a:solidFill>
+              <a:latin typeface="Helvetica" charset="0"/>
+              <a:ea typeface="Helvetica" charset="0"/>
+              <a:cs typeface="Helvetica" charset="0"/>
+            </a:endParaRPr>
+          </a:p>
+          <a:p>
+            <a:r>
+              <a:rPr lang="en-US" dirty="0" err="1" smtClean="0">
+                <a:solidFill>
+                  <a:schemeClr val="tx1"/>
+                </a:solidFill>
+                <a:latin typeface="Helvetica" charset="0"/>
+                <a:ea typeface="Helvetica" charset="0"/>
+                <a:cs typeface="Helvetica" charset="0"/>
+              </a:rPr>
+              <a:t>Comparação</a:t>
+            </a:r>
+            <a:r>
+              <a:rPr lang="en-US" dirty="0" smtClean="0">
+                <a:solidFill>
+                  <a:schemeClr val="tx1"/>
+                </a:solidFill>
+                <a:latin typeface="Helvetica" charset="0"/>
+                <a:ea typeface="Helvetica" charset="0"/>
+                <a:cs typeface="Helvetica" charset="0"/>
+              </a:rPr>
+              <a:t> do </a:t>
+            </a:r>
+            <a:r>
+              <a:rPr lang="en-US" dirty="0" err="1" smtClean="0">
+                <a:solidFill>
+                  <a:schemeClr val="tx1"/>
+                </a:solidFill>
+                <a:latin typeface="Helvetica" charset="0"/>
+                <a:ea typeface="Helvetica" charset="0"/>
+                <a:cs typeface="Helvetica" charset="0"/>
+              </a:rPr>
+              <a:t>problema</a:t>
+            </a:r>
+            <a:r>
+              <a:rPr lang="en-US" dirty="0" smtClean="0">
+                <a:solidFill>
+                  <a:schemeClr val="tx1"/>
+                </a:solidFill>
+                <a:latin typeface="Helvetica" charset="0"/>
+                <a:ea typeface="Helvetica" charset="0"/>
+                <a:cs typeface="Helvetica" charset="0"/>
+              </a:rPr>
+              <a:t> do </a:t>
+            </a:r>
+            <a:r>
+              <a:rPr lang="en-US" dirty="0" err="1" smtClean="0">
+                <a:solidFill>
+                  <a:schemeClr val="tx1"/>
+                </a:solidFill>
+                <a:latin typeface="Helvetica" charset="0"/>
+                <a:ea typeface="Helvetica" charset="0"/>
+                <a:cs typeface="Helvetica" charset="0"/>
+              </a:rPr>
+              <a:t>Caixeiro</a:t>
+            </a:r>
+            <a:r>
+              <a:rPr lang="en-US" dirty="0" smtClean="0">
+                <a:solidFill>
+                  <a:schemeClr val="tx1"/>
+                </a:solidFill>
+                <a:latin typeface="Helvetica" charset="0"/>
+                <a:ea typeface="Helvetica" charset="0"/>
+                <a:cs typeface="Helvetica" charset="0"/>
+              </a:rPr>
+              <a:t> </a:t>
+            </a:r>
+            <a:r>
+              <a:rPr lang="en-US" dirty="0" err="1" smtClean="0">
+                <a:solidFill>
+                  <a:schemeClr val="tx1"/>
+                </a:solidFill>
+                <a:latin typeface="Helvetica" charset="0"/>
+                <a:ea typeface="Helvetica" charset="0"/>
+                <a:cs typeface="Helvetica" charset="0"/>
+              </a:rPr>
+              <a:t>Viajante</a:t>
+            </a:r>
+            <a:r>
+              <a:rPr lang="en-US" dirty="0" smtClean="0">
+                <a:solidFill>
+                  <a:schemeClr val="tx1"/>
+                </a:solidFill>
+                <a:latin typeface="Helvetica" charset="0"/>
+                <a:ea typeface="Helvetica" charset="0"/>
+                <a:cs typeface="Helvetica" charset="0"/>
+              </a:rPr>
+              <a:t> c/genes </a:t>
+            </a:r>
+            <a:r>
+              <a:rPr lang="en-US" dirty="0" err="1" smtClean="0">
+                <a:solidFill>
+                  <a:schemeClr val="tx1"/>
+                </a:solidFill>
+                <a:latin typeface="Helvetica" charset="0"/>
+                <a:ea typeface="Helvetica" charset="0"/>
+                <a:cs typeface="Helvetica" charset="0"/>
+              </a:rPr>
+              <a:t>deste</a:t>
+            </a:r>
+            <a:r>
+              <a:rPr lang="en-US" dirty="0" smtClean="0">
+                <a:solidFill>
+                  <a:schemeClr val="tx1"/>
+                </a:solidFill>
+                <a:latin typeface="Helvetica" charset="0"/>
+                <a:ea typeface="Helvetica" charset="0"/>
+                <a:cs typeface="Helvetica" charset="0"/>
+              </a:rPr>
+              <a:t> </a:t>
+            </a:r>
+            <a:r>
+              <a:rPr lang="en-US" dirty="0" err="1" smtClean="0">
+                <a:solidFill>
+                  <a:schemeClr val="tx1"/>
+                </a:solidFill>
+                <a:latin typeface="Helvetica" charset="0"/>
+                <a:ea typeface="Helvetica" charset="0"/>
+                <a:cs typeface="Helvetica" charset="0"/>
+              </a:rPr>
+              <a:t>trabalho</a:t>
+            </a:r>
+            <a:endParaRPr lang="en-US" dirty="0" smtClean="0">
+              <a:solidFill>
+                <a:schemeClr val="tx1"/>
+              </a:solidFill>
+              <a:latin typeface="Helvetica" charset="0"/>
+              <a:ea typeface="Helvetica" charset="0"/>
+              <a:cs typeface="Helvetica" charset="0"/>
+            </a:endParaRPr>
+          </a:p>
+          <a:p>
+            <a:r>
+              <a:rPr lang="en-US" dirty="0" err="1" smtClean="0">
+                <a:solidFill>
+                  <a:schemeClr val="tx1"/>
+                </a:solidFill>
+                <a:latin typeface="Helvetica" charset="0"/>
+                <a:ea typeface="Helvetica" charset="0"/>
+                <a:cs typeface="Helvetica" charset="0"/>
+              </a:rPr>
+              <a:t>Evoluir</a:t>
+            </a:r>
+            <a:r>
+              <a:rPr lang="en-US" dirty="0" smtClean="0">
+                <a:solidFill>
+                  <a:schemeClr val="tx1"/>
+                </a:solidFill>
+                <a:latin typeface="Helvetica" charset="0"/>
+                <a:ea typeface="Helvetica" charset="0"/>
+                <a:cs typeface="Helvetica" charset="0"/>
+              </a:rPr>
+              <a:t> </a:t>
+            </a:r>
+            <a:r>
+              <a:rPr lang="en-US" dirty="0" err="1" smtClean="0">
+                <a:solidFill>
+                  <a:schemeClr val="tx1"/>
+                </a:solidFill>
+                <a:latin typeface="Helvetica" charset="0"/>
+                <a:ea typeface="Helvetica" charset="0"/>
+                <a:cs typeface="Helvetica" charset="0"/>
+              </a:rPr>
+              <a:t>os</a:t>
+            </a:r>
+            <a:r>
+              <a:rPr lang="en-US" dirty="0" smtClean="0">
+                <a:solidFill>
+                  <a:schemeClr val="tx1"/>
+                </a:solidFill>
+                <a:latin typeface="Helvetica" charset="0"/>
+                <a:ea typeface="Helvetica" charset="0"/>
+                <a:cs typeface="Helvetica" charset="0"/>
+              </a:rPr>
+              <a:t> </a:t>
+            </a:r>
+            <a:r>
+              <a:rPr lang="en-US" dirty="0" err="1" smtClean="0">
+                <a:solidFill>
+                  <a:schemeClr val="tx1"/>
+                </a:solidFill>
+                <a:latin typeface="Helvetica" charset="0"/>
+                <a:ea typeface="Helvetica" charset="0"/>
+                <a:cs typeface="Helvetica" charset="0"/>
+              </a:rPr>
+              <a:t>conceitos</a:t>
+            </a:r>
+            <a:r>
+              <a:rPr lang="en-US" dirty="0" smtClean="0">
+                <a:solidFill>
+                  <a:schemeClr val="tx1"/>
+                </a:solidFill>
+                <a:latin typeface="Helvetica" charset="0"/>
+                <a:ea typeface="Helvetica" charset="0"/>
+                <a:cs typeface="Helvetica" charset="0"/>
+              </a:rPr>
+              <a:t> </a:t>
+            </a:r>
+            <a:r>
+              <a:rPr lang="en-US" dirty="0" err="1" smtClean="0">
+                <a:solidFill>
+                  <a:schemeClr val="tx1"/>
+                </a:solidFill>
+                <a:latin typeface="Helvetica" charset="0"/>
+                <a:ea typeface="Helvetica" charset="0"/>
+                <a:cs typeface="Helvetica" charset="0"/>
+              </a:rPr>
+              <a:t>por</a:t>
+            </a:r>
+            <a:r>
+              <a:rPr lang="en-US" dirty="0" smtClean="0">
+                <a:solidFill>
+                  <a:schemeClr val="tx1"/>
+                </a:solidFill>
+                <a:latin typeface="Helvetica" charset="0"/>
+                <a:ea typeface="Helvetica" charset="0"/>
+                <a:cs typeface="Helvetica" charset="0"/>
+              </a:rPr>
+              <a:t> </a:t>
+            </a:r>
+            <a:r>
+              <a:rPr lang="en-US" dirty="0" err="1" smtClean="0">
+                <a:solidFill>
+                  <a:schemeClr val="tx1"/>
+                </a:solidFill>
+                <a:latin typeface="Helvetica" charset="0"/>
+                <a:ea typeface="Helvetica" charset="0"/>
+                <a:cs typeface="Helvetica" charset="0"/>
+              </a:rPr>
+              <a:t>trás</a:t>
+            </a:r>
+            <a:r>
+              <a:rPr lang="en-US" dirty="0" smtClean="0">
+                <a:solidFill>
+                  <a:schemeClr val="tx1"/>
+                </a:solidFill>
+                <a:latin typeface="Helvetica" charset="0"/>
+                <a:ea typeface="Helvetica" charset="0"/>
+                <a:cs typeface="Helvetica" charset="0"/>
+              </a:rPr>
+              <a:t> do AGA e </a:t>
+            </a:r>
+            <a:r>
+              <a:rPr lang="en-US" dirty="0" err="1" smtClean="0">
+                <a:solidFill>
+                  <a:schemeClr val="tx1"/>
+                </a:solidFill>
+                <a:latin typeface="Helvetica" charset="0"/>
+                <a:ea typeface="Helvetica" charset="0"/>
+                <a:cs typeface="Helvetica" charset="0"/>
+              </a:rPr>
+              <a:t>melhorá</a:t>
+            </a:r>
+            <a:r>
+              <a:rPr lang="en-US" dirty="0" smtClean="0">
+                <a:solidFill>
+                  <a:schemeClr val="tx1"/>
+                </a:solidFill>
+                <a:latin typeface="Helvetica" charset="0"/>
+                <a:ea typeface="Helvetica" charset="0"/>
+                <a:cs typeface="Helvetica" charset="0"/>
+              </a:rPr>
+              <a:t>-lo</a:t>
+            </a:r>
+          </a:p>
+          <a:p>
+            <a:r>
+              <a:rPr lang="en-US" dirty="0" err="1" smtClean="0">
+                <a:solidFill>
+                  <a:schemeClr val="tx1"/>
+                </a:solidFill>
+                <a:latin typeface="Helvetica" charset="0"/>
+                <a:ea typeface="Helvetica" charset="0"/>
+                <a:cs typeface="Helvetica" charset="0"/>
+              </a:rPr>
+              <a:t>Testar</a:t>
+            </a:r>
+            <a:r>
+              <a:rPr lang="en-US" dirty="0" smtClean="0">
+                <a:solidFill>
+                  <a:schemeClr val="tx1"/>
+                </a:solidFill>
+                <a:latin typeface="Helvetica" charset="0"/>
+                <a:ea typeface="Helvetica" charset="0"/>
+                <a:cs typeface="Helvetica" charset="0"/>
+              </a:rPr>
+              <a:t> o AGA junto a </a:t>
+            </a:r>
+            <a:r>
+              <a:rPr lang="en-US" dirty="0" err="1" smtClean="0">
+                <a:solidFill>
+                  <a:schemeClr val="tx1"/>
+                </a:solidFill>
+                <a:latin typeface="Helvetica" charset="0"/>
+                <a:ea typeface="Helvetica" charset="0"/>
+                <a:cs typeface="Helvetica" charset="0"/>
+              </a:rPr>
+              <a:t>mais</a:t>
+            </a:r>
+            <a:r>
+              <a:rPr lang="en-US" dirty="0" smtClean="0">
+                <a:solidFill>
+                  <a:schemeClr val="tx1"/>
+                </a:solidFill>
+                <a:latin typeface="Helvetica" charset="0"/>
+                <a:ea typeface="Helvetica" charset="0"/>
+                <a:cs typeface="Helvetica" charset="0"/>
+              </a:rPr>
+              <a:t> </a:t>
+            </a:r>
+            <a:r>
+              <a:rPr lang="en-US" dirty="0" err="1" smtClean="0">
+                <a:solidFill>
+                  <a:schemeClr val="tx1"/>
+                </a:solidFill>
+                <a:latin typeface="Helvetica" charset="0"/>
+                <a:ea typeface="Helvetica" charset="0"/>
+                <a:cs typeface="Helvetica" charset="0"/>
+              </a:rPr>
+              <a:t>problemas</a:t>
+            </a:r>
+            <a:r>
+              <a:rPr lang="en-US" dirty="0" smtClean="0">
+                <a:solidFill>
+                  <a:schemeClr val="tx1"/>
+                </a:solidFill>
+                <a:latin typeface="Helvetica" charset="0"/>
+                <a:ea typeface="Helvetica" charset="0"/>
+                <a:cs typeface="Helvetica" charset="0"/>
+              </a:rPr>
+              <a:t> (</a:t>
+            </a:r>
+            <a:r>
+              <a:rPr lang="en-US" dirty="0" err="1" smtClean="0">
+                <a:solidFill>
+                  <a:schemeClr val="tx1"/>
+                </a:solidFill>
+                <a:latin typeface="Helvetica" charset="0"/>
+                <a:ea typeface="Helvetica" charset="0"/>
+                <a:cs typeface="Helvetica" charset="0"/>
+              </a:rPr>
+              <a:t>verificar</a:t>
+            </a:r>
+            <a:r>
+              <a:rPr lang="en-US" dirty="0" smtClean="0">
+                <a:solidFill>
+                  <a:schemeClr val="tx1"/>
+                </a:solidFill>
+                <a:latin typeface="Helvetica" charset="0"/>
+                <a:ea typeface="Helvetica" charset="0"/>
+                <a:cs typeface="Helvetica" charset="0"/>
+              </a:rPr>
+              <a:t> </a:t>
+            </a:r>
+            <a:r>
+              <a:rPr lang="en-US" dirty="0" err="1" smtClean="0">
+                <a:solidFill>
+                  <a:schemeClr val="tx1"/>
+                </a:solidFill>
+                <a:latin typeface="Helvetica" charset="0"/>
+                <a:ea typeface="Helvetica" charset="0"/>
+                <a:cs typeface="Helvetica" charset="0"/>
+              </a:rPr>
+              <a:t>prós</a:t>
+            </a:r>
+            <a:r>
+              <a:rPr lang="en-US" dirty="0" smtClean="0">
+                <a:solidFill>
+                  <a:schemeClr val="tx1"/>
+                </a:solidFill>
+                <a:latin typeface="Helvetica" charset="0"/>
+                <a:ea typeface="Helvetica" charset="0"/>
+                <a:cs typeface="Helvetica" charset="0"/>
+              </a:rPr>
+              <a:t>/contras/</a:t>
+            </a:r>
+            <a:r>
+              <a:rPr lang="en-US" dirty="0" err="1" smtClean="0">
+                <a:solidFill>
+                  <a:schemeClr val="tx1"/>
+                </a:solidFill>
+                <a:latin typeface="Helvetica" charset="0"/>
+                <a:ea typeface="Helvetica" charset="0"/>
+                <a:cs typeface="Helvetica" charset="0"/>
+              </a:rPr>
+              <a:t>limitações</a:t>
+            </a:r>
+            <a:r>
+              <a:rPr lang="en-US" dirty="0" smtClean="0">
+                <a:solidFill>
+                  <a:schemeClr val="tx1"/>
+                </a:solidFill>
+                <a:latin typeface="Helvetica" charset="0"/>
+                <a:ea typeface="Helvetica" charset="0"/>
+                <a:cs typeface="Helvetica" charset="0"/>
+              </a:rPr>
+              <a:t>)</a:t>
+            </a:r>
+            <a:endParaRPr lang="en-US" dirty="0" smtClean="0">
+              <a:solidFill>
+                <a:schemeClr val="tx1"/>
+              </a:solidFill>
+              <a:latin typeface="Helvetica" charset="0"/>
+              <a:ea typeface="Helvetica" charset="0"/>
+              <a:cs typeface="Helvetica" charset="0"/>
+            </a:endParaRPr>
+          </a:p>
+          <a:p>
+            <a:r>
+              <a:rPr lang="en-US" dirty="0" err="1" smtClean="0">
+                <a:solidFill>
+                  <a:schemeClr val="tx1"/>
+                </a:solidFill>
+                <a:latin typeface="Helvetica" charset="0"/>
+                <a:ea typeface="Helvetica" charset="0"/>
+                <a:cs typeface="Helvetica" charset="0"/>
+              </a:rPr>
+              <a:t>Organização</a:t>
+            </a:r>
+            <a:r>
+              <a:rPr lang="en-US" dirty="0" smtClean="0">
+                <a:solidFill>
+                  <a:schemeClr val="tx1"/>
+                </a:solidFill>
+                <a:latin typeface="Helvetica" charset="0"/>
+                <a:ea typeface="Helvetica" charset="0"/>
+                <a:cs typeface="Helvetica" charset="0"/>
+              </a:rPr>
+              <a:t> do </a:t>
+            </a:r>
+            <a:r>
+              <a:rPr lang="en-US" dirty="0" err="1" smtClean="0">
+                <a:solidFill>
+                  <a:schemeClr val="tx1"/>
+                </a:solidFill>
+                <a:latin typeface="Helvetica" charset="0"/>
+                <a:ea typeface="Helvetica" charset="0"/>
+                <a:cs typeface="Helvetica" charset="0"/>
+              </a:rPr>
+              <a:t>código</a:t>
+            </a:r>
+            <a:r>
+              <a:rPr lang="en-US" dirty="0" smtClean="0">
+                <a:solidFill>
+                  <a:schemeClr val="tx1"/>
+                </a:solidFill>
+                <a:latin typeface="Helvetica" charset="0"/>
+                <a:ea typeface="Helvetica" charset="0"/>
+                <a:cs typeface="Helvetica" charset="0"/>
+              </a:rPr>
+              <a:t> do AG para </a:t>
+            </a:r>
+            <a:r>
+              <a:rPr lang="en-US" dirty="0" err="1" smtClean="0">
+                <a:solidFill>
+                  <a:schemeClr val="tx1"/>
+                </a:solidFill>
+                <a:latin typeface="Helvetica" charset="0"/>
+                <a:ea typeface="Helvetica" charset="0"/>
+                <a:cs typeface="Helvetica" charset="0"/>
+              </a:rPr>
+              <a:t>comportar</a:t>
+            </a:r>
+            <a:r>
+              <a:rPr lang="en-US" dirty="0" smtClean="0">
+                <a:solidFill>
+                  <a:schemeClr val="tx1"/>
+                </a:solidFill>
+                <a:latin typeface="Helvetica" charset="0"/>
+                <a:ea typeface="Helvetica" charset="0"/>
+                <a:cs typeface="Helvetica" charset="0"/>
+              </a:rPr>
+              <a:t> </a:t>
+            </a:r>
+            <a:r>
+              <a:rPr lang="en-US" dirty="0" err="1" smtClean="0">
+                <a:solidFill>
+                  <a:schemeClr val="tx1"/>
+                </a:solidFill>
+                <a:latin typeface="Helvetica" charset="0"/>
+                <a:ea typeface="Helvetica" charset="0"/>
+                <a:cs typeface="Helvetica" charset="0"/>
+              </a:rPr>
+              <a:t>mais</a:t>
+            </a:r>
+            <a:r>
+              <a:rPr lang="en-US" dirty="0" smtClean="0">
+                <a:solidFill>
+                  <a:schemeClr val="tx1"/>
+                </a:solidFill>
+                <a:latin typeface="Helvetica" charset="0"/>
+                <a:ea typeface="Helvetica" charset="0"/>
+                <a:cs typeface="Helvetica" charset="0"/>
+              </a:rPr>
+              <a:t> </a:t>
+            </a:r>
+            <a:r>
+              <a:rPr lang="en-US" dirty="0" err="1" smtClean="0">
+                <a:solidFill>
+                  <a:schemeClr val="tx1"/>
+                </a:solidFill>
+                <a:latin typeface="Helvetica" charset="0"/>
+                <a:ea typeface="Helvetica" charset="0"/>
+                <a:cs typeface="Helvetica" charset="0"/>
+              </a:rPr>
+              <a:t>problemas</a:t>
+            </a:r>
+            <a:r>
+              <a:rPr lang="en-US" dirty="0" smtClean="0">
+                <a:solidFill>
+                  <a:schemeClr val="tx1"/>
+                </a:solidFill>
+                <a:latin typeface="Helvetica" charset="0"/>
+                <a:ea typeface="Helvetica" charset="0"/>
+                <a:cs typeface="Helvetica" charset="0"/>
+              </a:rPr>
+              <a:t> e </a:t>
+            </a:r>
+            <a:r>
+              <a:rPr lang="en-US" dirty="0" err="1" smtClean="0">
+                <a:solidFill>
+                  <a:schemeClr val="tx1"/>
+                </a:solidFill>
+                <a:latin typeface="Helvetica" charset="0"/>
+                <a:ea typeface="Helvetica" charset="0"/>
+                <a:cs typeface="Helvetica" charset="0"/>
+              </a:rPr>
+              <a:t>diferentes</a:t>
+            </a:r>
+            <a:r>
+              <a:rPr lang="en-US" dirty="0" smtClean="0">
+                <a:solidFill>
+                  <a:schemeClr val="tx1"/>
+                </a:solidFill>
+                <a:latin typeface="Helvetica" charset="0"/>
+                <a:ea typeface="Helvetica" charset="0"/>
+                <a:cs typeface="Helvetica" charset="0"/>
+              </a:rPr>
+              <a:t> </a:t>
+            </a:r>
+            <a:r>
+              <a:rPr lang="en-US" smtClean="0">
+                <a:solidFill>
+                  <a:schemeClr val="tx1"/>
+                </a:solidFill>
+                <a:latin typeface="Helvetica" charset="0"/>
+                <a:ea typeface="Helvetica" charset="0"/>
+                <a:cs typeface="Helvetica" charset="0"/>
+              </a:rPr>
+              <a:t>operadores</a:t>
+            </a:r>
+            <a:endParaRPr lang="en-US" dirty="0" smtClean="0">
               <a:solidFill>
                 <a:schemeClr val="tx1"/>
               </a:solidFill>

</xml_diff>